<commit_message>
Add cross section of PCB differential parameters
</commit_message>
<xml_diff>
--- a/latex_report/Design Picture.pptx
+++ b/latex_report/Design Picture.pptx
@@ -9,6 +9,8 @@
     <p:sldId id="257" r:id="rId3"/>
     <p:sldId id="258" r:id="rId4"/>
     <p:sldId id="259" r:id="rId5"/>
+    <p:sldId id="260" r:id="rId6"/>
+    <p:sldId id="261" r:id="rId7"/>
   </p:sldIdLst>
   <p:sldSz cx="9144000" cy="6858000" type="screen4x3"/>
   <p:notesSz cx="6858000" cy="9144000"/>
@@ -246,7 +248,7 @@
           <a:p>
             <a:fld id="{D6C45EEA-C602-4478-A810-24EF6DA94153}" type="datetimeFigureOut">
               <a:rPr lang="en-US" smtClean="0"/>
-              <a:t>4/25/2016</a:t>
+              <a:t>5/2/2016</a:t>
             </a:fld>
             <a:endParaRPr lang="en-US"/>
           </a:p>
@@ -416,7 +418,7 @@
           <a:p>
             <a:fld id="{D6C45EEA-C602-4478-A810-24EF6DA94153}" type="datetimeFigureOut">
               <a:rPr lang="en-US" smtClean="0"/>
-              <a:t>4/25/2016</a:t>
+              <a:t>5/2/2016</a:t>
             </a:fld>
             <a:endParaRPr lang="en-US"/>
           </a:p>
@@ -596,7 +598,7 @@
           <a:p>
             <a:fld id="{D6C45EEA-C602-4478-A810-24EF6DA94153}" type="datetimeFigureOut">
               <a:rPr lang="en-US" smtClean="0"/>
-              <a:t>4/25/2016</a:t>
+              <a:t>5/2/2016</a:t>
             </a:fld>
             <a:endParaRPr lang="en-US"/>
           </a:p>
@@ -766,7 +768,7 @@
           <a:p>
             <a:fld id="{D6C45EEA-C602-4478-A810-24EF6DA94153}" type="datetimeFigureOut">
               <a:rPr lang="en-US" smtClean="0"/>
-              <a:t>4/25/2016</a:t>
+              <a:t>5/2/2016</a:t>
             </a:fld>
             <a:endParaRPr lang="en-US"/>
           </a:p>
@@ -1010,7 +1012,7 @@
           <a:p>
             <a:fld id="{D6C45EEA-C602-4478-A810-24EF6DA94153}" type="datetimeFigureOut">
               <a:rPr lang="en-US" smtClean="0"/>
-              <a:t>4/25/2016</a:t>
+              <a:t>5/2/2016</a:t>
             </a:fld>
             <a:endParaRPr lang="en-US"/>
           </a:p>
@@ -1242,7 +1244,7 @@
           <a:p>
             <a:fld id="{D6C45EEA-C602-4478-A810-24EF6DA94153}" type="datetimeFigureOut">
               <a:rPr lang="en-US" smtClean="0"/>
-              <a:t>4/25/2016</a:t>
+              <a:t>5/2/2016</a:t>
             </a:fld>
             <a:endParaRPr lang="en-US"/>
           </a:p>
@@ -1609,7 +1611,7 @@
           <a:p>
             <a:fld id="{D6C45EEA-C602-4478-A810-24EF6DA94153}" type="datetimeFigureOut">
               <a:rPr lang="en-US" smtClean="0"/>
-              <a:t>4/25/2016</a:t>
+              <a:t>5/2/2016</a:t>
             </a:fld>
             <a:endParaRPr lang="en-US"/>
           </a:p>
@@ -1727,7 +1729,7 @@
           <a:p>
             <a:fld id="{D6C45EEA-C602-4478-A810-24EF6DA94153}" type="datetimeFigureOut">
               <a:rPr lang="en-US" smtClean="0"/>
-              <a:t>4/25/2016</a:t>
+              <a:t>5/2/2016</a:t>
             </a:fld>
             <a:endParaRPr lang="en-US"/>
           </a:p>
@@ -1822,7 +1824,7 @@
           <a:p>
             <a:fld id="{D6C45EEA-C602-4478-A810-24EF6DA94153}" type="datetimeFigureOut">
               <a:rPr lang="en-US" smtClean="0"/>
-              <a:t>4/25/2016</a:t>
+              <a:t>5/2/2016</a:t>
             </a:fld>
             <a:endParaRPr lang="en-US"/>
           </a:p>
@@ -2099,7 +2101,7 @@
           <a:p>
             <a:fld id="{D6C45EEA-C602-4478-A810-24EF6DA94153}" type="datetimeFigureOut">
               <a:rPr lang="en-US" smtClean="0"/>
-              <a:t>4/25/2016</a:t>
+              <a:t>5/2/2016</a:t>
             </a:fld>
             <a:endParaRPr lang="en-US"/>
           </a:p>
@@ -2356,7 +2358,7 @@
           <a:p>
             <a:fld id="{D6C45EEA-C602-4478-A810-24EF6DA94153}" type="datetimeFigureOut">
               <a:rPr lang="en-US" smtClean="0"/>
-              <a:t>4/25/2016</a:t>
+              <a:t>5/2/2016</a:t>
             </a:fld>
             <a:endParaRPr lang="en-US"/>
           </a:p>
@@ -2569,7 +2571,7 @@
           <a:p>
             <a:fld id="{D6C45EEA-C602-4478-A810-24EF6DA94153}" type="datetimeFigureOut">
               <a:rPr lang="en-US" smtClean="0"/>
-              <a:t>4/25/2016</a:t>
+              <a:t>5/2/2016</a:t>
             </a:fld>
             <a:endParaRPr lang="en-US"/>
           </a:p>
@@ -9800,6 +9802,1440 @@
 </p:sld>
 </file>
 
+<file path=ppt/slides/slide5.xml><?xml version="1.0" encoding="utf-8"?>
+<p:sld xmlns:a="http://schemas.openxmlformats.org/drawingml/2006/main" xmlns:r="http://schemas.openxmlformats.org/officeDocument/2006/relationships" xmlns:p="http://schemas.openxmlformats.org/presentationml/2006/main">
+  <p:cSld>
+    <p:spTree>
+      <p:nvGrpSpPr>
+        <p:cNvPr id="1" name=""/>
+        <p:cNvGrpSpPr/>
+        <p:nvPr/>
+      </p:nvGrpSpPr>
+      <p:grpSpPr>
+        <a:xfrm>
+          <a:off x="0" y="0"/>
+          <a:ext cx="0" cy="0"/>
+          <a:chOff x="0" y="0"/>
+          <a:chExt cx="0" cy="0"/>
+        </a:xfrm>
+      </p:grpSpPr>
+      <p:grpSp>
+        <p:nvGrpSpPr>
+          <p:cNvPr id="25" name="群組 24"/>
+          <p:cNvGrpSpPr/>
+          <p:nvPr/>
+        </p:nvGrpSpPr>
+        <p:grpSpPr>
+          <a:xfrm>
+            <a:off x="3346450" y="2640372"/>
+            <a:ext cx="4067748" cy="1577255"/>
+            <a:chOff x="3346450" y="2640372"/>
+            <a:chExt cx="4067748" cy="1577255"/>
+          </a:xfrm>
+        </p:grpSpPr>
+        <p:pic>
+          <p:nvPicPr>
+            <p:cNvPr id="2" name="圖片 1"/>
+            <p:cNvPicPr>
+              <a:picLocks noChangeAspect="1"/>
+            </p:cNvPicPr>
+            <p:nvPr/>
+          </p:nvPicPr>
+          <p:blipFill rotWithShape="1">
+            <a:blip r:embed="rId2">
+              <a:extLst>
+                <a:ext uri="{28A0092B-C50C-407E-A947-70E740481C1C}">
+                  <a14:useLocalDpi xmlns:a14="http://schemas.microsoft.com/office/drawing/2010/main" val="0"/>
+                </a:ext>
+              </a:extLst>
+            </a:blip>
+            <a:srcRect l="34575" r="22026"/>
+            <a:stretch/>
+          </p:blipFill>
+          <p:spPr>
+            <a:xfrm>
+              <a:off x="3346450" y="2640372"/>
+              <a:ext cx="3448050" cy="1577255"/>
+            </a:xfrm>
+            <a:prstGeom prst="rect">
+              <a:avLst/>
+            </a:prstGeom>
+          </p:spPr>
+        </p:pic>
+        <p:cxnSp>
+          <p:nvCxnSpPr>
+            <p:cNvPr id="3" name="直線單箭頭接點 2"/>
+            <p:cNvCxnSpPr/>
+            <p:nvPr/>
+          </p:nvCxnSpPr>
+          <p:spPr>
+            <a:xfrm>
+              <a:off x="5806193" y="3767138"/>
+              <a:ext cx="0" cy="166928"/>
+            </a:xfrm>
+            <a:prstGeom prst="straightConnector1">
+              <a:avLst/>
+            </a:prstGeom>
+            <a:ln>
+              <a:solidFill>
+                <a:schemeClr val="tx1"/>
+              </a:solidFill>
+              <a:headEnd type="triangle"/>
+              <a:tailEnd type="triangle"/>
+            </a:ln>
+          </p:spPr>
+          <p:style>
+            <a:lnRef idx="1">
+              <a:schemeClr val="accent1"/>
+            </a:lnRef>
+            <a:fillRef idx="0">
+              <a:schemeClr val="accent1"/>
+            </a:fillRef>
+            <a:effectRef idx="0">
+              <a:schemeClr val="accent1"/>
+            </a:effectRef>
+            <a:fontRef idx="minor">
+              <a:schemeClr val="tx1"/>
+            </a:fontRef>
+          </p:style>
+        </p:cxnSp>
+        <p:sp>
+          <p:nvSpPr>
+            <p:cNvPr id="6" name="文字方塊 5"/>
+            <p:cNvSpPr txBox="1"/>
+            <p:nvPr/>
+          </p:nvSpPr>
+          <p:spPr>
+            <a:xfrm>
+              <a:off x="5806193" y="3696713"/>
+              <a:ext cx="795647" cy="307777"/>
+            </a:xfrm>
+            <a:prstGeom prst="rect">
+              <a:avLst/>
+            </a:prstGeom>
+            <a:noFill/>
+          </p:spPr>
+          <p:txBody>
+            <a:bodyPr wrap="square" rtlCol="0">
+              <a:spAutoFit/>
+            </a:bodyPr>
+            <a:lstStyle/>
+            <a:p>
+              <a:r>
+                <a:rPr lang="en-US" sz="1400" b="1" dirty="0" smtClean="0"/>
+                <a:t>19 mil</a:t>
+              </a:r>
+              <a:endParaRPr lang="en-US" sz="1400" b="1" dirty="0"/>
+            </a:p>
+          </p:txBody>
+        </p:sp>
+        <p:cxnSp>
+          <p:nvCxnSpPr>
+            <p:cNvPr id="7" name="直線單箭頭接點 6"/>
+            <p:cNvCxnSpPr/>
+            <p:nvPr/>
+          </p:nvCxnSpPr>
+          <p:spPr>
+            <a:xfrm flipH="1">
+              <a:off x="4940300" y="3691951"/>
+              <a:ext cx="427743" cy="4762"/>
+            </a:xfrm>
+            <a:prstGeom prst="straightConnector1">
+              <a:avLst/>
+            </a:prstGeom>
+            <a:ln>
+              <a:solidFill>
+                <a:schemeClr val="tx1"/>
+              </a:solidFill>
+              <a:headEnd type="triangle"/>
+              <a:tailEnd type="triangle"/>
+            </a:ln>
+          </p:spPr>
+          <p:style>
+            <a:lnRef idx="1">
+              <a:schemeClr val="accent1"/>
+            </a:lnRef>
+            <a:fillRef idx="0">
+              <a:schemeClr val="accent1"/>
+            </a:fillRef>
+            <a:effectRef idx="0">
+              <a:schemeClr val="accent1"/>
+            </a:effectRef>
+            <a:fontRef idx="minor">
+              <a:schemeClr val="tx1"/>
+            </a:fontRef>
+          </p:style>
+        </p:cxnSp>
+        <p:cxnSp>
+          <p:nvCxnSpPr>
+            <p:cNvPr id="9" name="直線單箭頭接點 8"/>
+            <p:cNvCxnSpPr/>
+            <p:nvPr/>
+          </p:nvCxnSpPr>
+          <p:spPr>
+            <a:xfrm flipH="1">
+              <a:off x="4191001" y="3688202"/>
+              <a:ext cx="749299" cy="0"/>
+            </a:xfrm>
+            <a:prstGeom prst="straightConnector1">
+              <a:avLst/>
+            </a:prstGeom>
+            <a:ln>
+              <a:solidFill>
+                <a:schemeClr val="tx1"/>
+              </a:solidFill>
+              <a:headEnd type="triangle"/>
+              <a:tailEnd type="triangle"/>
+            </a:ln>
+          </p:spPr>
+          <p:style>
+            <a:lnRef idx="1">
+              <a:schemeClr val="accent1"/>
+            </a:lnRef>
+            <a:fillRef idx="0">
+              <a:schemeClr val="accent1"/>
+            </a:fillRef>
+            <a:effectRef idx="0">
+              <a:schemeClr val="accent1"/>
+            </a:effectRef>
+            <a:fontRef idx="minor">
+              <a:schemeClr val="tx1"/>
+            </a:fontRef>
+          </p:style>
+        </p:cxnSp>
+        <p:sp>
+          <p:nvSpPr>
+            <p:cNvPr id="10" name="文字方塊 9"/>
+            <p:cNvSpPr txBox="1"/>
+            <p:nvPr/>
+          </p:nvSpPr>
+          <p:spPr>
+            <a:xfrm>
+              <a:off x="4890601" y="3382300"/>
+              <a:ext cx="795647" cy="307777"/>
+            </a:xfrm>
+            <a:prstGeom prst="rect">
+              <a:avLst/>
+            </a:prstGeom>
+            <a:noFill/>
+          </p:spPr>
+          <p:txBody>
+            <a:bodyPr wrap="square" rtlCol="0">
+              <a:spAutoFit/>
+            </a:bodyPr>
+            <a:lstStyle/>
+            <a:p>
+              <a:r>
+                <a:rPr lang="en-US" altLang="zh-TW" sz="1400" b="1" dirty="0" smtClean="0"/>
+                <a:t>40</a:t>
+              </a:r>
+              <a:r>
+                <a:rPr lang="en-US" sz="1400" b="1" dirty="0" smtClean="0"/>
+                <a:t> </a:t>
+              </a:r>
+              <a:r>
+                <a:rPr lang="en-US" sz="1400" b="1" dirty="0" smtClean="0"/>
+                <a:t>mil</a:t>
+              </a:r>
+              <a:endParaRPr lang="en-US" sz="1400" b="1" dirty="0"/>
+            </a:p>
+          </p:txBody>
+        </p:sp>
+        <p:sp>
+          <p:nvSpPr>
+            <p:cNvPr id="12" name="文字方塊 11"/>
+            <p:cNvSpPr txBox="1"/>
+            <p:nvPr/>
+          </p:nvSpPr>
+          <p:spPr>
+            <a:xfrm>
+              <a:off x="4270903" y="3384174"/>
+              <a:ext cx="795647" cy="307777"/>
+            </a:xfrm>
+            <a:prstGeom prst="rect">
+              <a:avLst/>
+            </a:prstGeom>
+            <a:noFill/>
+          </p:spPr>
+          <p:txBody>
+            <a:bodyPr wrap="square" rtlCol="0">
+              <a:spAutoFit/>
+            </a:bodyPr>
+            <a:lstStyle/>
+            <a:p>
+              <a:r>
+                <a:rPr lang="en-US" altLang="zh-TW" sz="1400" b="1" dirty="0" smtClean="0"/>
+                <a:t>80</a:t>
+              </a:r>
+              <a:r>
+                <a:rPr lang="en-US" sz="1400" b="1" dirty="0" smtClean="0"/>
+                <a:t> </a:t>
+              </a:r>
+              <a:r>
+                <a:rPr lang="en-US" sz="1400" b="1" dirty="0" smtClean="0"/>
+                <a:t>mil</a:t>
+              </a:r>
+              <a:endParaRPr lang="en-US" sz="1400" b="1" dirty="0"/>
+            </a:p>
+          </p:txBody>
+        </p:sp>
+        <p:grpSp>
+          <p:nvGrpSpPr>
+            <p:cNvPr id="15" name="群組 14"/>
+            <p:cNvGrpSpPr/>
+            <p:nvPr/>
+          </p:nvGrpSpPr>
+          <p:grpSpPr>
+            <a:xfrm>
+              <a:off x="6820635" y="3726302"/>
+              <a:ext cx="385879" cy="31172"/>
+              <a:chOff x="6075218" y="2826240"/>
+              <a:chExt cx="385879" cy="31172"/>
+            </a:xfrm>
+          </p:grpSpPr>
+          <p:cxnSp>
+            <p:nvCxnSpPr>
+              <p:cNvPr id="13" name="直線接點 12"/>
+              <p:cNvCxnSpPr/>
+              <p:nvPr/>
+            </p:nvCxnSpPr>
+            <p:spPr>
+              <a:xfrm>
+                <a:off x="6075218" y="2826240"/>
+                <a:ext cx="385879" cy="0"/>
+              </a:xfrm>
+              <a:prstGeom prst="line">
+                <a:avLst/>
+              </a:prstGeom>
+              <a:ln>
+                <a:prstDash val="lgDashDot"/>
+              </a:ln>
+            </p:spPr>
+            <p:style>
+              <a:lnRef idx="1">
+                <a:schemeClr val="accent1"/>
+              </a:lnRef>
+              <a:fillRef idx="0">
+                <a:schemeClr val="accent1"/>
+              </a:fillRef>
+              <a:effectRef idx="0">
+                <a:schemeClr val="accent1"/>
+              </a:effectRef>
+              <a:fontRef idx="minor">
+                <a:schemeClr val="tx1"/>
+              </a:fontRef>
+            </p:style>
+          </p:cxnSp>
+          <p:cxnSp>
+            <p:nvCxnSpPr>
+              <p:cNvPr id="14" name="直線接點 13"/>
+              <p:cNvCxnSpPr/>
+              <p:nvPr/>
+            </p:nvCxnSpPr>
+            <p:spPr>
+              <a:xfrm>
+                <a:off x="6075218" y="2857412"/>
+                <a:ext cx="385879" cy="0"/>
+              </a:xfrm>
+              <a:prstGeom prst="line">
+                <a:avLst/>
+              </a:prstGeom>
+              <a:ln>
+                <a:prstDash val="lgDashDot"/>
+              </a:ln>
+            </p:spPr>
+            <p:style>
+              <a:lnRef idx="1">
+                <a:schemeClr val="accent1"/>
+              </a:lnRef>
+              <a:fillRef idx="0">
+                <a:schemeClr val="accent1"/>
+              </a:fillRef>
+              <a:effectRef idx="0">
+                <a:schemeClr val="accent1"/>
+              </a:effectRef>
+              <a:fontRef idx="minor">
+                <a:schemeClr val="tx1"/>
+              </a:fontRef>
+            </p:style>
+          </p:cxnSp>
+        </p:grpSp>
+        <p:grpSp>
+          <p:nvGrpSpPr>
+            <p:cNvPr id="16" name="群組 15"/>
+            <p:cNvGrpSpPr/>
+            <p:nvPr/>
+          </p:nvGrpSpPr>
+          <p:grpSpPr>
+            <a:xfrm>
+              <a:off x="6820635" y="3934066"/>
+              <a:ext cx="385879" cy="31172"/>
+              <a:chOff x="6075218" y="2826240"/>
+              <a:chExt cx="385879" cy="31172"/>
+            </a:xfrm>
+          </p:grpSpPr>
+          <p:cxnSp>
+            <p:nvCxnSpPr>
+              <p:cNvPr id="17" name="直線接點 16"/>
+              <p:cNvCxnSpPr/>
+              <p:nvPr/>
+            </p:nvCxnSpPr>
+            <p:spPr>
+              <a:xfrm>
+                <a:off x="6075218" y="2826240"/>
+                <a:ext cx="385879" cy="0"/>
+              </a:xfrm>
+              <a:prstGeom prst="line">
+                <a:avLst/>
+              </a:prstGeom>
+              <a:ln>
+                <a:prstDash val="lgDashDot"/>
+              </a:ln>
+            </p:spPr>
+            <p:style>
+              <a:lnRef idx="1">
+                <a:schemeClr val="accent1"/>
+              </a:lnRef>
+              <a:fillRef idx="0">
+                <a:schemeClr val="accent1"/>
+              </a:fillRef>
+              <a:effectRef idx="0">
+                <a:schemeClr val="accent1"/>
+              </a:effectRef>
+              <a:fontRef idx="minor">
+                <a:schemeClr val="tx1"/>
+              </a:fontRef>
+            </p:style>
+          </p:cxnSp>
+          <p:cxnSp>
+            <p:nvCxnSpPr>
+              <p:cNvPr id="18" name="直線接點 17"/>
+              <p:cNvCxnSpPr/>
+              <p:nvPr/>
+            </p:nvCxnSpPr>
+            <p:spPr>
+              <a:xfrm>
+                <a:off x="6075218" y="2857412"/>
+                <a:ext cx="385879" cy="0"/>
+              </a:xfrm>
+              <a:prstGeom prst="line">
+                <a:avLst/>
+              </a:prstGeom>
+              <a:ln>
+                <a:prstDash val="lgDashDot"/>
+              </a:ln>
+            </p:spPr>
+            <p:style>
+              <a:lnRef idx="1">
+                <a:schemeClr val="accent1"/>
+              </a:lnRef>
+              <a:fillRef idx="0">
+                <a:schemeClr val="accent1"/>
+              </a:fillRef>
+              <a:effectRef idx="0">
+                <a:schemeClr val="accent1"/>
+              </a:effectRef>
+              <a:fontRef idx="minor">
+                <a:schemeClr val="tx1"/>
+              </a:fontRef>
+            </p:style>
+          </p:cxnSp>
+        </p:grpSp>
+        <p:sp>
+          <p:nvSpPr>
+            <p:cNvPr id="20" name="文字方塊 19"/>
+            <p:cNvSpPr txBox="1"/>
+            <p:nvPr/>
+          </p:nvSpPr>
+          <p:spPr>
+            <a:xfrm>
+              <a:off x="6305946" y="3300640"/>
+              <a:ext cx="795647" cy="307777"/>
+            </a:xfrm>
+            <a:prstGeom prst="rect">
+              <a:avLst/>
+            </a:prstGeom>
+            <a:noFill/>
+          </p:spPr>
+          <p:txBody>
+            <a:bodyPr wrap="square" rtlCol="0">
+              <a:spAutoFit/>
+            </a:bodyPr>
+            <a:lstStyle/>
+            <a:p>
+              <a:r>
+                <a:rPr lang="en-US" sz="1400" b="1" dirty="0" smtClean="0"/>
+                <a:t>1 </a:t>
+              </a:r>
+              <a:r>
+                <a:rPr lang="en-US" sz="1400" b="1" dirty="0" smtClean="0"/>
+                <a:t>mil</a:t>
+              </a:r>
+              <a:endParaRPr lang="en-US" sz="1400" b="1" dirty="0"/>
+            </a:p>
+          </p:txBody>
+        </p:sp>
+        <p:sp>
+          <p:nvSpPr>
+            <p:cNvPr id="23" name="手繪多邊形 22"/>
+            <p:cNvSpPr/>
+            <p:nvPr/>
+          </p:nvSpPr>
+          <p:spPr>
+            <a:xfrm>
+              <a:off x="6794500" y="3467099"/>
+              <a:ext cx="494590" cy="294653"/>
+            </a:xfrm>
+            <a:custGeom>
+              <a:avLst/>
+              <a:gdLst>
+                <a:gd name="connsiteX0" fmla="*/ 0 w 393834"/>
+                <a:gd name="connsiteY0" fmla="*/ 0 h 342900"/>
+                <a:gd name="connsiteX1" fmla="*/ 298450 w 393834"/>
+                <a:gd name="connsiteY1" fmla="*/ 82550 h 342900"/>
+                <a:gd name="connsiteX2" fmla="*/ 374650 w 393834"/>
+                <a:gd name="connsiteY2" fmla="*/ 158750 h 342900"/>
+                <a:gd name="connsiteX3" fmla="*/ 393700 w 393834"/>
+                <a:gd name="connsiteY3" fmla="*/ 228600 h 342900"/>
+                <a:gd name="connsiteX4" fmla="*/ 381000 w 393834"/>
+                <a:gd name="connsiteY4" fmla="*/ 285750 h 342900"/>
+                <a:gd name="connsiteX5" fmla="*/ 342900 w 393834"/>
+                <a:gd name="connsiteY5" fmla="*/ 342900 h 342900"/>
+              </a:gdLst>
+              <a:ahLst/>
+              <a:cxnLst>
+                <a:cxn ang="0">
+                  <a:pos x="connsiteX0" y="connsiteY0"/>
+                </a:cxn>
+                <a:cxn ang="0">
+                  <a:pos x="connsiteX1" y="connsiteY1"/>
+                </a:cxn>
+                <a:cxn ang="0">
+                  <a:pos x="connsiteX2" y="connsiteY2"/>
+                </a:cxn>
+                <a:cxn ang="0">
+                  <a:pos x="connsiteX3" y="connsiteY3"/>
+                </a:cxn>
+                <a:cxn ang="0">
+                  <a:pos x="connsiteX4" y="connsiteY4"/>
+                </a:cxn>
+                <a:cxn ang="0">
+                  <a:pos x="connsiteX5" y="connsiteY5"/>
+                </a:cxn>
+              </a:cxnLst>
+              <a:rect l="l" t="t" r="r" b="b"/>
+              <a:pathLst>
+                <a:path w="393834" h="342900">
+                  <a:moveTo>
+                    <a:pt x="0" y="0"/>
+                  </a:moveTo>
+                  <a:cubicBezTo>
+                    <a:pt x="118004" y="28046"/>
+                    <a:pt x="236008" y="56092"/>
+                    <a:pt x="298450" y="82550"/>
+                  </a:cubicBezTo>
+                  <a:cubicBezTo>
+                    <a:pt x="360892" y="109008"/>
+                    <a:pt x="358775" y="134408"/>
+                    <a:pt x="374650" y="158750"/>
+                  </a:cubicBezTo>
+                  <a:cubicBezTo>
+                    <a:pt x="390525" y="183092"/>
+                    <a:pt x="392642" y="207433"/>
+                    <a:pt x="393700" y="228600"/>
+                  </a:cubicBezTo>
+                  <a:cubicBezTo>
+                    <a:pt x="394758" y="249767"/>
+                    <a:pt x="389467" y="266700"/>
+                    <a:pt x="381000" y="285750"/>
+                  </a:cubicBezTo>
+                  <a:cubicBezTo>
+                    <a:pt x="372533" y="304800"/>
+                    <a:pt x="357716" y="323850"/>
+                    <a:pt x="342900" y="342900"/>
+                  </a:cubicBezTo>
+                </a:path>
+              </a:pathLst>
+            </a:custGeom>
+            <a:noFill/>
+            <a:ln>
+              <a:solidFill>
+                <a:schemeClr val="tx1"/>
+              </a:solidFill>
+              <a:tailEnd type="triangle"/>
+            </a:ln>
+          </p:spPr>
+          <p:style>
+            <a:lnRef idx="2">
+              <a:schemeClr val="accent1">
+                <a:shade val="50000"/>
+              </a:schemeClr>
+            </a:lnRef>
+            <a:fillRef idx="1">
+              <a:schemeClr val="accent1"/>
+            </a:fillRef>
+            <a:effectRef idx="0">
+              <a:schemeClr val="accent1"/>
+            </a:effectRef>
+            <a:fontRef idx="minor">
+              <a:schemeClr val="lt1"/>
+            </a:fontRef>
+          </p:style>
+          <p:txBody>
+            <a:bodyPr rtlCol="0" anchor="ctr"/>
+            <a:lstStyle/>
+            <a:p>
+              <a:pPr algn="ctr"/>
+              <a:endParaRPr lang="en-US"/>
+            </a:p>
+          </p:txBody>
+        </p:sp>
+        <p:sp>
+          <p:nvSpPr>
+            <p:cNvPr id="24" name="手繪多邊形 23"/>
+            <p:cNvSpPr/>
+            <p:nvPr/>
+          </p:nvSpPr>
+          <p:spPr>
+            <a:xfrm>
+              <a:off x="6804660" y="3413760"/>
+              <a:ext cx="609538" cy="552235"/>
+            </a:xfrm>
+            <a:custGeom>
+              <a:avLst/>
+              <a:gdLst>
+                <a:gd name="connsiteX0" fmla="*/ 0 w 585787"/>
+                <a:gd name="connsiteY0" fmla="*/ 0 h 552235"/>
+                <a:gd name="connsiteX1" fmla="*/ 304800 w 585787"/>
+                <a:gd name="connsiteY1" fmla="*/ 45720 h 552235"/>
+                <a:gd name="connsiteX2" fmla="*/ 556260 w 585787"/>
+                <a:gd name="connsiteY2" fmla="*/ 167640 h 552235"/>
+                <a:gd name="connsiteX3" fmla="*/ 571500 w 585787"/>
+                <a:gd name="connsiteY3" fmla="*/ 365760 h 552235"/>
+                <a:gd name="connsiteX4" fmla="*/ 472440 w 585787"/>
+                <a:gd name="connsiteY4" fmla="*/ 533400 h 552235"/>
+                <a:gd name="connsiteX5" fmla="*/ 434340 w 585787"/>
+                <a:gd name="connsiteY5" fmla="*/ 541020 h 552235"/>
+              </a:gdLst>
+              <a:ahLst/>
+              <a:cxnLst>
+                <a:cxn ang="0">
+                  <a:pos x="connsiteX0" y="connsiteY0"/>
+                </a:cxn>
+                <a:cxn ang="0">
+                  <a:pos x="connsiteX1" y="connsiteY1"/>
+                </a:cxn>
+                <a:cxn ang="0">
+                  <a:pos x="connsiteX2" y="connsiteY2"/>
+                </a:cxn>
+                <a:cxn ang="0">
+                  <a:pos x="connsiteX3" y="connsiteY3"/>
+                </a:cxn>
+                <a:cxn ang="0">
+                  <a:pos x="connsiteX4" y="connsiteY4"/>
+                </a:cxn>
+                <a:cxn ang="0">
+                  <a:pos x="connsiteX5" y="connsiteY5"/>
+                </a:cxn>
+              </a:cxnLst>
+              <a:rect l="l" t="t" r="r" b="b"/>
+              <a:pathLst>
+                <a:path w="585787" h="552235">
+                  <a:moveTo>
+                    <a:pt x="0" y="0"/>
+                  </a:moveTo>
+                  <a:cubicBezTo>
+                    <a:pt x="106045" y="8890"/>
+                    <a:pt x="212090" y="17780"/>
+                    <a:pt x="304800" y="45720"/>
+                  </a:cubicBezTo>
+                  <a:cubicBezTo>
+                    <a:pt x="397510" y="73660"/>
+                    <a:pt x="511810" y="114300"/>
+                    <a:pt x="556260" y="167640"/>
+                  </a:cubicBezTo>
+                  <a:cubicBezTo>
+                    <a:pt x="600710" y="220980"/>
+                    <a:pt x="585470" y="304800"/>
+                    <a:pt x="571500" y="365760"/>
+                  </a:cubicBezTo>
+                  <a:cubicBezTo>
+                    <a:pt x="557530" y="426720"/>
+                    <a:pt x="495300" y="504190"/>
+                    <a:pt x="472440" y="533400"/>
+                  </a:cubicBezTo>
+                  <a:cubicBezTo>
+                    <a:pt x="449580" y="562610"/>
+                    <a:pt x="441960" y="551815"/>
+                    <a:pt x="434340" y="541020"/>
+                  </a:cubicBezTo>
+                </a:path>
+              </a:pathLst>
+            </a:custGeom>
+            <a:noFill/>
+            <a:ln>
+              <a:solidFill>
+                <a:schemeClr val="tx1"/>
+              </a:solidFill>
+              <a:tailEnd type="triangle"/>
+            </a:ln>
+          </p:spPr>
+          <p:style>
+            <a:lnRef idx="2">
+              <a:schemeClr val="accent1">
+                <a:shade val="50000"/>
+              </a:schemeClr>
+            </a:lnRef>
+            <a:fillRef idx="1">
+              <a:schemeClr val="accent1"/>
+            </a:fillRef>
+            <a:effectRef idx="0">
+              <a:schemeClr val="accent1"/>
+            </a:effectRef>
+            <a:fontRef idx="minor">
+              <a:schemeClr val="lt1"/>
+            </a:fontRef>
+          </p:style>
+          <p:txBody>
+            <a:bodyPr rtlCol="0" anchor="ctr"/>
+            <a:lstStyle/>
+            <a:p>
+              <a:pPr algn="ctr"/>
+              <a:endParaRPr lang="en-US"/>
+            </a:p>
+          </p:txBody>
+        </p:sp>
+      </p:grpSp>
+    </p:spTree>
+    <p:extLst>
+      <p:ext uri="{BB962C8B-B14F-4D97-AF65-F5344CB8AC3E}">
+        <p14:creationId xmlns:p14="http://schemas.microsoft.com/office/powerpoint/2010/main" val="3641200871"/>
+      </p:ext>
+    </p:extLst>
+  </p:cSld>
+  <p:clrMapOvr>
+    <a:masterClrMapping/>
+  </p:clrMapOvr>
+</p:sld>
+</file>
+
+<file path=ppt/slides/slide6.xml><?xml version="1.0" encoding="utf-8"?>
+<p:sld xmlns:a="http://schemas.openxmlformats.org/drawingml/2006/main" xmlns:r="http://schemas.openxmlformats.org/officeDocument/2006/relationships" xmlns:p="http://schemas.openxmlformats.org/presentationml/2006/main">
+  <p:cSld>
+    <p:spTree>
+      <p:nvGrpSpPr>
+        <p:cNvPr id="1" name=""/>
+        <p:cNvGrpSpPr/>
+        <p:nvPr/>
+      </p:nvGrpSpPr>
+      <p:grpSpPr>
+        <a:xfrm>
+          <a:off x="0" y="0"/>
+          <a:ext cx="0" cy="0"/>
+          <a:chOff x="0" y="0"/>
+          <a:chExt cx="0" cy="0"/>
+        </a:xfrm>
+      </p:grpSpPr>
+      <p:grpSp>
+        <p:nvGrpSpPr>
+          <p:cNvPr id="2" name="群組 1"/>
+          <p:cNvGrpSpPr/>
+          <p:nvPr/>
+        </p:nvGrpSpPr>
+        <p:grpSpPr>
+          <a:xfrm>
+            <a:off x="3346450" y="2640372"/>
+            <a:ext cx="4067748" cy="1577255"/>
+            <a:chOff x="3346450" y="2640372"/>
+            <a:chExt cx="4067748" cy="1577255"/>
+          </a:xfrm>
+        </p:grpSpPr>
+        <p:pic>
+          <p:nvPicPr>
+            <p:cNvPr id="3" name="圖片 2"/>
+            <p:cNvPicPr>
+              <a:picLocks noChangeAspect="1"/>
+            </p:cNvPicPr>
+            <p:nvPr/>
+          </p:nvPicPr>
+          <p:blipFill rotWithShape="1">
+            <a:blip r:embed="rId2">
+              <a:extLst>
+                <a:ext uri="{28A0092B-C50C-407E-A947-70E740481C1C}">
+                  <a14:useLocalDpi xmlns:a14="http://schemas.microsoft.com/office/drawing/2010/main" val="0"/>
+                </a:ext>
+              </a:extLst>
+            </a:blip>
+            <a:srcRect l="34575" r="22026"/>
+            <a:stretch/>
+          </p:blipFill>
+          <p:spPr>
+            <a:xfrm>
+              <a:off x="3346450" y="2640372"/>
+              <a:ext cx="3448050" cy="1577255"/>
+            </a:xfrm>
+            <a:prstGeom prst="rect">
+              <a:avLst/>
+            </a:prstGeom>
+          </p:spPr>
+        </p:pic>
+        <p:cxnSp>
+          <p:nvCxnSpPr>
+            <p:cNvPr id="4" name="直線單箭頭接點 3"/>
+            <p:cNvCxnSpPr/>
+            <p:nvPr/>
+          </p:nvCxnSpPr>
+          <p:spPr>
+            <a:xfrm>
+              <a:off x="5806193" y="3767138"/>
+              <a:ext cx="0" cy="166928"/>
+            </a:xfrm>
+            <a:prstGeom prst="straightConnector1">
+              <a:avLst/>
+            </a:prstGeom>
+            <a:ln>
+              <a:solidFill>
+                <a:schemeClr val="tx1"/>
+              </a:solidFill>
+              <a:headEnd type="triangle"/>
+              <a:tailEnd type="triangle"/>
+            </a:ln>
+          </p:spPr>
+          <p:style>
+            <a:lnRef idx="1">
+              <a:schemeClr val="accent1"/>
+            </a:lnRef>
+            <a:fillRef idx="0">
+              <a:schemeClr val="accent1"/>
+            </a:fillRef>
+            <a:effectRef idx="0">
+              <a:schemeClr val="accent1"/>
+            </a:effectRef>
+            <a:fontRef idx="minor">
+              <a:schemeClr val="tx1"/>
+            </a:fontRef>
+          </p:style>
+        </p:cxnSp>
+        <p:sp>
+          <p:nvSpPr>
+            <p:cNvPr id="5" name="文字方塊 4"/>
+            <p:cNvSpPr txBox="1"/>
+            <p:nvPr/>
+          </p:nvSpPr>
+          <p:spPr>
+            <a:xfrm>
+              <a:off x="5806193" y="3696713"/>
+              <a:ext cx="795647" cy="307777"/>
+            </a:xfrm>
+            <a:prstGeom prst="rect">
+              <a:avLst/>
+            </a:prstGeom>
+            <a:noFill/>
+          </p:spPr>
+          <p:txBody>
+            <a:bodyPr wrap="square" rtlCol="0">
+              <a:spAutoFit/>
+            </a:bodyPr>
+            <a:lstStyle/>
+            <a:p>
+              <a:r>
+                <a:rPr lang="en-US" sz="1400" b="1" dirty="0" smtClean="0"/>
+                <a:t>19 mil</a:t>
+              </a:r>
+              <a:endParaRPr lang="en-US" sz="1400" b="1" dirty="0"/>
+            </a:p>
+          </p:txBody>
+        </p:sp>
+        <p:cxnSp>
+          <p:nvCxnSpPr>
+            <p:cNvPr id="6" name="直線單箭頭接點 5"/>
+            <p:cNvCxnSpPr/>
+            <p:nvPr/>
+          </p:nvCxnSpPr>
+          <p:spPr>
+            <a:xfrm flipH="1">
+              <a:off x="4940300" y="3691951"/>
+              <a:ext cx="427743" cy="4762"/>
+            </a:xfrm>
+            <a:prstGeom prst="straightConnector1">
+              <a:avLst/>
+            </a:prstGeom>
+            <a:ln>
+              <a:solidFill>
+                <a:schemeClr val="tx1"/>
+              </a:solidFill>
+              <a:headEnd type="triangle"/>
+              <a:tailEnd type="triangle"/>
+            </a:ln>
+          </p:spPr>
+          <p:style>
+            <a:lnRef idx="1">
+              <a:schemeClr val="accent1"/>
+            </a:lnRef>
+            <a:fillRef idx="0">
+              <a:schemeClr val="accent1"/>
+            </a:fillRef>
+            <a:effectRef idx="0">
+              <a:schemeClr val="accent1"/>
+            </a:effectRef>
+            <a:fontRef idx="minor">
+              <a:schemeClr val="tx1"/>
+            </a:fontRef>
+          </p:style>
+        </p:cxnSp>
+        <p:cxnSp>
+          <p:nvCxnSpPr>
+            <p:cNvPr id="7" name="直線單箭頭接點 6"/>
+            <p:cNvCxnSpPr/>
+            <p:nvPr/>
+          </p:nvCxnSpPr>
+          <p:spPr>
+            <a:xfrm flipH="1">
+              <a:off x="4191001" y="3688202"/>
+              <a:ext cx="749299" cy="0"/>
+            </a:xfrm>
+            <a:prstGeom prst="straightConnector1">
+              <a:avLst/>
+            </a:prstGeom>
+            <a:ln>
+              <a:solidFill>
+                <a:schemeClr val="tx1"/>
+              </a:solidFill>
+              <a:headEnd type="triangle"/>
+              <a:tailEnd type="triangle"/>
+            </a:ln>
+          </p:spPr>
+          <p:style>
+            <a:lnRef idx="1">
+              <a:schemeClr val="accent1"/>
+            </a:lnRef>
+            <a:fillRef idx="0">
+              <a:schemeClr val="accent1"/>
+            </a:fillRef>
+            <a:effectRef idx="0">
+              <a:schemeClr val="accent1"/>
+            </a:effectRef>
+            <a:fontRef idx="minor">
+              <a:schemeClr val="tx1"/>
+            </a:fontRef>
+          </p:style>
+        </p:cxnSp>
+        <p:sp>
+          <p:nvSpPr>
+            <p:cNvPr id="8" name="文字方塊 7"/>
+            <p:cNvSpPr txBox="1"/>
+            <p:nvPr/>
+          </p:nvSpPr>
+          <p:spPr>
+            <a:xfrm>
+              <a:off x="4890601" y="3382300"/>
+              <a:ext cx="795647" cy="307777"/>
+            </a:xfrm>
+            <a:prstGeom prst="rect">
+              <a:avLst/>
+            </a:prstGeom>
+            <a:noFill/>
+          </p:spPr>
+          <p:txBody>
+            <a:bodyPr wrap="square" rtlCol="0">
+              <a:spAutoFit/>
+            </a:bodyPr>
+            <a:lstStyle/>
+            <a:p>
+              <a:r>
+                <a:rPr lang="en-US" altLang="zh-TW" sz="1400" b="1" dirty="0" smtClean="0"/>
+                <a:t>40</a:t>
+              </a:r>
+              <a:r>
+                <a:rPr lang="en-US" sz="1400" b="1" dirty="0" smtClean="0"/>
+                <a:t> </a:t>
+              </a:r>
+              <a:r>
+                <a:rPr lang="en-US" sz="1400" b="1" dirty="0" smtClean="0"/>
+                <a:t>mil</a:t>
+              </a:r>
+              <a:endParaRPr lang="en-US" sz="1400" b="1" dirty="0"/>
+            </a:p>
+          </p:txBody>
+        </p:sp>
+        <p:sp>
+          <p:nvSpPr>
+            <p:cNvPr id="9" name="文字方塊 8"/>
+            <p:cNvSpPr txBox="1"/>
+            <p:nvPr/>
+          </p:nvSpPr>
+          <p:spPr>
+            <a:xfrm>
+              <a:off x="4270903" y="3384174"/>
+              <a:ext cx="795647" cy="307777"/>
+            </a:xfrm>
+            <a:prstGeom prst="rect">
+              <a:avLst/>
+            </a:prstGeom>
+            <a:noFill/>
+          </p:spPr>
+          <p:txBody>
+            <a:bodyPr wrap="square" rtlCol="0">
+              <a:spAutoFit/>
+            </a:bodyPr>
+            <a:lstStyle/>
+            <a:p>
+              <a:r>
+                <a:rPr lang="en-US" altLang="zh-TW" sz="1400" b="1" dirty="0" smtClean="0"/>
+                <a:t>80</a:t>
+              </a:r>
+              <a:r>
+                <a:rPr lang="en-US" sz="1400" b="1" dirty="0" smtClean="0"/>
+                <a:t> </a:t>
+              </a:r>
+              <a:r>
+                <a:rPr lang="en-US" sz="1400" b="1" dirty="0" smtClean="0"/>
+                <a:t>mil</a:t>
+              </a:r>
+              <a:endParaRPr lang="en-US" sz="1400" b="1" dirty="0"/>
+            </a:p>
+          </p:txBody>
+        </p:sp>
+        <p:grpSp>
+          <p:nvGrpSpPr>
+            <p:cNvPr id="10" name="群組 9"/>
+            <p:cNvGrpSpPr/>
+            <p:nvPr/>
+          </p:nvGrpSpPr>
+          <p:grpSpPr>
+            <a:xfrm>
+              <a:off x="6820635" y="3726302"/>
+              <a:ext cx="385879" cy="31172"/>
+              <a:chOff x="6075218" y="2826240"/>
+              <a:chExt cx="385879" cy="31172"/>
+            </a:xfrm>
+          </p:grpSpPr>
+          <p:cxnSp>
+            <p:nvCxnSpPr>
+              <p:cNvPr id="17" name="直線接點 16"/>
+              <p:cNvCxnSpPr/>
+              <p:nvPr/>
+            </p:nvCxnSpPr>
+            <p:spPr>
+              <a:xfrm>
+                <a:off x="6075218" y="2826240"/>
+                <a:ext cx="385879" cy="0"/>
+              </a:xfrm>
+              <a:prstGeom prst="line">
+                <a:avLst/>
+              </a:prstGeom>
+              <a:ln>
+                <a:prstDash val="lgDashDot"/>
+              </a:ln>
+            </p:spPr>
+            <p:style>
+              <a:lnRef idx="1">
+                <a:schemeClr val="accent1"/>
+              </a:lnRef>
+              <a:fillRef idx="0">
+                <a:schemeClr val="accent1"/>
+              </a:fillRef>
+              <a:effectRef idx="0">
+                <a:schemeClr val="accent1"/>
+              </a:effectRef>
+              <a:fontRef idx="minor">
+                <a:schemeClr val="tx1"/>
+              </a:fontRef>
+            </p:style>
+          </p:cxnSp>
+          <p:cxnSp>
+            <p:nvCxnSpPr>
+              <p:cNvPr id="18" name="直線接點 17"/>
+              <p:cNvCxnSpPr/>
+              <p:nvPr/>
+            </p:nvCxnSpPr>
+            <p:spPr>
+              <a:xfrm>
+                <a:off x="6075218" y="2857412"/>
+                <a:ext cx="385879" cy="0"/>
+              </a:xfrm>
+              <a:prstGeom prst="line">
+                <a:avLst/>
+              </a:prstGeom>
+              <a:ln>
+                <a:prstDash val="lgDashDot"/>
+              </a:ln>
+            </p:spPr>
+            <p:style>
+              <a:lnRef idx="1">
+                <a:schemeClr val="accent1"/>
+              </a:lnRef>
+              <a:fillRef idx="0">
+                <a:schemeClr val="accent1"/>
+              </a:fillRef>
+              <a:effectRef idx="0">
+                <a:schemeClr val="accent1"/>
+              </a:effectRef>
+              <a:fontRef idx="minor">
+                <a:schemeClr val="tx1"/>
+              </a:fontRef>
+            </p:style>
+          </p:cxnSp>
+        </p:grpSp>
+        <p:grpSp>
+          <p:nvGrpSpPr>
+            <p:cNvPr id="11" name="群組 10"/>
+            <p:cNvGrpSpPr/>
+            <p:nvPr/>
+          </p:nvGrpSpPr>
+          <p:grpSpPr>
+            <a:xfrm>
+              <a:off x="6820635" y="3934066"/>
+              <a:ext cx="385879" cy="31172"/>
+              <a:chOff x="6075218" y="2826240"/>
+              <a:chExt cx="385879" cy="31172"/>
+            </a:xfrm>
+          </p:grpSpPr>
+          <p:cxnSp>
+            <p:nvCxnSpPr>
+              <p:cNvPr id="15" name="直線接點 14"/>
+              <p:cNvCxnSpPr/>
+              <p:nvPr/>
+            </p:nvCxnSpPr>
+            <p:spPr>
+              <a:xfrm>
+                <a:off x="6075218" y="2826240"/>
+                <a:ext cx="385879" cy="0"/>
+              </a:xfrm>
+              <a:prstGeom prst="line">
+                <a:avLst/>
+              </a:prstGeom>
+              <a:ln>
+                <a:prstDash val="lgDashDot"/>
+              </a:ln>
+            </p:spPr>
+            <p:style>
+              <a:lnRef idx="1">
+                <a:schemeClr val="accent1"/>
+              </a:lnRef>
+              <a:fillRef idx="0">
+                <a:schemeClr val="accent1"/>
+              </a:fillRef>
+              <a:effectRef idx="0">
+                <a:schemeClr val="accent1"/>
+              </a:effectRef>
+              <a:fontRef idx="minor">
+                <a:schemeClr val="tx1"/>
+              </a:fontRef>
+            </p:style>
+          </p:cxnSp>
+          <p:cxnSp>
+            <p:nvCxnSpPr>
+              <p:cNvPr id="16" name="直線接點 15"/>
+              <p:cNvCxnSpPr/>
+              <p:nvPr/>
+            </p:nvCxnSpPr>
+            <p:spPr>
+              <a:xfrm>
+                <a:off x="6075218" y="2857412"/>
+                <a:ext cx="385879" cy="0"/>
+              </a:xfrm>
+              <a:prstGeom prst="line">
+                <a:avLst/>
+              </a:prstGeom>
+              <a:ln>
+                <a:prstDash val="lgDashDot"/>
+              </a:ln>
+            </p:spPr>
+            <p:style>
+              <a:lnRef idx="1">
+                <a:schemeClr val="accent1"/>
+              </a:lnRef>
+              <a:fillRef idx="0">
+                <a:schemeClr val="accent1"/>
+              </a:fillRef>
+              <a:effectRef idx="0">
+                <a:schemeClr val="accent1"/>
+              </a:effectRef>
+              <a:fontRef idx="minor">
+                <a:schemeClr val="tx1"/>
+              </a:fontRef>
+            </p:style>
+          </p:cxnSp>
+        </p:grpSp>
+        <p:sp>
+          <p:nvSpPr>
+            <p:cNvPr id="12" name="文字方塊 11"/>
+            <p:cNvSpPr txBox="1"/>
+            <p:nvPr/>
+          </p:nvSpPr>
+          <p:spPr>
+            <a:xfrm>
+              <a:off x="6305946" y="3300640"/>
+              <a:ext cx="795647" cy="307777"/>
+            </a:xfrm>
+            <a:prstGeom prst="rect">
+              <a:avLst/>
+            </a:prstGeom>
+            <a:noFill/>
+          </p:spPr>
+          <p:txBody>
+            <a:bodyPr wrap="square" rtlCol="0">
+              <a:spAutoFit/>
+            </a:bodyPr>
+            <a:lstStyle/>
+            <a:p>
+              <a:r>
+                <a:rPr lang="en-US" sz="1400" b="1" dirty="0" smtClean="0"/>
+                <a:t>1 </a:t>
+              </a:r>
+              <a:r>
+                <a:rPr lang="en-US" sz="1400" b="1" dirty="0" smtClean="0"/>
+                <a:t>mil</a:t>
+              </a:r>
+              <a:endParaRPr lang="en-US" sz="1400" b="1" dirty="0"/>
+            </a:p>
+          </p:txBody>
+        </p:sp>
+        <p:sp>
+          <p:nvSpPr>
+            <p:cNvPr id="13" name="手繪多邊形 12"/>
+            <p:cNvSpPr/>
+            <p:nvPr/>
+          </p:nvSpPr>
+          <p:spPr>
+            <a:xfrm>
+              <a:off x="6794500" y="3467099"/>
+              <a:ext cx="494590" cy="294653"/>
+            </a:xfrm>
+            <a:custGeom>
+              <a:avLst/>
+              <a:gdLst>
+                <a:gd name="connsiteX0" fmla="*/ 0 w 393834"/>
+                <a:gd name="connsiteY0" fmla="*/ 0 h 342900"/>
+                <a:gd name="connsiteX1" fmla="*/ 298450 w 393834"/>
+                <a:gd name="connsiteY1" fmla="*/ 82550 h 342900"/>
+                <a:gd name="connsiteX2" fmla="*/ 374650 w 393834"/>
+                <a:gd name="connsiteY2" fmla="*/ 158750 h 342900"/>
+                <a:gd name="connsiteX3" fmla="*/ 393700 w 393834"/>
+                <a:gd name="connsiteY3" fmla="*/ 228600 h 342900"/>
+                <a:gd name="connsiteX4" fmla="*/ 381000 w 393834"/>
+                <a:gd name="connsiteY4" fmla="*/ 285750 h 342900"/>
+                <a:gd name="connsiteX5" fmla="*/ 342900 w 393834"/>
+                <a:gd name="connsiteY5" fmla="*/ 342900 h 342900"/>
+              </a:gdLst>
+              <a:ahLst/>
+              <a:cxnLst>
+                <a:cxn ang="0">
+                  <a:pos x="connsiteX0" y="connsiteY0"/>
+                </a:cxn>
+                <a:cxn ang="0">
+                  <a:pos x="connsiteX1" y="connsiteY1"/>
+                </a:cxn>
+                <a:cxn ang="0">
+                  <a:pos x="connsiteX2" y="connsiteY2"/>
+                </a:cxn>
+                <a:cxn ang="0">
+                  <a:pos x="connsiteX3" y="connsiteY3"/>
+                </a:cxn>
+                <a:cxn ang="0">
+                  <a:pos x="connsiteX4" y="connsiteY4"/>
+                </a:cxn>
+                <a:cxn ang="0">
+                  <a:pos x="connsiteX5" y="connsiteY5"/>
+                </a:cxn>
+              </a:cxnLst>
+              <a:rect l="l" t="t" r="r" b="b"/>
+              <a:pathLst>
+                <a:path w="393834" h="342900">
+                  <a:moveTo>
+                    <a:pt x="0" y="0"/>
+                  </a:moveTo>
+                  <a:cubicBezTo>
+                    <a:pt x="118004" y="28046"/>
+                    <a:pt x="236008" y="56092"/>
+                    <a:pt x="298450" y="82550"/>
+                  </a:cubicBezTo>
+                  <a:cubicBezTo>
+                    <a:pt x="360892" y="109008"/>
+                    <a:pt x="358775" y="134408"/>
+                    <a:pt x="374650" y="158750"/>
+                  </a:cubicBezTo>
+                  <a:cubicBezTo>
+                    <a:pt x="390525" y="183092"/>
+                    <a:pt x="392642" y="207433"/>
+                    <a:pt x="393700" y="228600"/>
+                  </a:cubicBezTo>
+                  <a:cubicBezTo>
+                    <a:pt x="394758" y="249767"/>
+                    <a:pt x="389467" y="266700"/>
+                    <a:pt x="381000" y="285750"/>
+                  </a:cubicBezTo>
+                  <a:cubicBezTo>
+                    <a:pt x="372533" y="304800"/>
+                    <a:pt x="357716" y="323850"/>
+                    <a:pt x="342900" y="342900"/>
+                  </a:cubicBezTo>
+                </a:path>
+              </a:pathLst>
+            </a:custGeom>
+            <a:noFill/>
+            <a:ln>
+              <a:solidFill>
+                <a:schemeClr val="tx1"/>
+              </a:solidFill>
+              <a:tailEnd type="triangle"/>
+            </a:ln>
+          </p:spPr>
+          <p:style>
+            <a:lnRef idx="2">
+              <a:schemeClr val="accent1">
+                <a:shade val="50000"/>
+              </a:schemeClr>
+            </a:lnRef>
+            <a:fillRef idx="1">
+              <a:schemeClr val="accent1"/>
+            </a:fillRef>
+            <a:effectRef idx="0">
+              <a:schemeClr val="accent1"/>
+            </a:effectRef>
+            <a:fontRef idx="minor">
+              <a:schemeClr val="lt1"/>
+            </a:fontRef>
+          </p:style>
+          <p:txBody>
+            <a:bodyPr rtlCol="0" anchor="ctr"/>
+            <a:lstStyle/>
+            <a:p>
+              <a:pPr algn="ctr"/>
+              <a:endParaRPr lang="en-US"/>
+            </a:p>
+          </p:txBody>
+        </p:sp>
+        <p:sp>
+          <p:nvSpPr>
+            <p:cNvPr id="14" name="手繪多邊形 13"/>
+            <p:cNvSpPr/>
+            <p:nvPr/>
+          </p:nvSpPr>
+          <p:spPr>
+            <a:xfrm>
+              <a:off x="6804660" y="3413760"/>
+              <a:ext cx="609538" cy="552235"/>
+            </a:xfrm>
+            <a:custGeom>
+              <a:avLst/>
+              <a:gdLst>
+                <a:gd name="connsiteX0" fmla="*/ 0 w 585787"/>
+                <a:gd name="connsiteY0" fmla="*/ 0 h 552235"/>
+                <a:gd name="connsiteX1" fmla="*/ 304800 w 585787"/>
+                <a:gd name="connsiteY1" fmla="*/ 45720 h 552235"/>
+                <a:gd name="connsiteX2" fmla="*/ 556260 w 585787"/>
+                <a:gd name="connsiteY2" fmla="*/ 167640 h 552235"/>
+                <a:gd name="connsiteX3" fmla="*/ 571500 w 585787"/>
+                <a:gd name="connsiteY3" fmla="*/ 365760 h 552235"/>
+                <a:gd name="connsiteX4" fmla="*/ 472440 w 585787"/>
+                <a:gd name="connsiteY4" fmla="*/ 533400 h 552235"/>
+                <a:gd name="connsiteX5" fmla="*/ 434340 w 585787"/>
+                <a:gd name="connsiteY5" fmla="*/ 541020 h 552235"/>
+              </a:gdLst>
+              <a:ahLst/>
+              <a:cxnLst>
+                <a:cxn ang="0">
+                  <a:pos x="connsiteX0" y="connsiteY0"/>
+                </a:cxn>
+                <a:cxn ang="0">
+                  <a:pos x="connsiteX1" y="connsiteY1"/>
+                </a:cxn>
+                <a:cxn ang="0">
+                  <a:pos x="connsiteX2" y="connsiteY2"/>
+                </a:cxn>
+                <a:cxn ang="0">
+                  <a:pos x="connsiteX3" y="connsiteY3"/>
+                </a:cxn>
+                <a:cxn ang="0">
+                  <a:pos x="connsiteX4" y="connsiteY4"/>
+                </a:cxn>
+                <a:cxn ang="0">
+                  <a:pos x="connsiteX5" y="connsiteY5"/>
+                </a:cxn>
+              </a:cxnLst>
+              <a:rect l="l" t="t" r="r" b="b"/>
+              <a:pathLst>
+                <a:path w="585787" h="552235">
+                  <a:moveTo>
+                    <a:pt x="0" y="0"/>
+                  </a:moveTo>
+                  <a:cubicBezTo>
+                    <a:pt x="106045" y="8890"/>
+                    <a:pt x="212090" y="17780"/>
+                    <a:pt x="304800" y="45720"/>
+                  </a:cubicBezTo>
+                  <a:cubicBezTo>
+                    <a:pt x="397510" y="73660"/>
+                    <a:pt x="511810" y="114300"/>
+                    <a:pt x="556260" y="167640"/>
+                  </a:cubicBezTo>
+                  <a:cubicBezTo>
+                    <a:pt x="600710" y="220980"/>
+                    <a:pt x="585470" y="304800"/>
+                    <a:pt x="571500" y="365760"/>
+                  </a:cubicBezTo>
+                  <a:cubicBezTo>
+                    <a:pt x="557530" y="426720"/>
+                    <a:pt x="495300" y="504190"/>
+                    <a:pt x="472440" y="533400"/>
+                  </a:cubicBezTo>
+                  <a:cubicBezTo>
+                    <a:pt x="449580" y="562610"/>
+                    <a:pt x="441960" y="551815"/>
+                    <a:pt x="434340" y="541020"/>
+                  </a:cubicBezTo>
+                </a:path>
+              </a:pathLst>
+            </a:custGeom>
+            <a:noFill/>
+            <a:ln>
+              <a:solidFill>
+                <a:schemeClr val="tx1"/>
+              </a:solidFill>
+              <a:tailEnd type="triangle"/>
+            </a:ln>
+          </p:spPr>
+          <p:style>
+            <a:lnRef idx="2">
+              <a:schemeClr val="accent1">
+                <a:shade val="50000"/>
+              </a:schemeClr>
+            </a:lnRef>
+            <a:fillRef idx="1">
+              <a:schemeClr val="accent1"/>
+            </a:fillRef>
+            <a:effectRef idx="0">
+              <a:schemeClr val="accent1"/>
+            </a:effectRef>
+            <a:fontRef idx="minor">
+              <a:schemeClr val="lt1"/>
+            </a:fontRef>
+          </p:style>
+          <p:txBody>
+            <a:bodyPr rtlCol="0" anchor="ctr"/>
+            <a:lstStyle/>
+            <a:p>
+              <a:pPr algn="ctr"/>
+              <a:endParaRPr lang="en-US"/>
+            </a:p>
+          </p:txBody>
+        </p:sp>
+      </p:grpSp>
+    </p:spTree>
+    <p:extLst>
+      <p:ext uri="{BB962C8B-B14F-4D97-AF65-F5344CB8AC3E}">
+        <p14:creationId xmlns:p14="http://schemas.microsoft.com/office/powerpoint/2010/main" val="814737871"/>
+      </p:ext>
+    </p:extLst>
+  </p:cSld>
+  <p:clrMapOvr>
+    <a:masterClrMapping/>
+  </p:clrMapOvr>
+</p:sld>
+</file>
+
 <file path=ppt/theme/theme1.xml><?xml version="1.0" encoding="utf-8"?>
 <a:theme xmlns:a="http://schemas.openxmlformats.org/drawingml/2006/main" name="Office 佈景主題">
   <a:themeElements>

</xml_diff>

<commit_message>
Add the half-delayed DFE schematic
</commit_message>
<xml_diff>
--- a/latex_report/Design Picture.pptx
+++ b/latex_report/Design Picture.pptx
@@ -11,6 +11,7 @@
     <p:sldId id="259" r:id="rId5"/>
     <p:sldId id="260" r:id="rId6"/>
     <p:sldId id="261" r:id="rId7"/>
+    <p:sldId id="262" r:id="rId8"/>
   </p:sldIdLst>
   <p:sldSz cx="9144000" cy="6858000" type="screen4x3"/>
   <p:notesSz cx="6858000" cy="9144000"/>
@@ -248,7 +249,7 @@
           <a:p>
             <a:fld id="{D6C45EEA-C602-4478-A810-24EF6DA94153}" type="datetimeFigureOut">
               <a:rPr lang="en-US" smtClean="0"/>
-              <a:t>5/2/2016</a:t>
+              <a:t>5/4/2016</a:t>
             </a:fld>
             <a:endParaRPr lang="en-US"/>
           </a:p>
@@ -418,7 +419,7 @@
           <a:p>
             <a:fld id="{D6C45EEA-C602-4478-A810-24EF6DA94153}" type="datetimeFigureOut">
               <a:rPr lang="en-US" smtClean="0"/>
-              <a:t>5/2/2016</a:t>
+              <a:t>5/4/2016</a:t>
             </a:fld>
             <a:endParaRPr lang="en-US"/>
           </a:p>
@@ -598,7 +599,7 @@
           <a:p>
             <a:fld id="{D6C45EEA-C602-4478-A810-24EF6DA94153}" type="datetimeFigureOut">
               <a:rPr lang="en-US" smtClean="0"/>
-              <a:t>5/2/2016</a:t>
+              <a:t>5/4/2016</a:t>
             </a:fld>
             <a:endParaRPr lang="en-US"/>
           </a:p>
@@ -768,7 +769,7 @@
           <a:p>
             <a:fld id="{D6C45EEA-C602-4478-A810-24EF6DA94153}" type="datetimeFigureOut">
               <a:rPr lang="en-US" smtClean="0"/>
-              <a:t>5/2/2016</a:t>
+              <a:t>5/4/2016</a:t>
             </a:fld>
             <a:endParaRPr lang="en-US"/>
           </a:p>
@@ -1012,7 +1013,7 @@
           <a:p>
             <a:fld id="{D6C45EEA-C602-4478-A810-24EF6DA94153}" type="datetimeFigureOut">
               <a:rPr lang="en-US" smtClean="0"/>
-              <a:t>5/2/2016</a:t>
+              <a:t>5/4/2016</a:t>
             </a:fld>
             <a:endParaRPr lang="en-US"/>
           </a:p>
@@ -1244,7 +1245,7 @@
           <a:p>
             <a:fld id="{D6C45EEA-C602-4478-A810-24EF6DA94153}" type="datetimeFigureOut">
               <a:rPr lang="en-US" smtClean="0"/>
-              <a:t>5/2/2016</a:t>
+              <a:t>5/4/2016</a:t>
             </a:fld>
             <a:endParaRPr lang="en-US"/>
           </a:p>
@@ -1611,7 +1612,7 @@
           <a:p>
             <a:fld id="{D6C45EEA-C602-4478-A810-24EF6DA94153}" type="datetimeFigureOut">
               <a:rPr lang="en-US" smtClean="0"/>
-              <a:t>5/2/2016</a:t>
+              <a:t>5/4/2016</a:t>
             </a:fld>
             <a:endParaRPr lang="en-US"/>
           </a:p>
@@ -1729,7 +1730,7 @@
           <a:p>
             <a:fld id="{D6C45EEA-C602-4478-A810-24EF6DA94153}" type="datetimeFigureOut">
               <a:rPr lang="en-US" smtClean="0"/>
-              <a:t>5/2/2016</a:t>
+              <a:t>5/4/2016</a:t>
             </a:fld>
             <a:endParaRPr lang="en-US"/>
           </a:p>
@@ -1824,7 +1825,7 @@
           <a:p>
             <a:fld id="{D6C45EEA-C602-4478-A810-24EF6DA94153}" type="datetimeFigureOut">
               <a:rPr lang="en-US" smtClean="0"/>
-              <a:t>5/2/2016</a:t>
+              <a:t>5/4/2016</a:t>
             </a:fld>
             <a:endParaRPr lang="en-US"/>
           </a:p>
@@ -2101,7 +2102,7 @@
           <a:p>
             <a:fld id="{D6C45EEA-C602-4478-A810-24EF6DA94153}" type="datetimeFigureOut">
               <a:rPr lang="en-US" smtClean="0"/>
-              <a:t>5/2/2016</a:t>
+              <a:t>5/4/2016</a:t>
             </a:fld>
             <a:endParaRPr lang="en-US"/>
           </a:p>
@@ -2358,7 +2359,7 @@
           <a:p>
             <a:fld id="{D6C45EEA-C602-4478-A810-24EF6DA94153}" type="datetimeFigureOut">
               <a:rPr lang="en-US" smtClean="0"/>
-              <a:t>5/2/2016</a:t>
+              <a:t>5/4/2016</a:t>
             </a:fld>
             <a:endParaRPr lang="en-US"/>
           </a:p>
@@ -2571,7 +2572,7 @@
           <a:p>
             <a:fld id="{D6C45EEA-C602-4478-A810-24EF6DA94153}" type="datetimeFigureOut">
               <a:rPr lang="en-US" smtClean="0"/>
-              <a:t>5/2/2016</a:t>
+              <a:t>5/4/2016</a:t>
             </a:fld>
             <a:endParaRPr lang="en-US"/>
           </a:p>
@@ -10031,11 +10032,7 @@
               </a:r>
               <a:r>
                 <a:rPr lang="en-US" sz="1400" b="1" dirty="0" smtClean="0"/>
-                <a:t> </a:t>
-              </a:r>
-              <a:r>
-                <a:rPr lang="en-US" sz="1400" b="1" dirty="0" smtClean="0"/>
-                <a:t>mil</a:t>
+                <a:t> mil</a:t>
               </a:r>
               <a:endParaRPr lang="en-US" sz="1400" b="1" dirty="0"/>
             </a:p>
@@ -10069,11 +10066,7 @@
               </a:r>
               <a:r>
                 <a:rPr lang="en-US" sz="1400" b="1" dirty="0" smtClean="0"/>
-                <a:t> </a:t>
-              </a:r>
-              <a:r>
-                <a:rPr lang="en-US" sz="1400" b="1" dirty="0" smtClean="0"/>
-                <a:t>mil</a:t>
+                <a:t> mil</a:t>
               </a:r>
               <a:endParaRPr lang="en-US" sz="1400" b="1" dirty="0"/>
             </a:p>
@@ -10265,11 +10258,7 @@
             <a:p>
               <a:r>
                 <a:rPr lang="en-US" sz="1400" b="1" dirty="0" smtClean="0"/>
-                <a:t>1 </a:t>
-              </a:r>
-              <a:r>
-                <a:rPr lang="en-US" sz="1400" b="1" dirty="0" smtClean="0"/>
-                <a:t>mil</a:t>
+                <a:t>1 mil</a:t>
               </a:r>
               <a:endParaRPr lang="en-US" sz="1400" b="1" dirty="0"/>
             </a:p>
@@ -10748,11 +10737,7 @@
               </a:r>
               <a:r>
                 <a:rPr lang="en-US" sz="1400" b="1" dirty="0" smtClean="0"/>
-                <a:t> </a:t>
-              </a:r>
-              <a:r>
-                <a:rPr lang="en-US" sz="1400" b="1" dirty="0" smtClean="0"/>
-                <a:t>mil</a:t>
+                <a:t> mil</a:t>
               </a:r>
               <a:endParaRPr lang="en-US" sz="1400" b="1" dirty="0"/>
             </a:p>
@@ -10786,11 +10771,7 @@
               </a:r>
               <a:r>
                 <a:rPr lang="en-US" sz="1400" b="1" dirty="0" smtClean="0"/>
-                <a:t> </a:t>
-              </a:r>
-              <a:r>
-                <a:rPr lang="en-US" sz="1400" b="1" dirty="0" smtClean="0"/>
-                <a:t>mil</a:t>
+                <a:t> mil</a:t>
               </a:r>
               <a:endParaRPr lang="en-US" sz="1400" b="1" dirty="0"/>
             </a:p>
@@ -10982,11 +10963,7 @@
             <a:p>
               <a:r>
                 <a:rPr lang="en-US" sz="1400" b="1" dirty="0" smtClean="0"/>
-                <a:t>1 </a:t>
-              </a:r>
-              <a:r>
-                <a:rPr lang="en-US" sz="1400" b="1" dirty="0" smtClean="0"/>
-                <a:t>mil</a:t>
+                <a:t>1 mil</a:t>
               </a:r>
               <a:endParaRPr lang="en-US" sz="1400" b="1" dirty="0"/>
             </a:p>
@@ -11227,6 +11204,1922 @@
     <p:extLst>
       <p:ext uri="{BB962C8B-B14F-4D97-AF65-F5344CB8AC3E}">
         <p14:creationId xmlns:p14="http://schemas.microsoft.com/office/powerpoint/2010/main" val="814737871"/>
+      </p:ext>
+    </p:extLst>
+  </p:cSld>
+  <p:clrMapOvr>
+    <a:masterClrMapping/>
+  </p:clrMapOvr>
+</p:sld>
+</file>
+
+<file path=ppt/slides/slide7.xml><?xml version="1.0" encoding="utf-8"?>
+<p:sld xmlns:a="http://schemas.openxmlformats.org/drawingml/2006/main" xmlns:r="http://schemas.openxmlformats.org/officeDocument/2006/relationships" xmlns:p="http://schemas.openxmlformats.org/presentationml/2006/main">
+  <p:cSld>
+    <p:spTree>
+      <p:nvGrpSpPr>
+        <p:cNvPr id="1" name=""/>
+        <p:cNvGrpSpPr/>
+        <p:nvPr/>
+      </p:nvGrpSpPr>
+      <p:grpSpPr>
+        <a:xfrm>
+          <a:off x="0" y="0"/>
+          <a:ext cx="0" cy="0"/>
+          <a:chOff x="0" y="0"/>
+          <a:chExt cx="0" cy="0"/>
+        </a:xfrm>
+      </p:grpSpPr>
+      <p:grpSp>
+        <p:nvGrpSpPr>
+          <p:cNvPr id="103" name="群組 102"/>
+          <p:cNvGrpSpPr/>
+          <p:nvPr/>
+        </p:nvGrpSpPr>
+        <p:grpSpPr>
+          <a:xfrm>
+            <a:off x="5146200" y="1248959"/>
+            <a:ext cx="3513196" cy="5066332"/>
+            <a:chOff x="3935568" y="254813"/>
+            <a:chExt cx="3513196" cy="5066332"/>
+          </a:xfrm>
+        </p:grpSpPr>
+        <p:sp>
+          <p:nvSpPr>
+            <p:cNvPr id="2" name="矩形 1"/>
+            <p:cNvSpPr/>
+            <p:nvPr/>
+          </p:nvSpPr>
+          <p:spPr>
+            <a:xfrm>
+              <a:off x="5694595" y="1859688"/>
+              <a:ext cx="1623317" cy="708917"/>
+            </a:xfrm>
+            <a:prstGeom prst="rect">
+              <a:avLst/>
+            </a:prstGeom>
+            <a:solidFill>
+              <a:schemeClr val="bg1">
+                <a:lumMod val="85000"/>
+              </a:schemeClr>
+            </a:solidFill>
+            <a:ln w="50800">
+              <a:solidFill>
+                <a:schemeClr val="tx1"/>
+              </a:solidFill>
+            </a:ln>
+          </p:spPr>
+          <p:style>
+            <a:lnRef idx="2">
+              <a:schemeClr val="accent1">
+                <a:shade val="50000"/>
+              </a:schemeClr>
+            </a:lnRef>
+            <a:fillRef idx="1">
+              <a:schemeClr val="accent1"/>
+            </a:fillRef>
+            <a:effectRef idx="0">
+              <a:schemeClr val="accent1"/>
+            </a:effectRef>
+            <a:fontRef idx="minor">
+              <a:schemeClr val="lt1"/>
+            </a:fontRef>
+          </p:style>
+          <p:txBody>
+            <a:bodyPr rtlCol="0" anchor="ctr"/>
+            <a:lstStyle/>
+            <a:p>
+              <a:pPr algn="ctr"/>
+              <a:r>
+                <a:rPr lang="en-US" dirty="0" smtClean="0">
+                  <a:solidFill>
+                    <a:srgbClr val="FF0000"/>
+                  </a:solidFill>
+                </a:rPr>
+                <a:t>delay half clock period 0.5 T </a:t>
+              </a:r>
+              <a:endParaRPr lang="en-US" dirty="0">
+                <a:solidFill>
+                  <a:srgbClr val="FF0000"/>
+                </a:solidFill>
+              </a:endParaRPr>
+            </a:p>
+          </p:txBody>
+        </p:sp>
+        <p:sp>
+          <p:nvSpPr>
+            <p:cNvPr id="3" name="橢圓 2"/>
+            <p:cNvSpPr/>
+            <p:nvPr/>
+          </p:nvSpPr>
+          <p:spPr>
+            <a:xfrm>
+              <a:off x="4599964" y="647473"/>
+              <a:ext cx="578783" cy="554667"/>
+            </a:xfrm>
+            <a:prstGeom prst="ellipse">
+              <a:avLst/>
+            </a:prstGeom>
+            <a:noFill/>
+            <a:ln w="50800">
+              <a:solidFill>
+                <a:schemeClr val="tx1"/>
+              </a:solidFill>
+            </a:ln>
+          </p:spPr>
+          <p:style>
+            <a:lnRef idx="2">
+              <a:schemeClr val="accent1">
+                <a:shade val="50000"/>
+              </a:schemeClr>
+            </a:lnRef>
+            <a:fillRef idx="1">
+              <a:schemeClr val="accent1"/>
+            </a:fillRef>
+            <a:effectRef idx="0">
+              <a:schemeClr val="accent1"/>
+            </a:effectRef>
+            <a:fontRef idx="minor">
+              <a:schemeClr val="lt1"/>
+            </a:fontRef>
+          </p:style>
+          <p:txBody>
+            <a:bodyPr rot="0" spcFirstLastPara="0" vertOverflow="overflow" horzOverflow="overflow" vert="horz" wrap="square" lIns="91440" tIns="45720" rIns="91440" bIns="45720" numCol="1" spcCol="0" rtlCol="0" fromWordArt="0" anchor="ctr" anchorCtr="0" forceAA="0" compatLnSpc="1">
+              <a:prstTxWarp prst="textNoShape">
+                <a:avLst/>
+              </a:prstTxWarp>
+              <a:noAutofit/>
+            </a:bodyPr>
+            <a:lstStyle/>
+            <a:p>
+              <a:pPr algn="ctr"/>
+              <a:r>
+                <a:rPr lang="en-US" sz="3600" dirty="0" smtClean="0">
+                  <a:solidFill>
+                    <a:schemeClr val="tx1"/>
+                  </a:solidFill>
+                </a:rPr>
+                <a:t>+</a:t>
+              </a:r>
+            </a:p>
+          </p:txBody>
+        </p:sp>
+        <p:grpSp>
+          <p:nvGrpSpPr>
+            <p:cNvPr id="8" name="群組 7"/>
+            <p:cNvGrpSpPr/>
+            <p:nvPr/>
+          </p:nvGrpSpPr>
+          <p:grpSpPr>
+            <a:xfrm>
+              <a:off x="5694595" y="647473"/>
+              <a:ext cx="523982" cy="553419"/>
+              <a:chOff x="5948737" y="1078787"/>
+              <a:chExt cx="914400" cy="965770"/>
+            </a:xfrm>
+          </p:grpSpPr>
+          <p:sp>
+            <p:nvSpPr>
+              <p:cNvPr id="4" name="矩形 3"/>
+              <p:cNvSpPr/>
+              <p:nvPr/>
+            </p:nvSpPr>
+            <p:spPr>
+              <a:xfrm>
+                <a:off x="5948737" y="1078787"/>
+                <a:ext cx="914400" cy="965770"/>
+              </a:xfrm>
+              <a:prstGeom prst="rect">
+                <a:avLst/>
+              </a:prstGeom>
+              <a:noFill/>
+              <a:ln w="50800">
+                <a:solidFill>
+                  <a:schemeClr val="tx1"/>
+                </a:solidFill>
+              </a:ln>
+            </p:spPr>
+            <p:style>
+              <a:lnRef idx="2">
+                <a:schemeClr val="accent1">
+                  <a:shade val="50000"/>
+                </a:schemeClr>
+              </a:lnRef>
+              <a:fillRef idx="1">
+                <a:schemeClr val="accent1"/>
+              </a:fillRef>
+              <a:effectRef idx="0">
+                <a:schemeClr val="accent1"/>
+              </a:effectRef>
+              <a:fontRef idx="minor">
+                <a:schemeClr val="lt1"/>
+              </a:fontRef>
+            </p:style>
+            <p:txBody>
+              <a:bodyPr rot="0" spcFirstLastPara="0" vertOverflow="overflow" horzOverflow="overflow" vert="horz" wrap="square" lIns="91440" tIns="45720" rIns="91440" bIns="45720" numCol="1" spcCol="0" rtlCol="0" fromWordArt="0" anchor="ctr" anchorCtr="0" forceAA="0" compatLnSpc="1">
+                <a:prstTxWarp prst="textNoShape">
+                  <a:avLst/>
+                </a:prstTxWarp>
+                <a:noAutofit/>
+              </a:bodyPr>
+              <a:lstStyle/>
+              <a:p>
+                <a:pPr algn="ctr"/>
+                <a:endParaRPr lang="en-US" dirty="0" err="1" smtClean="0">
+                  <a:solidFill>
+                    <a:schemeClr val="tx1"/>
+                  </a:solidFill>
+                </a:endParaRPr>
+              </a:p>
+            </p:txBody>
+          </p:sp>
+          <p:cxnSp>
+            <p:nvCxnSpPr>
+              <p:cNvPr id="6" name="肘形接點 5"/>
+              <p:cNvCxnSpPr/>
+              <p:nvPr/>
+            </p:nvCxnSpPr>
+            <p:spPr>
+              <a:xfrm rot="10800000" flipV="1">
+                <a:off x="6087438" y="1330036"/>
+                <a:ext cx="636998" cy="463272"/>
+              </a:xfrm>
+              <a:prstGeom prst="bentConnector3">
+                <a:avLst/>
+              </a:prstGeom>
+              <a:ln w="50800">
+                <a:solidFill>
+                  <a:schemeClr val="tx1"/>
+                </a:solidFill>
+              </a:ln>
+            </p:spPr>
+            <p:style>
+              <a:lnRef idx="1">
+                <a:schemeClr val="accent1"/>
+              </a:lnRef>
+              <a:fillRef idx="0">
+                <a:schemeClr val="accent1"/>
+              </a:fillRef>
+              <a:effectRef idx="0">
+                <a:schemeClr val="accent1"/>
+              </a:effectRef>
+              <a:fontRef idx="minor">
+                <a:schemeClr val="tx1"/>
+              </a:fontRef>
+            </p:style>
+          </p:cxnSp>
+        </p:grpSp>
+        <p:cxnSp>
+          <p:nvCxnSpPr>
+            <p:cNvPr id="10" name="直線接點 9"/>
+            <p:cNvCxnSpPr>
+              <a:stCxn id="2" idx="1"/>
+            </p:cNvCxnSpPr>
+            <p:nvPr/>
+          </p:nvCxnSpPr>
+          <p:spPr>
+            <a:xfrm flipH="1" flipV="1">
+              <a:off x="4880224" y="2214146"/>
+              <a:ext cx="814371" cy="1"/>
+            </a:xfrm>
+            <a:prstGeom prst="line">
+              <a:avLst/>
+            </a:prstGeom>
+            <a:ln w="50800">
+              <a:solidFill>
+                <a:schemeClr val="tx1"/>
+              </a:solidFill>
+            </a:ln>
+          </p:spPr>
+          <p:style>
+            <a:lnRef idx="1">
+              <a:schemeClr val="accent1"/>
+            </a:lnRef>
+            <a:fillRef idx="0">
+              <a:schemeClr val="accent1"/>
+            </a:fillRef>
+            <a:effectRef idx="0">
+              <a:schemeClr val="accent1"/>
+            </a:effectRef>
+            <a:fontRef idx="minor">
+              <a:schemeClr val="tx1"/>
+            </a:fontRef>
+          </p:style>
+        </p:cxnSp>
+        <p:cxnSp>
+          <p:nvCxnSpPr>
+            <p:cNvPr id="12" name="直線單箭頭接點 11"/>
+            <p:cNvCxnSpPr/>
+            <p:nvPr/>
+          </p:nvCxnSpPr>
+          <p:spPr>
+            <a:xfrm flipV="1">
+              <a:off x="4890499" y="1202141"/>
+              <a:ext cx="0" cy="3904311"/>
+            </a:xfrm>
+            <a:prstGeom prst="straightConnector1">
+              <a:avLst/>
+            </a:prstGeom>
+            <a:ln w="50800">
+              <a:solidFill>
+                <a:schemeClr val="tx1"/>
+              </a:solidFill>
+              <a:tailEnd type="triangle"/>
+            </a:ln>
+          </p:spPr>
+          <p:style>
+            <a:lnRef idx="1">
+              <a:schemeClr val="accent1"/>
+            </a:lnRef>
+            <a:fillRef idx="0">
+              <a:schemeClr val="accent1"/>
+            </a:fillRef>
+            <a:effectRef idx="0">
+              <a:schemeClr val="accent1"/>
+            </a:effectRef>
+            <a:fontRef idx="minor">
+              <a:schemeClr val="tx1"/>
+            </a:fontRef>
+          </p:style>
+        </p:cxnSp>
+        <p:sp>
+          <p:nvSpPr>
+            <p:cNvPr id="13" name="文字方塊 12"/>
+            <p:cNvSpPr txBox="1"/>
+            <p:nvPr/>
+          </p:nvSpPr>
+          <p:spPr>
+            <a:xfrm>
+              <a:off x="4941398" y="1837378"/>
+              <a:ext cx="780598" cy="369332"/>
+            </a:xfrm>
+            <a:prstGeom prst="rect">
+              <a:avLst/>
+            </a:prstGeom>
+            <a:noFill/>
+          </p:spPr>
+          <p:txBody>
+            <a:bodyPr wrap="none" rtlCol="0">
+              <a:spAutoFit/>
+            </a:bodyPr>
+            <a:lstStyle/>
+            <a:p>
+              <a:r>
+                <a:rPr lang="en-US" altLang="zh-TW" dirty="0" smtClean="0"/>
+                <a:t>x Tap1</a:t>
+              </a:r>
+              <a:endParaRPr lang="en-US" dirty="0"/>
+            </a:p>
+          </p:txBody>
+        </p:sp>
+        <p:cxnSp>
+          <p:nvCxnSpPr>
+            <p:cNvPr id="14" name="直線接點 13"/>
+            <p:cNvCxnSpPr>
+              <a:stCxn id="4" idx="1"/>
+              <a:endCxn id="3" idx="6"/>
+            </p:cNvCxnSpPr>
+            <p:nvPr/>
+          </p:nvCxnSpPr>
+          <p:spPr>
+            <a:xfrm flipH="1">
+              <a:off x="5178747" y="924183"/>
+              <a:ext cx="515848" cy="624"/>
+            </a:xfrm>
+            <a:prstGeom prst="line">
+              <a:avLst/>
+            </a:prstGeom>
+            <a:ln w="50800">
+              <a:solidFill>
+                <a:schemeClr val="tx1"/>
+              </a:solidFill>
+            </a:ln>
+          </p:spPr>
+          <p:style>
+            <a:lnRef idx="1">
+              <a:schemeClr val="accent1"/>
+            </a:lnRef>
+            <a:fillRef idx="0">
+              <a:schemeClr val="accent1"/>
+            </a:fillRef>
+            <a:effectRef idx="0">
+              <a:schemeClr val="accent1"/>
+            </a:effectRef>
+            <a:fontRef idx="minor">
+              <a:schemeClr val="tx1"/>
+            </a:fontRef>
+          </p:style>
+        </p:cxnSp>
+        <p:cxnSp>
+          <p:nvCxnSpPr>
+            <p:cNvPr id="16" name="直線接點 15"/>
+            <p:cNvCxnSpPr/>
+            <p:nvPr/>
+          </p:nvCxnSpPr>
+          <p:spPr>
+            <a:xfrm flipH="1">
+              <a:off x="6222463" y="924517"/>
+              <a:ext cx="1226301" cy="0"/>
+            </a:xfrm>
+            <a:prstGeom prst="line">
+              <a:avLst/>
+            </a:prstGeom>
+            <a:ln w="50800">
+              <a:solidFill>
+                <a:schemeClr val="tx1"/>
+              </a:solidFill>
+              <a:headEnd type="triangle"/>
+            </a:ln>
+          </p:spPr>
+          <p:style>
+            <a:lnRef idx="1">
+              <a:schemeClr val="accent1"/>
+            </a:lnRef>
+            <a:fillRef idx="0">
+              <a:schemeClr val="accent1"/>
+            </a:fillRef>
+            <a:effectRef idx="0">
+              <a:schemeClr val="accent1"/>
+            </a:effectRef>
+            <a:fontRef idx="minor">
+              <a:schemeClr val="tx1"/>
+            </a:fontRef>
+          </p:style>
+        </p:cxnSp>
+        <p:cxnSp>
+          <p:nvCxnSpPr>
+            <p:cNvPr id="19" name="直線接點 18"/>
+            <p:cNvCxnSpPr/>
+            <p:nvPr/>
+          </p:nvCxnSpPr>
+          <p:spPr>
+            <a:xfrm>
+              <a:off x="6873412" y="924182"/>
+              <a:ext cx="0" cy="935506"/>
+            </a:xfrm>
+            <a:prstGeom prst="line">
+              <a:avLst/>
+            </a:prstGeom>
+            <a:ln w="50800" cap="rnd">
+              <a:solidFill>
+                <a:schemeClr val="tx1"/>
+              </a:solidFill>
+              <a:tailEnd type="triangle"/>
+            </a:ln>
+          </p:spPr>
+          <p:style>
+            <a:lnRef idx="1">
+              <a:schemeClr val="accent1"/>
+            </a:lnRef>
+            <a:fillRef idx="0">
+              <a:schemeClr val="accent1"/>
+            </a:fillRef>
+            <a:effectRef idx="0">
+              <a:schemeClr val="accent1"/>
+            </a:effectRef>
+            <a:fontRef idx="minor">
+              <a:schemeClr val="tx1"/>
+            </a:fontRef>
+          </p:style>
+        </p:cxnSp>
+        <p:cxnSp>
+          <p:nvCxnSpPr>
+            <p:cNvPr id="29" name="直線接點 28"/>
+            <p:cNvCxnSpPr/>
+            <p:nvPr/>
+          </p:nvCxnSpPr>
+          <p:spPr>
+            <a:xfrm>
+              <a:off x="6873412" y="2568605"/>
+              <a:ext cx="0" cy="935506"/>
+            </a:xfrm>
+            <a:prstGeom prst="line">
+              <a:avLst/>
+            </a:prstGeom>
+            <a:ln w="50800" cap="rnd">
+              <a:solidFill>
+                <a:schemeClr val="tx1"/>
+              </a:solidFill>
+              <a:tailEnd type="triangle"/>
+            </a:ln>
+          </p:spPr>
+          <p:style>
+            <a:lnRef idx="1">
+              <a:schemeClr val="accent1"/>
+            </a:lnRef>
+            <a:fillRef idx="0">
+              <a:schemeClr val="accent1"/>
+            </a:fillRef>
+            <a:effectRef idx="0">
+              <a:schemeClr val="accent1"/>
+            </a:effectRef>
+            <a:fontRef idx="minor">
+              <a:schemeClr val="tx1"/>
+            </a:fontRef>
+          </p:style>
+        </p:cxnSp>
+        <p:sp>
+          <p:nvSpPr>
+            <p:cNvPr id="30" name="矩形 29"/>
+            <p:cNvSpPr/>
+            <p:nvPr/>
+          </p:nvSpPr>
+          <p:spPr>
+            <a:xfrm>
+              <a:off x="6616558" y="3503775"/>
+              <a:ext cx="513707" cy="441100"/>
+            </a:xfrm>
+            <a:prstGeom prst="rect">
+              <a:avLst/>
+            </a:prstGeom>
+            <a:noFill/>
+            <a:ln w="50800">
+              <a:solidFill>
+                <a:schemeClr val="tx1"/>
+              </a:solidFill>
+            </a:ln>
+          </p:spPr>
+          <p:style>
+            <a:lnRef idx="2">
+              <a:schemeClr val="accent1">
+                <a:shade val="50000"/>
+              </a:schemeClr>
+            </a:lnRef>
+            <a:fillRef idx="1">
+              <a:schemeClr val="accent1"/>
+            </a:fillRef>
+            <a:effectRef idx="0">
+              <a:schemeClr val="accent1"/>
+            </a:effectRef>
+            <a:fontRef idx="minor">
+              <a:schemeClr val="lt1"/>
+            </a:fontRef>
+          </p:style>
+          <p:txBody>
+            <a:bodyPr rtlCol="0" anchor="ctr"/>
+            <a:lstStyle/>
+            <a:p>
+              <a:pPr algn="ctr"/>
+              <a:r>
+                <a:rPr lang="en-US" dirty="0" smtClean="0">
+                  <a:solidFill>
+                    <a:schemeClr val="tx1"/>
+                  </a:solidFill>
+                </a:rPr>
+                <a:t>Z</a:t>
+              </a:r>
+              <a:r>
+                <a:rPr lang="en-US" baseline="30000" dirty="0" smtClean="0">
+                  <a:solidFill>
+                    <a:schemeClr val="tx1"/>
+                  </a:solidFill>
+                </a:rPr>
+                <a:t>-1</a:t>
+              </a:r>
+              <a:endParaRPr lang="en-US" baseline="30000" dirty="0">
+                <a:solidFill>
+                  <a:schemeClr val="tx1"/>
+                </a:solidFill>
+              </a:endParaRPr>
+            </a:p>
+          </p:txBody>
+        </p:sp>
+        <p:cxnSp>
+          <p:nvCxnSpPr>
+            <p:cNvPr id="31" name="直線接點 30"/>
+            <p:cNvCxnSpPr>
+              <a:stCxn id="30" idx="1"/>
+            </p:cNvCxnSpPr>
+            <p:nvPr/>
+          </p:nvCxnSpPr>
+          <p:spPr>
+            <a:xfrm flipH="1">
+              <a:off x="4880225" y="3724325"/>
+              <a:ext cx="1736333" cy="0"/>
+            </a:xfrm>
+            <a:prstGeom prst="line">
+              <a:avLst/>
+            </a:prstGeom>
+            <a:ln w="50800">
+              <a:solidFill>
+                <a:schemeClr val="tx1"/>
+              </a:solidFill>
+            </a:ln>
+          </p:spPr>
+          <p:style>
+            <a:lnRef idx="1">
+              <a:schemeClr val="accent1"/>
+            </a:lnRef>
+            <a:fillRef idx="0">
+              <a:schemeClr val="accent1"/>
+            </a:fillRef>
+            <a:effectRef idx="0">
+              <a:schemeClr val="accent1"/>
+            </a:effectRef>
+            <a:fontRef idx="minor">
+              <a:schemeClr val="tx1"/>
+            </a:fontRef>
+          </p:style>
+        </p:cxnSp>
+        <p:sp>
+          <p:nvSpPr>
+            <p:cNvPr id="36" name="文字方塊 35"/>
+            <p:cNvSpPr txBox="1"/>
+            <p:nvPr/>
+          </p:nvSpPr>
+          <p:spPr>
+            <a:xfrm>
+              <a:off x="4941398" y="3314328"/>
+              <a:ext cx="780598" cy="369332"/>
+            </a:xfrm>
+            <a:prstGeom prst="rect">
+              <a:avLst/>
+            </a:prstGeom>
+            <a:noFill/>
+          </p:spPr>
+          <p:txBody>
+            <a:bodyPr wrap="none" rtlCol="0">
+              <a:spAutoFit/>
+            </a:bodyPr>
+            <a:lstStyle/>
+            <a:p>
+              <a:r>
+                <a:rPr lang="en-US" altLang="zh-TW" dirty="0" smtClean="0"/>
+                <a:t>x Tap2</a:t>
+              </a:r>
+              <a:endParaRPr lang="en-US" dirty="0"/>
+            </a:p>
+          </p:txBody>
+        </p:sp>
+        <p:sp>
+          <p:nvSpPr>
+            <p:cNvPr id="38" name="矩形 37"/>
+            <p:cNvSpPr/>
+            <p:nvPr/>
+          </p:nvSpPr>
+          <p:spPr>
+            <a:xfrm>
+              <a:off x="6616558" y="4880045"/>
+              <a:ext cx="513707" cy="441100"/>
+            </a:xfrm>
+            <a:prstGeom prst="rect">
+              <a:avLst/>
+            </a:prstGeom>
+            <a:noFill/>
+            <a:ln w="50800">
+              <a:solidFill>
+                <a:schemeClr val="tx1"/>
+              </a:solidFill>
+            </a:ln>
+          </p:spPr>
+          <p:style>
+            <a:lnRef idx="2">
+              <a:schemeClr val="accent1">
+                <a:shade val="50000"/>
+              </a:schemeClr>
+            </a:lnRef>
+            <a:fillRef idx="1">
+              <a:schemeClr val="accent1"/>
+            </a:fillRef>
+            <a:effectRef idx="0">
+              <a:schemeClr val="accent1"/>
+            </a:effectRef>
+            <a:fontRef idx="minor">
+              <a:schemeClr val="lt1"/>
+            </a:fontRef>
+          </p:style>
+          <p:txBody>
+            <a:bodyPr rtlCol="0" anchor="ctr"/>
+            <a:lstStyle/>
+            <a:p>
+              <a:pPr algn="ctr"/>
+              <a:r>
+                <a:rPr lang="en-US" dirty="0" smtClean="0">
+                  <a:solidFill>
+                    <a:schemeClr val="tx1"/>
+                  </a:solidFill>
+                </a:rPr>
+                <a:t>Z</a:t>
+              </a:r>
+              <a:r>
+                <a:rPr lang="en-US" baseline="30000" dirty="0" smtClean="0">
+                  <a:solidFill>
+                    <a:schemeClr val="tx1"/>
+                  </a:solidFill>
+                </a:rPr>
+                <a:t>-1</a:t>
+              </a:r>
+              <a:endParaRPr lang="en-US" baseline="30000" dirty="0">
+                <a:solidFill>
+                  <a:schemeClr val="tx1"/>
+                </a:solidFill>
+              </a:endParaRPr>
+            </a:p>
+          </p:txBody>
+        </p:sp>
+        <p:cxnSp>
+          <p:nvCxnSpPr>
+            <p:cNvPr id="39" name="直線接點 38"/>
+            <p:cNvCxnSpPr/>
+            <p:nvPr/>
+          </p:nvCxnSpPr>
+          <p:spPr>
+            <a:xfrm>
+              <a:off x="6873412" y="3944875"/>
+              <a:ext cx="0" cy="935506"/>
+            </a:xfrm>
+            <a:prstGeom prst="line">
+              <a:avLst/>
+            </a:prstGeom>
+            <a:ln w="50800" cap="rnd">
+              <a:solidFill>
+                <a:schemeClr val="tx1"/>
+              </a:solidFill>
+              <a:tailEnd type="triangle"/>
+            </a:ln>
+          </p:spPr>
+          <p:style>
+            <a:lnRef idx="1">
+              <a:schemeClr val="accent1"/>
+            </a:lnRef>
+            <a:fillRef idx="0">
+              <a:schemeClr val="accent1"/>
+            </a:fillRef>
+            <a:effectRef idx="0">
+              <a:schemeClr val="accent1"/>
+            </a:effectRef>
+            <a:fontRef idx="minor">
+              <a:schemeClr val="tx1"/>
+            </a:fontRef>
+          </p:style>
+        </p:cxnSp>
+        <p:cxnSp>
+          <p:nvCxnSpPr>
+            <p:cNvPr id="40" name="直線接點 39"/>
+            <p:cNvCxnSpPr/>
+            <p:nvPr/>
+          </p:nvCxnSpPr>
+          <p:spPr>
+            <a:xfrm flipH="1">
+              <a:off x="4880225" y="5106452"/>
+              <a:ext cx="1736333" cy="0"/>
+            </a:xfrm>
+            <a:prstGeom prst="line">
+              <a:avLst/>
+            </a:prstGeom>
+            <a:ln w="50800">
+              <a:solidFill>
+                <a:schemeClr val="tx1"/>
+              </a:solidFill>
+            </a:ln>
+          </p:spPr>
+          <p:style>
+            <a:lnRef idx="1">
+              <a:schemeClr val="accent1"/>
+            </a:lnRef>
+            <a:fillRef idx="0">
+              <a:schemeClr val="accent1"/>
+            </a:fillRef>
+            <a:effectRef idx="0">
+              <a:schemeClr val="accent1"/>
+            </a:effectRef>
+            <a:fontRef idx="minor">
+              <a:schemeClr val="tx1"/>
+            </a:fontRef>
+          </p:style>
+        </p:cxnSp>
+        <p:sp>
+          <p:nvSpPr>
+            <p:cNvPr id="41" name="文字方塊 40"/>
+            <p:cNvSpPr txBox="1"/>
+            <p:nvPr/>
+          </p:nvSpPr>
+          <p:spPr>
+            <a:xfrm>
+              <a:off x="4941398" y="4696455"/>
+              <a:ext cx="780598" cy="369332"/>
+            </a:xfrm>
+            <a:prstGeom prst="rect">
+              <a:avLst/>
+            </a:prstGeom>
+            <a:noFill/>
+          </p:spPr>
+          <p:txBody>
+            <a:bodyPr wrap="none" rtlCol="0">
+              <a:spAutoFit/>
+            </a:bodyPr>
+            <a:lstStyle/>
+            <a:p>
+              <a:r>
+                <a:rPr lang="en-US" altLang="zh-TW" dirty="0" smtClean="0"/>
+                <a:t>x Tap3</a:t>
+              </a:r>
+              <a:endParaRPr lang="en-US" dirty="0"/>
+            </a:p>
+          </p:txBody>
+        </p:sp>
+        <p:cxnSp>
+          <p:nvCxnSpPr>
+            <p:cNvPr id="66" name="直線接點 65"/>
+            <p:cNvCxnSpPr>
+              <a:stCxn id="3" idx="2"/>
+            </p:cNvCxnSpPr>
+            <p:nvPr/>
+          </p:nvCxnSpPr>
+          <p:spPr>
+            <a:xfrm flipH="1" flipV="1">
+              <a:off x="4027297" y="924182"/>
+              <a:ext cx="572667" cy="625"/>
+            </a:xfrm>
+            <a:prstGeom prst="line">
+              <a:avLst/>
+            </a:prstGeom>
+            <a:ln w="50800">
+              <a:solidFill>
+                <a:schemeClr val="tx1"/>
+              </a:solidFill>
+              <a:headEnd type="triangle"/>
+            </a:ln>
+          </p:spPr>
+          <p:style>
+            <a:lnRef idx="1">
+              <a:schemeClr val="accent1"/>
+            </a:lnRef>
+            <a:fillRef idx="0">
+              <a:schemeClr val="accent1"/>
+            </a:fillRef>
+            <a:effectRef idx="0">
+              <a:schemeClr val="accent1"/>
+            </a:effectRef>
+            <a:fontRef idx="minor">
+              <a:schemeClr val="tx1"/>
+            </a:fontRef>
+          </p:style>
+        </p:cxnSp>
+        <p:sp>
+          <p:nvSpPr>
+            <p:cNvPr id="70" name="文字方塊 69"/>
+            <p:cNvSpPr txBox="1"/>
+            <p:nvPr/>
+          </p:nvSpPr>
+          <p:spPr>
+            <a:xfrm>
+              <a:off x="6834461" y="544030"/>
+              <a:ext cx="540533" cy="369332"/>
+            </a:xfrm>
+            <a:prstGeom prst="rect">
+              <a:avLst/>
+            </a:prstGeom>
+            <a:noFill/>
+          </p:spPr>
+          <p:txBody>
+            <a:bodyPr wrap="none" rtlCol="0">
+              <a:spAutoFit/>
+            </a:bodyPr>
+            <a:lstStyle/>
+            <a:p>
+              <a:r>
+                <a:rPr lang="en-US" dirty="0" err="1" smtClean="0"/>
+                <a:t>D</a:t>
+              </a:r>
+              <a:r>
+                <a:rPr lang="en-US" baseline="-25000" dirty="0" err="1" smtClean="0"/>
+                <a:t>out</a:t>
+              </a:r>
+              <a:endParaRPr lang="en-US" baseline="-25000" dirty="0"/>
+            </a:p>
+          </p:txBody>
+        </p:sp>
+        <p:sp>
+          <p:nvSpPr>
+            <p:cNvPr id="72" name="文字方塊 71"/>
+            <p:cNvSpPr txBox="1"/>
+            <p:nvPr/>
+          </p:nvSpPr>
+          <p:spPr>
+            <a:xfrm>
+              <a:off x="3935568" y="254813"/>
+              <a:ext cx="1234312" cy="646331"/>
+            </a:xfrm>
+            <a:prstGeom prst="rect">
+              <a:avLst/>
+            </a:prstGeom>
+            <a:noFill/>
+          </p:spPr>
+          <p:txBody>
+            <a:bodyPr wrap="none" rtlCol="0">
+              <a:spAutoFit/>
+            </a:bodyPr>
+            <a:lstStyle/>
+            <a:p>
+              <a:r>
+                <a:rPr lang="en-US" dirty="0" smtClean="0"/>
+                <a:t>Differential</a:t>
+              </a:r>
+              <a:br>
+                <a:rPr lang="en-US" dirty="0" smtClean="0"/>
+              </a:br>
+              <a:r>
+                <a:rPr lang="en-US" dirty="0" smtClean="0"/>
+                <a:t>input</a:t>
+              </a:r>
+              <a:endParaRPr lang="en-US" baseline="-25000" dirty="0"/>
+            </a:p>
+          </p:txBody>
+        </p:sp>
+      </p:grpSp>
+      <p:grpSp>
+        <p:nvGrpSpPr>
+          <p:cNvPr id="111" name="群組 110"/>
+          <p:cNvGrpSpPr/>
+          <p:nvPr/>
+        </p:nvGrpSpPr>
+        <p:grpSpPr>
+          <a:xfrm>
+            <a:off x="602608" y="1250567"/>
+            <a:ext cx="3580064" cy="5066332"/>
+            <a:chOff x="602608" y="254813"/>
+            <a:chExt cx="3580064" cy="5066332"/>
+          </a:xfrm>
+        </p:grpSpPr>
+        <p:sp>
+          <p:nvSpPr>
+            <p:cNvPr id="44" name="橢圓 43"/>
+            <p:cNvSpPr/>
+            <p:nvPr/>
+          </p:nvSpPr>
+          <p:spPr>
+            <a:xfrm>
+              <a:off x="1255001" y="647473"/>
+              <a:ext cx="578783" cy="554667"/>
+            </a:xfrm>
+            <a:prstGeom prst="ellipse">
+              <a:avLst/>
+            </a:prstGeom>
+            <a:noFill/>
+            <a:ln w="50800">
+              <a:solidFill>
+                <a:schemeClr val="tx1"/>
+              </a:solidFill>
+            </a:ln>
+          </p:spPr>
+          <p:style>
+            <a:lnRef idx="2">
+              <a:schemeClr val="accent1">
+                <a:shade val="50000"/>
+              </a:schemeClr>
+            </a:lnRef>
+            <a:fillRef idx="1">
+              <a:schemeClr val="accent1"/>
+            </a:fillRef>
+            <a:effectRef idx="0">
+              <a:schemeClr val="accent1"/>
+            </a:effectRef>
+            <a:fontRef idx="minor">
+              <a:schemeClr val="lt1"/>
+            </a:fontRef>
+          </p:style>
+          <p:txBody>
+            <a:bodyPr rot="0" spcFirstLastPara="0" vertOverflow="overflow" horzOverflow="overflow" vert="horz" wrap="square" lIns="91440" tIns="45720" rIns="91440" bIns="45720" numCol="1" spcCol="0" rtlCol="0" fromWordArt="0" anchor="ctr" anchorCtr="0" forceAA="0" compatLnSpc="1">
+              <a:prstTxWarp prst="textNoShape">
+                <a:avLst/>
+              </a:prstTxWarp>
+              <a:noAutofit/>
+            </a:bodyPr>
+            <a:lstStyle/>
+            <a:p>
+              <a:pPr algn="ctr"/>
+              <a:r>
+                <a:rPr lang="en-US" sz="3600" dirty="0" smtClean="0">
+                  <a:solidFill>
+                    <a:schemeClr val="tx1"/>
+                  </a:solidFill>
+                </a:rPr>
+                <a:t>+</a:t>
+              </a:r>
+            </a:p>
+          </p:txBody>
+        </p:sp>
+        <p:grpSp>
+          <p:nvGrpSpPr>
+            <p:cNvPr id="45" name="群組 44"/>
+            <p:cNvGrpSpPr/>
+            <p:nvPr/>
+          </p:nvGrpSpPr>
+          <p:grpSpPr>
+            <a:xfrm>
+              <a:off x="2350403" y="647473"/>
+              <a:ext cx="523982" cy="553419"/>
+              <a:chOff x="5948737" y="1078787"/>
+              <a:chExt cx="914400" cy="965770"/>
+            </a:xfrm>
+          </p:grpSpPr>
+          <p:sp>
+            <p:nvSpPr>
+              <p:cNvPr id="46" name="矩形 45"/>
+              <p:cNvSpPr/>
+              <p:nvPr/>
+            </p:nvSpPr>
+            <p:spPr>
+              <a:xfrm>
+                <a:off x="5948737" y="1078787"/>
+                <a:ext cx="914400" cy="965770"/>
+              </a:xfrm>
+              <a:prstGeom prst="rect">
+                <a:avLst/>
+              </a:prstGeom>
+              <a:noFill/>
+              <a:ln w="50800">
+                <a:solidFill>
+                  <a:schemeClr val="tx1"/>
+                </a:solidFill>
+              </a:ln>
+            </p:spPr>
+            <p:style>
+              <a:lnRef idx="2">
+                <a:schemeClr val="accent1">
+                  <a:shade val="50000"/>
+                </a:schemeClr>
+              </a:lnRef>
+              <a:fillRef idx="1">
+                <a:schemeClr val="accent1"/>
+              </a:fillRef>
+              <a:effectRef idx="0">
+                <a:schemeClr val="accent1"/>
+              </a:effectRef>
+              <a:fontRef idx="minor">
+                <a:schemeClr val="lt1"/>
+              </a:fontRef>
+            </p:style>
+            <p:txBody>
+              <a:bodyPr rot="0" spcFirstLastPara="0" vertOverflow="overflow" horzOverflow="overflow" vert="horz" wrap="square" lIns="91440" tIns="45720" rIns="91440" bIns="45720" numCol="1" spcCol="0" rtlCol="0" fromWordArt="0" anchor="ctr" anchorCtr="0" forceAA="0" compatLnSpc="1">
+                <a:prstTxWarp prst="textNoShape">
+                  <a:avLst/>
+                </a:prstTxWarp>
+                <a:noAutofit/>
+              </a:bodyPr>
+              <a:lstStyle/>
+              <a:p>
+                <a:pPr algn="ctr"/>
+                <a:endParaRPr lang="en-US" dirty="0" err="1" smtClean="0">
+                  <a:solidFill>
+                    <a:schemeClr val="tx1"/>
+                  </a:solidFill>
+                </a:endParaRPr>
+              </a:p>
+            </p:txBody>
+          </p:sp>
+          <p:cxnSp>
+            <p:nvCxnSpPr>
+              <p:cNvPr id="47" name="肘形接點 46"/>
+              <p:cNvCxnSpPr/>
+              <p:nvPr/>
+            </p:nvCxnSpPr>
+            <p:spPr>
+              <a:xfrm rot="10800000" flipV="1">
+                <a:off x="6087438" y="1330036"/>
+                <a:ext cx="636998" cy="463272"/>
+              </a:xfrm>
+              <a:prstGeom prst="bentConnector3">
+                <a:avLst/>
+              </a:prstGeom>
+              <a:ln w="50800">
+                <a:solidFill>
+                  <a:schemeClr val="tx1"/>
+                </a:solidFill>
+              </a:ln>
+            </p:spPr>
+            <p:style>
+              <a:lnRef idx="1">
+                <a:schemeClr val="accent1"/>
+              </a:lnRef>
+              <a:fillRef idx="0">
+                <a:schemeClr val="accent1"/>
+              </a:fillRef>
+              <a:effectRef idx="0">
+                <a:schemeClr val="accent1"/>
+              </a:effectRef>
+              <a:fontRef idx="minor">
+                <a:schemeClr val="tx1"/>
+              </a:fontRef>
+            </p:style>
+          </p:cxnSp>
+        </p:grpSp>
+        <p:cxnSp>
+          <p:nvCxnSpPr>
+            <p:cNvPr id="48" name="直線接點 47"/>
+            <p:cNvCxnSpPr>
+              <a:stCxn id="106" idx="1"/>
+            </p:cNvCxnSpPr>
+            <p:nvPr/>
+          </p:nvCxnSpPr>
+          <p:spPr>
+            <a:xfrm flipH="1" flipV="1">
+              <a:off x="1546307" y="2200889"/>
+              <a:ext cx="1726059" cy="3141"/>
+            </a:xfrm>
+            <a:prstGeom prst="line">
+              <a:avLst/>
+            </a:prstGeom>
+            <a:ln w="50800">
+              <a:solidFill>
+                <a:schemeClr val="tx1"/>
+              </a:solidFill>
+            </a:ln>
+          </p:spPr>
+          <p:style>
+            <a:lnRef idx="1">
+              <a:schemeClr val="accent1"/>
+            </a:lnRef>
+            <a:fillRef idx="0">
+              <a:schemeClr val="accent1"/>
+            </a:fillRef>
+            <a:effectRef idx="0">
+              <a:schemeClr val="accent1"/>
+            </a:effectRef>
+            <a:fontRef idx="minor">
+              <a:schemeClr val="tx1"/>
+            </a:fontRef>
+          </p:style>
+        </p:cxnSp>
+        <p:cxnSp>
+          <p:nvCxnSpPr>
+            <p:cNvPr id="49" name="直線單箭頭接點 48"/>
+            <p:cNvCxnSpPr/>
+            <p:nvPr/>
+          </p:nvCxnSpPr>
+          <p:spPr>
+            <a:xfrm flipV="1">
+              <a:off x="1546307" y="1202141"/>
+              <a:ext cx="0" cy="3904311"/>
+            </a:xfrm>
+            <a:prstGeom prst="straightConnector1">
+              <a:avLst/>
+            </a:prstGeom>
+            <a:ln w="50800">
+              <a:solidFill>
+                <a:schemeClr val="tx1"/>
+              </a:solidFill>
+              <a:tailEnd type="triangle"/>
+            </a:ln>
+          </p:spPr>
+          <p:style>
+            <a:lnRef idx="1">
+              <a:schemeClr val="accent1"/>
+            </a:lnRef>
+            <a:fillRef idx="0">
+              <a:schemeClr val="accent1"/>
+            </a:fillRef>
+            <a:effectRef idx="0">
+              <a:schemeClr val="accent1"/>
+            </a:effectRef>
+            <a:fontRef idx="minor">
+              <a:schemeClr val="tx1"/>
+            </a:fontRef>
+          </p:style>
+        </p:cxnSp>
+        <p:sp>
+          <p:nvSpPr>
+            <p:cNvPr id="50" name="文字方塊 49"/>
+            <p:cNvSpPr txBox="1"/>
+            <p:nvPr/>
+          </p:nvSpPr>
+          <p:spPr>
+            <a:xfrm>
+              <a:off x="1597206" y="1837378"/>
+              <a:ext cx="780598" cy="369332"/>
+            </a:xfrm>
+            <a:prstGeom prst="rect">
+              <a:avLst/>
+            </a:prstGeom>
+            <a:noFill/>
+          </p:spPr>
+          <p:txBody>
+            <a:bodyPr wrap="none" rtlCol="0">
+              <a:spAutoFit/>
+            </a:bodyPr>
+            <a:lstStyle/>
+            <a:p>
+              <a:r>
+                <a:rPr lang="en-US" altLang="zh-TW" dirty="0" smtClean="0"/>
+                <a:t>x Tap1</a:t>
+              </a:r>
+              <a:endParaRPr lang="en-US" dirty="0"/>
+            </a:p>
+          </p:txBody>
+        </p:sp>
+        <p:cxnSp>
+          <p:nvCxnSpPr>
+            <p:cNvPr id="51" name="直線接點 50"/>
+            <p:cNvCxnSpPr>
+              <a:stCxn id="46" idx="1"/>
+              <a:endCxn id="44" idx="6"/>
+            </p:cNvCxnSpPr>
+            <p:nvPr/>
+          </p:nvCxnSpPr>
+          <p:spPr>
+            <a:xfrm flipH="1">
+              <a:off x="1833784" y="924183"/>
+              <a:ext cx="516619" cy="624"/>
+            </a:xfrm>
+            <a:prstGeom prst="line">
+              <a:avLst/>
+            </a:prstGeom>
+            <a:ln w="50800">
+              <a:solidFill>
+                <a:schemeClr val="tx1"/>
+              </a:solidFill>
+            </a:ln>
+          </p:spPr>
+          <p:style>
+            <a:lnRef idx="1">
+              <a:schemeClr val="accent1"/>
+            </a:lnRef>
+            <a:fillRef idx="0">
+              <a:schemeClr val="accent1"/>
+            </a:fillRef>
+            <a:effectRef idx="0">
+              <a:schemeClr val="accent1"/>
+            </a:effectRef>
+            <a:fontRef idx="minor">
+              <a:schemeClr val="tx1"/>
+            </a:fontRef>
+          </p:style>
+        </p:cxnSp>
+        <p:cxnSp>
+          <p:nvCxnSpPr>
+            <p:cNvPr id="52" name="直線接點 51"/>
+            <p:cNvCxnSpPr/>
+            <p:nvPr/>
+          </p:nvCxnSpPr>
+          <p:spPr>
+            <a:xfrm flipH="1">
+              <a:off x="2878271" y="924517"/>
+              <a:ext cx="1304401" cy="0"/>
+            </a:xfrm>
+            <a:prstGeom prst="line">
+              <a:avLst/>
+            </a:prstGeom>
+            <a:ln w="50800">
+              <a:solidFill>
+                <a:schemeClr val="tx1"/>
+              </a:solidFill>
+              <a:headEnd type="triangle"/>
+            </a:ln>
+          </p:spPr>
+          <p:style>
+            <a:lnRef idx="1">
+              <a:schemeClr val="accent1"/>
+            </a:lnRef>
+            <a:fillRef idx="0">
+              <a:schemeClr val="accent1"/>
+            </a:fillRef>
+            <a:effectRef idx="0">
+              <a:schemeClr val="accent1"/>
+            </a:effectRef>
+            <a:fontRef idx="minor">
+              <a:schemeClr val="tx1"/>
+            </a:fontRef>
+          </p:style>
+        </p:cxnSp>
+        <p:cxnSp>
+          <p:nvCxnSpPr>
+            <p:cNvPr id="53" name="直線接點 52"/>
+            <p:cNvCxnSpPr>
+              <a:endCxn id="106" idx="0"/>
+            </p:cNvCxnSpPr>
+            <p:nvPr/>
+          </p:nvCxnSpPr>
+          <p:spPr>
+            <a:xfrm>
+              <a:off x="3529220" y="924182"/>
+              <a:ext cx="0" cy="1059298"/>
+            </a:xfrm>
+            <a:prstGeom prst="line">
+              <a:avLst/>
+            </a:prstGeom>
+            <a:ln w="50800" cap="rnd">
+              <a:solidFill>
+                <a:schemeClr val="tx1"/>
+              </a:solidFill>
+              <a:tailEnd type="triangle"/>
+            </a:ln>
+          </p:spPr>
+          <p:style>
+            <a:lnRef idx="1">
+              <a:schemeClr val="accent1"/>
+            </a:lnRef>
+            <a:fillRef idx="0">
+              <a:schemeClr val="accent1"/>
+            </a:fillRef>
+            <a:effectRef idx="0">
+              <a:schemeClr val="accent1"/>
+            </a:effectRef>
+            <a:fontRef idx="minor">
+              <a:schemeClr val="tx1"/>
+            </a:fontRef>
+          </p:style>
+        </p:cxnSp>
+        <p:cxnSp>
+          <p:nvCxnSpPr>
+            <p:cNvPr id="54" name="直線接點 53"/>
+            <p:cNvCxnSpPr>
+              <a:stCxn id="106" idx="2"/>
+            </p:cNvCxnSpPr>
+            <p:nvPr/>
+          </p:nvCxnSpPr>
+          <p:spPr>
+            <a:xfrm>
+              <a:off x="3529220" y="2424580"/>
+              <a:ext cx="0" cy="1079531"/>
+            </a:xfrm>
+            <a:prstGeom prst="line">
+              <a:avLst/>
+            </a:prstGeom>
+            <a:ln w="50800" cap="rnd">
+              <a:solidFill>
+                <a:schemeClr val="tx1"/>
+              </a:solidFill>
+              <a:tailEnd type="triangle"/>
+            </a:ln>
+          </p:spPr>
+          <p:style>
+            <a:lnRef idx="1">
+              <a:schemeClr val="accent1"/>
+            </a:lnRef>
+            <a:fillRef idx="0">
+              <a:schemeClr val="accent1"/>
+            </a:fillRef>
+            <a:effectRef idx="0">
+              <a:schemeClr val="accent1"/>
+            </a:effectRef>
+            <a:fontRef idx="minor">
+              <a:schemeClr val="tx1"/>
+            </a:fontRef>
+          </p:style>
+        </p:cxnSp>
+        <p:sp>
+          <p:nvSpPr>
+            <p:cNvPr id="55" name="矩形 54"/>
+            <p:cNvSpPr/>
+            <p:nvPr/>
+          </p:nvSpPr>
+          <p:spPr>
+            <a:xfrm>
+              <a:off x="3272366" y="3503775"/>
+              <a:ext cx="513707" cy="441100"/>
+            </a:xfrm>
+            <a:prstGeom prst="rect">
+              <a:avLst/>
+            </a:prstGeom>
+            <a:noFill/>
+            <a:ln w="50800">
+              <a:solidFill>
+                <a:schemeClr val="tx1"/>
+              </a:solidFill>
+            </a:ln>
+          </p:spPr>
+          <p:style>
+            <a:lnRef idx="2">
+              <a:schemeClr val="accent1">
+                <a:shade val="50000"/>
+              </a:schemeClr>
+            </a:lnRef>
+            <a:fillRef idx="1">
+              <a:schemeClr val="accent1"/>
+            </a:fillRef>
+            <a:effectRef idx="0">
+              <a:schemeClr val="accent1"/>
+            </a:effectRef>
+            <a:fontRef idx="minor">
+              <a:schemeClr val="lt1"/>
+            </a:fontRef>
+          </p:style>
+          <p:txBody>
+            <a:bodyPr rtlCol="0" anchor="ctr"/>
+            <a:lstStyle/>
+            <a:p>
+              <a:pPr algn="ctr"/>
+              <a:r>
+                <a:rPr lang="en-US" dirty="0" smtClean="0">
+                  <a:solidFill>
+                    <a:schemeClr val="tx1"/>
+                  </a:solidFill>
+                </a:rPr>
+                <a:t>Z</a:t>
+              </a:r>
+              <a:r>
+                <a:rPr lang="en-US" baseline="30000" dirty="0" smtClean="0">
+                  <a:solidFill>
+                    <a:schemeClr val="tx1"/>
+                  </a:solidFill>
+                </a:rPr>
+                <a:t>-1</a:t>
+              </a:r>
+              <a:endParaRPr lang="en-US" baseline="30000" dirty="0">
+                <a:solidFill>
+                  <a:schemeClr val="tx1"/>
+                </a:solidFill>
+              </a:endParaRPr>
+            </a:p>
+          </p:txBody>
+        </p:sp>
+        <p:cxnSp>
+          <p:nvCxnSpPr>
+            <p:cNvPr id="56" name="直線接點 55"/>
+            <p:cNvCxnSpPr>
+              <a:stCxn id="55" idx="1"/>
+            </p:cNvCxnSpPr>
+            <p:nvPr/>
+          </p:nvCxnSpPr>
+          <p:spPr>
+            <a:xfrm flipH="1">
+              <a:off x="1536033" y="3724325"/>
+              <a:ext cx="1736333" cy="0"/>
+            </a:xfrm>
+            <a:prstGeom prst="line">
+              <a:avLst/>
+            </a:prstGeom>
+            <a:ln w="50800">
+              <a:solidFill>
+                <a:schemeClr val="tx1"/>
+              </a:solidFill>
+            </a:ln>
+          </p:spPr>
+          <p:style>
+            <a:lnRef idx="1">
+              <a:schemeClr val="accent1"/>
+            </a:lnRef>
+            <a:fillRef idx="0">
+              <a:schemeClr val="accent1"/>
+            </a:fillRef>
+            <a:effectRef idx="0">
+              <a:schemeClr val="accent1"/>
+            </a:effectRef>
+            <a:fontRef idx="minor">
+              <a:schemeClr val="tx1"/>
+            </a:fontRef>
+          </p:style>
+        </p:cxnSp>
+        <p:sp>
+          <p:nvSpPr>
+            <p:cNvPr id="57" name="文字方塊 56"/>
+            <p:cNvSpPr txBox="1"/>
+            <p:nvPr/>
+          </p:nvSpPr>
+          <p:spPr>
+            <a:xfrm>
+              <a:off x="1597206" y="3314328"/>
+              <a:ext cx="780598" cy="369332"/>
+            </a:xfrm>
+            <a:prstGeom prst="rect">
+              <a:avLst/>
+            </a:prstGeom>
+            <a:noFill/>
+          </p:spPr>
+          <p:txBody>
+            <a:bodyPr wrap="none" rtlCol="0">
+              <a:spAutoFit/>
+            </a:bodyPr>
+            <a:lstStyle/>
+            <a:p>
+              <a:r>
+                <a:rPr lang="en-US" altLang="zh-TW" dirty="0" smtClean="0"/>
+                <a:t>x Tap2</a:t>
+              </a:r>
+              <a:endParaRPr lang="en-US" dirty="0"/>
+            </a:p>
+          </p:txBody>
+        </p:sp>
+        <p:sp>
+          <p:nvSpPr>
+            <p:cNvPr id="58" name="矩形 57"/>
+            <p:cNvSpPr/>
+            <p:nvPr/>
+          </p:nvSpPr>
+          <p:spPr>
+            <a:xfrm>
+              <a:off x="3272366" y="4880045"/>
+              <a:ext cx="513707" cy="441100"/>
+            </a:xfrm>
+            <a:prstGeom prst="rect">
+              <a:avLst/>
+            </a:prstGeom>
+            <a:noFill/>
+            <a:ln w="50800">
+              <a:solidFill>
+                <a:schemeClr val="tx1"/>
+              </a:solidFill>
+            </a:ln>
+          </p:spPr>
+          <p:style>
+            <a:lnRef idx="2">
+              <a:schemeClr val="accent1">
+                <a:shade val="50000"/>
+              </a:schemeClr>
+            </a:lnRef>
+            <a:fillRef idx="1">
+              <a:schemeClr val="accent1"/>
+            </a:fillRef>
+            <a:effectRef idx="0">
+              <a:schemeClr val="accent1"/>
+            </a:effectRef>
+            <a:fontRef idx="minor">
+              <a:schemeClr val="lt1"/>
+            </a:fontRef>
+          </p:style>
+          <p:txBody>
+            <a:bodyPr rtlCol="0" anchor="ctr"/>
+            <a:lstStyle/>
+            <a:p>
+              <a:pPr algn="ctr"/>
+              <a:r>
+                <a:rPr lang="en-US" dirty="0" smtClean="0">
+                  <a:solidFill>
+                    <a:schemeClr val="tx1"/>
+                  </a:solidFill>
+                </a:rPr>
+                <a:t>Z</a:t>
+              </a:r>
+              <a:r>
+                <a:rPr lang="en-US" baseline="30000" dirty="0" smtClean="0">
+                  <a:solidFill>
+                    <a:schemeClr val="tx1"/>
+                  </a:solidFill>
+                </a:rPr>
+                <a:t>-1</a:t>
+              </a:r>
+              <a:endParaRPr lang="en-US" baseline="30000" dirty="0">
+                <a:solidFill>
+                  <a:schemeClr val="tx1"/>
+                </a:solidFill>
+              </a:endParaRPr>
+            </a:p>
+          </p:txBody>
+        </p:sp>
+        <p:cxnSp>
+          <p:nvCxnSpPr>
+            <p:cNvPr id="59" name="直線接點 58"/>
+            <p:cNvCxnSpPr/>
+            <p:nvPr/>
+          </p:nvCxnSpPr>
+          <p:spPr>
+            <a:xfrm>
+              <a:off x="3529220" y="3944875"/>
+              <a:ext cx="0" cy="935506"/>
+            </a:xfrm>
+            <a:prstGeom prst="line">
+              <a:avLst/>
+            </a:prstGeom>
+            <a:ln w="50800" cap="rnd">
+              <a:solidFill>
+                <a:schemeClr val="tx1"/>
+              </a:solidFill>
+              <a:tailEnd type="triangle"/>
+            </a:ln>
+          </p:spPr>
+          <p:style>
+            <a:lnRef idx="1">
+              <a:schemeClr val="accent1"/>
+            </a:lnRef>
+            <a:fillRef idx="0">
+              <a:schemeClr val="accent1"/>
+            </a:fillRef>
+            <a:effectRef idx="0">
+              <a:schemeClr val="accent1"/>
+            </a:effectRef>
+            <a:fontRef idx="minor">
+              <a:schemeClr val="tx1"/>
+            </a:fontRef>
+          </p:style>
+        </p:cxnSp>
+        <p:cxnSp>
+          <p:nvCxnSpPr>
+            <p:cNvPr id="60" name="直線接點 59"/>
+            <p:cNvCxnSpPr/>
+            <p:nvPr/>
+          </p:nvCxnSpPr>
+          <p:spPr>
+            <a:xfrm flipH="1">
+              <a:off x="1536033" y="5106452"/>
+              <a:ext cx="1736333" cy="0"/>
+            </a:xfrm>
+            <a:prstGeom prst="line">
+              <a:avLst/>
+            </a:prstGeom>
+            <a:ln w="50800">
+              <a:solidFill>
+                <a:schemeClr val="tx1"/>
+              </a:solidFill>
+            </a:ln>
+          </p:spPr>
+          <p:style>
+            <a:lnRef idx="1">
+              <a:schemeClr val="accent1"/>
+            </a:lnRef>
+            <a:fillRef idx="0">
+              <a:schemeClr val="accent1"/>
+            </a:fillRef>
+            <a:effectRef idx="0">
+              <a:schemeClr val="accent1"/>
+            </a:effectRef>
+            <a:fontRef idx="minor">
+              <a:schemeClr val="tx1"/>
+            </a:fontRef>
+          </p:style>
+        </p:cxnSp>
+        <p:sp>
+          <p:nvSpPr>
+            <p:cNvPr id="61" name="文字方塊 60"/>
+            <p:cNvSpPr txBox="1"/>
+            <p:nvPr/>
+          </p:nvSpPr>
+          <p:spPr>
+            <a:xfrm>
+              <a:off x="1597206" y="4696455"/>
+              <a:ext cx="780598" cy="369332"/>
+            </a:xfrm>
+            <a:prstGeom prst="rect">
+              <a:avLst/>
+            </a:prstGeom>
+            <a:noFill/>
+          </p:spPr>
+          <p:txBody>
+            <a:bodyPr wrap="none" rtlCol="0">
+              <a:spAutoFit/>
+            </a:bodyPr>
+            <a:lstStyle/>
+            <a:p>
+              <a:r>
+                <a:rPr lang="en-US" altLang="zh-TW" dirty="0" smtClean="0"/>
+                <a:t>x Tap3</a:t>
+              </a:r>
+              <a:endParaRPr lang="en-US" dirty="0"/>
+            </a:p>
+          </p:txBody>
+        </p:sp>
+        <p:cxnSp>
+          <p:nvCxnSpPr>
+            <p:cNvPr id="68" name="直線接點 67"/>
+            <p:cNvCxnSpPr/>
+            <p:nvPr/>
+          </p:nvCxnSpPr>
+          <p:spPr>
+            <a:xfrm flipH="1" flipV="1">
+              <a:off x="680391" y="924182"/>
+              <a:ext cx="572667" cy="625"/>
+            </a:xfrm>
+            <a:prstGeom prst="line">
+              <a:avLst/>
+            </a:prstGeom>
+            <a:ln w="50800">
+              <a:solidFill>
+                <a:schemeClr val="tx1"/>
+              </a:solidFill>
+              <a:headEnd type="triangle"/>
+            </a:ln>
+          </p:spPr>
+          <p:style>
+            <a:lnRef idx="1">
+              <a:schemeClr val="accent1"/>
+            </a:lnRef>
+            <a:fillRef idx="0">
+              <a:schemeClr val="accent1"/>
+            </a:fillRef>
+            <a:effectRef idx="0">
+              <a:schemeClr val="accent1"/>
+            </a:effectRef>
+            <a:fontRef idx="minor">
+              <a:schemeClr val="tx1"/>
+            </a:fontRef>
+          </p:style>
+        </p:cxnSp>
+        <p:sp>
+          <p:nvSpPr>
+            <p:cNvPr id="69" name="文字方塊 68"/>
+            <p:cNvSpPr txBox="1"/>
+            <p:nvPr/>
+          </p:nvSpPr>
+          <p:spPr>
+            <a:xfrm>
+              <a:off x="3574988" y="544030"/>
+              <a:ext cx="540533" cy="369332"/>
+            </a:xfrm>
+            <a:prstGeom prst="rect">
+              <a:avLst/>
+            </a:prstGeom>
+            <a:noFill/>
+          </p:spPr>
+          <p:txBody>
+            <a:bodyPr wrap="none" rtlCol="0">
+              <a:spAutoFit/>
+            </a:bodyPr>
+            <a:lstStyle/>
+            <a:p>
+              <a:r>
+                <a:rPr lang="en-US" dirty="0" err="1" smtClean="0"/>
+                <a:t>D</a:t>
+              </a:r>
+              <a:r>
+                <a:rPr lang="en-US" baseline="-25000" dirty="0" err="1" smtClean="0"/>
+                <a:t>out</a:t>
+              </a:r>
+              <a:endParaRPr lang="en-US" baseline="-25000" dirty="0"/>
+            </a:p>
+          </p:txBody>
+        </p:sp>
+        <p:sp>
+          <p:nvSpPr>
+            <p:cNvPr id="73" name="文字方塊 72"/>
+            <p:cNvSpPr txBox="1"/>
+            <p:nvPr/>
+          </p:nvSpPr>
+          <p:spPr>
+            <a:xfrm>
+              <a:off x="602608" y="254813"/>
+              <a:ext cx="1234312" cy="646331"/>
+            </a:xfrm>
+            <a:prstGeom prst="rect">
+              <a:avLst/>
+            </a:prstGeom>
+            <a:noFill/>
+          </p:spPr>
+          <p:txBody>
+            <a:bodyPr wrap="none" rtlCol="0">
+              <a:spAutoFit/>
+            </a:bodyPr>
+            <a:lstStyle/>
+            <a:p>
+              <a:r>
+                <a:rPr lang="en-US" dirty="0" smtClean="0"/>
+                <a:t>Differential</a:t>
+              </a:r>
+              <a:br>
+                <a:rPr lang="en-US" dirty="0" smtClean="0"/>
+              </a:br>
+              <a:r>
+                <a:rPr lang="en-US" dirty="0" smtClean="0"/>
+                <a:t>input</a:t>
+              </a:r>
+              <a:endParaRPr lang="en-US" baseline="-25000" dirty="0"/>
+            </a:p>
+          </p:txBody>
+        </p:sp>
+        <p:sp>
+          <p:nvSpPr>
+            <p:cNvPr id="106" name="矩形 105"/>
+            <p:cNvSpPr/>
+            <p:nvPr/>
+          </p:nvSpPr>
+          <p:spPr>
+            <a:xfrm>
+              <a:off x="3272366" y="1983480"/>
+              <a:ext cx="513707" cy="441100"/>
+            </a:xfrm>
+            <a:prstGeom prst="rect">
+              <a:avLst/>
+            </a:prstGeom>
+            <a:noFill/>
+            <a:ln w="50800">
+              <a:solidFill>
+                <a:schemeClr val="tx1"/>
+              </a:solidFill>
+            </a:ln>
+          </p:spPr>
+          <p:style>
+            <a:lnRef idx="2">
+              <a:schemeClr val="accent1">
+                <a:shade val="50000"/>
+              </a:schemeClr>
+            </a:lnRef>
+            <a:fillRef idx="1">
+              <a:schemeClr val="accent1"/>
+            </a:fillRef>
+            <a:effectRef idx="0">
+              <a:schemeClr val="accent1"/>
+            </a:effectRef>
+            <a:fontRef idx="minor">
+              <a:schemeClr val="lt1"/>
+            </a:fontRef>
+          </p:style>
+          <p:txBody>
+            <a:bodyPr rtlCol="0" anchor="ctr"/>
+            <a:lstStyle/>
+            <a:p>
+              <a:pPr algn="ctr"/>
+              <a:r>
+                <a:rPr lang="en-US" dirty="0" smtClean="0">
+                  <a:solidFill>
+                    <a:schemeClr val="tx1"/>
+                  </a:solidFill>
+                </a:rPr>
+                <a:t>Z</a:t>
+              </a:r>
+              <a:r>
+                <a:rPr lang="en-US" baseline="30000" dirty="0" smtClean="0">
+                  <a:solidFill>
+                    <a:schemeClr val="tx1"/>
+                  </a:solidFill>
+                </a:rPr>
+                <a:t>-1</a:t>
+              </a:r>
+              <a:endParaRPr lang="en-US" baseline="30000" dirty="0">
+                <a:solidFill>
+                  <a:schemeClr val="tx1"/>
+                </a:solidFill>
+              </a:endParaRPr>
+            </a:p>
+          </p:txBody>
+        </p:sp>
+      </p:grpSp>
+      <p:sp>
+        <p:nvSpPr>
+          <p:cNvPr id="112" name="文字方塊 111"/>
+          <p:cNvSpPr txBox="1"/>
+          <p:nvPr/>
+        </p:nvSpPr>
+        <p:spPr>
+          <a:xfrm>
+            <a:off x="1741101" y="778922"/>
+            <a:ext cx="1788118" cy="400110"/>
+          </a:xfrm>
+          <a:prstGeom prst="rect">
+            <a:avLst/>
+          </a:prstGeom>
+          <a:solidFill>
+            <a:schemeClr val="bg1">
+              <a:lumMod val="85000"/>
+            </a:schemeClr>
+          </a:solidFill>
+        </p:spPr>
+        <p:txBody>
+          <a:bodyPr wrap="none" rtlCol="0">
+            <a:spAutoFit/>
+          </a:bodyPr>
+          <a:lstStyle/>
+          <a:p>
+            <a:r>
+              <a:rPr lang="en-US" sz="2000" b="1" dirty="0" smtClean="0">
+                <a:solidFill>
+                  <a:srgbClr val="FF0000"/>
+                </a:solidFill>
+              </a:rPr>
+              <a:t>Traditional DFE</a:t>
+            </a:r>
+            <a:endParaRPr lang="en-US" sz="2000" b="1" dirty="0">
+              <a:solidFill>
+                <a:srgbClr val="FF0000"/>
+              </a:solidFill>
+            </a:endParaRPr>
+          </a:p>
+        </p:txBody>
+      </p:sp>
+      <p:sp>
+        <p:nvSpPr>
+          <p:cNvPr id="113" name="文字方塊 112"/>
+          <p:cNvSpPr txBox="1"/>
+          <p:nvPr/>
+        </p:nvSpPr>
+        <p:spPr>
+          <a:xfrm>
+            <a:off x="6168931" y="778922"/>
+            <a:ext cx="1996572" cy="400110"/>
+          </a:xfrm>
+          <a:prstGeom prst="rect">
+            <a:avLst/>
+          </a:prstGeom>
+          <a:solidFill>
+            <a:schemeClr val="bg1">
+              <a:lumMod val="85000"/>
+            </a:schemeClr>
+          </a:solidFill>
+        </p:spPr>
+        <p:txBody>
+          <a:bodyPr wrap="none" rtlCol="0">
+            <a:spAutoFit/>
+          </a:bodyPr>
+          <a:lstStyle/>
+          <a:p>
+            <a:r>
+              <a:rPr lang="en-US" sz="2000" b="1" dirty="0" smtClean="0">
+                <a:solidFill>
+                  <a:srgbClr val="FF0000"/>
+                </a:solidFill>
+              </a:rPr>
+              <a:t>Half-delayed DFE</a:t>
+            </a:r>
+            <a:endParaRPr lang="en-US" sz="2000" b="1" dirty="0">
+              <a:solidFill>
+                <a:srgbClr val="FF0000"/>
+              </a:solidFill>
+            </a:endParaRPr>
+          </a:p>
+        </p:txBody>
+      </p:sp>
+    </p:spTree>
+    <p:extLst>
+      <p:ext uri="{BB962C8B-B14F-4D97-AF65-F5344CB8AC3E}">
+        <p14:creationId xmlns:p14="http://schemas.microsoft.com/office/powerpoint/2010/main" val="1376592454"/>
       </p:ext>
     </p:extLst>
   </p:cSld>
@@ -11487,7 +13380,69 @@
       </a:bgFillStyleLst>
     </a:fmtScheme>
   </a:themeElements>
-  <a:objectDefaults/>
+  <a:objectDefaults>
+    <a:spDef>
+      <a:spPr>
+        <a:noFill/>
+        <a:ln w="50800">
+          <a:solidFill>
+            <a:schemeClr val="tx1"/>
+          </a:solidFill>
+        </a:ln>
+      </a:spPr>
+      <a:bodyPr rtlCol="0" anchor="ctr"/>
+      <a:lstStyle>
+        <a:defPPr algn="ctr">
+          <a:defRPr dirty="0" err="1" smtClean="0">
+            <a:solidFill>
+              <a:schemeClr val="tx1"/>
+            </a:solidFill>
+          </a:defRPr>
+        </a:defPPr>
+      </a:lstStyle>
+      <a:style>
+        <a:lnRef idx="2">
+          <a:schemeClr val="accent1">
+            <a:shade val="50000"/>
+          </a:schemeClr>
+        </a:lnRef>
+        <a:fillRef idx="1">
+          <a:schemeClr val="accent1"/>
+        </a:fillRef>
+        <a:effectRef idx="0">
+          <a:schemeClr val="accent1"/>
+        </a:effectRef>
+        <a:fontRef idx="minor">
+          <a:schemeClr val="lt1"/>
+        </a:fontRef>
+      </a:style>
+    </a:spDef>
+    <a:lnDef>
+      <a:spPr>
+        <a:ln w="50800" cap="rnd">
+          <a:solidFill>
+            <a:schemeClr val="tx1"/>
+          </a:solidFill>
+        </a:ln>
+      </a:spPr>
+      <a:bodyPr/>
+      <a:lstStyle/>
+      <a:style>
+        <a:lnRef idx="1">
+          <a:schemeClr val="accent1"/>
+        </a:lnRef>
+        <a:fillRef idx="0">
+          <a:schemeClr val="accent1"/>
+        </a:fillRef>
+        <a:effectRef idx="0">
+          <a:schemeClr val="accent1"/>
+        </a:effectRef>
+        <a:fontRef idx="minor">
+          <a:schemeClr val="tx1"/>
+        </a:fontRef>
+      </a:style>
+    </a:lnDef>
+  </a:objectDefaults>
   <a:extraClrSchemeLst/>
   <a:extLst>
     <a:ext uri="{05A4C25C-085E-4340-85A3-A5531E510DB2}">

</xml_diff>

<commit_message>
Update several figures and finish PCB trace subssection
</commit_message>
<xml_diff>
--- a/latex_report/Design Picture.pptx
+++ b/latex_report/Design Picture.pptx
@@ -249,7 +249,7 @@
           <a:p>
             <a:fld id="{D6C45EEA-C602-4478-A810-24EF6DA94153}" type="datetimeFigureOut">
               <a:rPr lang="en-US" smtClean="0"/>
-              <a:t>5/4/2016</a:t>
+              <a:t>5/10/2016</a:t>
             </a:fld>
             <a:endParaRPr lang="en-US"/>
           </a:p>
@@ -419,7 +419,7 @@
           <a:p>
             <a:fld id="{D6C45EEA-C602-4478-A810-24EF6DA94153}" type="datetimeFigureOut">
               <a:rPr lang="en-US" smtClean="0"/>
-              <a:t>5/4/2016</a:t>
+              <a:t>5/10/2016</a:t>
             </a:fld>
             <a:endParaRPr lang="en-US"/>
           </a:p>
@@ -599,7 +599,7 @@
           <a:p>
             <a:fld id="{D6C45EEA-C602-4478-A810-24EF6DA94153}" type="datetimeFigureOut">
               <a:rPr lang="en-US" smtClean="0"/>
-              <a:t>5/4/2016</a:t>
+              <a:t>5/10/2016</a:t>
             </a:fld>
             <a:endParaRPr lang="en-US"/>
           </a:p>
@@ -769,7 +769,7 @@
           <a:p>
             <a:fld id="{D6C45EEA-C602-4478-A810-24EF6DA94153}" type="datetimeFigureOut">
               <a:rPr lang="en-US" smtClean="0"/>
-              <a:t>5/4/2016</a:t>
+              <a:t>5/10/2016</a:t>
             </a:fld>
             <a:endParaRPr lang="en-US"/>
           </a:p>
@@ -1013,7 +1013,7 @@
           <a:p>
             <a:fld id="{D6C45EEA-C602-4478-A810-24EF6DA94153}" type="datetimeFigureOut">
               <a:rPr lang="en-US" smtClean="0"/>
-              <a:t>5/4/2016</a:t>
+              <a:t>5/10/2016</a:t>
             </a:fld>
             <a:endParaRPr lang="en-US"/>
           </a:p>
@@ -1245,7 +1245,7 @@
           <a:p>
             <a:fld id="{D6C45EEA-C602-4478-A810-24EF6DA94153}" type="datetimeFigureOut">
               <a:rPr lang="en-US" smtClean="0"/>
-              <a:t>5/4/2016</a:t>
+              <a:t>5/10/2016</a:t>
             </a:fld>
             <a:endParaRPr lang="en-US"/>
           </a:p>
@@ -1612,7 +1612,7 @@
           <a:p>
             <a:fld id="{D6C45EEA-C602-4478-A810-24EF6DA94153}" type="datetimeFigureOut">
               <a:rPr lang="en-US" smtClean="0"/>
-              <a:t>5/4/2016</a:t>
+              <a:t>5/10/2016</a:t>
             </a:fld>
             <a:endParaRPr lang="en-US"/>
           </a:p>
@@ -1730,7 +1730,7 @@
           <a:p>
             <a:fld id="{D6C45EEA-C602-4478-A810-24EF6DA94153}" type="datetimeFigureOut">
               <a:rPr lang="en-US" smtClean="0"/>
-              <a:t>5/4/2016</a:t>
+              <a:t>5/10/2016</a:t>
             </a:fld>
             <a:endParaRPr lang="en-US"/>
           </a:p>
@@ -1825,7 +1825,7 @@
           <a:p>
             <a:fld id="{D6C45EEA-C602-4478-A810-24EF6DA94153}" type="datetimeFigureOut">
               <a:rPr lang="en-US" smtClean="0"/>
-              <a:t>5/4/2016</a:t>
+              <a:t>5/10/2016</a:t>
             </a:fld>
             <a:endParaRPr lang="en-US"/>
           </a:p>
@@ -2102,7 +2102,7 @@
           <a:p>
             <a:fld id="{D6C45EEA-C602-4478-A810-24EF6DA94153}" type="datetimeFigureOut">
               <a:rPr lang="en-US" smtClean="0"/>
-              <a:t>5/4/2016</a:t>
+              <a:t>5/10/2016</a:t>
             </a:fld>
             <a:endParaRPr lang="en-US"/>
           </a:p>
@@ -2359,7 +2359,7 @@
           <a:p>
             <a:fld id="{D6C45EEA-C602-4478-A810-24EF6DA94153}" type="datetimeFigureOut">
               <a:rPr lang="en-US" smtClean="0"/>
-              <a:t>5/4/2016</a:t>
+              <a:t>5/10/2016</a:t>
             </a:fld>
             <a:endParaRPr lang="en-US"/>
           </a:p>
@@ -2572,7 +2572,7 @@
           <a:p>
             <a:fld id="{D6C45EEA-C602-4478-A810-24EF6DA94153}" type="datetimeFigureOut">
               <a:rPr lang="en-US" smtClean="0"/>
-              <a:t>5/4/2016</a:t>
+              <a:t>5/10/2016</a:t>
             </a:fld>
             <a:endParaRPr lang="en-US"/>
           </a:p>
@@ -4830,6 +4830,155 @@
           </p:txBody>
         </p:sp>
       </p:grpSp>
+      <p:sp>
+        <p:nvSpPr>
+          <p:cNvPr id="58" name="文字方塊 57"/>
+          <p:cNvSpPr txBox="1"/>
+          <p:nvPr/>
+        </p:nvSpPr>
+        <p:spPr>
+          <a:xfrm>
+            <a:off x="5423384" y="851704"/>
+            <a:ext cx="795647" cy="307777"/>
+          </a:xfrm>
+          <a:prstGeom prst="rect">
+            <a:avLst/>
+          </a:prstGeom>
+          <a:noFill/>
+        </p:spPr>
+        <p:txBody>
+          <a:bodyPr wrap="square" rtlCol="0">
+            <a:spAutoFit/>
+          </a:bodyPr>
+          <a:lstStyle/>
+          <a:p>
+            <a:r>
+              <a:rPr lang="en-US" sz="1400" b="1" dirty="0" smtClean="0"/>
+              <a:t>1  </a:t>
+            </a:r>
+            <a:r>
+              <a:rPr lang="en-US" sz="1400" b="1" dirty="0" smtClean="0"/>
+              <a:t>mil</a:t>
+            </a:r>
+            <a:endParaRPr lang="en-US" sz="1400" b="1" dirty="0"/>
+          </a:p>
+        </p:txBody>
+      </p:sp>
+      <p:sp>
+        <p:nvSpPr>
+          <p:cNvPr id="4" name="手繪多邊形 3"/>
+          <p:cNvSpPr/>
+          <p:nvPr/>
+        </p:nvSpPr>
+        <p:spPr>
+          <a:xfrm>
+            <a:off x="5957309" y="994874"/>
+            <a:ext cx="770631" cy="207460"/>
+          </a:xfrm>
+          <a:custGeom>
+            <a:avLst/>
+            <a:gdLst>
+              <a:gd name="connsiteX0" fmla="*/ 0 w 770631"/>
+              <a:gd name="connsiteY0" fmla="*/ 1977 h 207460"/>
+              <a:gd name="connsiteX1" fmla="*/ 267128 w 770631"/>
+              <a:gd name="connsiteY1" fmla="*/ 1977 h 207460"/>
+              <a:gd name="connsiteX2" fmla="*/ 585627 w 770631"/>
+              <a:gd name="connsiteY2" fmla="*/ 22526 h 207460"/>
+              <a:gd name="connsiteX3" fmla="*/ 770562 w 770631"/>
+              <a:gd name="connsiteY3" fmla="*/ 104719 h 207460"/>
+              <a:gd name="connsiteX4" fmla="*/ 606176 w 770631"/>
+              <a:gd name="connsiteY4" fmla="*/ 186912 h 207460"/>
+              <a:gd name="connsiteX5" fmla="*/ 503434 w 770631"/>
+              <a:gd name="connsiteY5" fmla="*/ 207460 h 207460"/>
+            </a:gdLst>
+            <a:ahLst/>
+            <a:cxnLst>
+              <a:cxn ang="0">
+                <a:pos x="connsiteX0" y="connsiteY0"/>
+              </a:cxn>
+              <a:cxn ang="0">
+                <a:pos x="connsiteX1" y="connsiteY1"/>
+              </a:cxn>
+              <a:cxn ang="0">
+                <a:pos x="connsiteX2" y="connsiteY2"/>
+              </a:cxn>
+              <a:cxn ang="0">
+                <a:pos x="connsiteX3" y="connsiteY3"/>
+              </a:cxn>
+              <a:cxn ang="0">
+                <a:pos x="connsiteX4" y="connsiteY4"/>
+              </a:cxn>
+              <a:cxn ang="0">
+                <a:pos x="connsiteX5" y="connsiteY5"/>
+              </a:cxn>
+            </a:cxnLst>
+            <a:rect l="l" t="t" r="r" b="b"/>
+            <a:pathLst>
+              <a:path w="770631" h="207460">
+                <a:moveTo>
+                  <a:pt x="0" y="1977"/>
+                </a:moveTo>
+                <a:cubicBezTo>
+                  <a:pt x="84762" y="264"/>
+                  <a:pt x="169524" y="-1448"/>
+                  <a:pt x="267128" y="1977"/>
+                </a:cubicBezTo>
+                <a:cubicBezTo>
+                  <a:pt x="364732" y="5402"/>
+                  <a:pt x="501721" y="5402"/>
+                  <a:pt x="585627" y="22526"/>
+                </a:cubicBezTo>
+                <a:cubicBezTo>
+                  <a:pt x="669533" y="39650"/>
+                  <a:pt x="767137" y="77321"/>
+                  <a:pt x="770562" y="104719"/>
+                </a:cubicBezTo>
+                <a:cubicBezTo>
+                  <a:pt x="773987" y="132117"/>
+                  <a:pt x="650697" y="169789"/>
+                  <a:pt x="606176" y="186912"/>
+                </a:cubicBezTo>
+                <a:cubicBezTo>
+                  <a:pt x="561655" y="204036"/>
+                  <a:pt x="532544" y="205748"/>
+                  <a:pt x="503434" y="207460"/>
+                </a:cubicBezTo>
+              </a:path>
+            </a:pathLst>
+          </a:custGeom>
+          <a:noFill/>
+          <a:ln w="12700">
+            <a:solidFill>
+              <a:schemeClr val="tx1"/>
+            </a:solidFill>
+            <a:tailEnd type="triangle"/>
+          </a:ln>
+        </p:spPr>
+        <p:style>
+          <a:lnRef idx="2">
+            <a:schemeClr val="accent1">
+              <a:shade val="50000"/>
+            </a:schemeClr>
+          </a:lnRef>
+          <a:fillRef idx="1">
+            <a:schemeClr val="accent1"/>
+          </a:fillRef>
+          <a:effectRef idx="0">
+            <a:schemeClr val="accent1"/>
+          </a:effectRef>
+          <a:fontRef idx="minor">
+            <a:schemeClr val="lt1"/>
+          </a:fontRef>
+        </p:style>
+        <p:txBody>
+          <a:bodyPr rtlCol="0" anchor="ctr"/>
+          <a:lstStyle/>
+          <a:p>
+            <a:pPr algn="ctr"/>
+            <a:endParaRPr lang="en-US"/>
+          </a:p>
+        </p:txBody>
+      </p:sp>
     </p:spTree>
     <p:extLst>
       <p:ext uri="{BB962C8B-B14F-4D97-AF65-F5344CB8AC3E}">
@@ -7271,6 +7420,221 @@
           </a:fontRef>
         </p:style>
       </p:cxnSp>
+      <p:cxnSp>
+        <p:nvCxnSpPr>
+          <p:cNvPr id="86" name="直線接點 85"/>
+          <p:cNvCxnSpPr/>
+          <p:nvPr/>
+        </p:nvCxnSpPr>
+        <p:spPr>
+          <a:xfrm>
+            <a:off x="6040133" y="1229040"/>
+            <a:ext cx="385879" cy="0"/>
+          </a:xfrm>
+          <a:prstGeom prst="line">
+            <a:avLst/>
+          </a:prstGeom>
+          <a:ln>
+            <a:prstDash val="lgDashDot"/>
+          </a:ln>
+        </p:spPr>
+        <p:style>
+          <a:lnRef idx="1">
+            <a:schemeClr val="accent1"/>
+          </a:lnRef>
+          <a:fillRef idx="0">
+            <a:schemeClr val="accent1"/>
+          </a:fillRef>
+          <a:effectRef idx="0">
+            <a:schemeClr val="accent1"/>
+          </a:effectRef>
+          <a:fontRef idx="minor">
+            <a:schemeClr val="tx1"/>
+          </a:fontRef>
+        </p:style>
+      </p:cxnSp>
+      <p:cxnSp>
+        <p:nvCxnSpPr>
+          <p:cNvPr id="87" name="直線接點 86"/>
+          <p:cNvCxnSpPr/>
+          <p:nvPr/>
+        </p:nvCxnSpPr>
+        <p:spPr>
+          <a:xfrm>
+            <a:off x="6068288" y="1159768"/>
+            <a:ext cx="385879" cy="0"/>
+          </a:xfrm>
+          <a:prstGeom prst="line">
+            <a:avLst/>
+          </a:prstGeom>
+          <a:ln>
+            <a:prstDash val="lgDashDot"/>
+          </a:ln>
+        </p:spPr>
+        <p:style>
+          <a:lnRef idx="1">
+            <a:schemeClr val="accent1"/>
+          </a:lnRef>
+          <a:fillRef idx="0">
+            <a:schemeClr val="accent1"/>
+          </a:fillRef>
+          <a:effectRef idx="0">
+            <a:schemeClr val="accent1"/>
+          </a:effectRef>
+          <a:fontRef idx="minor">
+            <a:schemeClr val="tx1"/>
+          </a:fontRef>
+        </p:style>
+      </p:cxnSp>
+      <p:sp>
+        <p:nvSpPr>
+          <p:cNvPr id="88" name="文字方塊 87"/>
+          <p:cNvSpPr txBox="1"/>
+          <p:nvPr/>
+        </p:nvSpPr>
+        <p:spPr>
+          <a:xfrm>
+            <a:off x="5789598" y="852885"/>
+            <a:ext cx="795647" cy="307777"/>
+          </a:xfrm>
+          <a:prstGeom prst="rect">
+            <a:avLst/>
+          </a:prstGeom>
+          <a:noFill/>
+        </p:spPr>
+        <p:txBody>
+          <a:bodyPr wrap="square" rtlCol="0">
+            <a:spAutoFit/>
+          </a:bodyPr>
+          <a:lstStyle/>
+          <a:p>
+            <a:r>
+              <a:rPr lang="en-US" sz="1400" b="1" dirty="0" smtClean="0"/>
+              <a:t>1  </a:t>
+            </a:r>
+            <a:r>
+              <a:rPr lang="en-US" sz="1400" b="1" dirty="0" smtClean="0"/>
+              <a:t>mil</a:t>
+            </a:r>
+            <a:endParaRPr lang="en-US" sz="1400" b="1" dirty="0"/>
+          </a:p>
+        </p:txBody>
+      </p:sp>
+      <p:sp>
+        <p:nvSpPr>
+          <p:cNvPr id="89" name="手繪多邊形 88"/>
+          <p:cNvSpPr/>
+          <p:nvPr/>
+        </p:nvSpPr>
+        <p:spPr>
+          <a:xfrm>
+            <a:off x="6349429" y="1005207"/>
+            <a:ext cx="265982" cy="197152"/>
+          </a:xfrm>
+          <a:custGeom>
+            <a:avLst/>
+            <a:gdLst>
+              <a:gd name="connsiteX0" fmla="*/ 0 w 770631"/>
+              <a:gd name="connsiteY0" fmla="*/ 1977 h 207460"/>
+              <a:gd name="connsiteX1" fmla="*/ 267128 w 770631"/>
+              <a:gd name="connsiteY1" fmla="*/ 1977 h 207460"/>
+              <a:gd name="connsiteX2" fmla="*/ 585627 w 770631"/>
+              <a:gd name="connsiteY2" fmla="*/ 22526 h 207460"/>
+              <a:gd name="connsiteX3" fmla="*/ 770562 w 770631"/>
+              <a:gd name="connsiteY3" fmla="*/ 104719 h 207460"/>
+              <a:gd name="connsiteX4" fmla="*/ 606176 w 770631"/>
+              <a:gd name="connsiteY4" fmla="*/ 186912 h 207460"/>
+              <a:gd name="connsiteX5" fmla="*/ 503434 w 770631"/>
+              <a:gd name="connsiteY5" fmla="*/ 207460 h 207460"/>
+            </a:gdLst>
+            <a:ahLst/>
+            <a:cxnLst>
+              <a:cxn ang="0">
+                <a:pos x="connsiteX0" y="connsiteY0"/>
+              </a:cxn>
+              <a:cxn ang="0">
+                <a:pos x="connsiteX1" y="connsiteY1"/>
+              </a:cxn>
+              <a:cxn ang="0">
+                <a:pos x="connsiteX2" y="connsiteY2"/>
+              </a:cxn>
+              <a:cxn ang="0">
+                <a:pos x="connsiteX3" y="connsiteY3"/>
+              </a:cxn>
+              <a:cxn ang="0">
+                <a:pos x="connsiteX4" y="connsiteY4"/>
+              </a:cxn>
+              <a:cxn ang="0">
+                <a:pos x="connsiteX5" y="connsiteY5"/>
+              </a:cxn>
+            </a:cxnLst>
+            <a:rect l="l" t="t" r="r" b="b"/>
+            <a:pathLst>
+              <a:path w="770631" h="207460">
+                <a:moveTo>
+                  <a:pt x="0" y="1977"/>
+                </a:moveTo>
+                <a:cubicBezTo>
+                  <a:pt x="84762" y="264"/>
+                  <a:pt x="169524" y="-1448"/>
+                  <a:pt x="267128" y="1977"/>
+                </a:cubicBezTo>
+                <a:cubicBezTo>
+                  <a:pt x="364732" y="5402"/>
+                  <a:pt x="501721" y="5402"/>
+                  <a:pt x="585627" y="22526"/>
+                </a:cubicBezTo>
+                <a:cubicBezTo>
+                  <a:pt x="669533" y="39650"/>
+                  <a:pt x="767137" y="77321"/>
+                  <a:pt x="770562" y="104719"/>
+                </a:cubicBezTo>
+                <a:cubicBezTo>
+                  <a:pt x="773987" y="132117"/>
+                  <a:pt x="650697" y="169789"/>
+                  <a:pt x="606176" y="186912"/>
+                </a:cubicBezTo>
+                <a:cubicBezTo>
+                  <a:pt x="561655" y="204036"/>
+                  <a:pt x="532544" y="205748"/>
+                  <a:pt x="503434" y="207460"/>
+                </a:cubicBezTo>
+              </a:path>
+            </a:pathLst>
+          </a:custGeom>
+          <a:noFill/>
+          <a:ln w="12700">
+            <a:solidFill>
+              <a:schemeClr val="tx1"/>
+            </a:solidFill>
+            <a:tailEnd type="triangle"/>
+          </a:ln>
+        </p:spPr>
+        <p:style>
+          <a:lnRef idx="2">
+            <a:schemeClr val="accent1">
+              <a:shade val="50000"/>
+            </a:schemeClr>
+          </a:lnRef>
+          <a:fillRef idx="1">
+            <a:schemeClr val="accent1"/>
+          </a:fillRef>
+          <a:effectRef idx="0">
+            <a:schemeClr val="accent1"/>
+          </a:effectRef>
+          <a:fontRef idx="minor">
+            <a:schemeClr val="lt1"/>
+          </a:fontRef>
+        </p:style>
+        <p:txBody>
+          <a:bodyPr rtlCol="0" anchor="ctr"/>
+          <a:lstStyle/>
+          <a:p>
+            <a:pPr algn="ctr"/>
+            <a:endParaRPr lang="en-US"/>
+          </a:p>
+        </p:txBody>
+      </p:sp>
     </p:spTree>
     <p:extLst>
       <p:ext uri="{BB962C8B-B14F-4D97-AF65-F5344CB8AC3E}">
@@ -10533,10 +10897,10 @@
         </p:nvGrpSpPr>
         <p:grpSpPr>
           <a:xfrm>
-            <a:off x="3346450" y="2640372"/>
-            <a:ext cx="4067748" cy="1577255"/>
-            <a:chOff x="3346450" y="2640372"/>
-            <a:chExt cx="4067748" cy="1577255"/>
+            <a:off x="2712378" y="2917861"/>
+            <a:ext cx="4701820" cy="1299766"/>
+            <a:chOff x="2712378" y="2917861"/>
+            <a:chExt cx="4701820" cy="1299766"/>
           </a:xfrm>
         </p:grpSpPr>
         <p:pic>
@@ -10555,13 +10919,13 @@
                 </a:ext>
               </a:extLst>
             </a:blip>
-            <a:srcRect l="34575" r="22026"/>
+            <a:srcRect l="26595" t="17593" r="22025"/>
             <a:stretch/>
           </p:blipFill>
           <p:spPr>
             <a:xfrm>
-              <a:off x="3346450" y="2640372"/>
-              <a:ext cx="3448050" cy="1577255"/>
+              <a:off x="2712378" y="2917861"/>
+              <a:ext cx="4082122" cy="1299766"/>
             </a:xfrm>
             <a:prstGeom prst="rect">
               <a:avLst/>

</xml_diff>

<commit_message>
Finish the Via transition and both pkg, pcb traces
</commit_message>
<xml_diff>
--- a/latex_report/Design Picture.pptx
+++ b/latex_report/Design Picture.pptx
@@ -9,9 +9,10 @@
     <p:sldId id="257" r:id="rId3"/>
     <p:sldId id="258" r:id="rId4"/>
     <p:sldId id="259" r:id="rId5"/>
-    <p:sldId id="260" r:id="rId6"/>
+    <p:sldId id="263" r:id="rId6"/>
     <p:sldId id="261" r:id="rId7"/>
-    <p:sldId id="262" r:id="rId8"/>
+    <p:sldId id="264" r:id="rId8"/>
+    <p:sldId id="262" r:id="rId9"/>
   </p:sldIdLst>
   <p:sldSz cx="9144000" cy="6858000" type="screen4x3"/>
   <p:notesSz cx="6858000" cy="9144000"/>
@@ -249,7 +250,7 @@
           <a:p>
             <a:fld id="{D6C45EEA-C602-4478-A810-24EF6DA94153}" type="datetimeFigureOut">
               <a:rPr lang="en-US" smtClean="0"/>
-              <a:t>5/10/2016</a:t>
+              <a:t>5/11/2016</a:t>
             </a:fld>
             <a:endParaRPr lang="en-US"/>
           </a:p>
@@ -419,7 +420,7 @@
           <a:p>
             <a:fld id="{D6C45EEA-C602-4478-A810-24EF6DA94153}" type="datetimeFigureOut">
               <a:rPr lang="en-US" smtClean="0"/>
-              <a:t>5/10/2016</a:t>
+              <a:t>5/11/2016</a:t>
             </a:fld>
             <a:endParaRPr lang="en-US"/>
           </a:p>
@@ -599,7 +600,7 @@
           <a:p>
             <a:fld id="{D6C45EEA-C602-4478-A810-24EF6DA94153}" type="datetimeFigureOut">
               <a:rPr lang="en-US" smtClean="0"/>
-              <a:t>5/10/2016</a:t>
+              <a:t>5/11/2016</a:t>
             </a:fld>
             <a:endParaRPr lang="en-US"/>
           </a:p>
@@ -769,7 +770,7 @@
           <a:p>
             <a:fld id="{D6C45EEA-C602-4478-A810-24EF6DA94153}" type="datetimeFigureOut">
               <a:rPr lang="en-US" smtClean="0"/>
-              <a:t>5/10/2016</a:t>
+              <a:t>5/11/2016</a:t>
             </a:fld>
             <a:endParaRPr lang="en-US"/>
           </a:p>
@@ -1013,7 +1014,7 @@
           <a:p>
             <a:fld id="{D6C45EEA-C602-4478-A810-24EF6DA94153}" type="datetimeFigureOut">
               <a:rPr lang="en-US" smtClean="0"/>
-              <a:t>5/10/2016</a:t>
+              <a:t>5/11/2016</a:t>
             </a:fld>
             <a:endParaRPr lang="en-US"/>
           </a:p>
@@ -1245,7 +1246,7 @@
           <a:p>
             <a:fld id="{D6C45EEA-C602-4478-A810-24EF6DA94153}" type="datetimeFigureOut">
               <a:rPr lang="en-US" smtClean="0"/>
-              <a:t>5/10/2016</a:t>
+              <a:t>5/11/2016</a:t>
             </a:fld>
             <a:endParaRPr lang="en-US"/>
           </a:p>
@@ -1612,7 +1613,7 @@
           <a:p>
             <a:fld id="{D6C45EEA-C602-4478-A810-24EF6DA94153}" type="datetimeFigureOut">
               <a:rPr lang="en-US" smtClean="0"/>
-              <a:t>5/10/2016</a:t>
+              <a:t>5/11/2016</a:t>
             </a:fld>
             <a:endParaRPr lang="en-US"/>
           </a:p>
@@ -1730,7 +1731,7 @@
           <a:p>
             <a:fld id="{D6C45EEA-C602-4478-A810-24EF6DA94153}" type="datetimeFigureOut">
               <a:rPr lang="en-US" smtClean="0"/>
-              <a:t>5/10/2016</a:t>
+              <a:t>5/11/2016</a:t>
             </a:fld>
             <a:endParaRPr lang="en-US"/>
           </a:p>
@@ -1825,7 +1826,7 @@
           <a:p>
             <a:fld id="{D6C45EEA-C602-4478-A810-24EF6DA94153}" type="datetimeFigureOut">
               <a:rPr lang="en-US" smtClean="0"/>
-              <a:t>5/10/2016</a:t>
+              <a:t>5/11/2016</a:t>
             </a:fld>
             <a:endParaRPr lang="en-US"/>
           </a:p>
@@ -2102,7 +2103,7 @@
           <a:p>
             <a:fld id="{D6C45EEA-C602-4478-A810-24EF6DA94153}" type="datetimeFigureOut">
               <a:rPr lang="en-US" smtClean="0"/>
-              <a:t>5/10/2016</a:t>
+              <a:t>5/11/2016</a:t>
             </a:fld>
             <a:endParaRPr lang="en-US"/>
           </a:p>
@@ -2359,7 +2360,7 @@
           <a:p>
             <a:fld id="{D6C45EEA-C602-4478-A810-24EF6DA94153}" type="datetimeFigureOut">
               <a:rPr lang="en-US" smtClean="0"/>
-              <a:t>5/10/2016</a:t>
+              <a:t>5/11/2016</a:t>
             </a:fld>
             <a:endParaRPr lang="en-US"/>
           </a:p>
@@ -2572,7 +2573,7 @@
           <a:p>
             <a:fld id="{D6C45EEA-C602-4478-A810-24EF6DA94153}" type="datetimeFigureOut">
               <a:rPr lang="en-US" smtClean="0"/>
-              <a:t>5/10/2016</a:t>
+              <a:t>5/11/2016</a:t>
             </a:fld>
             <a:endParaRPr lang="en-US"/>
           </a:p>
@@ -4854,11 +4855,7 @@
           <a:p>
             <a:r>
               <a:rPr lang="en-US" sz="1400" b="1" dirty="0" smtClean="0"/>
-              <a:t>1  </a:t>
-            </a:r>
-            <a:r>
-              <a:rPr lang="en-US" sz="1400" b="1" dirty="0" smtClean="0"/>
-              <a:t>mil</a:t>
+              <a:t>1  mil</a:t>
             </a:r>
             <a:endParaRPr lang="en-US" sz="1400" b="1" dirty="0"/>
           </a:p>
@@ -7510,11 +7507,7 @@
           <a:p>
             <a:r>
               <a:rPr lang="en-US" sz="1400" b="1" dirty="0" smtClean="0"/>
-              <a:t>1  </a:t>
-            </a:r>
-            <a:r>
-              <a:rPr lang="en-US" sz="1400" b="1" dirty="0" smtClean="0"/>
-              <a:t>mil</a:t>
+              <a:t>1  mil</a:t>
             </a:r>
             <a:endParaRPr lang="en-US" sz="1400" b="1" dirty="0"/>
           </a:p>
@@ -10186,286 +10179,103 @@
       </p:grpSpPr>
       <p:grpSp>
         <p:nvGrpSpPr>
-          <p:cNvPr id="25" name="群組 24"/>
+          <p:cNvPr id="12" name="群組 11"/>
           <p:cNvGrpSpPr/>
           <p:nvPr/>
         </p:nvGrpSpPr>
         <p:grpSpPr>
           <a:xfrm>
-            <a:off x="3346450" y="2640372"/>
-            <a:ext cx="4067748" cy="1577255"/>
-            <a:chOff x="3346450" y="2640372"/>
-            <a:chExt cx="4067748" cy="1577255"/>
+            <a:off x="595915" y="2092722"/>
+            <a:ext cx="1954020" cy="888250"/>
+            <a:chOff x="2054345" y="5704659"/>
+            <a:chExt cx="1954020" cy="888250"/>
           </a:xfrm>
         </p:grpSpPr>
-        <p:pic>
-          <p:nvPicPr>
-            <p:cNvPr id="2" name="圖片 1"/>
-            <p:cNvPicPr>
-              <a:picLocks noChangeAspect="1"/>
-            </p:cNvPicPr>
-            <p:nvPr/>
-          </p:nvPicPr>
-          <p:blipFill rotWithShape="1">
-            <a:blip r:embed="rId2">
-              <a:extLst>
-                <a:ext uri="{28A0092B-C50C-407E-A947-70E740481C1C}">
-                  <a14:useLocalDpi xmlns:a14="http://schemas.microsoft.com/office/drawing/2010/main" val="0"/>
-                </a:ext>
-              </a:extLst>
-            </a:blip>
-            <a:srcRect l="34575" r="22026"/>
-            <a:stretch/>
-          </p:blipFill>
-          <p:spPr>
-            <a:xfrm>
-              <a:off x="3346450" y="2640372"/>
-              <a:ext cx="3448050" cy="1577255"/>
-            </a:xfrm>
-            <a:prstGeom prst="rect">
-              <a:avLst/>
-            </a:prstGeom>
-          </p:spPr>
-        </p:pic>
-        <p:cxnSp>
-          <p:nvCxnSpPr>
-            <p:cNvPr id="3" name="直線單箭頭接點 2"/>
-            <p:cNvCxnSpPr/>
-            <p:nvPr/>
-          </p:nvCxnSpPr>
-          <p:spPr>
-            <a:xfrm>
-              <a:off x="5806193" y="3767138"/>
-              <a:ext cx="0" cy="166928"/>
-            </a:xfrm>
-            <a:prstGeom prst="straightConnector1">
-              <a:avLst/>
-            </a:prstGeom>
-            <a:ln>
-              <a:solidFill>
-                <a:schemeClr val="tx1"/>
-              </a:solidFill>
-              <a:headEnd type="triangle"/>
-              <a:tailEnd type="triangle"/>
-            </a:ln>
-          </p:spPr>
-          <p:style>
-            <a:lnRef idx="1">
-              <a:schemeClr val="accent1"/>
-            </a:lnRef>
-            <a:fillRef idx="0">
-              <a:schemeClr val="accent1"/>
-            </a:fillRef>
-            <a:effectRef idx="0">
-              <a:schemeClr val="accent1"/>
-            </a:effectRef>
-            <a:fontRef idx="minor">
-              <a:schemeClr val="tx1"/>
-            </a:fontRef>
-          </p:style>
-        </p:cxnSp>
-        <p:sp>
-          <p:nvSpPr>
-            <p:cNvPr id="6" name="文字方塊 5"/>
-            <p:cNvSpPr txBox="1"/>
-            <p:nvPr/>
-          </p:nvSpPr>
-          <p:spPr>
-            <a:xfrm>
-              <a:off x="5806193" y="3696713"/>
-              <a:ext cx="795647" cy="307777"/>
-            </a:xfrm>
-            <a:prstGeom prst="rect">
-              <a:avLst/>
-            </a:prstGeom>
-            <a:noFill/>
-          </p:spPr>
-          <p:txBody>
-            <a:bodyPr wrap="square" rtlCol="0">
-              <a:spAutoFit/>
-            </a:bodyPr>
-            <a:lstStyle/>
-            <a:p>
-              <a:r>
-                <a:rPr lang="en-US" sz="1400" b="1" dirty="0" smtClean="0"/>
-                <a:t>19 mil</a:t>
-              </a:r>
-              <a:endParaRPr lang="en-US" sz="1400" b="1" dirty="0"/>
-            </a:p>
-          </p:txBody>
-        </p:sp>
-        <p:cxnSp>
-          <p:nvCxnSpPr>
-            <p:cNvPr id="7" name="直線單箭頭接點 6"/>
-            <p:cNvCxnSpPr/>
-            <p:nvPr/>
-          </p:nvCxnSpPr>
-          <p:spPr>
-            <a:xfrm flipH="1">
-              <a:off x="4940300" y="3691951"/>
-              <a:ext cx="427743" cy="4762"/>
-            </a:xfrm>
-            <a:prstGeom prst="straightConnector1">
-              <a:avLst/>
-            </a:prstGeom>
-            <a:ln>
-              <a:solidFill>
-                <a:schemeClr val="tx1"/>
-              </a:solidFill>
-              <a:headEnd type="triangle"/>
-              <a:tailEnd type="triangle"/>
-            </a:ln>
-          </p:spPr>
-          <p:style>
-            <a:lnRef idx="1">
-              <a:schemeClr val="accent1"/>
-            </a:lnRef>
-            <a:fillRef idx="0">
-              <a:schemeClr val="accent1"/>
-            </a:fillRef>
-            <a:effectRef idx="0">
-              <a:schemeClr val="accent1"/>
-            </a:effectRef>
-            <a:fontRef idx="minor">
-              <a:schemeClr val="tx1"/>
-            </a:fontRef>
-          </p:style>
-        </p:cxnSp>
-        <p:cxnSp>
-          <p:nvCxnSpPr>
-            <p:cNvPr id="9" name="直線單箭頭接點 8"/>
-            <p:cNvCxnSpPr/>
-            <p:nvPr/>
-          </p:nvCxnSpPr>
-          <p:spPr>
-            <a:xfrm flipH="1">
-              <a:off x="4191001" y="3688202"/>
-              <a:ext cx="749299" cy="0"/>
-            </a:xfrm>
-            <a:prstGeom prst="straightConnector1">
-              <a:avLst/>
-            </a:prstGeom>
-            <a:ln>
-              <a:solidFill>
-                <a:schemeClr val="tx1"/>
-              </a:solidFill>
-              <a:headEnd type="triangle"/>
-              <a:tailEnd type="triangle"/>
-            </a:ln>
-          </p:spPr>
-          <p:style>
-            <a:lnRef idx="1">
-              <a:schemeClr val="accent1"/>
-            </a:lnRef>
-            <a:fillRef idx="0">
-              <a:schemeClr val="accent1"/>
-            </a:fillRef>
-            <a:effectRef idx="0">
-              <a:schemeClr val="accent1"/>
-            </a:effectRef>
-            <a:fontRef idx="minor">
-              <a:schemeClr val="tx1"/>
-            </a:fontRef>
-          </p:style>
-        </p:cxnSp>
-        <p:sp>
-          <p:nvSpPr>
-            <p:cNvPr id="10" name="文字方塊 9"/>
-            <p:cNvSpPr txBox="1"/>
-            <p:nvPr/>
-          </p:nvSpPr>
-          <p:spPr>
-            <a:xfrm>
-              <a:off x="4890601" y="3382300"/>
-              <a:ext cx="795647" cy="307777"/>
-            </a:xfrm>
-            <a:prstGeom prst="rect">
-              <a:avLst/>
-            </a:prstGeom>
-            <a:noFill/>
-          </p:spPr>
-          <p:txBody>
-            <a:bodyPr wrap="square" rtlCol="0">
-              <a:spAutoFit/>
-            </a:bodyPr>
-            <a:lstStyle/>
-            <a:p>
-              <a:r>
-                <a:rPr lang="en-US" altLang="zh-TW" sz="1400" b="1" dirty="0" smtClean="0"/>
-                <a:t>40</a:t>
-              </a:r>
-              <a:r>
-                <a:rPr lang="en-US" sz="1400" b="1" dirty="0" smtClean="0"/>
-                <a:t> mil</a:t>
-              </a:r>
-              <a:endParaRPr lang="en-US" sz="1400" b="1" dirty="0"/>
-            </a:p>
-          </p:txBody>
-        </p:sp>
-        <p:sp>
-          <p:nvSpPr>
-            <p:cNvPr id="12" name="文字方塊 11"/>
-            <p:cNvSpPr txBox="1"/>
-            <p:nvPr/>
-          </p:nvSpPr>
-          <p:spPr>
-            <a:xfrm>
-              <a:off x="4270903" y="3384174"/>
-              <a:ext cx="795647" cy="307777"/>
-            </a:xfrm>
-            <a:prstGeom prst="rect">
-              <a:avLst/>
-            </a:prstGeom>
-            <a:noFill/>
-          </p:spPr>
-          <p:txBody>
-            <a:bodyPr wrap="square" rtlCol="0">
-              <a:spAutoFit/>
-            </a:bodyPr>
-            <a:lstStyle/>
-            <a:p>
-              <a:r>
-                <a:rPr lang="en-US" altLang="zh-TW" sz="1400" b="1" dirty="0" smtClean="0"/>
-                <a:t>80</a:t>
-              </a:r>
-              <a:r>
-                <a:rPr lang="en-US" sz="1400" b="1" dirty="0" smtClean="0"/>
-                <a:t> mil</a:t>
-              </a:r>
-              <a:endParaRPr lang="en-US" sz="1400" b="1" dirty="0"/>
-            </a:p>
-          </p:txBody>
-        </p:sp>
         <p:grpSp>
           <p:nvGrpSpPr>
-            <p:cNvPr id="15" name="群組 14"/>
+            <p:cNvPr id="13" name="群組 12"/>
             <p:cNvGrpSpPr/>
             <p:nvPr/>
           </p:nvGrpSpPr>
           <p:grpSpPr>
             <a:xfrm>
-              <a:off x="6820635" y="3726302"/>
-              <a:ext cx="385879" cy="31172"/>
-              <a:chOff x="6075218" y="2826240"/>
-              <a:chExt cx="385879" cy="31172"/>
+              <a:off x="2054345" y="5704659"/>
+              <a:ext cx="1954020" cy="180020"/>
+              <a:chOff x="4402535" y="4538816"/>
+              <a:chExt cx="1954020" cy="180020"/>
             </a:xfrm>
           </p:grpSpPr>
+          <p:sp>
+            <p:nvSpPr>
+              <p:cNvPr id="19" name="矩形 18"/>
+              <p:cNvSpPr/>
+              <p:nvPr/>
+            </p:nvSpPr>
+            <p:spPr>
+              <a:xfrm>
+                <a:off x="4672927" y="4538816"/>
+                <a:ext cx="1439593" cy="180020"/>
+              </a:xfrm>
+              <a:prstGeom prst="rect">
+                <a:avLst/>
+              </a:prstGeom>
+              <a:solidFill>
+                <a:schemeClr val="accent1">
+                  <a:lumMod val="20000"/>
+                  <a:lumOff val="80000"/>
+                </a:schemeClr>
+              </a:solidFill>
+              <a:ln w="50800">
+                <a:solidFill>
+                  <a:schemeClr val="tx1"/>
+                </a:solidFill>
+              </a:ln>
+            </p:spPr>
+            <p:style>
+              <a:lnRef idx="2">
+                <a:schemeClr val="accent1">
+                  <a:shade val="50000"/>
+                </a:schemeClr>
+              </a:lnRef>
+              <a:fillRef idx="1">
+                <a:schemeClr val="accent1"/>
+              </a:fillRef>
+              <a:effectRef idx="0">
+                <a:schemeClr val="accent1"/>
+              </a:effectRef>
+              <a:fontRef idx="minor">
+                <a:schemeClr val="lt1"/>
+              </a:fontRef>
+            </p:style>
+            <p:txBody>
+              <a:bodyPr rtlCol="0" anchor="ctr"/>
+              <a:lstStyle/>
+              <a:p>
+                <a:pPr algn="ctr"/>
+                <a:endParaRPr lang="zh-TW" altLang="en-US"/>
+              </a:p>
+            </p:txBody>
+          </p:sp>
           <p:cxnSp>
             <p:nvCxnSpPr>
-              <p:cNvPr id="13" name="直線接點 12"/>
+              <p:cNvPr id="20" name="直線接點 19"/>
               <p:cNvCxnSpPr/>
               <p:nvPr/>
             </p:nvCxnSpPr>
             <p:spPr>
               <a:xfrm>
-                <a:off x="6075218" y="2826240"/>
-                <a:ext cx="385879" cy="0"/>
+                <a:off x="6127098" y="4628826"/>
+                <a:ext cx="229457" cy="0"/>
               </a:xfrm>
               <a:prstGeom prst="line">
                 <a:avLst/>
               </a:prstGeom>
-              <a:ln>
-                <a:prstDash val="lgDashDot"/>
+              <a:ln w="50800" cap="rnd">
+                <a:solidFill>
+                  <a:schemeClr val="tx1"/>
+                </a:solidFill>
+                <a:headEnd type="none"/>
+                <a:tailEnd type="none" w="med" len="sm"/>
               </a:ln>
             </p:spPr>
             <p:style>
@@ -10485,20 +10295,26 @@
           </p:cxnSp>
           <p:cxnSp>
             <p:nvCxnSpPr>
-              <p:cNvPr id="14" name="直線接點 13"/>
-              <p:cNvCxnSpPr/>
+              <p:cNvPr id="21" name="直線接點 20"/>
+              <p:cNvCxnSpPr>
+                <a:endCxn id="19" idx="1"/>
+              </p:cNvCxnSpPr>
               <p:nvPr/>
             </p:nvCxnSpPr>
             <p:spPr>
               <a:xfrm>
-                <a:off x="6075218" y="2857412"/>
-                <a:ext cx="385879" cy="0"/>
+                <a:off x="4402535" y="4628826"/>
+                <a:ext cx="270392" cy="0"/>
               </a:xfrm>
               <a:prstGeom prst="line">
                 <a:avLst/>
               </a:prstGeom>
-              <a:ln>
-                <a:prstDash val="lgDashDot"/>
+              <a:ln w="50800" cap="rnd">
+                <a:solidFill>
+                  <a:schemeClr val="tx1"/>
+                </a:solidFill>
+                <a:headEnd type="none"/>
+                <a:tailEnd type="none" w="med" len="sm"/>
               </a:ln>
             </p:spPr>
             <p:style>
@@ -10517,20 +10333,106 @@
             </p:style>
           </p:cxnSp>
         </p:grpSp>
+        <p:sp>
+          <p:nvSpPr>
+            <p:cNvPr id="14" name="文字方塊 13"/>
+            <p:cNvSpPr txBox="1"/>
+            <p:nvPr/>
+          </p:nvSpPr>
+          <p:spPr>
+            <a:xfrm>
+              <a:off x="2241271" y="5949948"/>
+              <a:ext cx="1606530" cy="369332"/>
+            </a:xfrm>
+            <a:prstGeom prst="rect">
+              <a:avLst/>
+            </a:prstGeom>
+            <a:noFill/>
+          </p:spPr>
+          <p:txBody>
+            <a:bodyPr wrap="none" rtlCol="0">
+              <a:spAutoFit/>
+            </a:bodyPr>
+            <a:lstStyle/>
+            <a:p>
+              <a:pPr algn="ctr"/>
+              <a:r>
+                <a:rPr lang="en-US" altLang="zh-TW" b="1" i="1" dirty="0" smtClean="0">
+                  <a:latin typeface="Bookman Old Style" panose="02050604050505020204" pitchFamily="18" charset="0"/>
+                </a:rPr>
+                <a:t>Differential</a:t>
+              </a:r>
+              <a:endParaRPr lang="en-US" b="1" i="1" dirty="0">
+                <a:latin typeface="Bookman Old Style" panose="02050604050505020204" pitchFamily="18" charset="0"/>
+              </a:endParaRPr>
+            </a:p>
+          </p:txBody>
+        </p:sp>
         <p:grpSp>
           <p:nvGrpSpPr>
-            <p:cNvPr id="16" name="群組 15"/>
+            <p:cNvPr id="15" name="群組 14"/>
             <p:cNvGrpSpPr/>
             <p:nvPr/>
           </p:nvGrpSpPr>
           <p:grpSpPr>
             <a:xfrm>
-              <a:off x="6820635" y="3934066"/>
-              <a:ext cx="385879" cy="31172"/>
-              <a:chOff x="6075218" y="2826240"/>
-              <a:chExt cx="385879" cy="31172"/>
+              <a:off x="2054345" y="6412889"/>
+              <a:ext cx="1954020" cy="180020"/>
+              <a:chOff x="4402535" y="4538816"/>
+              <a:chExt cx="1954020" cy="180020"/>
             </a:xfrm>
           </p:grpSpPr>
+          <p:sp>
+            <p:nvSpPr>
+              <p:cNvPr id="16" name="矩形 15"/>
+              <p:cNvSpPr/>
+              <p:nvPr/>
+            </p:nvSpPr>
+            <p:spPr>
+              <a:xfrm>
+                <a:off x="4672927" y="4538816"/>
+                <a:ext cx="1439593" cy="180020"/>
+              </a:xfrm>
+              <a:prstGeom prst="rect">
+                <a:avLst/>
+              </a:prstGeom>
+              <a:solidFill>
+                <a:schemeClr val="accent1">
+                  <a:lumMod val="20000"/>
+                  <a:lumOff val="80000"/>
+                </a:schemeClr>
+              </a:solidFill>
+              <a:ln w="50800">
+                <a:solidFill>
+                  <a:schemeClr val="tx1"/>
+                </a:solidFill>
+              </a:ln>
+            </p:spPr>
+            <p:style>
+              <a:lnRef idx="2">
+                <a:schemeClr val="accent1">
+                  <a:shade val="50000"/>
+                </a:schemeClr>
+              </a:lnRef>
+              <a:fillRef idx="1">
+                <a:schemeClr val="accent1"/>
+              </a:fillRef>
+              <a:effectRef idx="0">
+                <a:schemeClr val="accent1"/>
+              </a:effectRef>
+              <a:fontRef idx="minor">
+                <a:schemeClr val="lt1"/>
+              </a:fontRef>
+            </p:style>
+            <p:txBody>
+              <a:bodyPr rtlCol="0" anchor="ctr"/>
+              <a:lstStyle/>
+              <a:p>
+                <a:pPr algn="ctr"/>
+                <a:endParaRPr lang="zh-TW" altLang="en-US"/>
+              </a:p>
+            </p:txBody>
+          </p:sp>
           <p:cxnSp>
             <p:nvCxnSpPr>
               <p:cNvPr id="17" name="直線接點 16"/>
@@ -10539,14 +10441,18 @@
             </p:nvCxnSpPr>
             <p:spPr>
               <a:xfrm>
-                <a:off x="6075218" y="2826240"/>
-                <a:ext cx="385879" cy="0"/>
+                <a:off x="6127098" y="4628826"/>
+                <a:ext cx="229457" cy="0"/>
               </a:xfrm>
               <a:prstGeom prst="line">
                 <a:avLst/>
               </a:prstGeom>
-              <a:ln>
-                <a:prstDash val="lgDashDot"/>
+              <a:ln w="50800" cap="rnd">
+                <a:solidFill>
+                  <a:schemeClr val="tx1"/>
+                </a:solidFill>
+                <a:headEnd type="none"/>
+                <a:tailEnd type="none" w="med" len="sm"/>
               </a:ln>
             </p:spPr>
             <p:style>
@@ -10567,19 +10473,25 @@
           <p:cxnSp>
             <p:nvCxnSpPr>
               <p:cNvPr id="18" name="直線接點 17"/>
-              <p:cNvCxnSpPr/>
+              <p:cNvCxnSpPr>
+                <a:endCxn id="16" idx="1"/>
+              </p:cNvCxnSpPr>
               <p:nvPr/>
             </p:nvCxnSpPr>
             <p:spPr>
               <a:xfrm>
-                <a:off x="6075218" y="2857412"/>
-                <a:ext cx="385879" cy="0"/>
+                <a:off x="4402535" y="4628826"/>
+                <a:ext cx="270392" cy="0"/>
               </a:xfrm>
               <a:prstGeom prst="line">
                 <a:avLst/>
               </a:prstGeom>
-              <a:ln>
-                <a:prstDash val="lgDashDot"/>
+              <a:ln w="50800" cap="rnd">
+                <a:solidFill>
+                  <a:schemeClr val="tx1"/>
+                </a:solidFill>
+                <a:headEnd type="none"/>
+                <a:tailEnd type="none" w="med" len="sm"/>
               </a:ln>
             </p:spPr>
             <p:style>
@@ -10598,124 +10510,79 @@
             </p:style>
           </p:cxnSp>
         </p:grpSp>
+      </p:grpSp>
+      <p:cxnSp>
+        <p:nvCxnSpPr>
+          <p:cNvPr id="22" name="肘形接點 21"/>
+          <p:cNvCxnSpPr>
+            <a:stCxn id="81" idx="0"/>
+          </p:cNvCxnSpPr>
+          <p:nvPr/>
+        </p:nvCxnSpPr>
+        <p:spPr>
+          <a:xfrm rot="16200000" flipV="1">
+            <a:off x="4499280" y="2342379"/>
+            <a:ext cx="597404" cy="341513"/>
+          </a:xfrm>
+          <a:prstGeom prst="bentConnector2">
+            <a:avLst/>
+          </a:prstGeom>
+          <a:ln w="50800" cap="rnd">
+            <a:solidFill>
+              <a:schemeClr val="tx1"/>
+            </a:solidFill>
+          </a:ln>
+        </p:spPr>
+        <p:style>
+          <a:lnRef idx="1">
+            <a:schemeClr val="accent1"/>
+          </a:lnRef>
+          <a:fillRef idx="0">
+            <a:schemeClr val="accent1"/>
+          </a:fillRef>
+          <a:effectRef idx="0">
+            <a:schemeClr val="accent1"/>
+          </a:effectRef>
+          <a:fontRef idx="minor">
+            <a:schemeClr val="tx1"/>
+          </a:fontRef>
+        </p:style>
+      </p:cxnSp>
+      <p:grpSp>
+        <p:nvGrpSpPr>
+          <p:cNvPr id="23" name="群組 22"/>
+          <p:cNvGrpSpPr/>
+          <p:nvPr/>
+        </p:nvGrpSpPr>
+        <p:grpSpPr>
+          <a:xfrm>
+            <a:off x="2535428" y="1619385"/>
+            <a:ext cx="1743348" cy="759391"/>
+            <a:chOff x="3746575" y="3081517"/>
+            <a:chExt cx="1743348" cy="759391"/>
+          </a:xfrm>
+        </p:grpSpPr>
         <p:sp>
           <p:nvSpPr>
-            <p:cNvPr id="20" name="文字方塊 19"/>
-            <p:cNvSpPr txBox="1"/>
+            <p:cNvPr id="24" name="矩形 23"/>
+            <p:cNvSpPr/>
             <p:nvPr/>
           </p:nvSpPr>
           <p:spPr>
-            <a:xfrm>
-              <a:off x="6305946" y="3300640"/>
-              <a:ext cx="795647" cy="307777"/>
+            <a:xfrm rot="16200000">
+              <a:off x="4831930" y="3304391"/>
+              <a:ext cx="307885" cy="713863"/>
             </a:xfrm>
             <a:prstGeom prst="rect">
               <a:avLst/>
             </a:prstGeom>
-            <a:noFill/>
-          </p:spPr>
-          <p:txBody>
-            <a:bodyPr wrap="square" rtlCol="0">
-              <a:spAutoFit/>
-            </a:bodyPr>
-            <a:lstStyle/>
-            <a:p>
-              <a:r>
-                <a:rPr lang="en-US" sz="1400" b="1" dirty="0" smtClean="0"/>
-                <a:t>1 mil</a:t>
-              </a:r>
-              <a:endParaRPr lang="en-US" sz="1400" b="1" dirty="0"/>
-            </a:p>
-          </p:txBody>
-        </p:sp>
-        <p:sp>
-          <p:nvSpPr>
-            <p:cNvPr id="23" name="手繪多邊形 22"/>
-            <p:cNvSpPr/>
-            <p:nvPr/>
-          </p:nvSpPr>
-          <p:spPr>
-            <a:xfrm>
-              <a:off x="6794500" y="3467099"/>
-              <a:ext cx="494590" cy="294653"/>
-            </a:xfrm>
-            <a:custGeom>
-              <a:avLst/>
-              <a:gdLst>
-                <a:gd name="connsiteX0" fmla="*/ 0 w 393834"/>
-                <a:gd name="connsiteY0" fmla="*/ 0 h 342900"/>
-                <a:gd name="connsiteX1" fmla="*/ 298450 w 393834"/>
-                <a:gd name="connsiteY1" fmla="*/ 82550 h 342900"/>
-                <a:gd name="connsiteX2" fmla="*/ 374650 w 393834"/>
-                <a:gd name="connsiteY2" fmla="*/ 158750 h 342900"/>
-                <a:gd name="connsiteX3" fmla="*/ 393700 w 393834"/>
-                <a:gd name="connsiteY3" fmla="*/ 228600 h 342900"/>
-                <a:gd name="connsiteX4" fmla="*/ 381000 w 393834"/>
-                <a:gd name="connsiteY4" fmla="*/ 285750 h 342900"/>
-                <a:gd name="connsiteX5" fmla="*/ 342900 w 393834"/>
-                <a:gd name="connsiteY5" fmla="*/ 342900 h 342900"/>
-              </a:gdLst>
-              <a:ahLst/>
-              <a:cxnLst>
-                <a:cxn ang="0">
-                  <a:pos x="connsiteX0" y="connsiteY0"/>
-                </a:cxn>
-                <a:cxn ang="0">
-                  <a:pos x="connsiteX1" y="connsiteY1"/>
-                </a:cxn>
-                <a:cxn ang="0">
-                  <a:pos x="connsiteX2" y="connsiteY2"/>
-                </a:cxn>
-                <a:cxn ang="0">
-                  <a:pos x="connsiteX3" y="connsiteY3"/>
-                </a:cxn>
-                <a:cxn ang="0">
-                  <a:pos x="connsiteX4" y="connsiteY4"/>
-                </a:cxn>
-                <a:cxn ang="0">
-                  <a:pos x="connsiteX5" y="connsiteY5"/>
-                </a:cxn>
-              </a:cxnLst>
-              <a:rect l="l" t="t" r="r" b="b"/>
-              <a:pathLst>
-                <a:path w="393834" h="342900">
-                  <a:moveTo>
-                    <a:pt x="0" y="0"/>
-                  </a:moveTo>
-                  <a:cubicBezTo>
-                    <a:pt x="118004" y="28046"/>
-                    <a:pt x="236008" y="56092"/>
-                    <a:pt x="298450" y="82550"/>
-                  </a:cubicBezTo>
-                  <a:cubicBezTo>
-                    <a:pt x="360892" y="109008"/>
-                    <a:pt x="358775" y="134408"/>
-                    <a:pt x="374650" y="158750"/>
-                  </a:cubicBezTo>
-                  <a:cubicBezTo>
-                    <a:pt x="390525" y="183092"/>
-                    <a:pt x="392642" y="207433"/>
-                    <a:pt x="393700" y="228600"/>
-                  </a:cubicBezTo>
-                  <a:cubicBezTo>
-                    <a:pt x="394758" y="249767"/>
-                    <a:pt x="389467" y="266700"/>
-                    <a:pt x="381000" y="285750"/>
-                  </a:cubicBezTo>
-                  <a:cubicBezTo>
-                    <a:pt x="372533" y="304800"/>
-                    <a:pt x="357716" y="323850"/>
-                    <a:pt x="342900" y="342900"/>
-                  </a:cubicBezTo>
-                </a:path>
-              </a:pathLst>
-            </a:custGeom>
-            <a:noFill/>
+            <a:solidFill>
+              <a:srgbClr val="0000FF">
+                <a:alpha val="10000"/>
+              </a:srgbClr>
+            </a:solidFill>
             <a:ln>
-              <a:solidFill>
-                <a:schemeClr val="tx1"/>
-              </a:solidFill>
-              <a:tailEnd type="triangle"/>
+              <a:noFill/>
             </a:ln>
           </p:spPr>
           <p:style>
@@ -10739,98 +10606,888 @@
             <a:lstStyle/>
             <a:p>
               <a:pPr algn="ctr"/>
-              <a:endParaRPr lang="en-US"/>
+              <a:endParaRPr lang="zh-TW" altLang="en-US"/>
             </a:p>
           </p:txBody>
         </p:sp>
         <p:sp>
           <p:nvSpPr>
-            <p:cNvPr id="24" name="手繪多邊形 23"/>
+            <p:cNvPr id="25" name="文字方塊 24"/>
+            <p:cNvSpPr txBox="1"/>
+            <p:nvPr/>
+          </p:nvSpPr>
+          <p:spPr>
+            <a:xfrm>
+              <a:off x="4819449" y="3083721"/>
+              <a:ext cx="579005" cy="397673"/>
+            </a:xfrm>
+            <a:prstGeom prst="rect">
+              <a:avLst/>
+            </a:prstGeom>
+            <a:noFill/>
+          </p:spPr>
+          <p:txBody>
+            <a:bodyPr wrap="none" rtlCol="0">
+              <a:spAutoFit/>
+            </a:bodyPr>
+            <a:lstStyle/>
+            <a:p>
+              <a:r>
+                <a:rPr lang="en-US" b="1" i="1" dirty="0" smtClean="0">
+                  <a:latin typeface="Bookman Old Style" panose="02050604050505020204" pitchFamily="18" charset="0"/>
+                </a:rPr>
+                <a:t>L</a:t>
+              </a:r>
+              <a:r>
+                <a:rPr lang="en-US" b="1" i="1" baseline="-25000" dirty="0" smtClean="0">
+                  <a:latin typeface="Bookman Old Style" panose="02050604050505020204" pitchFamily="18" charset="0"/>
+                </a:rPr>
+                <a:t>11</a:t>
+              </a:r>
+              <a:endParaRPr lang="en-US" b="1" i="1" baseline="-25000" dirty="0">
+                <a:latin typeface="Bookman Old Style" panose="02050604050505020204" pitchFamily="18" charset="0"/>
+              </a:endParaRPr>
+            </a:p>
+          </p:txBody>
+        </p:sp>
+        <p:grpSp>
+          <p:nvGrpSpPr>
+            <p:cNvPr id="26" name="群組 25"/>
+            <p:cNvGrpSpPr/>
+            <p:nvPr/>
+          </p:nvGrpSpPr>
+          <p:grpSpPr>
+            <a:xfrm rot="16200000">
+              <a:off x="4821829" y="3316501"/>
+              <a:ext cx="339236" cy="709577"/>
+              <a:chOff x="5249520" y="3329267"/>
+              <a:chExt cx="339236" cy="708201"/>
+            </a:xfrm>
+          </p:grpSpPr>
+          <p:sp>
+            <p:nvSpPr>
+              <p:cNvPr id="40" name="弧形 39"/>
+              <p:cNvSpPr/>
+              <p:nvPr/>
+            </p:nvSpPr>
+            <p:spPr>
+              <a:xfrm rot="5400000">
+                <a:off x="5318542" y="3260245"/>
+                <a:ext cx="171658" cy="309701"/>
+              </a:xfrm>
+              <a:prstGeom prst="arc">
+                <a:avLst>
+                  <a:gd name="adj1" fmla="val 16244412"/>
+                  <a:gd name="adj2" fmla="val 3419958"/>
+                </a:avLst>
+              </a:prstGeom>
+              <a:ln w="50800" cap="rnd">
+                <a:solidFill>
+                  <a:schemeClr val="tx1"/>
+                </a:solidFill>
+                <a:headEnd type="none"/>
+                <a:tailEnd type="none"/>
+              </a:ln>
+            </p:spPr>
+            <p:style>
+              <a:lnRef idx="1">
+                <a:schemeClr val="accent1"/>
+              </a:lnRef>
+              <a:fillRef idx="0">
+                <a:schemeClr val="accent1"/>
+              </a:fillRef>
+              <a:effectRef idx="0">
+                <a:schemeClr val="accent1"/>
+              </a:effectRef>
+              <a:fontRef idx="minor">
+                <a:schemeClr val="tx1"/>
+              </a:fontRef>
+            </p:style>
+            <p:txBody>
+              <a:bodyPr rtlCol="0" anchor="ctr"/>
+              <a:lstStyle/>
+              <a:p>
+                <a:pPr algn="ctr"/>
+                <a:endParaRPr lang="en-US"/>
+              </a:p>
+            </p:txBody>
+          </p:sp>
+          <p:sp>
+            <p:nvSpPr>
+              <p:cNvPr id="41" name="弧形 40"/>
+              <p:cNvSpPr/>
+              <p:nvPr/>
+            </p:nvSpPr>
+            <p:spPr>
+              <a:xfrm rot="5400000">
+                <a:off x="5304097" y="3376394"/>
+                <a:ext cx="201520" cy="305985"/>
+              </a:xfrm>
+              <a:prstGeom prst="arc">
+                <a:avLst>
+                  <a:gd name="adj1" fmla="val 7511547"/>
+                  <a:gd name="adj2" fmla="val 3419958"/>
+                </a:avLst>
+              </a:prstGeom>
+              <a:ln w="50800" cap="rnd">
+                <a:solidFill>
+                  <a:schemeClr val="tx1"/>
+                </a:solidFill>
+                <a:headEnd type="none"/>
+                <a:tailEnd type="none"/>
+              </a:ln>
+            </p:spPr>
+            <p:style>
+              <a:lnRef idx="1">
+                <a:schemeClr val="accent1"/>
+              </a:lnRef>
+              <a:fillRef idx="0">
+                <a:schemeClr val="accent1"/>
+              </a:fillRef>
+              <a:effectRef idx="0">
+                <a:schemeClr val="accent1"/>
+              </a:effectRef>
+              <a:fontRef idx="minor">
+                <a:schemeClr val="tx1"/>
+              </a:fontRef>
+            </p:style>
+            <p:txBody>
+              <a:bodyPr rtlCol="0" anchor="ctr"/>
+              <a:lstStyle/>
+              <a:p>
+                <a:pPr algn="ctr"/>
+                <a:endParaRPr lang="en-US"/>
+              </a:p>
+            </p:txBody>
+          </p:sp>
+          <p:sp>
+            <p:nvSpPr>
+              <p:cNvPr id="42" name="弧形 41"/>
+              <p:cNvSpPr/>
+              <p:nvPr/>
+            </p:nvSpPr>
+            <p:spPr>
+              <a:xfrm rot="5400000">
+                <a:off x="5304097" y="3516255"/>
+                <a:ext cx="201520" cy="305985"/>
+              </a:xfrm>
+              <a:prstGeom prst="arc">
+                <a:avLst>
+                  <a:gd name="adj1" fmla="val 7511547"/>
+                  <a:gd name="adj2" fmla="val 3419958"/>
+                </a:avLst>
+              </a:prstGeom>
+              <a:ln w="50800" cap="rnd">
+                <a:solidFill>
+                  <a:schemeClr val="tx1"/>
+                </a:solidFill>
+                <a:headEnd type="none"/>
+                <a:tailEnd type="none"/>
+              </a:ln>
+            </p:spPr>
+            <p:style>
+              <a:lnRef idx="1">
+                <a:schemeClr val="accent1"/>
+              </a:lnRef>
+              <a:fillRef idx="0">
+                <a:schemeClr val="accent1"/>
+              </a:fillRef>
+              <a:effectRef idx="0">
+                <a:schemeClr val="accent1"/>
+              </a:effectRef>
+              <a:fontRef idx="minor">
+                <a:schemeClr val="tx1"/>
+              </a:fontRef>
+            </p:style>
+            <p:txBody>
+              <a:bodyPr rtlCol="0" anchor="ctr"/>
+              <a:lstStyle/>
+              <a:p>
+                <a:pPr algn="ctr"/>
+                <a:endParaRPr lang="en-US"/>
+              </a:p>
+            </p:txBody>
+          </p:sp>
+          <p:sp>
+            <p:nvSpPr>
+              <p:cNvPr id="43" name="弧形 42"/>
+              <p:cNvSpPr/>
+              <p:nvPr/>
+            </p:nvSpPr>
+            <p:spPr>
+              <a:xfrm rot="5400000">
+                <a:off x="5304097" y="3652246"/>
+                <a:ext cx="201520" cy="305985"/>
+              </a:xfrm>
+              <a:prstGeom prst="arc">
+                <a:avLst>
+                  <a:gd name="adj1" fmla="val 7511547"/>
+                  <a:gd name="adj2" fmla="val 3419958"/>
+                </a:avLst>
+              </a:prstGeom>
+              <a:ln w="50800" cap="rnd">
+                <a:solidFill>
+                  <a:schemeClr val="tx1"/>
+                </a:solidFill>
+                <a:headEnd type="none"/>
+                <a:tailEnd type="none"/>
+              </a:ln>
+            </p:spPr>
+            <p:style>
+              <a:lnRef idx="1">
+                <a:schemeClr val="accent1"/>
+              </a:lnRef>
+              <a:fillRef idx="0">
+                <a:schemeClr val="accent1"/>
+              </a:fillRef>
+              <a:effectRef idx="0">
+                <a:schemeClr val="accent1"/>
+              </a:effectRef>
+              <a:fontRef idx="minor">
+                <a:schemeClr val="tx1"/>
+              </a:fontRef>
+            </p:style>
+            <p:txBody>
+              <a:bodyPr rtlCol="0" anchor="ctr"/>
+              <a:lstStyle/>
+              <a:p>
+                <a:pPr algn="ctr"/>
+                <a:endParaRPr lang="en-US"/>
+              </a:p>
+            </p:txBody>
+          </p:sp>
+          <p:sp>
+            <p:nvSpPr>
+              <p:cNvPr id="44" name="弧形 43"/>
+              <p:cNvSpPr/>
+              <p:nvPr/>
+            </p:nvSpPr>
+            <p:spPr>
+              <a:xfrm rot="5400000">
+                <a:off x="5302192" y="3783715"/>
+                <a:ext cx="201520" cy="305985"/>
+              </a:xfrm>
+              <a:prstGeom prst="arc">
+                <a:avLst>
+                  <a:gd name="adj1" fmla="val 7511547"/>
+                  <a:gd name="adj2" fmla="val 16014537"/>
+                </a:avLst>
+              </a:prstGeom>
+              <a:ln w="50800" cap="rnd">
+                <a:solidFill>
+                  <a:schemeClr val="tx1"/>
+                </a:solidFill>
+                <a:headEnd type="none"/>
+                <a:tailEnd type="none"/>
+              </a:ln>
+            </p:spPr>
+            <p:style>
+              <a:lnRef idx="1">
+                <a:schemeClr val="accent1"/>
+              </a:lnRef>
+              <a:fillRef idx="0">
+                <a:schemeClr val="accent1"/>
+              </a:fillRef>
+              <a:effectRef idx="0">
+                <a:schemeClr val="accent1"/>
+              </a:effectRef>
+              <a:fontRef idx="minor">
+                <a:schemeClr val="tx1"/>
+              </a:fontRef>
+            </p:style>
+            <p:txBody>
+              <a:bodyPr rtlCol="0" anchor="ctr"/>
+              <a:lstStyle/>
+              <a:p>
+                <a:pPr algn="ctr"/>
+                <a:endParaRPr lang="en-US"/>
+              </a:p>
+            </p:txBody>
+          </p:sp>
+          <p:sp>
+            <p:nvSpPr>
+              <p:cNvPr id="45" name="弧形 44"/>
+              <p:cNvSpPr/>
+              <p:nvPr/>
+            </p:nvSpPr>
+            <p:spPr>
+              <a:xfrm rot="5400000">
+                <a:off x="5234673" y="3385551"/>
+                <a:ext cx="402820" cy="305347"/>
+              </a:xfrm>
+              <a:prstGeom prst="arc">
+                <a:avLst>
+                  <a:gd name="adj1" fmla="val 10690884"/>
+                  <a:gd name="adj2" fmla="val 13346613"/>
+                </a:avLst>
+              </a:prstGeom>
+              <a:ln w="50800" cap="rnd">
+                <a:solidFill>
+                  <a:schemeClr val="tx1"/>
+                </a:solidFill>
+                <a:headEnd type="none"/>
+                <a:tailEnd type="none"/>
+              </a:ln>
+            </p:spPr>
+            <p:style>
+              <a:lnRef idx="1">
+                <a:schemeClr val="accent1"/>
+              </a:lnRef>
+              <a:fillRef idx="0">
+                <a:schemeClr val="accent1"/>
+              </a:fillRef>
+              <a:effectRef idx="0">
+                <a:schemeClr val="accent1"/>
+              </a:effectRef>
+              <a:fontRef idx="minor">
+                <a:schemeClr val="tx1"/>
+              </a:fontRef>
+            </p:style>
+            <p:txBody>
+              <a:bodyPr rtlCol="0" anchor="ctr"/>
+              <a:lstStyle/>
+              <a:p>
+                <a:pPr algn="ctr"/>
+                <a:endParaRPr lang="en-US"/>
+              </a:p>
+            </p:txBody>
+          </p:sp>
+          <p:sp>
+            <p:nvSpPr>
+              <p:cNvPr id="46" name="弧形 45"/>
+              <p:cNvSpPr/>
+              <p:nvPr/>
+            </p:nvSpPr>
+            <p:spPr>
+              <a:xfrm rot="16200000" flipV="1">
+                <a:off x="5311064" y="3742517"/>
+                <a:ext cx="214248" cy="305347"/>
+              </a:xfrm>
+              <a:prstGeom prst="arc">
+                <a:avLst>
+                  <a:gd name="adj1" fmla="val 10739958"/>
+                  <a:gd name="adj2" fmla="val 15079701"/>
+                </a:avLst>
+              </a:prstGeom>
+              <a:ln w="50800" cap="rnd">
+                <a:solidFill>
+                  <a:schemeClr val="tx1"/>
+                </a:solidFill>
+                <a:headEnd type="none"/>
+                <a:tailEnd type="none"/>
+              </a:ln>
+            </p:spPr>
+            <p:style>
+              <a:lnRef idx="1">
+                <a:schemeClr val="accent1"/>
+              </a:lnRef>
+              <a:fillRef idx="0">
+                <a:schemeClr val="accent1"/>
+              </a:fillRef>
+              <a:effectRef idx="0">
+                <a:schemeClr val="accent1"/>
+              </a:effectRef>
+              <a:fontRef idx="minor">
+                <a:schemeClr val="tx1"/>
+              </a:fontRef>
+            </p:style>
+            <p:txBody>
+              <a:bodyPr rtlCol="0" anchor="ctr"/>
+              <a:lstStyle/>
+              <a:p>
+                <a:pPr algn="ctr"/>
+                <a:endParaRPr lang="en-US"/>
+              </a:p>
+            </p:txBody>
+          </p:sp>
+        </p:grpSp>
+        <p:grpSp>
+          <p:nvGrpSpPr>
+            <p:cNvPr id="27" name="群組 26"/>
+            <p:cNvGrpSpPr/>
+            <p:nvPr/>
+          </p:nvGrpSpPr>
+          <p:grpSpPr>
+            <a:xfrm rot="16200000">
+              <a:off x="3950514" y="3307678"/>
+              <a:ext cx="305985" cy="713863"/>
+              <a:chOff x="2149030" y="2184516"/>
+              <a:chExt cx="305985" cy="713863"/>
+            </a:xfrm>
+          </p:grpSpPr>
+          <p:sp>
+            <p:nvSpPr>
+              <p:cNvPr id="31" name="矩形 30"/>
+              <p:cNvSpPr/>
+              <p:nvPr/>
+            </p:nvSpPr>
+            <p:spPr>
+              <a:xfrm>
+                <a:off x="2149030" y="2184516"/>
+                <a:ext cx="305985" cy="713863"/>
+              </a:xfrm>
+              <a:prstGeom prst="rect">
+                <a:avLst/>
+              </a:prstGeom>
+              <a:solidFill>
+                <a:srgbClr val="0000FF">
+                  <a:alpha val="10000"/>
+                </a:srgbClr>
+              </a:solidFill>
+              <a:ln>
+                <a:noFill/>
+              </a:ln>
+            </p:spPr>
+            <p:style>
+              <a:lnRef idx="2">
+                <a:schemeClr val="accent1">
+                  <a:shade val="50000"/>
+                </a:schemeClr>
+              </a:lnRef>
+              <a:fillRef idx="1">
+                <a:schemeClr val="accent1"/>
+              </a:fillRef>
+              <a:effectRef idx="0">
+                <a:schemeClr val="accent1"/>
+              </a:effectRef>
+              <a:fontRef idx="minor">
+                <a:schemeClr val="lt1"/>
+              </a:fontRef>
+            </p:style>
+            <p:txBody>
+              <a:bodyPr rtlCol="0" anchor="ctr"/>
+              <a:lstStyle/>
+              <a:p>
+                <a:pPr algn="ctr"/>
+                <a:endParaRPr lang="zh-TW" altLang="en-US"/>
+              </a:p>
+            </p:txBody>
+          </p:sp>
+          <p:grpSp>
+            <p:nvGrpSpPr>
+              <p:cNvPr id="32" name="群組 31"/>
+              <p:cNvGrpSpPr/>
+              <p:nvPr/>
+            </p:nvGrpSpPr>
+            <p:grpSpPr>
+              <a:xfrm>
+                <a:off x="2175537" y="2222011"/>
+                <a:ext cx="251109" cy="676367"/>
+                <a:chOff x="2175537" y="2222011"/>
+                <a:chExt cx="251109" cy="676367"/>
+              </a:xfrm>
+            </p:grpSpPr>
+            <p:cxnSp>
+              <p:nvCxnSpPr>
+                <p:cNvPr id="33" name="直線接點 32"/>
+                <p:cNvCxnSpPr/>
+                <p:nvPr/>
+              </p:nvCxnSpPr>
+              <p:spPr>
+                <a:xfrm rot="480000" flipV="1">
+                  <a:off x="2194833" y="2479274"/>
+                  <a:ext cx="212770" cy="142789"/>
+                </a:xfrm>
+                <a:prstGeom prst="line">
+                  <a:avLst/>
+                </a:prstGeom>
+                <a:ln w="50800" cap="rnd">
+                  <a:solidFill>
+                    <a:schemeClr val="tx1"/>
+                  </a:solidFill>
+                  <a:headEnd type="none" w="sm" len="sm"/>
+                  <a:tailEnd type="none" w="sm" len="sm"/>
+                </a:ln>
+              </p:spPr>
+              <p:style>
+                <a:lnRef idx="1">
+                  <a:schemeClr val="accent1"/>
+                </a:lnRef>
+                <a:fillRef idx="0">
+                  <a:schemeClr val="accent1"/>
+                </a:fillRef>
+                <a:effectRef idx="0">
+                  <a:schemeClr val="accent1"/>
+                </a:effectRef>
+                <a:fontRef idx="minor">
+                  <a:schemeClr val="tx1"/>
+                </a:fontRef>
+              </p:style>
+            </p:cxnSp>
+            <p:cxnSp>
+              <p:nvCxnSpPr>
+                <p:cNvPr id="34" name="直線接點 33"/>
+                <p:cNvCxnSpPr/>
+                <p:nvPr/>
+              </p:nvCxnSpPr>
+              <p:spPr>
+                <a:xfrm rot="480000" flipV="1">
+                  <a:off x="2175537" y="2291186"/>
+                  <a:ext cx="245520" cy="114642"/>
+                </a:xfrm>
+                <a:prstGeom prst="line">
+                  <a:avLst/>
+                </a:prstGeom>
+                <a:ln w="50800" cap="rnd">
+                  <a:solidFill>
+                    <a:schemeClr val="tx1"/>
+                  </a:solidFill>
+                  <a:headEnd type="none" w="sm" len="sm"/>
+                  <a:tailEnd type="none" w="sm" len="sm"/>
+                </a:ln>
+              </p:spPr>
+              <p:style>
+                <a:lnRef idx="1">
+                  <a:schemeClr val="accent1"/>
+                </a:lnRef>
+                <a:fillRef idx="0">
+                  <a:schemeClr val="accent1"/>
+                </a:fillRef>
+                <a:effectRef idx="0">
+                  <a:schemeClr val="accent1"/>
+                </a:effectRef>
+                <a:fontRef idx="minor">
+                  <a:schemeClr val="tx1"/>
+                </a:fontRef>
+              </p:style>
+            </p:cxnSp>
+            <p:cxnSp>
+              <p:nvCxnSpPr>
+                <p:cNvPr id="35" name="直線接點 34"/>
+                <p:cNvCxnSpPr/>
+                <p:nvPr/>
+              </p:nvCxnSpPr>
+              <p:spPr>
+                <a:xfrm>
+                  <a:off x="2175537" y="2395701"/>
+                  <a:ext cx="245520" cy="93805"/>
+                </a:xfrm>
+                <a:prstGeom prst="line">
+                  <a:avLst/>
+                </a:prstGeom>
+                <a:ln w="50800" cap="rnd">
+                  <a:solidFill>
+                    <a:schemeClr val="tx1"/>
+                  </a:solidFill>
+                  <a:headEnd type="none"/>
+                  <a:tailEnd type="none"/>
+                </a:ln>
+              </p:spPr>
+              <p:style>
+                <a:lnRef idx="1">
+                  <a:schemeClr val="accent1"/>
+                </a:lnRef>
+                <a:fillRef idx="0">
+                  <a:schemeClr val="accent1"/>
+                </a:fillRef>
+                <a:effectRef idx="0">
+                  <a:schemeClr val="accent1"/>
+                </a:effectRef>
+                <a:fontRef idx="minor">
+                  <a:schemeClr val="tx1"/>
+                </a:fontRef>
+              </p:style>
+            </p:cxnSp>
+            <p:cxnSp>
+              <p:nvCxnSpPr>
+                <p:cNvPr id="36" name="直線接點 35"/>
+                <p:cNvCxnSpPr/>
+                <p:nvPr/>
+              </p:nvCxnSpPr>
+              <p:spPr>
+                <a:xfrm>
+                  <a:off x="2306026" y="2222011"/>
+                  <a:ext cx="120620" cy="86128"/>
+                </a:xfrm>
+                <a:prstGeom prst="line">
+                  <a:avLst/>
+                </a:prstGeom>
+                <a:ln w="50800" cap="rnd">
+                  <a:solidFill>
+                    <a:schemeClr val="tx1"/>
+                  </a:solidFill>
+                  <a:headEnd type="none"/>
+                  <a:tailEnd type="none"/>
+                </a:ln>
+              </p:spPr>
+              <p:style>
+                <a:lnRef idx="1">
+                  <a:schemeClr val="accent1"/>
+                </a:lnRef>
+                <a:fillRef idx="0">
+                  <a:schemeClr val="accent1"/>
+                </a:fillRef>
+                <a:effectRef idx="0">
+                  <a:schemeClr val="accent1"/>
+                </a:effectRef>
+                <a:fontRef idx="minor">
+                  <a:schemeClr val="tx1"/>
+                </a:fontRef>
+              </p:style>
+            </p:cxnSp>
+            <p:cxnSp>
+              <p:nvCxnSpPr>
+                <p:cNvPr id="37" name="直線接點 36"/>
+                <p:cNvCxnSpPr>
+                  <a:endCxn id="31" idx="2"/>
+                </p:cNvCxnSpPr>
+                <p:nvPr/>
+              </p:nvCxnSpPr>
+              <p:spPr>
+                <a:xfrm rot="5400000" flipV="1">
+                  <a:off x="2215988" y="2812342"/>
+                  <a:ext cx="65472" cy="106600"/>
+                </a:xfrm>
+                <a:prstGeom prst="line">
+                  <a:avLst/>
+                </a:prstGeom>
+                <a:ln w="50800" cap="rnd">
+                  <a:solidFill>
+                    <a:schemeClr val="tx1"/>
+                  </a:solidFill>
+                  <a:headEnd type="none"/>
+                  <a:tailEnd type="none"/>
+                </a:ln>
+              </p:spPr>
+              <p:style>
+                <a:lnRef idx="1">
+                  <a:schemeClr val="accent1"/>
+                </a:lnRef>
+                <a:fillRef idx="0">
+                  <a:schemeClr val="accent1"/>
+                </a:fillRef>
+                <a:effectRef idx="0">
+                  <a:schemeClr val="accent1"/>
+                </a:effectRef>
+                <a:fontRef idx="minor">
+                  <a:schemeClr val="tx1"/>
+                </a:fontRef>
+              </p:style>
+            </p:cxnSp>
+            <p:cxnSp>
+              <p:nvCxnSpPr>
+                <p:cNvPr id="38" name="直線接點 37"/>
+                <p:cNvCxnSpPr/>
+                <p:nvPr/>
+              </p:nvCxnSpPr>
+              <p:spPr>
+                <a:xfrm rot="480000" flipV="1">
+                  <a:off x="2194833" y="2702934"/>
+                  <a:ext cx="212770" cy="142789"/>
+                </a:xfrm>
+                <a:prstGeom prst="line">
+                  <a:avLst/>
+                </a:prstGeom>
+                <a:ln w="50800" cap="rnd">
+                  <a:solidFill>
+                    <a:schemeClr val="tx1"/>
+                  </a:solidFill>
+                  <a:headEnd type="none" w="sm" len="sm"/>
+                  <a:tailEnd type="none" w="sm" len="sm"/>
+                </a:ln>
+              </p:spPr>
+              <p:style>
+                <a:lnRef idx="1">
+                  <a:schemeClr val="accent1"/>
+                </a:lnRef>
+                <a:fillRef idx="0">
+                  <a:schemeClr val="accent1"/>
+                </a:fillRef>
+                <a:effectRef idx="0">
+                  <a:schemeClr val="accent1"/>
+                </a:effectRef>
+                <a:fontRef idx="minor">
+                  <a:schemeClr val="tx1"/>
+                </a:fontRef>
+              </p:style>
+            </p:cxnSp>
+            <p:cxnSp>
+              <p:nvCxnSpPr>
+                <p:cNvPr id="39" name="直線接點 38"/>
+                <p:cNvCxnSpPr/>
+                <p:nvPr/>
+              </p:nvCxnSpPr>
+              <p:spPr>
+                <a:xfrm>
+                  <a:off x="2175537" y="2610549"/>
+                  <a:ext cx="245520" cy="103072"/>
+                </a:xfrm>
+                <a:prstGeom prst="line">
+                  <a:avLst/>
+                </a:prstGeom>
+                <a:ln w="50800" cap="rnd">
+                  <a:solidFill>
+                    <a:schemeClr val="tx1"/>
+                  </a:solidFill>
+                  <a:headEnd type="none"/>
+                  <a:tailEnd type="none"/>
+                </a:ln>
+              </p:spPr>
+              <p:style>
+                <a:lnRef idx="1">
+                  <a:schemeClr val="accent1"/>
+                </a:lnRef>
+                <a:fillRef idx="0">
+                  <a:schemeClr val="accent1"/>
+                </a:fillRef>
+                <a:effectRef idx="0">
+                  <a:schemeClr val="accent1"/>
+                </a:effectRef>
+                <a:fontRef idx="minor">
+                  <a:schemeClr val="tx1"/>
+                </a:fontRef>
+              </p:style>
+            </p:cxnSp>
+          </p:grpSp>
+        </p:grpSp>
+        <p:sp>
+          <p:nvSpPr>
+            <p:cNvPr id="28" name="文字方塊 27"/>
+            <p:cNvSpPr txBox="1"/>
+            <p:nvPr/>
+          </p:nvSpPr>
+          <p:spPr>
+            <a:xfrm>
+              <a:off x="3895250" y="3081517"/>
+              <a:ext cx="457176" cy="397673"/>
+            </a:xfrm>
+            <a:prstGeom prst="rect">
+              <a:avLst/>
+            </a:prstGeom>
+            <a:noFill/>
+          </p:spPr>
+          <p:txBody>
+            <a:bodyPr wrap="none" rtlCol="0">
+              <a:spAutoFit/>
+            </a:bodyPr>
+            <a:lstStyle/>
+            <a:p>
+              <a:r>
+                <a:rPr lang="en-US" b="1" i="1" dirty="0" err="1" smtClean="0">
+                  <a:latin typeface="Bookman Old Style" panose="02050604050505020204" pitchFamily="18" charset="0"/>
+                </a:rPr>
+                <a:t>R</a:t>
+              </a:r>
+              <a:r>
+                <a:rPr lang="en-US" b="1" i="1" baseline="-25000" dirty="0" err="1" smtClean="0">
+                  <a:latin typeface="Bookman Old Style" panose="02050604050505020204" pitchFamily="18" charset="0"/>
+                </a:rPr>
+                <a:t>r</a:t>
+              </a:r>
+              <a:endParaRPr lang="en-US" b="1" i="1" baseline="-25000" dirty="0">
+                <a:latin typeface="Bookman Old Style" panose="02050604050505020204" pitchFamily="18" charset="0"/>
+              </a:endParaRPr>
+            </a:p>
+          </p:txBody>
+        </p:sp>
+        <p:cxnSp>
+          <p:nvCxnSpPr>
+            <p:cNvPr id="29" name="直線接點 28"/>
+            <p:cNvCxnSpPr>
+              <a:stCxn id="31" idx="2"/>
+            </p:cNvCxnSpPr>
+            <p:nvPr/>
+          </p:nvCxnSpPr>
+          <p:spPr>
+            <a:xfrm flipV="1">
+              <a:off x="4460438" y="3662579"/>
+              <a:ext cx="170337" cy="2030"/>
+            </a:xfrm>
+            <a:prstGeom prst="line">
+              <a:avLst/>
+            </a:prstGeom>
+            <a:ln w="50800" cap="rnd">
+              <a:solidFill>
+                <a:schemeClr val="tx1"/>
+              </a:solidFill>
+            </a:ln>
+          </p:spPr>
+          <p:style>
+            <a:lnRef idx="1">
+              <a:schemeClr val="accent1"/>
+            </a:lnRef>
+            <a:fillRef idx="0">
+              <a:schemeClr val="accent1"/>
+            </a:fillRef>
+            <a:effectRef idx="0">
+              <a:schemeClr val="accent1"/>
+            </a:effectRef>
+            <a:fontRef idx="minor">
+              <a:schemeClr val="tx1"/>
+            </a:fontRef>
+          </p:style>
+        </p:cxnSp>
+        <p:cxnSp>
+          <p:nvCxnSpPr>
+            <p:cNvPr id="30" name="直線接點 29"/>
+            <p:cNvCxnSpPr/>
+            <p:nvPr/>
+          </p:nvCxnSpPr>
+          <p:spPr>
+            <a:xfrm flipV="1">
+              <a:off x="5319586" y="3672144"/>
+              <a:ext cx="170337" cy="2030"/>
+            </a:xfrm>
+            <a:prstGeom prst="line">
+              <a:avLst/>
+            </a:prstGeom>
+            <a:ln w="50800" cap="rnd">
+              <a:solidFill>
+                <a:schemeClr val="tx1"/>
+              </a:solidFill>
+            </a:ln>
+          </p:spPr>
+          <p:style>
+            <a:lnRef idx="1">
+              <a:schemeClr val="accent1"/>
+            </a:lnRef>
+            <a:fillRef idx="0">
+              <a:schemeClr val="accent1"/>
+            </a:fillRef>
+            <a:effectRef idx="0">
+              <a:schemeClr val="accent1"/>
+            </a:effectRef>
+            <a:fontRef idx="minor">
+              <a:schemeClr val="tx1"/>
+            </a:fontRef>
+          </p:style>
+        </p:cxnSp>
+      </p:grpSp>
+      <p:grpSp>
+        <p:nvGrpSpPr>
+          <p:cNvPr id="47" name="群組 46"/>
+          <p:cNvGrpSpPr/>
+          <p:nvPr/>
+        </p:nvGrpSpPr>
+        <p:grpSpPr>
+          <a:xfrm>
+            <a:off x="2535428" y="2332811"/>
+            <a:ext cx="1743348" cy="759391"/>
+            <a:chOff x="3746575" y="3081517"/>
+            <a:chExt cx="1743348" cy="759391"/>
+          </a:xfrm>
+        </p:grpSpPr>
+        <p:sp>
+          <p:nvSpPr>
+            <p:cNvPr id="48" name="矩形 47"/>
             <p:cNvSpPr/>
             <p:nvPr/>
           </p:nvSpPr>
           <p:spPr>
-            <a:xfrm>
-              <a:off x="6804660" y="3413760"/>
-              <a:ext cx="609538" cy="552235"/>
+            <a:xfrm rot="16200000">
+              <a:off x="4831930" y="3304391"/>
+              <a:ext cx="307885" cy="713863"/>
             </a:xfrm>
-            <a:custGeom>
+            <a:prstGeom prst="rect">
               <a:avLst/>
-              <a:gdLst>
-                <a:gd name="connsiteX0" fmla="*/ 0 w 585787"/>
-                <a:gd name="connsiteY0" fmla="*/ 0 h 552235"/>
-                <a:gd name="connsiteX1" fmla="*/ 304800 w 585787"/>
-                <a:gd name="connsiteY1" fmla="*/ 45720 h 552235"/>
-                <a:gd name="connsiteX2" fmla="*/ 556260 w 585787"/>
-                <a:gd name="connsiteY2" fmla="*/ 167640 h 552235"/>
-                <a:gd name="connsiteX3" fmla="*/ 571500 w 585787"/>
-                <a:gd name="connsiteY3" fmla="*/ 365760 h 552235"/>
-                <a:gd name="connsiteX4" fmla="*/ 472440 w 585787"/>
-                <a:gd name="connsiteY4" fmla="*/ 533400 h 552235"/>
-                <a:gd name="connsiteX5" fmla="*/ 434340 w 585787"/>
-                <a:gd name="connsiteY5" fmla="*/ 541020 h 552235"/>
-              </a:gdLst>
-              <a:ahLst/>
-              <a:cxnLst>
-                <a:cxn ang="0">
-                  <a:pos x="connsiteX0" y="connsiteY0"/>
-                </a:cxn>
-                <a:cxn ang="0">
-                  <a:pos x="connsiteX1" y="connsiteY1"/>
-                </a:cxn>
-                <a:cxn ang="0">
-                  <a:pos x="connsiteX2" y="connsiteY2"/>
-                </a:cxn>
-                <a:cxn ang="0">
-                  <a:pos x="connsiteX3" y="connsiteY3"/>
-                </a:cxn>
-                <a:cxn ang="0">
-                  <a:pos x="connsiteX4" y="connsiteY4"/>
-                </a:cxn>
-                <a:cxn ang="0">
-                  <a:pos x="connsiteX5" y="connsiteY5"/>
-                </a:cxn>
-              </a:cxnLst>
-              <a:rect l="l" t="t" r="r" b="b"/>
-              <a:pathLst>
-                <a:path w="585787" h="552235">
-                  <a:moveTo>
-                    <a:pt x="0" y="0"/>
-                  </a:moveTo>
-                  <a:cubicBezTo>
-                    <a:pt x="106045" y="8890"/>
-                    <a:pt x="212090" y="17780"/>
-                    <a:pt x="304800" y="45720"/>
-                  </a:cubicBezTo>
-                  <a:cubicBezTo>
-                    <a:pt x="397510" y="73660"/>
-                    <a:pt x="511810" y="114300"/>
-                    <a:pt x="556260" y="167640"/>
-                  </a:cubicBezTo>
-                  <a:cubicBezTo>
-                    <a:pt x="600710" y="220980"/>
-                    <a:pt x="585470" y="304800"/>
-                    <a:pt x="571500" y="365760"/>
-                  </a:cubicBezTo>
-                  <a:cubicBezTo>
-                    <a:pt x="557530" y="426720"/>
-                    <a:pt x="495300" y="504190"/>
-                    <a:pt x="472440" y="533400"/>
-                  </a:cubicBezTo>
-                  <a:cubicBezTo>
-                    <a:pt x="449580" y="562610"/>
-                    <a:pt x="441960" y="551815"/>
-                    <a:pt x="434340" y="541020"/>
-                  </a:cubicBezTo>
-                </a:path>
-              </a:pathLst>
-            </a:custGeom>
-            <a:noFill/>
+            </a:prstGeom>
+            <a:solidFill>
+              <a:srgbClr val="0000FF">
+                <a:alpha val="10000"/>
+              </a:srgbClr>
+            </a:solidFill>
             <a:ln>
-              <a:solidFill>
-                <a:schemeClr val="tx1"/>
-              </a:solidFill>
-              <a:tailEnd type="triangle"/>
+              <a:noFill/>
             </a:ln>
           </p:spPr>
           <p:style>
@@ -10854,15 +11511,2087 @@
             <a:lstStyle/>
             <a:p>
               <a:pPr algn="ctr"/>
-              <a:endParaRPr lang="en-US"/>
+              <a:endParaRPr lang="zh-TW" altLang="en-US"/>
+            </a:p>
+          </p:txBody>
+        </p:sp>
+        <p:sp>
+          <p:nvSpPr>
+            <p:cNvPr id="49" name="文字方塊 48"/>
+            <p:cNvSpPr txBox="1"/>
+            <p:nvPr/>
+          </p:nvSpPr>
+          <p:spPr>
+            <a:xfrm>
+              <a:off x="4819449" y="3083721"/>
+              <a:ext cx="579005" cy="397673"/>
+            </a:xfrm>
+            <a:prstGeom prst="rect">
+              <a:avLst/>
+            </a:prstGeom>
+            <a:noFill/>
+          </p:spPr>
+          <p:txBody>
+            <a:bodyPr wrap="none" rtlCol="0">
+              <a:spAutoFit/>
+            </a:bodyPr>
+            <a:lstStyle/>
+            <a:p>
+              <a:r>
+                <a:rPr lang="en-US" b="1" i="1" dirty="0" smtClean="0">
+                  <a:latin typeface="Bookman Old Style" panose="02050604050505020204" pitchFamily="18" charset="0"/>
+                </a:rPr>
+                <a:t>L</a:t>
+              </a:r>
+              <a:r>
+                <a:rPr lang="en-US" b="1" i="1" baseline="-25000" dirty="0" smtClean="0">
+                  <a:latin typeface="Bookman Old Style" panose="02050604050505020204" pitchFamily="18" charset="0"/>
+                </a:rPr>
+                <a:t>22</a:t>
+              </a:r>
+              <a:endParaRPr lang="en-US" b="1" i="1" baseline="-25000" dirty="0">
+                <a:latin typeface="Bookman Old Style" panose="02050604050505020204" pitchFamily="18" charset="0"/>
+              </a:endParaRPr>
+            </a:p>
+          </p:txBody>
+        </p:sp>
+        <p:grpSp>
+          <p:nvGrpSpPr>
+            <p:cNvPr id="50" name="群組 49"/>
+            <p:cNvGrpSpPr/>
+            <p:nvPr/>
+          </p:nvGrpSpPr>
+          <p:grpSpPr>
+            <a:xfrm rot="16200000">
+              <a:off x="4821829" y="3316501"/>
+              <a:ext cx="339236" cy="709577"/>
+              <a:chOff x="5249520" y="3329267"/>
+              <a:chExt cx="339236" cy="708201"/>
+            </a:xfrm>
+          </p:grpSpPr>
+          <p:sp>
+            <p:nvSpPr>
+              <p:cNvPr id="64" name="弧形 63"/>
+              <p:cNvSpPr/>
+              <p:nvPr/>
+            </p:nvSpPr>
+            <p:spPr>
+              <a:xfrm rot="5400000">
+                <a:off x="5318542" y="3260245"/>
+                <a:ext cx="171658" cy="309701"/>
+              </a:xfrm>
+              <a:prstGeom prst="arc">
+                <a:avLst>
+                  <a:gd name="adj1" fmla="val 16244412"/>
+                  <a:gd name="adj2" fmla="val 3419958"/>
+                </a:avLst>
+              </a:prstGeom>
+              <a:ln w="50800" cap="rnd">
+                <a:solidFill>
+                  <a:schemeClr val="tx1"/>
+                </a:solidFill>
+                <a:headEnd type="none"/>
+                <a:tailEnd type="none"/>
+              </a:ln>
+            </p:spPr>
+            <p:style>
+              <a:lnRef idx="1">
+                <a:schemeClr val="accent1"/>
+              </a:lnRef>
+              <a:fillRef idx="0">
+                <a:schemeClr val="accent1"/>
+              </a:fillRef>
+              <a:effectRef idx="0">
+                <a:schemeClr val="accent1"/>
+              </a:effectRef>
+              <a:fontRef idx="minor">
+                <a:schemeClr val="tx1"/>
+              </a:fontRef>
+            </p:style>
+            <p:txBody>
+              <a:bodyPr rtlCol="0" anchor="ctr"/>
+              <a:lstStyle/>
+              <a:p>
+                <a:pPr algn="ctr"/>
+                <a:endParaRPr lang="en-US"/>
+              </a:p>
+            </p:txBody>
+          </p:sp>
+          <p:sp>
+            <p:nvSpPr>
+              <p:cNvPr id="65" name="弧形 64"/>
+              <p:cNvSpPr/>
+              <p:nvPr/>
+            </p:nvSpPr>
+            <p:spPr>
+              <a:xfrm rot="5400000">
+                <a:off x="5304097" y="3376394"/>
+                <a:ext cx="201520" cy="305985"/>
+              </a:xfrm>
+              <a:prstGeom prst="arc">
+                <a:avLst>
+                  <a:gd name="adj1" fmla="val 7511547"/>
+                  <a:gd name="adj2" fmla="val 3419958"/>
+                </a:avLst>
+              </a:prstGeom>
+              <a:ln w="50800" cap="rnd">
+                <a:solidFill>
+                  <a:schemeClr val="tx1"/>
+                </a:solidFill>
+                <a:headEnd type="none"/>
+                <a:tailEnd type="none"/>
+              </a:ln>
+            </p:spPr>
+            <p:style>
+              <a:lnRef idx="1">
+                <a:schemeClr val="accent1"/>
+              </a:lnRef>
+              <a:fillRef idx="0">
+                <a:schemeClr val="accent1"/>
+              </a:fillRef>
+              <a:effectRef idx="0">
+                <a:schemeClr val="accent1"/>
+              </a:effectRef>
+              <a:fontRef idx="minor">
+                <a:schemeClr val="tx1"/>
+              </a:fontRef>
+            </p:style>
+            <p:txBody>
+              <a:bodyPr rtlCol="0" anchor="ctr"/>
+              <a:lstStyle/>
+              <a:p>
+                <a:pPr algn="ctr"/>
+                <a:endParaRPr lang="en-US"/>
+              </a:p>
+            </p:txBody>
+          </p:sp>
+          <p:sp>
+            <p:nvSpPr>
+              <p:cNvPr id="66" name="弧形 65"/>
+              <p:cNvSpPr/>
+              <p:nvPr/>
+            </p:nvSpPr>
+            <p:spPr>
+              <a:xfrm rot="5400000">
+                <a:off x="5304097" y="3516255"/>
+                <a:ext cx="201520" cy="305985"/>
+              </a:xfrm>
+              <a:prstGeom prst="arc">
+                <a:avLst>
+                  <a:gd name="adj1" fmla="val 7511547"/>
+                  <a:gd name="adj2" fmla="val 3419958"/>
+                </a:avLst>
+              </a:prstGeom>
+              <a:ln w="50800" cap="rnd">
+                <a:solidFill>
+                  <a:schemeClr val="tx1"/>
+                </a:solidFill>
+                <a:headEnd type="none"/>
+                <a:tailEnd type="none"/>
+              </a:ln>
+            </p:spPr>
+            <p:style>
+              <a:lnRef idx="1">
+                <a:schemeClr val="accent1"/>
+              </a:lnRef>
+              <a:fillRef idx="0">
+                <a:schemeClr val="accent1"/>
+              </a:fillRef>
+              <a:effectRef idx="0">
+                <a:schemeClr val="accent1"/>
+              </a:effectRef>
+              <a:fontRef idx="minor">
+                <a:schemeClr val="tx1"/>
+              </a:fontRef>
+            </p:style>
+            <p:txBody>
+              <a:bodyPr rtlCol="0" anchor="ctr"/>
+              <a:lstStyle/>
+              <a:p>
+                <a:pPr algn="ctr"/>
+                <a:endParaRPr lang="en-US"/>
+              </a:p>
+            </p:txBody>
+          </p:sp>
+          <p:sp>
+            <p:nvSpPr>
+              <p:cNvPr id="67" name="弧形 66"/>
+              <p:cNvSpPr/>
+              <p:nvPr/>
+            </p:nvSpPr>
+            <p:spPr>
+              <a:xfrm rot="5400000">
+                <a:off x="5304097" y="3652246"/>
+                <a:ext cx="201520" cy="305985"/>
+              </a:xfrm>
+              <a:prstGeom prst="arc">
+                <a:avLst>
+                  <a:gd name="adj1" fmla="val 7511547"/>
+                  <a:gd name="adj2" fmla="val 3419958"/>
+                </a:avLst>
+              </a:prstGeom>
+              <a:ln w="50800" cap="rnd">
+                <a:solidFill>
+                  <a:schemeClr val="tx1"/>
+                </a:solidFill>
+                <a:headEnd type="none"/>
+                <a:tailEnd type="none"/>
+              </a:ln>
+            </p:spPr>
+            <p:style>
+              <a:lnRef idx="1">
+                <a:schemeClr val="accent1"/>
+              </a:lnRef>
+              <a:fillRef idx="0">
+                <a:schemeClr val="accent1"/>
+              </a:fillRef>
+              <a:effectRef idx="0">
+                <a:schemeClr val="accent1"/>
+              </a:effectRef>
+              <a:fontRef idx="minor">
+                <a:schemeClr val="tx1"/>
+              </a:fontRef>
+            </p:style>
+            <p:txBody>
+              <a:bodyPr rtlCol="0" anchor="ctr"/>
+              <a:lstStyle/>
+              <a:p>
+                <a:pPr algn="ctr"/>
+                <a:endParaRPr lang="en-US"/>
+              </a:p>
+            </p:txBody>
+          </p:sp>
+          <p:sp>
+            <p:nvSpPr>
+              <p:cNvPr id="68" name="弧形 67"/>
+              <p:cNvSpPr/>
+              <p:nvPr/>
+            </p:nvSpPr>
+            <p:spPr>
+              <a:xfrm rot="5400000">
+                <a:off x="5302192" y="3783715"/>
+                <a:ext cx="201520" cy="305985"/>
+              </a:xfrm>
+              <a:prstGeom prst="arc">
+                <a:avLst>
+                  <a:gd name="adj1" fmla="val 7511547"/>
+                  <a:gd name="adj2" fmla="val 16014537"/>
+                </a:avLst>
+              </a:prstGeom>
+              <a:ln w="50800" cap="rnd">
+                <a:solidFill>
+                  <a:schemeClr val="tx1"/>
+                </a:solidFill>
+                <a:headEnd type="none"/>
+                <a:tailEnd type="none"/>
+              </a:ln>
+            </p:spPr>
+            <p:style>
+              <a:lnRef idx="1">
+                <a:schemeClr val="accent1"/>
+              </a:lnRef>
+              <a:fillRef idx="0">
+                <a:schemeClr val="accent1"/>
+              </a:fillRef>
+              <a:effectRef idx="0">
+                <a:schemeClr val="accent1"/>
+              </a:effectRef>
+              <a:fontRef idx="minor">
+                <a:schemeClr val="tx1"/>
+              </a:fontRef>
+            </p:style>
+            <p:txBody>
+              <a:bodyPr rtlCol="0" anchor="ctr"/>
+              <a:lstStyle/>
+              <a:p>
+                <a:pPr algn="ctr"/>
+                <a:endParaRPr lang="en-US"/>
+              </a:p>
+            </p:txBody>
+          </p:sp>
+          <p:sp>
+            <p:nvSpPr>
+              <p:cNvPr id="69" name="弧形 68"/>
+              <p:cNvSpPr/>
+              <p:nvPr/>
+            </p:nvSpPr>
+            <p:spPr>
+              <a:xfrm rot="5400000">
+                <a:off x="5234673" y="3385551"/>
+                <a:ext cx="402820" cy="305347"/>
+              </a:xfrm>
+              <a:prstGeom prst="arc">
+                <a:avLst>
+                  <a:gd name="adj1" fmla="val 10690884"/>
+                  <a:gd name="adj2" fmla="val 13346613"/>
+                </a:avLst>
+              </a:prstGeom>
+              <a:ln w="50800" cap="rnd">
+                <a:solidFill>
+                  <a:schemeClr val="tx1"/>
+                </a:solidFill>
+                <a:headEnd type="none"/>
+                <a:tailEnd type="none"/>
+              </a:ln>
+            </p:spPr>
+            <p:style>
+              <a:lnRef idx="1">
+                <a:schemeClr val="accent1"/>
+              </a:lnRef>
+              <a:fillRef idx="0">
+                <a:schemeClr val="accent1"/>
+              </a:fillRef>
+              <a:effectRef idx="0">
+                <a:schemeClr val="accent1"/>
+              </a:effectRef>
+              <a:fontRef idx="minor">
+                <a:schemeClr val="tx1"/>
+              </a:fontRef>
+            </p:style>
+            <p:txBody>
+              <a:bodyPr rtlCol="0" anchor="ctr"/>
+              <a:lstStyle/>
+              <a:p>
+                <a:pPr algn="ctr"/>
+                <a:endParaRPr lang="en-US"/>
+              </a:p>
+            </p:txBody>
+          </p:sp>
+          <p:sp>
+            <p:nvSpPr>
+              <p:cNvPr id="70" name="弧形 69"/>
+              <p:cNvSpPr/>
+              <p:nvPr/>
+            </p:nvSpPr>
+            <p:spPr>
+              <a:xfrm rot="16200000" flipV="1">
+                <a:off x="5311064" y="3742517"/>
+                <a:ext cx="214248" cy="305347"/>
+              </a:xfrm>
+              <a:prstGeom prst="arc">
+                <a:avLst>
+                  <a:gd name="adj1" fmla="val 10739958"/>
+                  <a:gd name="adj2" fmla="val 15079701"/>
+                </a:avLst>
+              </a:prstGeom>
+              <a:ln w="50800" cap="rnd">
+                <a:solidFill>
+                  <a:schemeClr val="tx1"/>
+                </a:solidFill>
+                <a:headEnd type="none"/>
+                <a:tailEnd type="none"/>
+              </a:ln>
+            </p:spPr>
+            <p:style>
+              <a:lnRef idx="1">
+                <a:schemeClr val="accent1"/>
+              </a:lnRef>
+              <a:fillRef idx="0">
+                <a:schemeClr val="accent1"/>
+              </a:fillRef>
+              <a:effectRef idx="0">
+                <a:schemeClr val="accent1"/>
+              </a:effectRef>
+              <a:fontRef idx="minor">
+                <a:schemeClr val="tx1"/>
+              </a:fontRef>
+            </p:style>
+            <p:txBody>
+              <a:bodyPr rtlCol="0" anchor="ctr"/>
+              <a:lstStyle/>
+              <a:p>
+                <a:pPr algn="ctr"/>
+                <a:endParaRPr lang="en-US"/>
+              </a:p>
+            </p:txBody>
+          </p:sp>
+        </p:grpSp>
+        <p:grpSp>
+          <p:nvGrpSpPr>
+            <p:cNvPr id="51" name="群組 50"/>
+            <p:cNvGrpSpPr/>
+            <p:nvPr/>
+          </p:nvGrpSpPr>
+          <p:grpSpPr>
+            <a:xfrm rot="16200000">
+              <a:off x="3950514" y="3307678"/>
+              <a:ext cx="305985" cy="713863"/>
+              <a:chOff x="2149030" y="2184516"/>
+              <a:chExt cx="305985" cy="713863"/>
+            </a:xfrm>
+          </p:grpSpPr>
+          <p:sp>
+            <p:nvSpPr>
+              <p:cNvPr id="55" name="矩形 54"/>
+              <p:cNvSpPr/>
+              <p:nvPr/>
+            </p:nvSpPr>
+            <p:spPr>
+              <a:xfrm>
+                <a:off x="2149030" y="2184516"/>
+                <a:ext cx="305985" cy="713863"/>
+              </a:xfrm>
+              <a:prstGeom prst="rect">
+                <a:avLst/>
+              </a:prstGeom>
+              <a:solidFill>
+                <a:srgbClr val="0000FF">
+                  <a:alpha val="10000"/>
+                </a:srgbClr>
+              </a:solidFill>
+              <a:ln>
+                <a:noFill/>
+              </a:ln>
+            </p:spPr>
+            <p:style>
+              <a:lnRef idx="2">
+                <a:schemeClr val="accent1">
+                  <a:shade val="50000"/>
+                </a:schemeClr>
+              </a:lnRef>
+              <a:fillRef idx="1">
+                <a:schemeClr val="accent1"/>
+              </a:fillRef>
+              <a:effectRef idx="0">
+                <a:schemeClr val="accent1"/>
+              </a:effectRef>
+              <a:fontRef idx="minor">
+                <a:schemeClr val="lt1"/>
+              </a:fontRef>
+            </p:style>
+            <p:txBody>
+              <a:bodyPr rtlCol="0" anchor="ctr"/>
+              <a:lstStyle/>
+              <a:p>
+                <a:pPr algn="ctr"/>
+                <a:endParaRPr lang="zh-TW" altLang="en-US"/>
+              </a:p>
+            </p:txBody>
+          </p:sp>
+          <p:grpSp>
+            <p:nvGrpSpPr>
+              <p:cNvPr id="56" name="群組 55"/>
+              <p:cNvGrpSpPr/>
+              <p:nvPr/>
+            </p:nvGrpSpPr>
+            <p:grpSpPr>
+              <a:xfrm>
+                <a:off x="2175537" y="2222011"/>
+                <a:ext cx="251109" cy="676367"/>
+                <a:chOff x="2175537" y="2222011"/>
+                <a:chExt cx="251109" cy="676367"/>
+              </a:xfrm>
+            </p:grpSpPr>
+            <p:cxnSp>
+              <p:nvCxnSpPr>
+                <p:cNvPr id="57" name="直線接點 56"/>
+                <p:cNvCxnSpPr/>
+                <p:nvPr/>
+              </p:nvCxnSpPr>
+              <p:spPr>
+                <a:xfrm rot="480000" flipV="1">
+                  <a:off x="2194833" y="2479274"/>
+                  <a:ext cx="212770" cy="142789"/>
+                </a:xfrm>
+                <a:prstGeom prst="line">
+                  <a:avLst/>
+                </a:prstGeom>
+                <a:ln w="50800" cap="rnd">
+                  <a:solidFill>
+                    <a:schemeClr val="tx1"/>
+                  </a:solidFill>
+                  <a:headEnd type="none" w="sm" len="sm"/>
+                  <a:tailEnd type="none" w="sm" len="sm"/>
+                </a:ln>
+              </p:spPr>
+              <p:style>
+                <a:lnRef idx="1">
+                  <a:schemeClr val="accent1"/>
+                </a:lnRef>
+                <a:fillRef idx="0">
+                  <a:schemeClr val="accent1"/>
+                </a:fillRef>
+                <a:effectRef idx="0">
+                  <a:schemeClr val="accent1"/>
+                </a:effectRef>
+                <a:fontRef idx="minor">
+                  <a:schemeClr val="tx1"/>
+                </a:fontRef>
+              </p:style>
+            </p:cxnSp>
+            <p:cxnSp>
+              <p:nvCxnSpPr>
+                <p:cNvPr id="58" name="直線接點 57"/>
+                <p:cNvCxnSpPr/>
+                <p:nvPr/>
+              </p:nvCxnSpPr>
+              <p:spPr>
+                <a:xfrm rot="480000" flipV="1">
+                  <a:off x="2175537" y="2291186"/>
+                  <a:ext cx="245520" cy="114642"/>
+                </a:xfrm>
+                <a:prstGeom prst="line">
+                  <a:avLst/>
+                </a:prstGeom>
+                <a:ln w="50800" cap="rnd">
+                  <a:solidFill>
+                    <a:schemeClr val="tx1"/>
+                  </a:solidFill>
+                  <a:headEnd type="none" w="sm" len="sm"/>
+                  <a:tailEnd type="none" w="sm" len="sm"/>
+                </a:ln>
+              </p:spPr>
+              <p:style>
+                <a:lnRef idx="1">
+                  <a:schemeClr val="accent1"/>
+                </a:lnRef>
+                <a:fillRef idx="0">
+                  <a:schemeClr val="accent1"/>
+                </a:fillRef>
+                <a:effectRef idx="0">
+                  <a:schemeClr val="accent1"/>
+                </a:effectRef>
+                <a:fontRef idx="minor">
+                  <a:schemeClr val="tx1"/>
+                </a:fontRef>
+              </p:style>
+            </p:cxnSp>
+            <p:cxnSp>
+              <p:nvCxnSpPr>
+                <p:cNvPr id="59" name="直線接點 58"/>
+                <p:cNvCxnSpPr/>
+                <p:nvPr/>
+              </p:nvCxnSpPr>
+              <p:spPr>
+                <a:xfrm>
+                  <a:off x="2175537" y="2395701"/>
+                  <a:ext cx="245520" cy="93805"/>
+                </a:xfrm>
+                <a:prstGeom prst="line">
+                  <a:avLst/>
+                </a:prstGeom>
+                <a:ln w="50800" cap="rnd">
+                  <a:solidFill>
+                    <a:schemeClr val="tx1"/>
+                  </a:solidFill>
+                  <a:headEnd type="none"/>
+                  <a:tailEnd type="none"/>
+                </a:ln>
+              </p:spPr>
+              <p:style>
+                <a:lnRef idx="1">
+                  <a:schemeClr val="accent1"/>
+                </a:lnRef>
+                <a:fillRef idx="0">
+                  <a:schemeClr val="accent1"/>
+                </a:fillRef>
+                <a:effectRef idx="0">
+                  <a:schemeClr val="accent1"/>
+                </a:effectRef>
+                <a:fontRef idx="minor">
+                  <a:schemeClr val="tx1"/>
+                </a:fontRef>
+              </p:style>
+            </p:cxnSp>
+            <p:cxnSp>
+              <p:nvCxnSpPr>
+                <p:cNvPr id="60" name="直線接點 59"/>
+                <p:cNvCxnSpPr/>
+                <p:nvPr/>
+              </p:nvCxnSpPr>
+              <p:spPr>
+                <a:xfrm>
+                  <a:off x="2306026" y="2222011"/>
+                  <a:ext cx="120620" cy="86128"/>
+                </a:xfrm>
+                <a:prstGeom prst="line">
+                  <a:avLst/>
+                </a:prstGeom>
+                <a:ln w="50800" cap="rnd">
+                  <a:solidFill>
+                    <a:schemeClr val="tx1"/>
+                  </a:solidFill>
+                  <a:headEnd type="none"/>
+                  <a:tailEnd type="none"/>
+                </a:ln>
+              </p:spPr>
+              <p:style>
+                <a:lnRef idx="1">
+                  <a:schemeClr val="accent1"/>
+                </a:lnRef>
+                <a:fillRef idx="0">
+                  <a:schemeClr val="accent1"/>
+                </a:fillRef>
+                <a:effectRef idx="0">
+                  <a:schemeClr val="accent1"/>
+                </a:effectRef>
+                <a:fontRef idx="minor">
+                  <a:schemeClr val="tx1"/>
+                </a:fontRef>
+              </p:style>
+            </p:cxnSp>
+            <p:cxnSp>
+              <p:nvCxnSpPr>
+                <p:cNvPr id="61" name="直線接點 60"/>
+                <p:cNvCxnSpPr>
+                  <a:endCxn id="55" idx="2"/>
+                </p:cNvCxnSpPr>
+                <p:nvPr/>
+              </p:nvCxnSpPr>
+              <p:spPr>
+                <a:xfrm rot="5400000" flipV="1">
+                  <a:off x="2215988" y="2812342"/>
+                  <a:ext cx="65472" cy="106600"/>
+                </a:xfrm>
+                <a:prstGeom prst="line">
+                  <a:avLst/>
+                </a:prstGeom>
+                <a:ln w="50800" cap="rnd">
+                  <a:solidFill>
+                    <a:schemeClr val="tx1"/>
+                  </a:solidFill>
+                  <a:headEnd type="none"/>
+                  <a:tailEnd type="none"/>
+                </a:ln>
+              </p:spPr>
+              <p:style>
+                <a:lnRef idx="1">
+                  <a:schemeClr val="accent1"/>
+                </a:lnRef>
+                <a:fillRef idx="0">
+                  <a:schemeClr val="accent1"/>
+                </a:fillRef>
+                <a:effectRef idx="0">
+                  <a:schemeClr val="accent1"/>
+                </a:effectRef>
+                <a:fontRef idx="minor">
+                  <a:schemeClr val="tx1"/>
+                </a:fontRef>
+              </p:style>
+            </p:cxnSp>
+            <p:cxnSp>
+              <p:nvCxnSpPr>
+                <p:cNvPr id="62" name="直線接點 61"/>
+                <p:cNvCxnSpPr/>
+                <p:nvPr/>
+              </p:nvCxnSpPr>
+              <p:spPr>
+                <a:xfrm rot="480000" flipV="1">
+                  <a:off x="2194833" y="2702934"/>
+                  <a:ext cx="212770" cy="142789"/>
+                </a:xfrm>
+                <a:prstGeom prst="line">
+                  <a:avLst/>
+                </a:prstGeom>
+                <a:ln w="50800" cap="rnd">
+                  <a:solidFill>
+                    <a:schemeClr val="tx1"/>
+                  </a:solidFill>
+                  <a:headEnd type="none" w="sm" len="sm"/>
+                  <a:tailEnd type="none" w="sm" len="sm"/>
+                </a:ln>
+              </p:spPr>
+              <p:style>
+                <a:lnRef idx="1">
+                  <a:schemeClr val="accent1"/>
+                </a:lnRef>
+                <a:fillRef idx="0">
+                  <a:schemeClr val="accent1"/>
+                </a:fillRef>
+                <a:effectRef idx="0">
+                  <a:schemeClr val="accent1"/>
+                </a:effectRef>
+                <a:fontRef idx="minor">
+                  <a:schemeClr val="tx1"/>
+                </a:fontRef>
+              </p:style>
+            </p:cxnSp>
+            <p:cxnSp>
+              <p:nvCxnSpPr>
+                <p:cNvPr id="63" name="直線接點 62"/>
+                <p:cNvCxnSpPr/>
+                <p:nvPr/>
+              </p:nvCxnSpPr>
+              <p:spPr>
+                <a:xfrm>
+                  <a:off x="2175537" y="2610549"/>
+                  <a:ext cx="245520" cy="103072"/>
+                </a:xfrm>
+                <a:prstGeom prst="line">
+                  <a:avLst/>
+                </a:prstGeom>
+                <a:ln w="50800" cap="rnd">
+                  <a:solidFill>
+                    <a:schemeClr val="tx1"/>
+                  </a:solidFill>
+                  <a:headEnd type="none"/>
+                  <a:tailEnd type="none"/>
+                </a:ln>
+              </p:spPr>
+              <p:style>
+                <a:lnRef idx="1">
+                  <a:schemeClr val="accent1"/>
+                </a:lnRef>
+                <a:fillRef idx="0">
+                  <a:schemeClr val="accent1"/>
+                </a:fillRef>
+                <a:effectRef idx="0">
+                  <a:schemeClr val="accent1"/>
+                </a:effectRef>
+                <a:fontRef idx="minor">
+                  <a:schemeClr val="tx1"/>
+                </a:fontRef>
+              </p:style>
+            </p:cxnSp>
+          </p:grpSp>
+        </p:grpSp>
+        <p:sp>
+          <p:nvSpPr>
+            <p:cNvPr id="52" name="文字方塊 51"/>
+            <p:cNvSpPr txBox="1"/>
+            <p:nvPr/>
+          </p:nvSpPr>
+          <p:spPr>
+            <a:xfrm>
+              <a:off x="3895250" y="3081517"/>
+              <a:ext cx="457176" cy="397673"/>
+            </a:xfrm>
+            <a:prstGeom prst="rect">
+              <a:avLst/>
+            </a:prstGeom>
+            <a:noFill/>
+          </p:spPr>
+          <p:txBody>
+            <a:bodyPr wrap="none" rtlCol="0">
+              <a:spAutoFit/>
+            </a:bodyPr>
+            <a:lstStyle/>
+            <a:p>
+              <a:r>
+                <a:rPr lang="en-US" b="1" i="1" dirty="0" err="1" smtClean="0">
+                  <a:latin typeface="Bookman Old Style" panose="02050604050505020204" pitchFamily="18" charset="0"/>
+                </a:rPr>
+                <a:t>R</a:t>
+              </a:r>
+              <a:r>
+                <a:rPr lang="en-US" b="1" i="1" baseline="-25000" dirty="0" err="1" smtClean="0">
+                  <a:latin typeface="Bookman Old Style" panose="02050604050505020204" pitchFamily="18" charset="0"/>
+                </a:rPr>
+                <a:t>r</a:t>
+              </a:r>
+              <a:endParaRPr lang="en-US" b="1" i="1" baseline="-25000" dirty="0">
+                <a:latin typeface="Bookman Old Style" panose="02050604050505020204" pitchFamily="18" charset="0"/>
+              </a:endParaRPr>
+            </a:p>
+          </p:txBody>
+        </p:sp>
+        <p:cxnSp>
+          <p:nvCxnSpPr>
+            <p:cNvPr id="53" name="直線接點 52"/>
+            <p:cNvCxnSpPr>
+              <a:stCxn id="55" idx="2"/>
+            </p:cNvCxnSpPr>
+            <p:nvPr/>
+          </p:nvCxnSpPr>
+          <p:spPr>
+            <a:xfrm flipV="1">
+              <a:off x="4460438" y="3662579"/>
+              <a:ext cx="170337" cy="2030"/>
+            </a:xfrm>
+            <a:prstGeom prst="line">
+              <a:avLst/>
+            </a:prstGeom>
+            <a:ln w="50800" cap="rnd">
+              <a:solidFill>
+                <a:schemeClr val="tx1"/>
+              </a:solidFill>
+            </a:ln>
+          </p:spPr>
+          <p:style>
+            <a:lnRef idx="1">
+              <a:schemeClr val="accent1"/>
+            </a:lnRef>
+            <a:fillRef idx="0">
+              <a:schemeClr val="accent1"/>
+            </a:fillRef>
+            <a:effectRef idx="0">
+              <a:schemeClr val="accent1"/>
+            </a:effectRef>
+            <a:fontRef idx="minor">
+              <a:schemeClr val="tx1"/>
+            </a:fontRef>
+          </p:style>
+        </p:cxnSp>
+        <p:cxnSp>
+          <p:nvCxnSpPr>
+            <p:cNvPr id="54" name="直線接點 53"/>
+            <p:cNvCxnSpPr/>
+            <p:nvPr/>
+          </p:nvCxnSpPr>
+          <p:spPr>
+            <a:xfrm flipV="1">
+              <a:off x="5319586" y="3672144"/>
+              <a:ext cx="170337" cy="2030"/>
+            </a:xfrm>
+            <a:prstGeom prst="line">
+              <a:avLst/>
+            </a:prstGeom>
+            <a:ln w="50800" cap="rnd">
+              <a:solidFill>
+                <a:schemeClr val="tx1"/>
+              </a:solidFill>
+            </a:ln>
+          </p:spPr>
+          <p:style>
+            <a:lnRef idx="1">
+              <a:schemeClr val="accent1"/>
+            </a:lnRef>
+            <a:fillRef idx="0">
+              <a:schemeClr val="accent1"/>
+            </a:fillRef>
+            <a:effectRef idx="0">
+              <a:schemeClr val="accent1"/>
+            </a:effectRef>
+            <a:fontRef idx="minor">
+              <a:schemeClr val="tx1"/>
+            </a:fontRef>
+          </p:style>
+        </p:cxnSp>
+      </p:grpSp>
+      <p:grpSp>
+        <p:nvGrpSpPr>
+          <p:cNvPr id="71" name="群組 70"/>
+          <p:cNvGrpSpPr/>
+          <p:nvPr/>
+        </p:nvGrpSpPr>
+        <p:grpSpPr>
+          <a:xfrm>
+            <a:off x="4819985" y="2423750"/>
+            <a:ext cx="785302" cy="1419870"/>
+            <a:chOff x="4435066" y="2423750"/>
+            <a:chExt cx="785302" cy="1419870"/>
+          </a:xfrm>
+        </p:grpSpPr>
+        <p:grpSp>
+          <p:nvGrpSpPr>
+            <p:cNvPr id="72" name="群組 71"/>
+            <p:cNvGrpSpPr/>
+            <p:nvPr/>
+          </p:nvGrpSpPr>
+          <p:grpSpPr>
+            <a:xfrm>
+              <a:off x="4435066" y="2423750"/>
+              <a:ext cx="785302" cy="1016312"/>
+              <a:chOff x="1437787" y="2063830"/>
+              <a:chExt cx="785302" cy="1016312"/>
+            </a:xfrm>
+          </p:grpSpPr>
+          <p:grpSp>
+            <p:nvGrpSpPr>
+              <p:cNvPr id="79" name="群組 78"/>
+              <p:cNvGrpSpPr/>
+              <p:nvPr/>
+            </p:nvGrpSpPr>
+            <p:grpSpPr>
+              <a:xfrm>
+                <a:off x="1437787" y="2063830"/>
+                <a:ext cx="297505" cy="597393"/>
+                <a:chOff x="1437787" y="2063830"/>
+                <a:chExt cx="297505" cy="597393"/>
+              </a:xfrm>
+            </p:grpSpPr>
+            <p:sp>
+              <p:nvSpPr>
+                <p:cNvPr id="81" name="矩形 80"/>
+                <p:cNvSpPr/>
+                <p:nvPr/>
+              </p:nvSpPr>
+              <p:spPr>
+                <a:xfrm>
+                  <a:off x="1437787" y="2451918"/>
+                  <a:ext cx="297505" cy="209305"/>
+                </a:xfrm>
+                <a:prstGeom prst="rect">
+                  <a:avLst/>
+                </a:prstGeom>
+                <a:solidFill>
+                  <a:srgbClr val="0000FF">
+                    <a:alpha val="10000"/>
+                  </a:srgbClr>
+                </a:solidFill>
+                <a:ln>
+                  <a:noFill/>
+                </a:ln>
+              </p:spPr>
+              <p:style>
+                <a:lnRef idx="2">
+                  <a:schemeClr val="accent1">
+                    <a:shade val="50000"/>
+                  </a:schemeClr>
+                </a:lnRef>
+                <a:fillRef idx="1">
+                  <a:schemeClr val="accent1"/>
+                </a:fillRef>
+                <a:effectRef idx="0">
+                  <a:schemeClr val="accent1"/>
+                </a:effectRef>
+                <a:fontRef idx="minor">
+                  <a:schemeClr val="lt1"/>
+                </a:fontRef>
+              </p:style>
+              <p:txBody>
+                <a:bodyPr rtlCol="0" anchor="ctr"/>
+                <a:lstStyle/>
+                <a:p>
+                  <a:pPr algn="ctr"/>
+                  <a:endParaRPr lang="zh-TW" altLang="en-US"/>
+                </a:p>
+              </p:txBody>
+            </p:sp>
+            <p:grpSp>
+              <p:nvGrpSpPr>
+                <p:cNvPr id="82" name="群組 81"/>
+                <p:cNvGrpSpPr/>
+                <p:nvPr/>
+              </p:nvGrpSpPr>
+              <p:grpSpPr>
+                <a:xfrm>
+                  <a:off x="1450099" y="2063830"/>
+                  <a:ext cx="284017" cy="591522"/>
+                  <a:chOff x="1450099" y="2063830"/>
+                  <a:chExt cx="284017" cy="591522"/>
+                </a:xfrm>
+              </p:grpSpPr>
+              <p:cxnSp>
+                <p:nvCxnSpPr>
+                  <p:cNvPr id="83" name="直線接點 82"/>
+                  <p:cNvCxnSpPr/>
+                  <p:nvPr/>
+                </p:nvCxnSpPr>
+                <p:spPr>
+                  <a:xfrm>
+                    <a:off x="1450099" y="2655352"/>
+                    <a:ext cx="284017" cy="0"/>
+                  </a:xfrm>
+                  <a:prstGeom prst="line">
+                    <a:avLst/>
+                  </a:prstGeom>
+                  <a:ln w="50800" cap="rnd">
+                    <a:solidFill>
+                      <a:schemeClr val="tx1"/>
+                    </a:solidFill>
+                  </a:ln>
+                </p:spPr>
+                <p:style>
+                  <a:lnRef idx="1">
+                    <a:schemeClr val="accent1"/>
+                  </a:lnRef>
+                  <a:fillRef idx="0">
+                    <a:schemeClr val="accent1"/>
+                  </a:fillRef>
+                  <a:effectRef idx="0">
+                    <a:schemeClr val="accent1"/>
+                  </a:effectRef>
+                  <a:fontRef idx="minor">
+                    <a:schemeClr val="tx1"/>
+                  </a:fontRef>
+                </p:style>
+              </p:cxnSp>
+              <p:cxnSp>
+                <p:nvCxnSpPr>
+                  <p:cNvPr id="84" name="直線接點 83"/>
+                  <p:cNvCxnSpPr/>
+                  <p:nvPr/>
+                </p:nvCxnSpPr>
+                <p:spPr>
+                  <a:xfrm>
+                    <a:off x="1450099" y="2454711"/>
+                    <a:ext cx="284017" cy="0"/>
+                  </a:xfrm>
+                  <a:prstGeom prst="line">
+                    <a:avLst/>
+                  </a:prstGeom>
+                  <a:ln w="50800" cap="rnd">
+                    <a:solidFill>
+                      <a:schemeClr val="tx1"/>
+                    </a:solidFill>
+                  </a:ln>
+                </p:spPr>
+                <p:style>
+                  <a:lnRef idx="1">
+                    <a:schemeClr val="accent1"/>
+                  </a:lnRef>
+                  <a:fillRef idx="0">
+                    <a:schemeClr val="accent1"/>
+                  </a:fillRef>
+                  <a:effectRef idx="0">
+                    <a:schemeClr val="accent1"/>
+                  </a:effectRef>
+                  <a:fontRef idx="minor">
+                    <a:schemeClr val="tx1"/>
+                  </a:fontRef>
+                </p:style>
+              </p:cxnSp>
+              <p:cxnSp>
+                <p:nvCxnSpPr>
+                  <p:cNvPr id="85" name="直線接點 84"/>
+                  <p:cNvCxnSpPr/>
+                  <p:nvPr/>
+                </p:nvCxnSpPr>
+                <p:spPr>
+                  <a:xfrm flipH="1" flipV="1">
+                    <a:off x="1586539" y="2063830"/>
+                    <a:ext cx="2" cy="366498"/>
+                  </a:xfrm>
+                  <a:prstGeom prst="line">
+                    <a:avLst/>
+                  </a:prstGeom>
+                  <a:ln w="50800" cap="rnd">
+                    <a:solidFill>
+                      <a:schemeClr val="tx1"/>
+                    </a:solidFill>
+                    <a:headEnd type="none"/>
+                    <a:tailEnd type="none" w="med" len="sm"/>
+                  </a:ln>
+                </p:spPr>
+                <p:style>
+                  <a:lnRef idx="1">
+                    <a:schemeClr val="accent1"/>
+                  </a:lnRef>
+                  <a:fillRef idx="0">
+                    <a:schemeClr val="accent1"/>
+                  </a:fillRef>
+                  <a:effectRef idx="0">
+                    <a:schemeClr val="accent1"/>
+                  </a:effectRef>
+                  <a:fontRef idx="minor">
+                    <a:schemeClr val="tx1"/>
+                  </a:fontRef>
+                </p:style>
+              </p:cxnSp>
+            </p:grpSp>
+          </p:grpSp>
+          <p:sp>
+            <p:nvSpPr>
+              <p:cNvPr id="80" name="文字方塊 79"/>
+              <p:cNvSpPr txBox="1">
+                <a:spLocks noChangeAspect="1"/>
+              </p:cNvSpPr>
+              <p:nvPr/>
+            </p:nvSpPr>
+            <p:spPr>
+              <a:xfrm>
+                <a:off x="1620260" y="2682469"/>
+                <a:ext cx="602829" cy="397673"/>
+              </a:xfrm>
+              <a:prstGeom prst="rect">
+                <a:avLst/>
+              </a:prstGeom>
+              <a:noFill/>
+            </p:spPr>
+            <p:txBody>
+              <a:bodyPr wrap="square" rtlCol="0">
+                <a:spAutoFit/>
+              </a:bodyPr>
+              <a:lstStyle/>
+              <a:p>
+                <a:r>
+                  <a:rPr lang="en-US" b="1" i="1" dirty="0" smtClean="0">
+                    <a:latin typeface="Bookman Old Style" panose="02050604050505020204" pitchFamily="18" charset="0"/>
+                  </a:rPr>
+                  <a:t>C</a:t>
+                </a:r>
+                <a:r>
+                  <a:rPr lang="en-US" b="1" i="1" baseline="-25000" dirty="0" smtClean="0">
+                    <a:latin typeface="Bookman Old Style" panose="02050604050505020204" pitchFamily="18" charset="0"/>
+                  </a:rPr>
+                  <a:t>11</a:t>
+                </a:r>
+                <a:endParaRPr lang="en-US" b="1" i="1" baseline="-25000" dirty="0">
+                  <a:latin typeface="Bookman Old Style" panose="02050604050505020204" pitchFamily="18" charset="0"/>
+                </a:endParaRPr>
+              </a:p>
+            </p:txBody>
+          </p:sp>
+        </p:grpSp>
+        <p:sp>
+          <p:nvSpPr>
+            <p:cNvPr id="73" name="梯形 72"/>
+            <p:cNvSpPr/>
+            <p:nvPr/>
+          </p:nvSpPr>
+          <p:spPr>
+            <a:xfrm flipV="1">
+              <a:off x="4441498" y="3676372"/>
+              <a:ext cx="292632" cy="167248"/>
+            </a:xfrm>
+            <a:prstGeom prst="trapezoid">
+              <a:avLst>
+                <a:gd name="adj" fmla="val 36718"/>
+              </a:avLst>
+            </a:prstGeom>
+            <a:solidFill>
+              <a:srgbClr val="0000FF">
+                <a:alpha val="10000"/>
+              </a:srgbClr>
+            </a:solidFill>
+            <a:ln>
+              <a:noFill/>
+            </a:ln>
+          </p:spPr>
+          <p:style>
+            <a:lnRef idx="2">
+              <a:schemeClr val="accent1">
+                <a:shade val="50000"/>
+              </a:schemeClr>
+            </a:lnRef>
+            <a:fillRef idx="1">
+              <a:schemeClr val="accent1"/>
+            </a:fillRef>
+            <a:effectRef idx="0">
+              <a:schemeClr val="accent1"/>
+            </a:effectRef>
+            <a:fontRef idx="minor">
+              <a:schemeClr val="lt1"/>
+            </a:fontRef>
+          </p:style>
+          <p:txBody>
+            <a:bodyPr rtlCol="0" anchor="ctr"/>
+            <a:lstStyle/>
+            <a:p>
+              <a:pPr algn="ctr"/>
+              <a:endParaRPr lang="zh-TW" altLang="en-US"/>
+            </a:p>
+          </p:txBody>
+        </p:sp>
+        <p:grpSp>
+          <p:nvGrpSpPr>
+            <p:cNvPr id="74" name="群組 73"/>
+            <p:cNvGrpSpPr/>
+            <p:nvPr/>
+          </p:nvGrpSpPr>
+          <p:grpSpPr>
+            <a:xfrm>
+              <a:off x="4441498" y="3676374"/>
+              <a:ext cx="284442" cy="159586"/>
+              <a:chOff x="6484255" y="1479971"/>
+              <a:chExt cx="284442" cy="159586"/>
+            </a:xfrm>
+          </p:grpSpPr>
+          <p:cxnSp>
+            <p:nvCxnSpPr>
+              <p:cNvPr id="76" name="直線接點 75"/>
+              <p:cNvCxnSpPr/>
+              <p:nvPr/>
+            </p:nvCxnSpPr>
+            <p:spPr>
+              <a:xfrm>
+                <a:off x="6484255" y="1479971"/>
+                <a:ext cx="284442" cy="0"/>
+              </a:xfrm>
+              <a:prstGeom prst="line">
+                <a:avLst/>
+              </a:prstGeom>
+              <a:ln w="50800" cap="rnd">
+                <a:solidFill>
+                  <a:schemeClr val="tx1"/>
+                </a:solidFill>
+              </a:ln>
+            </p:spPr>
+            <p:style>
+              <a:lnRef idx="1">
+                <a:schemeClr val="accent1"/>
+              </a:lnRef>
+              <a:fillRef idx="0">
+                <a:schemeClr val="accent1"/>
+              </a:fillRef>
+              <a:effectRef idx="0">
+                <a:schemeClr val="accent1"/>
+              </a:effectRef>
+              <a:fontRef idx="minor">
+                <a:schemeClr val="tx1"/>
+              </a:fontRef>
+            </p:style>
+          </p:cxnSp>
+          <p:cxnSp>
+            <p:nvCxnSpPr>
+              <p:cNvPr id="77" name="直線接點 76"/>
+              <p:cNvCxnSpPr/>
+              <p:nvPr/>
+            </p:nvCxnSpPr>
+            <p:spPr>
+              <a:xfrm>
+                <a:off x="6527074" y="1559764"/>
+                <a:ext cx="198804" cy="0"/>
+              </a:xfrm>
+              <a:prstGeom prst="line">
+                <a:avLst/>
+              </a:prstGeom>
+              <a:ln w="50800" cap="rnd">
+                <a:solidFill>
+                  <a:schemeClr val="tx1"/>
+                </a:solidFill>
+              </a:ln>
+            </p:spPr>
+            <p:style>
+              <a:lnRef idx="1">
+                <a:schemeClr val="accent1"/>
+              </a:lnRef>
+              <a:fillRef idx="0">
+                <a:schemeClr val="accent1"/>
+              </a:fillRef>
+              <a:effectRef idx="0">
+                <a:schemeClr val="accent1"/>
+              </a:effectRef>
+              <a:fontRef idx="minor">
+                <a:schemeClr val="tx1"/>
+              </a:fontRef>
+            </p:style>
+          </p:cxnSp>
+          <p:cxnSp>
+            <p:nvCxnSpPr>
+              <p:cNvPr id="78" name="直線接點 77"/>
+              <p:cNvCxnSpPr/>
+              <p:nvPr/>
+            </p:nvCxnSpPr>
+            <p:spPr>
+              <a:xfrm>
+                <a:off x="6556307" y="1639557"/>
+                <a:ext cx="140338" cy="0"/>
+              </a:xfrm>
+              <a:prstGeom prst="line">
+                <a:avLst/>
+              </a:prstGeom>
+              <a:ln w="50800" cap="rnd">
+                <a:solidFill>
+                  <a:schemeClr val="tx1"/>
+                </a:solidFill>
+              </a:ln>
+            </p:spPr>
+            <p:style>
+              <a:lnRef idx="1">
+                <a:schemeClr val="accent1"/>
+              </a:lnRef>
+              <a:fillRef idx="0">
+                <a:schemeClr val="accent1"/>
+              </a:fillRef>
+              <a:effectRef idx="0">
+                <a:schemeClr val="accent1"/>
+              </a:effectRef>
+              <a:fontRef idx="minor">
+                <a:schemeClr val="tx1"/>
+              </a:fontRef>
+            </p:style>
+          </p:cxnSp>
+        </p:grpSp>
+        <p:cxnSp>
+          <p:nvCxnSpPr>
+            <p:cNvPr id="75" name="直線接點 74"/>
+            <p:cNvCxnSpPr/>
+            <p:nvPr/>
+          </p:nvCxnSpPr>
+          <p:spPr>
+            <a:xfrm>
+              <a:off x="4583819" y="3044216"/>
+              <a:ext cx="3995" cy="655229"/>
+            </a:xfrm>
+            <a:prstGeom prst="line">
+              <a:avLst/>
+            </a:prstGeom>
+            <a:ln w="50800" cap="rnd">
+              <a:solidFill>
+                <a:schemeClr val="tx1"/>
+              </a:solidFill>
+            </a:ln>
+          </p:spPr>
+          <p:style>
+            <a:lnRef idx="1">
+              <a:schemeClr val="accent1"/>
+            </a:lnRef>
+            <a:fillRef idx="0">
+              <a:schemeClr val="accent1"/>
+            </a:fillRef>
+            <a:effectRef idx="0">
+              <a:schemeClr val="accent1"/>
+            </a:effectRef>
+            <a:fontRef idx="minor">
+              <a:schemeClr val="tx1"/>
+            </a:fontRef>
+          </p:style>
+        </p:cxnSp>
+      </p:grpSp>
+      <p:grpSp>
+        <p:nvGrpSpPr>
+          <p:cNvPr id="86" name="群組 85"/>
+          <p:cNvGrpSpPr/>
+          <p:nvPr/>
+        </p:nvGrpSpPr>
+        <p:grpSpPr>
+          <a:xfrm>
+            <a:off x="4117958" y="2912552"/>
+            <a:ext cx="715999" cy="1060245"/>
+            <a:chOff x="1437787" y="2063830"/>
+            <a:chExt cx="715999" cy="1060245"/>
+          </a:xfrm>
+        </p:grpSpPr>
+        <p:grpSp>
+          <p:nvGrpSpPr>
+            <p:cNvPr id="87" name="群組 86"/>
+            <p:cNvGrpSpPr/>
+            <p:nvPr/>
+          </p:nvGrpSpPr>
+          <p:grpSpPr>
+            <a:xfrm>
+              <a:off x="1437787" y="2063830"/>
+              <a:ext cx="297505" cy="597393"/>
+              <a:chOff x="1437787" y="2063830"/>
+              <a:chExt cx="297505" cy="597393"/>
+            </a:xfrm>
+          </p:grpSpPr>
+          <p:sp>
+            <p:nvSpPr>
+              <p:cNvPr id="89" name="矩形 88"/>
+              <p:cNvSpPr/>
+              <p:nvPr/>
+            </p:nvSpPr>
+            <p:spPr>
+              <a:xfrm>
+                <a:off x="1437787" y="2451918"/>
+                <a:ext cx="297505" cy="209305"/>
+              </a:xfrm>
+              <a:prstGeom prst="rect">
+                <a:avLst/>
+              </a:prstGeom>
+              <a:solidFill>
+                <a:srgbClr val="0000FF">
+                  <a:alpha val="10000"/>
+                </a:srgbClr>
+              </a:solidFill>
+              <a:ln>
+                <a:noFill/>
+              </a:ln>
+            </p:spPr>
+            <p:style>
+              <a:lnRef idx="2">
+                <a:schemeClr val="accent1">
+                  <a:shade val="50000"/>
+                </a:schemeClr>
+              </a:lnRef>
+              <a:fillRef idx="1">
+                <a:schemeClr val="accent1"/>
+              </a:fillRef>
+              <a:effectRef idx="0">
+                <a:schemeClr val="accent1"/>
+              </a:effectRef>
+              <a:fontRef idx="minor">
+                <a:schemeClr val="lt1"/>
+              </a:fontRef>
+            </p:style>
+            <p:txBody>
+              <a:bodyPr rtlCol="0" anchor="ctr"/>
+              <a:lstStyle/>
+              <a:p>
+                <a:pPr algn="ctr"/>
+                <a:endParaRPr lang="zh-TW" altLang="en-US"/>
+              </a:p>
+            </p:txBody>
+          </p:sp>
+          <p:grpSp>
+            <p:nvGrpSpPr>
+              <p:cNvPr id="90" name="群組 89"/>
+              <p:cNvGrpSpPr/>
+              <p:nvPr/>
+            </p:nvGrpSpPr>
+            <p:grpSpPr>
+              <a:xfrm>
+                <a:off x="1450099" y="2063830"/>
+                <a:ext cx="284017" cy="591522"/>
+                <a:chOff x="1450099" y="2063830"/>
+                <a:chExt cx="284017" cy="591522"/>
+              </a:xfrm>
+            </p:grpSpPr>
+            <p:cxnSp>
+              <p:nvCxnSpPr>
+                <p:cNvPr id="91" name="直線接點 90"/>
+                <p:cNvCxnSpPr/>
+                <p:nvPr/>
+              </p:nvCxnSpPr>
+              <p:spPr>
+                <a:xfrm>
+                  <a:off x="1450099" y="2655352"/>
+                  <a:ext cx="284017" cy="0"/>
+                </a:xfrm>
+                <a:prstGeom prst="line">
+                  <a:avLst/>
+                </a:prstGeom>
+                <a:ln w="50800" cap="rnd">
+                  <a:solidFill>
+                    <a:schemeClr val="tx1"/>
+                  </a:solidFill>
+                </a:ln>
+              </p:spPr>
+              <p:style>
+                <a:lnRef idx="1">
+                  <a:schemeClr val="accent1"/>
+                </a:lnRef>
+                <a:fillRef idx="0">
+                  <a:schemeClr val="accent1"/>
+                </a:fillRef>
+                <a:effectRef idx="0">
+                  <a:schemeClr val="accent1"/>
+                </a:effectRef>
+                <a:fontRef idx="minor">
+                  <a:schemeClr val="tx1"/>
+                </a:fontRef>
+              </p:style>
+            </p:cxnSp>
+            <p:cxnSp>
+              <p:nvCxnSpPr>
+                <p:cNvPr id="92" name="直線接點 91"/>
+                <p:cNvCxnSpPr/>
+                <p:nvPr/>
+              </p:nvCxnSpPr>
+              <p:spPr>
+                <a:xfrm>
+                  <a:off x="1450099" y="2454711"/>
+                  <a:ext cx="284017" cy="0"/>
+                </a:xfrm>
+                <a:prstGeom prst="line">
+                  <a:avLst/>
+                </a:prstGeom>
+                <a:ln w="50800" cap="rnd">
+                  <a:solidFill>
+                    <a:schemeClr val="tx1"/>
+                  </a:solidFill>
+                </a:ln>
+              </p:spPr>
+              <p:style>
+                <a:lnRef idx="1">
+                  <a:schemeClr val="accent1"/>
+                </a:lnRef>
+                <a:fillRef idx="0">
+                  <a:schemeClr val="accent1"/>
+                </a:fillRef>
+                <a:effectRef idx="0">
+                  <a:schemeClr val="accent1"/>
+                </a:effectRef>
+                <a:fontRef idx="minor">
+                  <a:schemeClr val="tx1"/>
+                </a:fontRef>
+              </p:style>
+            </p:cxnSp>
+            <p:cxnSp>
+              <p:nvCxnSpPr>
+                <p:cNvPr id="93" name="直線接點 92"/>
+                <p:cNvCxnSpPr/>
+                <p:nvPr/>
+              </p:nvCxnSpPr>
+              <p:spPr>
+                <a:xfrm flipH="1" flipV="1">
+                  <a:off x="1586539" y="2063830"/>
+                  <a:ext cx="2" cy="366498"/>
+                </a:xfrm>
+                <a:prstGeom prst="line">
+                  <a:avLst/>
+                </a:prstGeom>
+                <a:ln w="50800" cap="rnd">
+                  <a:solidFill>
+                    <a:schemeClr val="tx1"/>
+                  </a:solidFill>
+                  <a:headEnd type="none"/>
+                  <a:tailEnd type="none" w="med" len="sm"/>
+                </a:ln>
+              </p:spPr>
+              <p:style>
+                <a:lnRef idx="1">
+                  <a:schemeClr val="accent1"/>
+                </a:lnRef>
+                <a:fillRef idx="0">
+                  <a:schemeClr val="accent1"/>
+                </a:fillRef>
+                <a:effectRef idx="0">
+                  <a:schemeClr val="accent1"/>
+                </a:effectRef>
+                <a:fontRef idx="minor">
+                  <a:schemeClr val="tx1"/>
+                </a:fontRef>
+              </p:style>
+            </p:cxnSp>
+          </p:grpSp>
+        </p:grpSp>
+        <p:sp>
+          <p:nvSpPr>
+            <p:cNvPr id="88" name="文字方塊 87"/>
+            <p:cNvSpPr txBox="1">
+              <a:spLocks noChangeAspect="1"/>
+            </p:cNvSpPr>
+            <p:nvPr/>
+          </p:nvSpPr>
+          <p:spPr>
+            <a:xfrm>
+              <a:off x="1550957" y="2726402"/>
+              <a:ext cx="602829" cy="397673"/>
+            </a:xfrm>
+            <a:prstGeom prst="rect">
+              <a:avLst/>
+            </a:prstGeom>
+            <a:noFill/>
+          </p:spPr>
+          <p:txBody>
+            <a:bodyPr wrap="square" rtlCol="0">
+              <a:spAutoFit/>
+            </a:bodyPr>
+            <a:lstStyle/>
+            <a:p>
+              <a:r>
+                <a:rPr lang="en-US" b="1" i="1" dirty="0" smtClean="0">
+                  <a:latin typeface="Bookman Old Style" panose="02050604050505020204" pitchFamily="18" charset="0"/>
+                </a:rPr>
+                <a:t>C</a:t>
+              </a:r>
+              <a:r>
+                <a:rPr lang="en-US" b="1" i="1" baseline="-25000" dirty="0" smtClean="0">
+                  <a:latin typeface="Bookman Old Style" panose="02050604050505020204" pitchFamily="18" charset="0"/>
+                </a:rPr>
+                <a:t>22</a:t>
+              </a:r>
+              <a:endParaRPr lang="en-US" b="1" i="1" baseline="-25000" dirty="0">
+                <a:latin typeface="Bookman Old Style" panose="02050604050505020204" pitchFamily="18" charset="0"/>
+              </a:endParaRPr>
             </a:p>
           </p:txBody>
         </p:sp>
       </p:grpSp>
+      <p:cxnSp>
+        <p:nvCxnSpPr>
+          <p:cNvPr id="94" name="直線接點 93"/>
+          <p:cNvCxnSpPr>
+            <a:stCxn id="89" idx="2"/>
+          </p:cNvCxnSpPr>
+          <p:nvPr/>
+        </p:nvCxnSpPr>
+        <p:spPr>
+          <a:xfrm>
+            <a:off x="4266711" y="3509945"/>
+            <a:ext cx="3995" cy="655229"/>
+          </a:xfrm>
+          <a:prstGeom prst="line">
+            <a:avLst/>
+          </a:prstGeom>
+          <a:ln w="50800" cap="rnd">
+            <a:solidFill>
+              <a:schemeClr val="tx1"/>
+            </a:solidFill>
+          </a:ln>
+        </p:spPr>
+        <p:style>
+          <a:lnRef idx="1">
+            <a:schemeClr val="accent1"/>
+          </a:lnRef>
+          <a:fillRef idx="0">
+            <a:schemeClr val="accent1"/>
+          </a:fillRef>
+          <a:effectRef idx="0">
+            <a:schemeClr val="accent1"/>
+          </a:effectRef>
+          <a:fontRef idx="minor">
+            <a:schemeClr val="tx1"/>
+          </a:fontRef>
+        </p:style>
+      </p:cxnSp>
+      <p:grpSp>
+        <p:nvGrpSpPr>
+          <p:cNvPr id="95" name="群組 94"/>
+          <p:cNvGrpSpPr/>
+          <p:nvPr/>
+        </p:nvGrpSpPr>
+        <p:grpSpPr>
+          <a:xfrm>
+            <a:off x="4136555" y="4165174"/>
+            <a:ext cx="284442" cy="159586"/>
+            <a:chOff x="6484255" y="1479971"/>
+            <a:chExt cx="284442" cy="159586"/>
+          </a:xfrm>
+        </p:grpSpPr>
+        <p:cxnSp>
+          <p:nvCxnSpPr>
+            <p:cNvPr id="96" name="直線接點 95"/>
+            <p:cNvCxnSpPr/>
+            <p:nvPr/>
+          </p:nvCxnSpPr>
+          <p:spPr>
+            <a:xfrm>
+              <a:off x="6484255" y="1479971"/>
+              <a:ext cx="284442" cy="0"/>
+            </a:xfrm>
+            <a:prstGeom prst="line">
+              <a:avLst/>
+            </a:prstGeom>
+            <a:ln w="50800" cap="rnd">
+              <a:solidFill>
+                <a:schemeClr val="tx1"/>
+              </a:solidFill>
+            </a:ln>
+          </p:spPr>
+          <p:style>
+            <a:lnRef idx="1">
+              <a:schemeClr val="accent1"/>
+            </a:lnRef>
+            <a:fillRef idx="0">
+              <a:schemeClr val="accent1"/>
+            </a:fillRef>
+            <a:effectRef idx="0">
+              <a:schemeClr val="accent1"/>
+            </a:effectRef>
+            <a:fontRef idx="minor">
+              <a:schemeClr val="tx1"/>
+            </a:fontRef>
+          </p:style>
+        </p:cxnSp>
+        <p:cxnSp>
+          <p:nvCxnSpPr>
+            <p:cNvPr id="97" name="直線接點 96"/>
+            <p:cNvCxnSpPr/>
+            <p:nvPr/>
+          </p:nvCxnSpPr>
+          <p:spPr>
+            <a:xfrm>
+              <a:off x="6527074" y="1559764"/>
+              <a:ext cx="198804" cy="0"/>
+            </a:xfrm>
+            <a:prstGeom prst="line">
+              <a:avLst/>
+            </a:prstGeom>
+            <a:ln w="50800" cap="rnd">
+              <a:solidFill>
+                <a:schemeClr val="tx1"/>
+              </a:solidFill>
+            </a:ln>
+          </p:spPr>
+          <p:style>
+            <a:lnRef idx="1">
+              <a:schemeClr val="accent1"/>
+            </a:lnRef>
+            <a:fillRef idx="0">
+              <a:schemeClr val="accent1"/>
+            </a:fillRef>
+            <a:effectRef idx="0">
+              <a:schemeClr val="accent1"/>
+            </a:effectRef>
+            <a:fontRef idx="minor">
+              <a:schemeClr val="tx1"/>
+            </a:fontRef>
+          </p:style>
+        </p:cxnSp>
+        <p:cxnSp>
+          <p:nvCxnSpPr>
+            <p:cNvPr id="98" name="直線接點 97"/>
+            <p:cNvCxnSpPr/>
+            <p:nvPr/>
+          </p:nvCxnSpPr>
+          <p:spPr>
+            <a:xfrm>
+              <a:off x="6556307" y="1639557"/>
+              <a:ext cx="140338" cy="0"/>
+            </a:xfrm>
+            <a:prstGeom prst="line">
+              <a:avLst/>
+            </a:prstGeom>
+            <a:ln w="50800" cap="rnd">
+              <a:solidFill>
+                <a:schemeClr val="tx1"/>
+              </a:solidFill>
+            </a:ln>
+          </p:spPr>
+          <p:style>
+            <a:lnRef idx="1">
+              <a:schemeClr val="accent1"/>
+            </a:lnRef>
+            <a:fillRef idx="0">
+              <a:schemeClr val="accent1"/>
+            </a:fillRef>
+            <a:effectRef idx="0">
+              <a:schemeClr val="accent1"/>
+            </a:effectRef>
+            <a:fontRef idx="minor">
+              <a:schemeClr val="tx1"/>
+            </a:fontRef>
+          </p:style>
+        </p:cxnSp>
+      </p:grpSp>
+      <p:grpSp>
+        <p:nvGrpSpPr>
+          <p:cNvPr id="99" name="群組 98"/>
+          <p:cNvGrpSpPr/>
+          <p:nvPr/>
+        </p:nvGrpSpPr>
+        <p:grpSpPr>
+          <a:xfrm>
+            <a:off x="4278776" y="2115795"/>
+            <a:ext cx="3361272" cy="888250"/>
+            <a:chOff x="647093" y="5704659"/>
+            <a:chExt cx="3361272" cy="888250"/>
+          </a:xfrm>
+        </p:grpSpPr>
+        <p:grpSp>
+          <p:nvGrpSpPr>
+            <p:cNvPr id="100" name="群組 99"/>
+            <p:cNvGrpSpPr/>
+            <p:nvPr/>
+          </p:nvGrpSpPr>
+          <p:grpSpPr>
+            <a:xfrm>
+              <a:off x="647093" y="5704659"/>
+              <a:ext cx="3361272" cy="180020"/>
+              <a:chOff x="2995283" y="4538816"/>
+              <a:chExt cx="3361272" cy="180020"/>
+            </a:xfrm>
+          </p:grpSpPr>
+          <p:sp>
+            <p:nvSpPr>
+              <p:cNvPr id="107" name="矩形 106"/>
+              <p:cNvSpPr/>
+              <p:nvPr/>
+            </p:nvSpPr>
+            <p:spPr>
+              <a:xfrm>
+                <a:off x="4672927" y="4538816"/>
+                <a:ext cx="1439593" cy="180020"/>
+              </a:xfrm>
+              <a:prstGeom prst="rect">
+                <a:avLst/>
+              </a:prstGeom>
+              <a:solidFill>
+                <a:schemeClr val="accent1">
+                  <a:lumMod val="20000"/>
+                  <a:lumOff val="80000"/>
+                </a:schemeClr>
+              </a:solidFill>
+              <a:ln w="50800">
+                <a:solidFill>
+                  <a:schemeClr val="tx1"/>
+                </a:solidFill>
+              </a:ln>
+            </p:spPr>
+            <p:style>
+              <a:lnRef idx="2">
+                <a:schemeClr val="accent1">
+                  <a:shade val="50000"/>
+                </a:schemeClr>
+              </a:lnRef>
+              <a:fillRef idx="1">
+                <a:schemeClr val="accent1"/>
+              </a:fillRef>
+              <a:effectRef idx="0">
+                <a:schemeClr val="accent1"/>
+              </a:effectRef>
+              <a:fontRef idx="minor">
+                <a:schemeClr val="lt1"/>
+              </a:fontRef>
+            </p:style>
+            <p:txBody>
+              <a:bodyPr rtlCol="0" anchor="ctr"/>
+              <a:lstStyle/>
+              <a:p>
+                <a:pPr algn="ctr"/>
+                <a:endParaRPr lang="zh-TW" altLang="en-US"/>
+              </a:p>
+            </p:txBody>
+          </p:sp>
+          <p:cxnSp>
+            <p:nvCxnSpPr>
+              <p:cNvPr id="108" name="直線接點 107"/>
+              <p:cNvCxnSpPr/>
+              <p:nvPr/>
+            </p:nvCxnSpPr>
+            <p:spPr>
+              <a:xfrm>
+                <a:off x="6127098" y="4628826"/>
+                <a:ext cx="229457" cy="0"/>
+              </a:xfrm>
+              <a:prstGeom prst="line">
+                <a:avLst/>
+              </a:prstGeom>
+              <a:ln w="50800" cap="rnd">
+                <a:solidFill>
+                  <a:schemeClr val="tx1"/>
+                </a:solidFill>
+                <a:headEnd type="none"/>
+                <a:tailEnd type="none" w="med" len="sm"/>
+              </a:ln>
+            </p:spPr>
+            <p:style>
+              <a:lnRef idx="1">
+                <a:schemeClr val="accent1"/>
+              </a:lnRef>
+              <a:fillRef idx="0">
+                <a:schemeClr val="accent1"/>
+              </a:fillRef>
+              <a:effectRef idx="0">
+                <a:schemeClr val="accent1"/>
+              </a:effectRef>
+              <a:fontRef idx="minor">
+                <a:schemeClr val="tx1"/>
+              </a:fontRef>
+            </p:style>
+          </p:cxnSp>
+          <p:cxnSp>
+            <p:nvCxnSpPr>
+              <p:cNvPr id="109" name="直線接點 108"/>
+              <p:cNvCxnSpPr>
+                <a:endCxn id="107" idx="1"/>
+              </p:cNvCxnSpPr>
+              <p:nvPr/>
+            </p:nvCxnSpPr>
+            <p:spPr>
+              <a:xfrm>
+                <a:off x="2995283" y="4628826"/>
+                <a:ext cx="1677644" cy="0"/>
+              </a:xfrm>
+              <a:prstGeom prst="line">
+                <a:avLst/>
+              </a:prstGeom>
+              <a:ln w="50800" cap="rnd">
+                <a:solidFill>
+                  <a:schemeClr val="tx1"/>
+                </a:solidFill>
+                <a:headEnd type="none"/>
+                <a:tailEnd type="none" w="med" len="sm"/>
+              </a:ln>
+            </p:spPr>
+            <p:style>
+              <a:lnRef idx="1">
+                <a:schemeClr val="accent1"/>
+              </a:lnRef>
+              <a:fillRef idx="0">
+                <a:schemeClr val="accent1"/>
+              </a:fillRef>
+              <a:effectRef idx="0">
+                <a:schemeClr val="accent1"/>
+              </a:effectRef>
+              <a:fontRef idx="minor">
+                <a:schemeClr val="tx1"/>
+              </a:fontRef>
+            </p:style>
+          </p:cxnSp>
+        </p:grpSp>
+        <p:sp>
+          <p:nvSpPr>
+            <p:cNvPr id="101" name="文字方塊 100"/>
+            <p:cNvSpPr txBox="1"/>
+            <p:nvPr/>
+          </p:nvSpPr>
+          <p:spPr>
+            <a:xfrm>
+              <a:off x="2241271" y="5949948"/>
+              <a:ext cx="1606530" cy="369332"/>
+            </a:xfrm>
+            <a:prstGeom prst="rect">
+              <a:avLst/>
+            </a:prstGeom>
+            <a:noFill/>
+          </p:spPr>
+          <p:txBody>
+            <a:bodyPr wrap="none" rtlCol="0">
+              <a:spAutoFit/>
+            </a:bodyPr>
+            <a:lstStyle/>
+            <a:p>
+              <a:pPr algn="ctr"/>
+              <a:r>
+                <a:rPr lang="en-US" altLang="zh-TW" b="1" i="1" dirty="0" smtClean="0">
+                  <a:latin typeface="Bookman Old Style" panose="02050604050505020204" pitchFamily="18" charset="0"/>
+                </a:rPr>
+                <a:t>Differential</a:t>
+              </a:r>
+              <a:endParaRPr lang="en-US" b="1" i="1" dirty="0">
+                <a:latin typeface="Bookman Old Style" panose="02050604050505020204" pitchFamily="18" charset="0"/>
+              </a:endParaRPr>
+            </a:p>
+          </p:txBody>
+        </p:sp>
+        <p:grpSp>
+          <p:nvGrpSpPr>
+            <p:cNvPr id="102" name="群組 101"/>
+            <p:cNvGrpSpPr/>
+            <p:nvPr/>
+          </p:nvGrpSpPr>
+          <p:grpSpPr>
+            <a:xfrm>
+              <a:off x="647093" y="6412889"/>
+              <a:ext cx="3361272" cy="180020"/>
+              <a:chOff x="2995283" y="4538816"/>
+              <a:chExt cx="3361272" cy="180020"/>
+            </a:xfrm>
+          </p:grpSpPr>
+          <p:sp>
+            <p:nvSpPr>
+              <p:cNvPr id="103" name="矩形 102"/>
+              <p:cNvSpPr/>
+              <p:nvPr/>
+            </p:nvSpPr>
+            <p:spPr>
+              <a:xfrm>
+                <a:off x="4672927" y="4538816"/>
+                <a:ext cx="1439593" cy="180020"/>
+              </a:xfrm>
+              <a:prstGeom prst="rect">
+                <a:avLst/>
+              </a:prstGeom>
+              <a:solidFill>
+                <a:schemeClr val="accent1">
+                  <a:lumMod val="20000"/>
+                  <a:lumOff val="80000"/>
+                </a:schemeClr>
+              </a:solidFill>
+              <a:ln w="50800">
+                <a:solidFill>
+                  <a:schemeClr val="tx1"/>
+                </a:solidFill>
+              </a:ln>
+            </p:spPr>
+            <p:style>
+              <a:lnRef idx="2">
+                <a:schemeClr val="accent1">
+                  <a:shade val="50000"/>
+                </a:schemeClr>
+              </a:lnRef>
+              <a:fillRef idx="1">
+                <a:schemeClr val="accent1"/>
+              </a:fillRef>
+              <a:effectRef idx="0">
+                <a:schemeClr val="accent1"/>
+              </a:effectRef>
+              <a:fontRef idx="minor">
+                <a:schemeClr val="lt1"/>
+              </a:fontRef>
+            </p:style>
+            <p:txBody>
+              <a:bodyPr rtlCol="0" anchor="ctr"/>
+              <a:lstStyle/>
+              <a:p>
+                <a:pPr algn="ctr"/>
+                <a:endParaRPr lang="zh-TW" altLang="en-US"/>
+              </a:p>
+            </p:txBody>
+          </p:sp>
+          <p:cxnSp>
+            <p:nvCxnSpPr>
+              <p:cNvPr id="104" name="直線接點 103"/>
+              <p:cNvCxnSpPr/>
+              <p:nvPr/>
+            </p:nvCxnSpPr>
+            <p:spPr>
+              <a:xfrm>
+                <a:off x="6127098" y="4628826"/>
+                <a:ext cx="229457" cy="0"/>
+              </a:xfrm>
+              <a:prstGeom prst="line">
+                <a:avLst/>
+              </a:prstGeom>
+              <a:ln w="50800" cap="rnd">
+                <a:solidFill>
+                  <a:schemeClr val="tx1"/>
+                </a:solidFill>
+                <a:headEnd type="none"/>
+                <a:tailEnd type="none" w="med" len="sm"/>
+              </a:ln>
+            </p:spPr>
+            <p:style>
+              <a:lnRef idx="1">
+                <a:schemeClr val="accent1"/>
+              </a:lnRef>
+              <a:fillRef idx="0">
+                <a:schemeClr val="accent1"/>
+              </a:fillRef>
+              <a:effectRef idx="0">
+                <a:schemeClr val="accent1"/>
+              </a:effectRef>
+              <a:fontRef idx="minor">
+                <a:schemeClr val="tx1"/>
+              </a:fontRef>
+            </p:style>
+          </p:cxnSp>
+          <p:cxnSp>
+            <p:nvCxnSpPr>
+              <p:cNvPr id="105" name="直線接點 104"/>
+              <p:cNvCxnSpPr/>
+              <p:nvPr/>
+            </p:nvCxnSpPr>
+            <p:spPr>
+              <a:xfrm>
+                <a:off x="4020379" y="4628826"/>
+                <a:ext cx="633017" cy="0"/>
+              </a:xfrm>
+              <a:prstGeom prst="line">
+                <a:avLst/>
+              </a:prstGeom>
+              <a:ln w="50800" cap="rnd">
+                <a:solidFill>
+                  <a:schemeClr val="tx1"/>
+                </a:solidFill>
+                <a:headEnd type="none"/>
+                <a:tailEnd type="none" w="med" len="sm"/>
+              </a:ln>
+            </p:spPr>
+            <p:style>
+              <a:lnRef idx="1">
+                <a:schemeClr val="accent1"/>
+              </a:lnRef>
+              <a:fillRef idx="0">
+                <a:schemeClr val="accent1"/>
+              </a:fillRef>
+              <a:effectRef idx="0">
+                <a:schemeClr val="accent1"/>
+              </a:effectRef>
+              <a:fontRef idx="minor">
+                <a:schemeClr val="tx1"/>
+              </a:fontRef>
+            </p:style>
+          </p:cxnSp>
+          <p:cxnSp>
+            <p:nvCxnSpPr>
+              <p:cNvPr id="106" name="直線接點 105"/>
+              <p:cNvCxnSpPr/>
+              <p:nvPr/>
+            </p:nvCxnSpPr>
+            <p:spPr>
+              <a:xfrm>
+                <a:off x="2995283" y="4628826"/>
+                <a:ext cx="397608" cy="0"/>
+              </a:xfrm>
+              <a:prstGeom prst="line">
+                <a:avLst/>
+              </a:prstGeom>
+              <a:ln w="50800" cap="rnd">
+                <a:solidFill>
+                  <a:schemeClr val="tx1"/>
+                </a:solidFill>
+                <a:headEnd type="none"/>
+                <a:tailEnd type="none" w="med" len="sm"/>
+              </a:ln>
+            </p:spPr>
+            <p:style>
+              <a:lnRef idx="1">
+                <a:schemeClr val="accent1"/>
+              </a:lnRef>
+              <a:fillRef idx="0">
+                <a:schemeClr val="accent1"/>
+              </a:fillRef>
+              <a:effectRef idx="0">
+                <a:schemeClr val="accent1"/>
+              </a:effectRef>
+              <a:fontRef idx="minor">
+                <a:schemeClr val="tx1"/>
+              </a:fontRef>
+            </p:style>
+          </p:cxnSp>
+        </p:grpSp>
+      </p:grpSp>
     </p:spTree>
     <p:extLst>
       <p:ext uri="{BB962C8B-B14F-4D97-AF65-F5344CB8AC3E}">
-        <p14:creationId xmlns:p14="http://schemas.microsoft.com/office/powerpoint/2010/main" val="3641200871"/>
+        <p14:creationId xmlns:p14="http://schemas.microsoft.com/office/powerpoint/2010/main" val="381153079"/>
       </p:ext>
     </p:extLst>
   </p:cSld>
@@ -10891,7 +13620,7 @@
       </p:grpSpPr>
       <p:grpSp>
         <p:nvGrpSpPr>
-          <p:cNvPr id="2" name="群組 1"/>
+          <p:cNvPr id="19" name="群組 18"/>
           <p:cNvGrpSpPr/>
           <p:nvPr/>
         </p:nvGrpSpPr>
@@ -11578,6 +14307,764 @@
 </file>
 
 <file path=ppt/slides/slide7.xml><?xml version="1.0" encoding="utf-8"?>
+<p:sld xmlns:a="http://schemas.openxmlformats.org/drawingml/2006/main" xmlns:r="http://schemas.openxmlformats.org/officeDocument/2006/relationships" xmlns:p="http://schemas.openxmlformats.org/presentationml/2006/main">
+  <p:cSld>
+    <p:spTree>
+      <p:nvGrpSpPr>
+        <p:cNvPr id="1" name=""/>
+        <p:cNvGrpSpPr/>
+        <p:nvPr/>
+      </p:nvGrpSpPr>
+      <p:grpSpPr>
+        <a:xfrm>
+          <a:off x="0" y="0"/>
+          <a:ext cx="0" cy="0"/>
+          <a:chOff x="0" y="0"/>
+          <a:chExt cx="0" cy="0"/>
+        </a:xfrm>
+      </p:grpSpPr>
+      <p:grpSp>
+        <p:nvGrpSpPr>
+          <p:cNvPr id="22" name="群組 21"/>
+          <p:cNvGrpSpPr/>
+          <p:nvPr/>
+        </p:nvGrpSpPr>
+        <p:grpSpPr>
+          <a:xfrm>
+            <a:off x="1428107" y="4187801"/>
+            <a:ext cx="5657318" cy="1072568"/>
+            <a:chOff x="1428107" y="4187801"/>
+            <a:chExt cx="5657318" cy="1072568"/>
+          </a:xfrm>
+        </p:grpSpPr>
+        <p:pic>
+          <p:nvPicPr>
+            <p:cNvPr id="2" name="圖片 1"/>
+            <p:cNvPicPr>
+              <a:picLocks noChangeAspect="1"/>
+            </p:cNvPicPr>
+            <p:nvPr/>
+          </p:nvPicPr>
+          <p:blipFill rotWithShape="1">
+            <a:blip r:embed="rId2"/>
+            <a:srcRect l="4952" t="37462" r="20954" b="26583"/>
+            <a:stretch/>
+          </p:blipFill>
+          <p:spPr>
+            <a:xfrm>
+              <a:off x="1428107" y="4187801"/>
+              <a:ext cx="5044611" cy="1072568"/>
+            </a:xfrm>
+            <a:prstGeom prst="rect">
+              <a:avLst/>
+            </a:prstGeom>
+          </p:spPr>
+        </p:pic>
+        <p:cxnSp>
+          <p:nvCxnSpPr>
+            <p:cNvPr id="3" name="直線單箭頭接點 2"/>
+            <p:cNvCxnSpPr/>
+            <p:nvPr/>
+          </p:nvCxnSpPr>
+          <p:spPr>
+            <a:xfrm>
+              <a:off x="5260505" y="4949666"/>
+              <a:ext cx="0" cy="166928"/>
+            </a:xfrm>
+            <a:prstGeom prst="straightConnector1">
+              <a:avLst/>
+            </a:prstGeom>
+            <a:ln>
+              <a:solidFill>
+                <a:schemeClr val="tx1"/>
+              </a:solidFill>
+              <a:headEnd type="triangle"/>
+              <a:tailEnd type="triangle"/>
+            </a:ln>
+          </p:spPr>
+          <p:style>
+            <a:lnRef idx="1">
+              <a:schemeClr val="accent1"/>
+            </a:lnRef>
+            <a:fillRef idx="0">
+              <a:schemeClr val="accent1"/>
+            </a:fillRef>
+            <a:effectRef idx="0">
+              <a:schemeClr val="accent1"/>
+            </a:effectRef>
+            <a:fontRef idx="minor">
+              <a:schemeClr val="tx1"/>
+            </a:fontRef>
+          </p:style>
+        </p:cxnSp>
+        <p:sp>
+          <p:nvSpPr>
+            <p:cNvPr id="4" name="文字方塊 3"/>
+            <p:cNvSpPr txBox="1"/>
+            <p:nvPr/>
+          </p:nvSpPr>
+          <p:spPr>
+            <a:xfrm>
+              <a:off x="5260505" y="4879241"/>
+              <a:ext cx="795647" cy="307777"/>
+            </a:xfrm>
+            <a:prstGeom prst="rect">
+              <a:avLst/>
+            </a:prstGeom>
+            <a:noFill/>
+          </p:spPr>
+          <p:txBody>
+            <a:bodyPr wrap="square" rtlCol="0">
+              <a:spAutoFit/>
+            </a:bodyPr>
+            <a:lstStyle/>
+            <a:p>
+              <a:r>
+                <a:rPr lang="en-US" sz="1400" b="1" dirty="0" smtClean="0"/>
+                <a:t>200 um</a:t>
+              </a:r>
+              <a:endParaRPr lang="en-US" sz="1400" b="1" dirty="0"/>
+            </a:p>
+          </p:txBody>
+        </p:sp>
+        <p:cxnSp>
+          <p:nvCxnSpPr>
+            <p:cNvPr id="5" name="直線單箭頭接點 4"/>
+            <p:cNvCxnSpPr/>
+            <p:nvPr/>
+          </p:nvCxnSpPr>
+          <p:spPr>
+            <a:xfrm flipH="1">
+              <a:off x="4807320" y="4757247"/>
+              <a:ext cx="245853" cy="0"/>
+            </a:xfrm>
+            <a:prstGeom prst="straightConnector1">
+              <a:avLst/>
+            </a:prstGeom>
+            <a:ln>
+              <a:solidFill>
+                <a:schemeClr val="tx1"/>
+              </a:solidFill>
+              <a:headEnd type="triangle"/>
+              <a:tailEnd type="triangle"/>
+            </a:ln>
+          </p:spPr>
+          <p:style>
+            <a:lnRef idx="1">
+              <a:schemeClr val="accent1"/>
+            </a:lnRef>
+            <a:fillRef idx="0">
+              <a:schemeClr val="accent1"/>
+            </a:fillRef>
+            <a:effectRef idx="0">
+              <a:schemeClr val="accent1"/>
+            </a:effectRef>
+            <a:fontRef idx="minor">
+              <a:schemeClr val="tx1"/>
+            </a:fontRef>
+          </p:style>
+        </p:cxnSp>
+        <p:cxnSp>
+          <p:nvCxnSpPr>
+            <p:cNvPr id="6" name="直線單箭頭接點 5"/>
+            <p:cNvCxnSpPr/>
+            <p:nvPr/>
+          </p:nvCxnSpPr>
+          <p:spPr>
+            <a:xfrm flipH="1">
+              <a:off x="3102796" y="4748736"/>
+              <a:ext cx="1704524" cy="0"/>
+            </a:xfrm>
+            <a:prstGeom prst="straightConnector1">
+              <a:avLst/>
+            </a:prstGeom>
+            <a:ln>
+              <a:solidFill>
+                <a:schemeClr val="tx1"/>
+              </a:solidFill>
+              <a:headEnd type="triangle"/>
+              <a:tailEnd type="triangle"/>
+            </a:ln>
+          </p:spPr>
+          <p:style>
+            <a:lnRef idx="1">
+              <a:schemeClr val="accent1"/>
+            </a:lnRef>
+            <a:fillRef idx="0">
+              <a:schemeClr val="accent1"/>
+            </a:fillRef>
+            <a:effectRef idx="0">
+              <a:schemeClr val="accent1"/>
+            </a:effectRef>
+            <a:fontRef idx="minor">
+              <a:schemeClr val="tx1"/>
+            </a:fontRef>
+          </p:style>
+        </p:cxnSp>
+        <p:sp>
+          <p:nvSpPr>
+            <p:cNvPr id="7" name="文字方塊 6"/>
+            <p:cNvSpPr txBox="1"/>
+            <p:nvPr/>
+          </p:nvSpPr>
+          <p:spPr>
+            <a:xfrm>
+              <a:off x="4719526" y="4443534"/>
+              <a:ext cx="795647" cy="307777"/>
+            </a:xfrm>
+            <a:prstGeom prst="rect">
+              <a:avLst/>
+            </a:prstGeom>
+            <a:noFill/>
+          </p:spPr>
+          <p:txBody>
+            <a:bodyPr wrap="square" rtlCol="0">
+              <a:spAutoFit/>
+            </a:bodyPr>
+            <a:lstStyle/>
+            <a:p>
+              <a:r>
+                <a:rPr lang="en-US" altLang="zh-TW" sz="1400" b="1" dirty="0" smtClean="0"/>
+                <a:t>367 um</a:t>
+              </a:r>
+              <a:endParaRPr lang="en-US" sz="1400" b="1" dirty="0"/>
+            </a:p>
+          </p:txBody>
+        </p:sp>
+        <p:sp>
+          <p:nvSpPr>
+            <p:cNvPr id="8" name="文字方塊 7"/>
+            <p:cNvSpPr txBox="1"/>
+            <p:nvPr/>
+          </p:nvSpPr>
+          <p:spPr>
+            <a:xfrm>
+              <a:off x="3637053" y="4495577"/>
+              <a:ext cx="853968" cy="307777"/>
+            </a:xfrm>
+            <a:prstGeom prst="rect">
+              <a:avLst/>
+            </a:prstGeom>
+            <a:noFill/>
+          </p:spPr>
+          <p:txBody>
+            <a:bodyPr wrap="square" rtlCol="0">
+              <a:spAutoFit/>
+            </a:bodyPr>
+            <a:lstStyle/>
+            <a:p>
+              <a:r>
+                <a:rPr lang="en-US" altLang="zh-TW" sz="1400" b="1" dirty="0" smtClean="0"/>
+                <a:t>3334 um</a:t>
+              </a:r>
+              <a:endParaRPr lang="en-US" sz="1400" b="1" dirty="0"/>
+            </a:p>
+          </p:txBody>
+        </p:sp>
+        <p:grpSp>
+          <p:nvGrpSpPr>
+            <p:cNvPr id="9" name="群組 8"/>
+            <p:cNvGrpSpPr/>
+            <p:nvPr/>
+          </p:nvGrpSpPr>
+          <p:grpSpPr>
+            <a:xfrm>
+              <a:off x="6491862" y="4921240"/>
+              <a:ext cx="385879" cy="31172"/>
+              <a:chOff x="6075218" y="2826240"/>
+              <a:chExt cx="385879" cy="31172"/>
+            </a:xfrm>
+          </p:grpSpPr>
+          <p:cxnSp>
+            <p:nvCxnSpPr>
+              <p:cNvPr id="10" name="直線接點 9"/>
+              <p:cNvCxnSpPr/>
+              <p:nvPr/>
+            </p:nvCxnSpPr>
+            <p:spPr>
+              <a:xfrm>
+                <a:off x="6075218" y="2826240"/>
+                <a:ext cx="385879" cy="0"/>
+              </a:xfrm>
+              <a:prstGeom prst="line">
+                <a:avLst/>
+              </a:prstGeom>
+              <a:ln>
+                <a:prstDash val="lgDashDot"/>
+              </a:ln>
+            </p:spPr>
+            <p:style>
+              <a:lnRef idx="1">
+                <a:schemeClr val="accent1"/>
+              </a:lnRef>
+              <a:fillRef idx="0">
+                <a:schemeClr val="accent1"/>
+              </a:fillRef>
+              <a:effectRef idx="0">
+                <a:schemeClr val="accent1"/>
+              </a:effectRef>
+              <a:fontRef idx="minor">
+                <a:schemeClr val="tx1"/>
+              </a:fontRef>
+            </p:style>
+          </p:cxnSp>
+          <p:cxnSp>
+            <p:nvCxnSpPr>
+              <p:cNvPr id="11" name="直線接點 10"/>
+              <p:cNvCxnSpPr/>
+              <p:nvPr/>
+            </p:nvCxnSpPr>
+            <p:spPr>
+              <a:xfrm>
+                <a:off x="6075218" y="2857412"/>
+                <a:ext cx="385879" cy="0"/>
+              </a:xfrm>
+              <a:prstGeom prst="line">
+                <a:avLst/>
+              </a:prstGeom>
+              <a:ln>
+                <a:prstDash val="lgDashDot"/>
+              </a:ln>
+            </p:spPr>
+            <p:style>
+              <a:lnRef idx="1">
+                <a:schemeClr val="accent1"/>
+              </a:lnRef>
+              <a:fillRef idx="0">
+                <a:schemeClr val="accent1"/>
+              </a:fillRef>
+              <a:effectRef idx="0">
+                <a:schemeClr val="accent1"/>
+              </a:effectRef>
+              <a:fontRef idx="minor">
+                <a:schemeClr val="tx1"/>
+              </a:fontRef>
+            </p:style>
+          </p:cxnSp>
+        </p:grpSp>
+        <p:grpSp>
+          <p:nvGrpSpPr>
+            <p:cNvPr id="12" name="群組 11"/>
+            <p:cNvGrpSpPr/>
+            <p:nvPr/>
+          </p:nvGrpSpPr>
+          <p:grpSpPr>
+            <a:xfrm>
+              <a:off x="6491862" y="5129004"/>
+              <a:ext cx="385879" cy="31172"/>
+              <a:chOff x="6075218" y="2826240"/>
+              <a:chExt cx="385879" cy="31172"/>
+            </a:xfrm>
+          </p:grpSpPr>
+          <p:cxnSp>
+            <p:nvCxnSpPr>
+              <p:cNvPr id="13" name="直線接點 12"/>
+              <p:cNvCxnSpPr/>
+              <p:nvPr/>
+            </p:nvCxnSpPr>
+            <p:spPr>
+              <a:xfrm>
+                <a:off x="6075218" y="2826240"/>
+                <a:ext cx="385879" cy="0"/>
+              </a:xfrm>
+              <a:prstGeom prst="line">
+                <a:avLst/>
+              </a:prstGeom>
+              <a:ln>
+                <a:prstDash val="lgDashDot"/>
+              </a:ln>
+            </p:spPr>
+            <p:style>
+              <a:lnRef idx="1">
+                <a:schemeClr val="accent1"/>
+              </a:lnRef>
+              <a:fillRef idx="0">
+                <a:schemeClr val="accent1"/>
+              </a:fillRef>
+              <a:effectRef idx="0">
+                <a:schemeClr val="accent1"/>
+              </a:effectRef>
+              <a:fontRef idx="minor">
+                <a:schemeClr val="tx1"/>
+              </a:fontRef>
+            </p:style>
+          </p:cxnSp>
+          <p:cxnSp>
+            <p:nvCxnSpPr>
+              <p:cNvPr id="14" name="直線接點 13"/>
+              <p:cNvCxnSpPr/>
+              <p:nvPr/>
+            </p:nvCxnSpPr>
+            <p:spPr>
+              <a:xfrm>
+                <a:off x="6075218" y="2857412"/>
+                <a:ext cx="385879" cy="0"/>
+              </a:xfrm>
+              <a:prstGeom prst="line">
+                <a:avLst/>
+              </a:prstGeom>
+              <a:ln>
+                <a:prstDash val="lgDashDot"/>
+              </a:ln>
+            </p:spPr>
+            <p:style>
+              <a:lnRef idx="1">
+                <a:schemeClr val="accent1"/>
+              </a:lnRef>
+              <a:fillRef idx="0">
+                <a:schemeClr val="accent1"/>
+              </a:fillRef>
+              <a:effectRef idx="0">
+                <a:schemeClr val="accent1"/>
+              </a:effectRef>
+              <a:fontRef idx="minor">
+                <a:schemeClr val="tx1"/>
+              </a:fontRef>
+            </p:style>
+          </p:cxnSp>
+        </p:grpSp>
+        <p:sp>
+          <p:nvSpPr>
+            <p:cNvPr id="15" name="文字方塊 14"/>
+            <p:cNvSpPr txBox="1"/>
+            <p:nvPr/>
+          </p:nvSpPr>
+          <p:spPr>
+            <a:xfrm>
+              <a:off x="5903575" y="4495578"/>
+              <a:ext cx="869245" cy="307777"/>
+            </a:xfrm>
+            <a:prstGeom prst="rect">
+              <a:avLst/>
+            </a:prstGeom>
+            <a:noFill/>
+          </p:spPr>
+          <p:txBody>
+            <a:bodyPr wrap="square" rtlCol="0">
+              <a:spAutoFit/>
+            </a:bodyPr>
+            <a:lstStyle/>
+            <a:p>
+              <a:r>
+                <a:rPr lang="en-US" sz="1400" b="1" dirty="0" smtClean="0"/>
+                <a:t>17 um</a:t>
+              </a:r>
+              <a:endParaRPr lang="en-US" sz="1400" b="1" dirty="0"/>
+            </a:p>
+          </p:txBody>
+        </p:sp>
+        <p:sp>
+          <p:nvSpPr>
+            <p:cNvPr id="16" name="手繪多邊形 15"/>
+            <p:cNvSpPr/>
+            <p:nvPr/>
+          </p:nvSpPr>
+          <p:spPr>
+            <a:xfrm>
+              <a:off x="6465727" y="4662037"/>
+              <a:ext cx="494590" cy="294653"/>
+            </a:xfrm>
+            <a:custGeom>
+              <a:avLst/>
+              <a:gdLst>
+                <a:gd name="connsiteX0" fmla="*/ 0 w 393834"/>
+                <a:gd name="connsiteY0" fmla="*/ 0 h 342900"/>
+                <a:gd name="connsiteX1" fmla="*/ 298450 w 393834"/>
+                <a:gd name="connsiteY1" fmla="*/ 82550 h 342900"/>
+                <a:gd name="connsiteX2" fmla="*/ 374650 w 393834"/>
+                <a:gd name="connsiteY2" fmla="*/ 158750 h 342900"/>
+                <a:gd name="connsiteX3" fmla="*/ 393700 w 393834"/>
+                <a:gd name="connsiteY3" fmla="*/ 228600 h 342900"/>
+                <a:gd name="connsiteX4" fmla="*/ 381000 w 393834"/>
+                <a:gd name="connsiteY4" fmla="*/ 285750 h 342900"/>
+                <a:gd name="connsiteX5" fmla="*/ 342900 w 393834"/>
+                <a:gd name="connsiteY5" fmla="*/ 342900 h 342900"/>
+              </a:gdLst>
+              <a:ahLst/>
+              <a:cxnLst>
+                <a:cxn ang="0">
+                  <a:pos x="connsiteX0" y="connsiteY0"/>
+                </a:cxn>
+                <a:cxn ang="0">
+                  <a:pos x="connsiteX1" y="connsiteY1"/>
+                </a:cxn>
+                <a:cxn ang="0">
+                  <a:pos x="connsiteX2" y="connsiteY2"/>
+                </a:cxn>
+                <a:cxn ang="0">
+                  <a:pos x="connsiteX3" y="connsiteY3"/>
+                </a:cxn>
+                <a:cxn ang="0">
+                  <a:pos x="connsiteX4" y="connsiteY4"/>
+                </a:cxn>
+                <a:cxn ang="0">
+                  <a:pos x="connsiteX5" y="connsiteY5"/>
+                </a:cxn>
+              </a:cxnLst>
+              <a:rect l="l" t="t" r="r" b="b"/>
+              <a:pathLst>
+                <a:path w="393834" h="342900">
+                  <a:moveTo>
+                    <a:pt x="0" y="0"/>
+                  </a:moveTo>
+                  <a:cubicBezTo>
+                    <a:pt x="118004" y="28046"/>
+                    <a:pt x="236008" y="56092"/>
+                    <a:pt x="298450" y="82550"/>
+                  </a:cubicBezTo>
+                  <a:cubicBezTo>
+                    <a:pt x="360892" y="109008"/>
+                    <a:pt x="358775" y="134408"/>
+                    <a:pt x="374650" y="158750"/>
+                  </a:cubicBezTo>
+                  <a:cubicBezTo>
+                    <a:pt x="390525" y="183092"/>
+                    <a:pt x="392642" y="207433"/>
+                    <a:pt x="393700" y="228600"/>
+                  </a:cubicBezTo>
+                  <a:cubicBezTo>
+                    <a:pt x="394758" y="249767"/>
+                    <a:pt x="389467" y="266700"/>
+                    <a:pt x="381000" y="285750"/>
+                  </a:cubicBezTo>
+                  <a:cubicBezTo>
+                    <a:pt x="372533" y="304800"/>
+                    <a:pt x="357716" y="323850"/>
+                    <a:pt x="342900" y="342900"/>
+                  </a:cubicBezTo>
+                </a:path>
+              </a:pathLst>
+            </a:custGeom>
+            <a:noFill/>
+            <a:ln>
+              <a:solidFill>
+                <a:schemeClr val="tx1"/>
+              </a:solidFill>
+              <a:tailEnd type="triangle"/>
+            </a:ln>
+          </p:spPr>
+          <p:style>
+            <a:lnRef idx="2">
+              <a:schemeClr val="accent1">
+                <a:shade val="50000"/>
+              </a:schemeClr>
+            </a:lnRef>
+            <a:fillRef idx="1">
+              <a:schemeClr val="accent1"/>
+            </a:fillRef>
+            <a:effectRef idx="0">
+              <a:schemeClr val="accent1"/>
+            </a:effectRef>
+            <a:fontRef idx="minor">
+              <a:schemeClr val="lt1"/>
+            </a:fontRef>
+          </p:style>
+          <p:txBody>
+            <a:bodyPr rtlCol="0" anchor="ctr"/>
+            <a:lstStyle/>
+            <a:p>
+              <a:pPr algn="ctr"/>
+              <a:endParaRPr lang="en-US"/>
+            </a:p>
+          </p:txBody>
+        </p:sp>
+        <p:sp>
+          <p:nvSpPr>
+            <p:cNvPr id="17" name="手繪多邊形 16"/>
+            <p:cNvSpPr/>
+            <p:nvPr/>
+          </p:nvSpPr>
+          <p:spPr>
+            <a:xfrm>
+              <a:off x="6475887" y="4608698"/>
+              <a:ext cx="609538" cy="552235"/>
+            </a:xfrm>
+            <a:custGeom>
+              <a:avLst/>
+              <a:gdLst>
+                <a:gd name="connsiteX0" fmla="*/ 0 w 585787"/>
+                <a:gd name="connsiteY0" fmla="*/ 0 h 552235"/>
+                <a:gd name="connsiteX1" fmla="*/ 304800 w 585787"/>
+                <a:gd name="connsiteY1" fmla="*/ 45720 h 552235"/>
+                <a:gd name="connsiteX2" fmla="*/ 556260 w 585787"/>
+                <a:gd name="connsiteY2" fmla="*/ 167640 h 552235"/>
+                <a:gd name="connsiteX3" fmla="*/ 571500 w 585787"/>
+                <a:gd name="connsiteY3" fmla="*/ 365760 h 552235"/>
+                <a:gd name="connsiteX4" fmla="*/ 472440 w 585787"/>
+                <a:gd name="connsiteY4" fmla="*/ 533400 h 552235"/>
+                <a:gd name="connsiteX5" fmla="*/ 434340 w 585787"/>
+                <a:gd name="connsiteY5" fmla="*/ 541020 h 552235"/>
+              </a:gdLst>
+              <a:ahLst/>
+              <a:cxnLst>
+                <a:cxn ang="0">
+                  <a:pos x="connsiteX0" y="connsiteY0"/>
+                </a:cxn>
+                <a:cxn ang="0">
+                  <a:pos x="connsiteX1" y="connsiteY1"/>
+                </a:cxn>
+                <a:cxn ang="0">
+                  <a:pos x="connsiteX2" y="connsiteY2"/>
+                </a:cxn>
+                <a:cxn ang="0">
+                  <a:pos x="connsiteX3" y="connsiteY3"/>
+                </a:cxn>
+                <a:cxn ang="0">
+                  <a:pos x="connsiteX4" y="connsiteY4"/>
+                </a:cxn>
+                <a:cxn ang="0">
+                  <a:pos x="connsiteX5" y="connsiteY5"/>
+                </a:cxn>
+              </a:cxnLst>
+              <a:rect l="l" t="t" r="r" b="b"/>
+              <a:pathLst>
+                <a:path w="585787" h="552235">
+                  <a:moveTo>
+                    <a:pt x="0" y="0"/>
+                  </a:moveTo>
+                  <a:cubicBezTo>
+                    <a:pt x="106045" y="8890"/>
+                    <a:pt x="212090" y="17780"/>
+                    <a:pt x="304800" y="45720"/>
+                  </a:cubicBezTo>
+                  <a:cubicBezTo>
+                    <a:pt x="397510" y="73660"/>
+                    <a:pt x="511810" y="114300"/>
+                    <a:pt x="556260" y="167640"/>
+                  </a:cubicBezTo>
+                  <a:cubicBezTo>
+                    <a:pt x="600710" y="220980"/>
+                    <a:pt x="585470" y="304800"/>
+                    <a:pt x="571500" y="365760"/>
+                  </a:cubicBezTo>
+                  <a:cubicBezTo>
+                    <a:pt x="557530" y="426720"/>
+                    <a:pt x="495300" y="504190"/>
+                    <a:pt x="472440" y="533400"/>
+                  </a:cubicBezTo>
+                  <a:cubicBezTo>
+                    <a:pt x="449580" y="562610"/>
+                    <a:pt x="441960" y="551815"/>
+                    <a:pt x="434340" y="541020"/>
+                  </a:cubicBezTo>
+                </a:path>
+              </a:pathLst>
+            </a:custGeom>
+            <a:noFill/>
+            <a:ln>
+              <a:solidFill>
+                <a:schemeClr val="tx1"/>
+              </a:solidFill>
+              <a:tailEnd type="triangle"/>
+            </a:ln>
+          </p:spPr>
+          <p:style>
+            <a:lnRef idx="2">
+              <a:schemeClr val="accent1">
+                <a:shade val="50000"/>
+              </a:schemeClr>
+            </a:lnRef>
+            <a:fillRef idx="1">
+              <a:schemeClr val="accent1"/>
+            </a:fillRef>
+            <a:effectRef idx="0">
+              <a:schemeClr val="accent1"/>
+            </a:effectRef>
+            <a:fontRef idx="minor">
+              <a:schemeClr val="lt1"/>
+            </a:fontRef>
+          </p:style>
+          <p:txBody>
+            <a:bodyPr rtlCol="0" anchor="ctr"/>
+            <a:lstStyle/>
+            <a:p>
+              <a:pPr algn="ctr"/>
+              <a:endParaRPr lang="en-US"/>
+            </a:p>
+          </p:txBody>
+        </p:sp>
+        <p:cxnSp>
+          <p:nvCxnSpPr>
+            <p:cNvPr id="20" name="直線單箭頭接點 19"/>
+            <p:cNvCxnSpPr/>
+            <p:nvPr/>
+          </p:nvCxnSpPr>
+          <p:spPr>
+            <a:xfrm flipH="1">
+              <a:off x="2865024" y="4757247"/>
+              <a:ext cx="245853" cy="0"/>
+            </a:xfrm>
+            <a:prstGeom prst="straightConnector1">
+              <a:avLst/>
+            </a:prstGeom>
+            <a:ln>
+              <a:solidFill>
+                <a:schemeClr val="tx1"/>
+              </a:solidFill>
+              <a:headEnd type="triangle"/>
+              <a:tailEnd type="triangle"/>
+            </a:ln>
+          </p:spPr>
+          <p:style>
+            <a:lnRef idx="1">
+              <a:schemeClr val="accent1"/>
+            </a:lnRef>
+            <a:fillRef idx="0">
+              <a:schemeClr val="accent1"/>
+            </a:fillRef>
+            <a:effectRef idx="0">
+              <a:schemeClr val="accent1"/>
+            </a:effectRef>
+            <a:fontRef idx="minor">
+              <a:schemeClr val="tx1"/>
+            </a:fontRef>
+          </p:style>
+        </p:cxnSp>
+        <p:sp>
+          <p:nvSpPr>
+            <p:cNvPr id="21" name="文字方塊 20"/>
+            <p:cNvSpPr txBox="1"/>
+            <p:nvPr/>
+          </p:nvSpPr>
+          <p:spPr>
+            <a:xfrm>
+              <a:off x="2790191" y="4435783"/>
+              <a:ext cx="795647" cy="307777"/>
+            </a:xfrm>
+            <a:prstGeom prst="rect">
+              <a:avLst/>
+            </a:prstGeom>
+            <a:noFill/>
+          </p:spPr>
+          <p:txBody>
+            <a:bodyPr wrap="square" rtlCol="0">
+              <a:spAutoFit/>
+            </a:bodyPr>
+            <a:lstStyle/>
+            <a:p>
+              <a:r>
+                <a:rPr lang="en-US" altLang="zh-TW" sz="1400" b="1" dirty="0" smtClean="0"/>
+                <a:t>367 um</a:t>
+              </a:r>
+              <a:endParaRPr lang="en-US" sz="1400" b="1" dirty="0"/>
+            </a:p>
+          </p:txBody>
+        </p:sp>
+      </p:grpSp>
+    </p:spTree>
+    <p:extLst>
+      <p:ext uri="{BB962C8B-B14F-4D97-AF65-F5344CB8AC3E}">
+        <p14:creationId xmlns:p14="http://schemas.microsoft.com/office/powerpoint/2010/main" val="632403648"/>
+      </p:ext>
+    </p:extLst>
+  </p:cSld>
+  <p:clrMapOvr>
+    <a:masterClrMapping/>
+  </p:clrMapOvr>
+</p:sld>
+</file>
+
+<file path=ppt/slides/slide8.xml><?xml version="1.0" encoding="utf-8"?>
 <p:sld xmlns:a="http://schemas.openxmlformats.org/drawingml/2006/main" xmlns:r="http://schemas.openxmlformats.org/officeDocument/2006/relationships" xmlns:p="http://schemas.openxmlformats.org/presentationml/2006/main">
   <p:cSld>
     <p:spTree>

</xml_diff>

<commit_message>
Update the bonding wire view
</commit_message>
<xml_diff>
--- a/latex_report/Design Picture.pptx
+++ b/latex_report/Design Picture.pptx
@@ -13,6 +13,8 @@
     <p:sldId id="261" r:id="rId7"/>
     <p:sldId id="264" r:id="rId8"/>
     <p:sldId id="262" r:id="rId9"/>
+    <p:sldId id="265" r:id="rId10"/>
+    <p:sldId id="266" r:id="rId11"/>
   </p:sldIdLst>
   <p:sldSz cx="9144000" cy="6858000" type="screen4x3"/>
   <p:notesSz cx="6858000" cy="9144000"/>
@@ -4993,6 +4995,988 @@
       </p:par>
     </p:tnLst>
   </p:timing>
+</p:sld>
+</file>
+
+<file path=ppt/slides/slide10.xml><?xml version="1.0" encoding="utf-8"?>
+<p:sld xmlns:a="http://schemas.openxmlformats.org/drawingml/2006/main" xmlns:r="http://schemas.openxmlformats.org/officeDocument/2006/relationships" xmlns:p="http://schemas.openxmlformats.org/presentationml/2006/main">
+  <p:cSld>
+    <p:spTree>
+      <p:nvGrpSpPr>
+        <p:cNvPr id="1" name=""/>
+        <p:cNvGrpSpPr/>
+        <p:nvPr/>
+      </p:nvGrpSpPr>
+      <p:grpSpPr>
+        <a:xfrm>
+          <a:off x="0" y="0"/>
+          <a:ext cx="0" cy="0"/>
+          <a:chOff x="0" y="0"/>
+          <a:chExt cx="0" cy="0"/>
+        </a:xfrm>
+      </p:grpSpPr>
+      <p:pic>
+        <p:nvPicPr>
+          <p:cNvPr id="49" name="圖片 48"/>
+          <p:cNvPicPr>
+            <a:picLocks noChangeAspect="1"/>
+          </p:cNvPicPr>
+          <p:nvPr/>
+        </p:nvPicPr>
+        <p:blipFill>
+          <a:blip r:embed="rId2">
+            <a:extLst>
+              <a:ext uri="{28A0092B-C50C-407E-A947-70E740481C1C}">
+                <a14:useLocalDpi xmlns:a14="http://schemas.microsoft.com/office/drawing/2010/main" val="0"/>
+              </a:ext>
+            </a:extLst>
+          </a:blip>
+          <a:stretch>
+            <a:fillRect/>
+          </a:stretch>
+        </p:blipFill>
+        <p:spPr>
+          <a:xfrm>
+            <a:off x="1431540" y="594916"/>
+            <a:ext cx="6315956" cy="5668166"/>
+          </a:xfrm>
+          <a:prstGeom prst="rect">
+            <a:avLst/>
+          </a:prstGeom>
+        </p:spPr>
+      </p:pic>
+      <p:cxnSp>
+        <p:nvCxnSpPr>
+          <p:cNvPr id="3" name="直線單箭頭接點 2"/>
+          <p:cNvCxnSpPr/>
+          <p:nvPr/>
+        </p:nvCxnSpPr>
+        <p:spPr>
+          <a:xfrm flipH="1">
+            <a:off x="4864983" y="5955909"/>
+            <a:ext cx="354717" cy="0"/>
+          </a:xfrm>
+          <a:prstGeom prst="straightConnector1">
+            <a:avLst/>
+          </a:prstGeom>
+          <a:ln w="25400" cap="rnd">
+            <a:solidFill>
+              <a:schemeClr val="tx1"/>
+            </a:solidFill>
+            <a:headEnd type="triangle"/>
+            <a:tailEnd type="triangle"/>
+          </a:ln>
+        </p:spPr>
+        <p:style>
+          <a:lnRef idx="1">
+            <a:schemeClr val="accent1"/>
+          </a:lnRef>
+          <a:fillRef idx="0">
+            <a:schemeClr val="accent1"/>
+          </a:fillRef>
+          <a:effectRef idx="0">
+            <a:schemeClr val="accent1"/>
+          </a:effectRef>
+          <a:fontRef idx="minor">
+            <a:schemeClr val="tx1"/>
+          </a:fontRef>
+        </p:style>
+      </p:cxnSp>
+      <p:sp>
+        <p:nvSpPr>
+          <p:cNvPr id="4" name="文字方塊 3"/>
+          <p:cNvSpPr txBox="1"/>
+          <p:nvPr/>
+        </p:nvSpPr>
+        <p:spPr>
+          <a:xfrm>
+            <a:off x="4855458" y="5979454"/>
+            <a:ext cx="635110" cy="369332"/>
+          </a:xfrm>
+          <a:prstGeom prst="rect">
+            <a:avLst/>
+          </a:prstGeom>
+          <a:noFill/>
+        </p:spPr>
+        <p:txBody>
+          <a:bodyPr wrap="none" rtlCol="0">
+            <a:spAutoFit/>
+          </a:bodyPr>
+          <a:lstStyle/>
+          <a:p>
+            <a:r>
+              <a:rPr lang="en-US" dirty="0" smtClean="0"/>
+              <a:t>W</a:t>
+            </a:r>
+            <a:r>
+              <a:rPr lang="en-US" baseline="-25000" dirty="0" smtClean="0"/>
+              <a:t>PCB</a:t>
+            </a:r>
+            <a:endParaRPr lang="en-US" baseline="-25000" dirty="0"/>
+          </a:p>
+        </p:txBody>
+      </p:sp>
+      <p:cxnSp>
+        <p:nvCxnSpPr>
+          <p:cNvPr id="7" name="直線單箭頭接點 6"/>
+          <p:cNvCxnSpPr/>
+          <p:nvPr/>
+        </p:nvCxnSpPr>
+        <p:spPr>
+          <a:xfrm flipH="1">
+            <a:off x="3912483" y="5955909"/>
+            <a:ext cx="354717" cy="0"/>
+          </a:xfrm>
+          <a:prstGeom prst="straightConnector1">
+            <a:avLst/>
+          </a:prstGeom>
+          <a:ln w="25400" cap="rnd">
+            <a:solidFill>
+              <a:schemeClr val="tx1"/>
+            </a:solidFill>
+            <a:headEnd type="triangle"/>
+            <a:tailEnd type="triangle"/>
+          </a:ln>
+        </p:spPr>
+        <p:style>
+          <a:lnRef idx="1">
+            <a:schemeClr val="accent1"/>
+          </a:lnRef>
+          <a:fillRef idx="0">
+            <a:schemeClr val="accent1"/>
+          </a:fillRef>
+          <a:effectRef idx="0">
+            <a:schemeClr val="accent1"/>
+          </a:effectRef>
+          <a:fontRef idx="minor">
+            <a:schemeClr val="tx1"/>
+          </a:fontRef>
+        </p:style>
+      </p:cxnSp>
+      <p:sp>
+        <p:nvSpPr>
+          <p:cNvPr id="8" name="文字方塊 7"/>
+          <p:cNvSpPr txBox="1"/>
+          <p:nvPr/>
+        </p:nvSpPr>
+        <p:spPr>
+          <a:xfrm>
+            <a:off x="3741459" y="5979454"/>
+            <a:ext cx="635110" cy="369332"/>
+          </a:xfrm>
+          <a:prstGeom prst="rect">
+            <a:avLst/>
+          </a:prstGeom>
+          <a:noFill/>
+        </p:spPr>
+        <p:txBody>
+          <a:bodyPr wrap="none" rtlCol="0">
+            <a:spAutoFit/>
+          </a:bodyPr>
+          <a:lstStyle/>
+          <a:p>
+            <a:r>
+              <a:rPr lang="en-US" dirty="0" smtClean="0"/>
+              <a:t>W</a:t>
+            </a:r>
+            <a:r>
+              <a:rPr lang="en-US" baseline="-25000" dirty="0" smtClean="0"/>
+              <a:t>PCB</a:t>
+            </a:r>
+            <a:endParaRPr lang="en-US" baseline="-25000" dirty="0"/>
+          </a:p>
+        </p:txBody>
+      </p:sp>
+      <p:cxnSp>
+        <p:nvCxnSpPr>
+          <p:cNvPr id="10" name="直線單箭頭接點 9"/>
+          <p:cNvCxnSpPr/>
+          <p:nvPr/>
+        </p:nvCxnSpPr>
+        <p:spPr>
+          <a:xfrm flipH="1">
+            <a:off x="4276726" y="5955909"/>
+            <a:ext cx="625584" cy="0"/>
+          </a:xfrm>
+          <a:prstGeom prst="straightConnector1">
+            <a:avLst/>
+          </a:prstGeom>
+          <a:ln w="25400" cap="rnd">
+            <a:solidFill>
+              <a:schemeClr val="tx1"/>
+            </a:solidFill>
+            <a:headEnd type="triangle"/>
+            <a:tailEnd type="triangle"/>
+          </a:ln>
+        </p:spPr>
+        <p:style>
+          <a:lnRef idx="1">
+            <a:schemeClr val="accent1"/>
+          </a:lnRef>
+          <a:fillRef idx="0">
+            <a:schemeClr val="accent1"/>
+          </a:fillRef>
+          <a:effectRef idx="0">
+            <a:schemeClr val="accent1"/>
+          </a:effectRef>
+          <a:fontRef idx="minor">
+            <a:schemeClr val="tx1"/>
+          </a:fontRef>
+        </p:style>
+      </p:cxnSp>
+      <p:sp>
+        <p:nvSpPr>
+          <p:cNvPr id="11" name="文字方塊 10"/>
+          <p:cNvSpPr txBox="1"/>
+          <p:nvPr/>
+        </p:nvSpPr>
+        <p:spPr>
+          <a:xfrm>
+            <a:off x="4329717" y="5979454"/>
+            <a:ext cx="572593" cy="369332"/>
+          </a:xfrm>
+          <a:prstGeom prst="rect">
+            <a:avLst/>
+          </a:prstGeom>
+          <a:noFill/>
+        </p:spPr>
+        <p:txBody>
+          <a:bodyPr wrap="none" rtlCol="0">
+            <a:spAutoFit/>
+          </a:bodyPr>
+          <a:lstStyle/>
+          <a:p>
+            <a:r>
+              <a:rPr lang="en-US" dirty="0" smtClean="0"/>
+              <a:t>D</a:t>
+            </a:r>
+            <a:r>
+              <a:rPr lang="en-US" baseline="-25000" dirty="0" smtClean="0"/>
+              <a:t>PCB</a:t>
+            </a:r>
+            <a:endParaRPr lang="en-US" baseline="-25000" dirty="0"/>
+          </a:p>
+        </p:txBody>
+      </p:sp>
+      <p:cxnSp>
+        <p:nvCxnSpPr>
+          <p:cNvPr id="13" name="直線單箭頭接點 12"/>
+          <p:cNvCxnSpPr/>
+          <p:nvPr/>
+        </p:nvCxnSpPr>
+        <p:spPr>
+          <a:xfrm flipH="1">
+            <a:off x="5057775" y="994184"/>
+            <a:ext cx="200026" cy="0"/>
+          </a:xfrm>
+          <a:prstGeom prst="straightConnector1">
+            <a:avLst/>
+          </a:prstGeom>
+          <a:ln w="25400" cap="rnd">
+            <a:solidFill>
+              <a:schemeClr val="tx1"/>
+            </a:solidFill>
+            <a:headEnd type="triangle"/>
+            <a:tailEnd type="triangle"/>
+          </a:ln>
+        </p:spPr>
+        <p:style>
+          <a:lnRef idx="1">
+            <a:schemeClr val="accent1"/>
+          </a:lnRef>
+          <a:fillRef idx="0">
+            <a:schemeClr val="accent1"/>
+          </a:fillRef>
+          <a:effectRef idx="0">
+            <a:schemeClr val="accent1"/>
+          </a:effectRef>
+          <a:fontRef idx="minor">
+            <a:schemeClr val="tx1"/>
+          </a:fontRef>
+        </p:style>
+      </p:cxnSp>
+      <p:sp>
+        <p:nvSpPr>
+          <p:cNvPr id="14" name="文字方塊 13"/>
+          <p:cNvSpPr txBox="1"/>
+          <p:nvPr/>
+        </p:nvSpPr>
+        <p:spPr>
+          <a:xfrm>
+            <a:off x="4840233" y="567033"/>
+            <a:ext cx="641907" cy="369332"/>
+          </a:xfrm>
+          <a:prstGeom prst="rect">
+            <a:avLst/>
+          </a:prstGeom>
+          <a:noFill/>
+        </p:spPr>
+        <p:txBody>
+          <a:bodyPr wrap="none" rtlCol="0">
+            <a:spAutoFit/>
+          </a:bodyPr>
+          <a:lstStyle/>
+          <a:p>
+            <a:r>
+              <a:rPr lang="en-US" dirty="0" smtClean="0"/>
+              <a:t>W</a:t>
+            </a:r>
+            <a:r>
+              <a:rPr lang="en-US" baseline="-25000" dirty="0" smtClean="0"/>
+              <a:t>PKG</a:t>
+            </a:r>
+            <a:endParaRPr lang="en-US" baseline="-25000" dirty="0"/>
+          </a:p>
+        </p:txBody>
+      </p:sp>
+      <p:cxnSp>
+        <p:nvCxnSpPr>
+          <p:cNvPr id="16" name="直線單箭頭接點 15"/>
+          <p:cNvCxnSpPr/>
+          <p:nvPr/>
+        </p:nvCxnSpPr>
+        <p:spPr>
+          <a:xfrm flipH="1">
+            <a:off x="4086225" y="1039666"/>
+            <a:ext cx="971551" cy="0"/>
+          </a:xfrm>
+          <a:prstGeom prst="straightConnector1">
+            <a:avLst/>
+          </a:prstGeom>
+          <a:ln w="25400" cap="rnd">
+            <a:solidFill>
+              <a:schemeClr val="tx1"/>
+            </a:solidFill>
+            <a:headEnd type="triangle"/>
+            <a:tailEnd type="triangle"/>
+          </a:ln>
+        </p:spPr>
+        <p:style>
+          <a:lnRef idx="1">
+            <a:schemeClr val="accent1"/>
+          </a:lnRef>
+          <a:fillRef idx="0">
+            <a:schemeClr val="accent1"/>
+          </a:fillRef>
+          <a:effectRef idx="0">
+            <a:schemeClr val="accent1"/>
+          </a:effectRef>
+          <a:fontRef idx="minor">
+            <a:schemeClr val="tx1"/>
+          </a:fontRef>
+        </p:style>
+      </p:cxnSp>
+      <p:sp>
+        <p:nvSpPr>
+          <p:cNvPr id="17" name="文字方塊 16"/>
+          <p:cNvSpPr txBox="1"/>
+          <p:nvPr/>
+        </p:nvSpPr>
+        <p:spPr>
+          <a:xfrm>
+            <a:off x="4367817" y="1063211"/>
+            <a:ext cx="579389" cy="369332"/>
+          </a:xfrm>
+          <a:prstGeom prst="rect">
+            <a:avLst/>
+          </a:prstGeom>
+          <a:noFill/>
+        </p:spPr>
+        <p:txBody>
+          <a:bodyPr wrap="none" rtlCol="0">
+            <a:spAutoFit/>
+          </a:bodyPr>
+          <a:lstStyle/>
+          <a:p>
+            <a:r>
+              <a:rPr lang="en-US" dirty="0" smtClean="0"/>
+              <a:t>D</a:t>
+            </a:r>
+            <a:r>
+              <a:rPr lang="en-US" baseline="-25000" dirty="0" smtClean="0"/>
+              <a:t>PKG</a:t>
+            </a:r>
+            <a:endParaRPr lang="en-US" baseline="-25000" dirty="0"/>
+          </a:p>
+        </p:txBody>
+      </p:sp>
+      <p:cxnSp>
+        <p:nvCxnSpPr>
+          <p:cNvPr id="20" name="直線單箭頭接點 19"/>
+          <p:cNvCxnSpPr/>
+          <p:nvPr/>
+        </p:nvCxnSpPr>
+        <p:spPr>
+          <a:xfrm flipH="1">
+            <a:off x="3890461" y="994184"/>
+            <a:ext cx="200026" cy="0"/>
+          </a:xfrm>
+          <a:prstGeom prst="straightConnector1">
+            <a:avLst/>
+          </a:prstGeom>
+          <a:ln w="25400" cap="rnd">
+            <a:solidFill>
+              <a:schemeClr val="tx1"/>
+            </a:solidFill>
+            <a:headEnd type="triangle"/>
+            <a:tailEnd type="triangle"/>
+          </a:ln>
+        </p:spPr>
+        <p:style>
+          <a:lnRef idx="1">
+            <a:schemeClr val="accent1"/>
+          </a:lnRef>
+          <a:fillRef idx="0">
+            <a:schemeClr val="accent1"/>
+          </a:fillRef>
+          <a:effectRef idx="0">
+            <a:schemeClr val="accent1"/>
+          </a:effectRef>
+          <a:fontRef idx="minor">
+            <a:schemeClr val="tx1"/>
+          </a:fontRef>
+        </p:style>
+      </p:cxnSp>
+      <p:sp>
+        <p:nvSpPr>
+          <p:cNvPr id="21" name="文字方塊 20"/>
+          <p:cNvSpPr txBox="1"/>
+          <p:nvPr/>
+        </p:nvSpPr>
+        <p:spPr>
+          <a:xfrm>
+            <a:off x="3672919" y="567033"/>
+            <a:ext cx="641907" cy="369332"/>
+          </a:xfrm>
+          <a:prstGeom prst="rect">
+            <a:avLst/>
+          </a:prstGeom>
+          <a:noFill/>
+        </p:spPr>
+        <p:txBody>
+          <a:bodyPr wrap="none" rtlCol="0">
+            <a:spAutoFit/>
+          </a:bodyPr>
+          <a:lstStyle/>
+          <a:p>
+            <a:r>
+              <a:rPr lang="en-US" dirty="0" smtClean="0"/>
+              <a:t>W</a:t>
+            </a:r>
+            <a:r>
+              <a:rPr lang="en-US" baseline="-25000" dirty="0" smtClean="0"/>
+              <a:t>PKG</a:t>
+            </a:r>
+            <a:endParaRPr lang="en-US" baseline="-25000" dirty="0"/>
+          </a:p>
+        </p:txBody>
+      </p:sp>
+      <p:cxnSp>
+        <p:nvCxnSpPr>
+          <p:cNvPr id="22" name="直線單箭頭接點 21"/>
+          <p:cNvCxnSpPr/>
+          <p:nvPr/>
+        </p:nvCxnSpPr>
+        <p:spPr>
+          <a:xfrm flipH="1">
+            <a:off x="4048126" y="2411266"/>
+            <a:ext cx="409574" cy="0"/>
+          </a:xfrm>
+          <a:prstGeom prst="straightConnector1">
+            <a:avLst/>
+          </a:prstGeom>
+          <a:ln w="25400" cap="rnd">
+            <a:solidFill>
+              <a:schemeClr val="tx1"/>
+            </a:solidFill>
+            <a:headEnd type="triangle"/>
+            <a:tailEnd type="triangle"/>
+          </a:ln>
+        </p:spPr>
+        <p:style>
+          <a:lnRef idx="1">
+            <a:schemeClr val="accent1"/>
+          </a:lnRef>
+          <a:fillRef idx="0">
+            <a:schemeClr val="accent1"/>
+          </a:fillRef>
+          <a:effectRef idx="0">
+            <a:schemeClr val="accent1"/>
+          </a:effectRef>
+          <a:fontRef idx="minor">
+            <a:schemeClr val="tx1"/>
+          </a:fontRef>
+        </p:style>
+      </p:cxnSp>
+      <p:sp>
+        <p:nvSpPr>
+          <p:cNvPr id="24" name="文字方塊 23"/>
+          <p:cNvSpPr txBox="1"/>
+          <p:nvPr/>
+        </p:nvSpPr>
+        <p:spPr>
+          <a:xfrm>
+            <a:off x="4041521" y="2041934"/>
+            <a:ext cx="468398" cy="369332"/>
+          </a:xfrm>
+          <a:prstGeom prst="rect">
+            <a:avLst/>
+          </a:prstGeom>
+          <a:noFill/>
+        </p:spPr>
+        <p:txBody>
+          <a:bodyPr wrap="none" rtlCol="0">
+            <a:spAutoFit/>
+          </a:bodyPr>
+          <a:lstStyle/>
+          <a:p>
+            <a:r>
+              <a:rPr lang="en-US" dirty="0" smtClean="0"/>
+              <a:t>W</a:t>
+            </a:r>
+            <a:r>
+              <a:rPr lang="en-US" baseline="-25000" dirty="0"/>
+              <a:t>1</a:t>
+            </a:r>
+          </a:p>
+        </p:txBody>
+      </p:sp>
+      <p:cxnSp>
+        <p:nvCxnSpPr>
+          <p:cNvPr id="25" name="直線單箭頭接點 24"/>
+          <p:cNvCxnSpPr/>
+          <p:nvPr/>
+        </p:nvCxnSpPr>
+        <p:spPr>
+          <a:xfrm flipH="1" flipV="1">
+            <a:off x="5285781" y="2505484"/>
+            <a:ext cx="594" cy="295197"/>
+          </a:xfrm>
+          <a:prstGeom prst="straightConnector1">
+            <a:avLst/>
+          </a:prstGeom>
+          <a:ln w="25400" cap="rnd">
+            <a:solidFill>
+              <a:schemeClr val="tx1"/>
+            </a:solidFill>
+            <a:headEnd type="triangle"/>
+            <a:tailEnd type="triangle"/>
+          </a:ln>
+        </p:spPr>
+        <p:style>
+          <a:lnRef idx="1">
+            <a:schemeClr val="accent1"/>
+          </a:lnRef>
+          <a:fillRef idx="0">
+            <a:schemeClr val="accent1"/>
+          </a:fillRef>
+          <a:effectRef idx="0">
+            <a:schemeClr val="accent1"/>
+          </a:effectRef>
+          <a:fontRef idx="minor">
+            <a:schemeClr val="tx1"/>
+          </a:fontRef>
+        </p:style>
+      </p:cxnSp>
+      <p:sp>
+        <p:nvSpPr>
+          <p:cNvPr id="26" name="文字方塊 25"/>
+          <p:cNvSpPr txBox="1"/>
+          <p:nvPr/>
+        </p:nvSpPr>
+        <p:spPr>
+          <a:xfrm>
+            <a:off x="5285781" y="2468416"/>
+            <a:ext cx="534505" cy="369332"/>
+          </a:xfrm>
+          <a:prstGeom prst="rect">
+            <a:avLst/>
+          </a:prstGeom>
+          <a:noFill/>
+        </p:spPr>
+        <p:txBody>
+          <a:bodyPr wrap="none" rtlCol="0">
+            <a:spAutoFit/>
+          </a:bodyPr>
+          <a:lstStyle/>
+          <a:p>
+            <a:r>
+              <a:rPr lang="en-US" altLang="zh-TW" dirty="0" smtClean="0"/>
+              <a:t>L</a:t>
+            </a:r>
+            <a:r>
+              <a:rPr lang="en-US" altLang="zh-TW" baseline="-25000" dirty="0" smtClean="0"/>
+              <a:t>PKG</a:t>
+            </a:r>
+            <a:endParaRPr lang="en-US" baseline="-25000" dirty="0"/>
+          </a:p>
+        </p:txBody>
+      </p:sp>
+      <p:sp>
+        <p:nvSpPr>
+          <p:cNvPr id="28" name="文字方塊 27"/>
+          <p:cNvSpPr txBox="1"/>
+          <p:nvPr/>
+        </p:nvSpPr>
+        <p:spPr>
+          <a:xfrm>
+            <a:off x="5285781" y="2935842"/>
+            <a:ext cx="527709" cy="369332"/>
+          </a:xfrm>
+          <a:prstGeom prst="rect">
+            <a:avLst/>
+          </a:prstGeom>
+          <a:noFill/>
+        </p:spPr>
+        <p:txBody>
+          <a:bodyPr wrap="none" rtlCol="0">
+            <a:spAutoFit/>
+          </a:bodyPr>
+          <a:lstStyle/>
+          <a:p>
+            <a:r>
+              <a:rPr lang="en-US" altLang="zh-TW" dirty="0" smtClean="0"/>
+              <a:t>L</a:t>
+            </a:r>
+            <a:r>
+              <a:rPr lang="en-US" altLang="zh-TW" baseline="-25000" dirty="0" smtClean="0"/>
+              <a:t>PCB</a:t>
+            </a:r>
+            <a:endParaRPr lang="en-US" baseline="-25000" dirty="0"/>
+          </a:p>
+        </p:txBody>
+      </p:sp>
+      <p:cxnSp>
+        <p:nvCxnSpPr>
+          <p:cNvPr id="29" name="直線單箭頭接點 28"/>
+          <p:cNvCxnSpPr/>
+          <p:nvPr/>
+        </p:nvCxnSpPr>
+        <p:spPr>
+          <a:xfrm flipV="1">
+            <a:off x="5285781" y="2935842"/>
+            <a:ext cx="0" cy="406400"/>
+          </a:xfrm>
+          <a:prstGeom prst="straightConnector1">
+            <a:avLst/>
+          </a:prstGeom>
+          <a:ln w="25400" cap="rnd">
+            <a:solidFill>
+              <a:schemeClr val="tx1"/>
+            </a:solidFill>
+            <a:headEnd type="triangle"/>
+            <a:tailEnd type="triangle"/>
+          </a:ln>
+        </p:spPr>
+        <p:style>
+          <a:lnRef idx="1">
+            <a:schemeClr val="accent1"/>
+          </a:lnRef>
+          <a:fillRef idx="0">
+            <a:schemeClr val="accent1"/>
+          </a:fillRef>
+          <a:effectRef idx="0">
+            <a:schemeClr val="accent1"/>
+          </a:effectRef>
+          <a:fontRef idx="minor">
+            <a:schemeClr val="tx1"/>
+          </a:fontRef>
+        </p:style>
+      </p:cxnSp>
+      <p:cxnSp>
+        <p:nvCxnSpPr>
+          <p:cNvPr id="36" name="直線單箭頭接點 35"/>
+          <p:cNvCxnSpPr/>
+          <p:nvPr/>
+        </p:nvCxnSpPr>
+        <p:spPr>
+          <a:xfrm flipV="1">
+            <a:off x="6438306" y="2905125"/>
+            <a:ext cx="0" cy="154542"/>
+          </a:xfrm>
+          <a:prstGeom prst="straightConnector1">
+            <a:avLst/>
+          </a:prstGeom>
+          <a:ln w="25400" cap="rnd">
+            <a:solidFill>
+              <a:schemeClr val="tx1"/>
+            </a:solidFill>
+            <a:headEnd type="triangle"/>
+            <a:tailEnd type="triangle"/>
+          </a:ln>
+        </p:spPr>
+        <p:style>
+          <a:lnRef idx="1">
+            <a:schemeClr val="accent1"/>
+          </a:lnRef>
+          <a:fillRef idx="0">
+            <a:schemeClr val="accent1"/>
+          </a:fillRef>
+          <a:effectRef idx="0">
+            <a:schemeClr val="accent1"/>
+          </a:effectRef>
+          <a:fontRef idx="minor">
+            <a:schemeClr val="tx1"/>
+          </a:fontRef>
+        </p:style>
+      </p:cxnSp>
+      <p:sp>
+        <p:nvSpPr>
+          <p:cNvPr id="37" name="文字方塊 36"/>
+          <p:cNvSpPr txBox="1"/>
+          <p:nvPr/>
+        </p:nvSpPr>
+        <p:spPr>
+          <a:xfrm>
+            <a:off x="6438306" y="2830365"/>
+            <a:ext cx="535596" cy="369332"/>
+          </a:xfrm>
+          <a:prstGeom prst="rect">
+            <a:avLst/>
+          </a:prstGeom>
+          <a:noFill/>
+        </p:spPr>
+        <p:txBody>
+          <a:bodyPr wrap="none" rtlCol="0">
+            <a:spAutoFit/>
+          </a:bodyPr>
+          <a:lstStyle/>
+          <a:p>
+            <a:r>
+              <a:rPr lang="en-US" altLang="zh-TW" dirty="0" smtClean="0"/>
+              <a:t>L</a:t>
+            </a:r>
+            <a:r>
+              <a:rPr lang="en-US" altLang="zh-TW" baseline="-25000" dirty="0" smtClean="0"/>
+              <a:t>PAD</a:t>
+            </a:r>
+            <a:endParaRPr lang="en-US" baseline="-25000" dirty="0"/>
+          </a:p>
+        </p:txBody>
+      </p:sp>
+      <p:cxnSp>
+        <p:nvCxnSpPr>
+          <p:cNvPr id="38" name="直線單箭頭接點 37"/>
+          <p:cNvCxnSpPr/>
+          <p:nvPr/>
+        </p:nvCxnSpPr>
+        <p:spPr>
+          <a:xfrm flipV="1">
+            <a:off x="6221067" y="3099888"/>
+            <a:ext cx="190105" cy="2437"/>
+          </a:xfrm>
+          <a:prstGeom prst="straightConnector1">
+            <a:avLst/>
+          </a:prstGeom>
+          <a:ln w="25400" cap="rnd">
+            <a:solidFill>
+              <a:schemeClr val="tx1"/>
+            </a:solidFill>
+            <a:headEnd type="triangle"/>
+            <a:tailEnd type="triangle"/>
+          </a:ln>
+        </p:spPr>
+        <p:style>
+          <a:lnRef idx="1">
+            <a:schemeClr val="accent1"/>
+          </a:lnRef>
+          <a:fillRef idx="0">
+            <a:schemeClr val="accent1"/>
+          </a:fillRef>
+          <a:effectRef idx="0">
+            <a:schemeClr val="accent1"/>
+          </a:effectRef>
+          <a:fontRef idx="minor">
+            <a:schemeClr val="tx1"/>
+          </a:fontRef>
+        </p:style>
+      </p:cxnSp>
+      <p:sp>
+        <p:nvSpPr>
+          <p:cNvPr id="39" name="文字方塊 38"/>
+          <p:cNvSpPr txBox="1"/>
+          <p:nvPr/>
+        </p:nvSpPr>
+        <p:spPr>
+          <a:xfrm>
+            <a:off x="6127970" y="3128463"/>
+            <a:ext cx="642997" cy="369332"/>
+          </a:xfrm>
+          <a:prstGeom prst="rect">
+            <a:avLst/>
+          </a:prstGeom>
+          <a:noFill/>
+        </p:spPr>
+        <p:txBody>
+          <a:bodyPr wrap="none" rtlCol="0">
+            <a:spAutoFit/>
+          </a:bodyPr>
+          <a:lstStyle/>
+          <a:p>
+            <a:r>
+              <a:rPr lang="en-US" altLang="zh-TW" dirty="0" smtClean="0"/>
+              <a:t>W</a:t>
+            </a:r>
+            <a:r>
+              <a:rPr lang="en-US" altLang="zh-TW" baseline="-25000" dirty="0" smtClean="0"/>
+              <a:t>PAD</a:t>
+            </a:r>
+            <a:endParaRPr lang="en-US" baseline="-25000" dirty="0"/>
+          </a:p>
+        </p:txBody>
+      </p:sp>
+      <p:cxnSp>
+        <p:nvCxnSpPr>
+          <p:cNvPr id="41" name="直線單箭頭接點 40"/>
+          <p:cNvCxnSpPr/>
+          <p:nvPr/>
+        </p:nvCxnSpPr>
+        <p:spPr>
+          <a:xfrm flipV="1">
+            <a:off x="5190728" y="2401040"/>
+            <a:ext cx="1001764" cy="1"/>
+          </a:xfrm>
+          <a:prstGeom prst="straightConnector1">
+            <a:avLst/>
+          </a:prstGeom>
+          <a:ln w="25400" cap="rnd">
+            <a:solidFill>
+              <a:schemeClr val="tx1"/>
+            </a:solidFill>
+            <a:headEnd type="triangle"/>
+            <a:tailEnd type="triangle"/>
+          </a:ln>
+        </p:spPr>
+        <p:style>
+          <a:lnRef idx="1">
+            <a:schemeClr val="accent1"/>
+          </a:lnRef>
+          <a:fillRef idx="0">
+            <a:schemeClr val="accent1"/>
+          </a:fillRef>
+          <a:effectRef idx="0">
+            <a:schemeClr val="accent1"/>
+          </a:effectRef>
+          <a:fontRef idx="minor">
+            <a:schemeClr val="tx1"/>
+          </a:fontRef>
+        </p:style>
+      </p:cxnSp>
+      <p:sp>
+        <p:nvSpPr>
+          <p:cNvPr id="42" name="文字方塊 41"/>
+          <p:cNvSpPr txBox="1"/>
+          <p:nvPr/>
+        </p:nvSpPr>
+        <p:spPr>
+          <a:xfrm>
+            <a:off x="5444040" y="2061705"/>
+            <a:ext cx="582595" cy="369332"/>
+          </a:xfrm>
+          <a:prstGeom prst="rect">
+            <a:avLst/>
+          </a:prstGeom>
+          <a:noFill/>
+        </p:spPr>
+        <p:txBody>
+          <a:bodyPr wrap="none" rtlCol="0">
+            <a:spAutoFit/>
+          </a:bodyPr>
+          <a:lstStyle/>
+          <a:p>
+            <a:r>
+              <a:rPr lang="en-US" dirty="0" smtClean="0"/>
+              <a:t>G</a:t>
+            </a:r>
+            <a:r>
+              <a:rPr lang="en-US" baseline="-25000" dirty="0" smtClean="0"/>
+              <a:t>PKG</a:t>
+            </a:r>
+            <a:endParaRPr lang="en-US" baseline="-25000" dirty="0"/>
+          </a:p>
+        </p:txBody>
+      </p:sp>
+      <p:cxnSp>
+        <p:nvCxnSpPr>
+          <p:cNvPr id="46" name="直線單箭頭接點 45"/>
+          <p:cNvCxnSpPr/>
+          <p:nvPr/>
+        </p:nvCxnSpPr>
+        <p:spPr>
+          <a:xfrm flipV="1">
+            <a:off x="3912483" y="3590123"/>
+            <a:ext cx="545217" cy="1"/>
+          </a:xfrm>
+          <a:prstGeom prst="straightConnector1">
+            <a:avLst/>
+          </a:prstGeom>
+          <a:ln w="25400" cap="rnd">
+            <a:solidFill>
+              <a:schemeClr val="tx1"/>
+            </a:solidFill>
+            <a:headEnd type="triangle"/>
+            <a:tailEnd type="triangle"/>
+          </a:ln>
+        </p:spPr>
+        <p:style>
+          <a:lnRef idx="1">
+            <a:schemeClr val="accent1"/>
+          </a:lnRef>
+          <a:fillRef idx="0">
+            <a:schemeClr val="accent1"/>
+          </a:fillRef>
+          <a:effectRef idx="0">
+            <a:schemeClr val="accent1"/>
+          </a:effectRef>
+          <a:fontRef idx="minor">
+            <a:schemeClr val="tx1"/>
+          </a:fontRef>
+        </p:style>
+      </p:cxnSp>
+      <p:sp>
+        <p:nvSpPr>
+          <p:cNvPr id="47" name="文字方塊 46"/>
+          <p:cNvSpPr txBox="1"/>
+          <p:nvPr/>
+        </p:nvSpPr>
+        <p:spPr>
+          <a:xfrm>
+            <a:off x="3989302" y="3619261"/>
+            <a:ext cx="468398" cy="369332"/>
+          </a:xfrm>
+          <a:prstGeom prst="rect">
+            <a:avLst/>
+          </a:prstGeom>
+          <a:noFill/>
+        </p:spPr>
+        <p:txBody>
+          <a:bodyPr wrap="none" rtlCol="0">
+            <a:spAutoFit/>
+          </a:bodyPr>
+          <a:lstStyle/>
+          <a:p>
+            <a:r>
+              <a:rPr lang="en-US" dirty="0" smtClean="0"/>
+              <a:t>W</a:t>
+            </a:r>
+            <a:r>
+              <a:rPr lang="en-US" baseline="-25000" dirty="0" smtClean="0"/>
+              <a:t>2</a:t>
+            </a:r>
+            <a:endParaRPr lang="en-US" baseline="-25000" dirty="0"/>
+          </a:p>
+        </p:txBody>
+      </p:sp>
+    </p:spTree>
+    <p:extLst>
+      <p:ext uri="{BB962C8B-B14F-4D97-AF65-F5344CB8AC3E}">
+        <p14:creationId xmlns:p14="http://schemas.microsoft.com/office/powerpoint/2010/main" val="3777501598"/>
+      </p:ext>
+    </p:extLst>
+  </p:cSld>
+  <p:clrMapOvr>
+    <a:masterClrMapping/>
+  </p:clrMapOvr>
 </p:sld>
 </file>
 
@@ -13618,136 +14602,274 @@
           <a:chExt cx="0" cy="0"/>
         </a:xfrm>
       </p:grpSpPr>
+      <p:pic>
+        <p:nvPicPr>
+          <p:cNvPr id="3" name="圖片 2"/>
+          <p:cNvPicPr>
+            <a:picLocks noChangeAspect="1"/>
+          </p:cNvPicPr>
+          <p:nvPr/>
+        </p:nvPicPr>
+        <p:blipFill rotWithShape="1">
+          <a:blip r:embed="rId2">
+            <a:extLst>
+              <a:ext uri="{28A0092B-C50C-407E-A947-70E740481C1C}">
+                <a14:useLocalDpi xmlns:a14="http://schemas.microsoft.com/office/drawing/2010/main" val="0"/>
+              </a:ext>
+            </a:extLst>
+          </a:blip>
+          <a:srcRect l="26595" t="17593" r="22025"/>
+          <a:stretch/>
+        </p:blipFill>
+        <p:spPr>
+          <a:xfrm>
+            <a:off x="2712378" y="2917861"/>
+            <a:ext cx="4082122" cy="1299766"/>
+          </a:xfrm>
+          <a:prstGeom prst="rect">
+            <a:avLst/>
+          </a:prstGeom>
+        </p:spPr>
+      </p:pic>
+      <p:cxnSp>
+        <p:nvCxnSpPr>
+          <p:cNvPr id="4" name="直線單箭頭接點 3"/>
+          <p:cNvCxnSpPr/>
+          <p:nvPr/>
+        </p:nvCxnSpPr>
+        <p:spPr>
+          <a:xfrm>
+            <a:off x="5806193" y="3767138"/>
+            <a:ext cx="0" cy="166928"/>
+          </a:xfrm>
+          <a:prstGeom prst="straightConnector1">
+            <a:avLst/>
+          </a:prstGeom>
+          <a:ln>
+            <a:solidFill>
+              <a:schemeClr val="tx1"/>
+            </a:solidFill>
+            <a:headEnd type="triangle"/>
+            <a:tailEnd type="triangle"/>
+          </a:ln>
+        </p:spPr>
+        <p:style>
+          <a:lnRef idx="1">
+            <a:schemeClr val="accent1"/>
+          </a:lnRef>
+          <a:fillRef idx="0">
+            <a:schemeClr val="accent1"/>
+          </a:fillRef>
+          <a:effectRef idx="0">
+            <a:schemeClr val="accent1"/>
+          </a:effectRef>
+          <a:fontRef idx="minor">
+            <a:schemeClr val="tx1"/>
+          </a:fontRef>
+        </p:style>
+      </p:cxnSp>
+      <p:sp>
+        <p:nvSpPr>
+          <p:cNvPr id="5" name="文字方塊 4"/>
+          <p:cNvSpPr txBox="1"/>
+          <p:nvPr/>
+        </p:nvSpPr>
+        <p:spPr>
+          <a:xfrm>
+            <a:off x="5806193" y="3696713"/>
+            <a:ext cx="795647" cy="307777"/>
+          </a:xfrm>
+          <a:prstGeom prst="rect">
+            <a:avLst/>
+          </a:prstGeom>
+          <a:noFill/>
+        </p:spPr>
+        <p:txBody>
+          <a:bodyPr wrap="square" rtlCol="0">
+            <a:spAutoFit/>
+          </a:bodyPr>
+          <a:lstStyle/>
+          <a:p>
+            <a:r>
+              <a:rPr lang="en-US" sz="1400" b="1" dirty="0" smtClean="0"/>
+              <a:t>19 mil</a:t>
+            </a:r>
+            <a:endParaRPr lang="en-US" sz="1400" b="1" dirty="0"/>
+          </a:p>
+        </p:txBody>
+      </p:sp>
+      <p:cxnSp>
+        <p:nvCxnSpPr>
+          <p:cNvPr id="6" name="直線單箭頭接點 5"/>
+          <p:cNvCxnSpPr/>
+          <p:nvPr/>
+        </p:nvCxnSpPr>
+        <p:spPr>
+          <a:xfrm flipH="1">
+            <a:off x="4940300" y="3691951"/>
+            <a:ext cx="427743" cy="4762"/>
+          </a:xfrm>
+          <a:prstGeom prst="straightConnector1">
+            <a:avLst/>
+          </a:prstGeom>
+          <a:ln>
+            <a:solidFill>
+              <a:schemeClr val="tx1"/>
+            </a:solidFill>
+            <a:headEnd type="triangle"/>
+            <a:tailEnd type="triangle"/>
+          </a:ln>
+        </p:spPr>
+        <p:style>
+          <a:lnRef idx="1">
+            <a:schemeClr val="accent1"/>
+          </a:lnRef>
+          <a:fillRef idx="0">
+            <a:schemeClr val="accent1"/>
+          </a:fillRef>
+          <a:effectRef idx="0">
+            <a:schemeClr val="accent1"/>
+          </a:effectRef>
+          <a:fontRef idx="minor">
+            <a:schemeClr val="tx1"/>
+          </a:fontRef>
+        </p:style>
+      </p:cxnSp>
+      <p:cxnSp>
+        <p:nvCxnSpPr>
+          <p:cNvPr id="7" name="直線單箭頭接點 6"/>
+          <p:cNvCxnSpPr/>
+          <p:nvPr/>
+        </p:nvCxnSpPr>
+        <p:spPr>
+          <a:xfrm flipH="1">
+            <a:off x="4191001" y="3688202"/>
+            <a:ext cx="749299" cy="0"/>
+          </a:xfrm>
+          <a:prstGeom prst="straightConnector1">
+            <a:avLst/>
+          </a:prstGeom>
+          <a:ln>
+            <a:solidFill>
+              <a:schemeClr val="tx1"/>
+            </a:solidFill>
+            <a:headEnd type="triangle"/>
+            <a:tailEnd type="triangle"/>
+          </a:ln>
+        </p:spPr>
+        <p:style>
+          <a:lnRef idx="1">
+            <a:schemeClr val="accent1"/>
+          </a:lnRef>
+          <a:fillRef idx="0">
+            <a:schemeClr val="accent1"/>
+          </a:fillRef>
+          <a:effectRef idx="0">
+            <a:schemeClr val="accent1"/>
+          </a:effectRef>
+          <a:fontRef idx="minor">
+            <a:schemeClr val="tx1"/>
+          </a:fontRef>
+        </p:style>
+      </p:cxnSp>
+      <p:sp>
+        <p:nvSpPr>
+          <p:cNvPr id="8" name="文字方塊 7"/>
+          <p:cNvSpPr txBox="1"/>
+          <p:nvPr/>
+        </p:nvSpPr>
+        <p:spPr>
+          <a:xfrm>
+            <a:off x="4890601" y="3382300"/>
+            <a:ext cx="795647" cy="307777"/>
+          </a:xfrm>
+          <a:prstGeom prst="rect">
+            <a:avLst/>
+          </a:prstGeom>
+          <a:noFill/>
+        </p:spPr>
+        <p:txBody>
+          <a:bodyPr wrap="square" rtlCol="0">
+            <a:spAutoFit/>
+          </a:bodyPr>
+          <a:lstStyle/>
+          <a:p>
+            <a:r>
+              <a:rPr lang="en-US" altLang="zh-TW" sz="1400" b="1" dirty="0" smtClean="0"/>
+              <a:t>40</a:t>
+            </a:r>
+            <a:r>
+              <a:rPr lang="en-US" sz="1400" b="1" dirty="0" smtClean="0"/>
+              <a:t> mil</a:t>
+            </a:r>
+            <a:endParaRPr lang="en-US" sz="1400" b="1" dirty="0"/>
+          </a:p>
+        </p:txBody>
+      </p:sp>
+      <p:sp>
+        <p:nvSpPr>
+          <p:cNvPr id="9" name="文字方塊 8"/>
+          <p:cNvSpPr txBox="1"/>
+          <p:nvPr/>
+        </p:nvSpPr>
+        <p:spPr>
+          <a:xfrm>
+            <a:off x="4270903" y="3384174"/>
+            <a:ext cx="795647" cy="307777"/>
+          </a:xfrm>
+          <a:prstGeom prst="rect">
+            <a:avLst/>
+          </a:prstGeom>
+          <a:noFill/>
+        </p:spPr>
+        <p:txBody>
+          <a:bodyPr wrap="square" rtlCol="0">
+            <a:spAutoFit/>
+          </a:bodyPr>
+          <a:lstStyle/>
+          <a:p>
+            <a:r>
+              <a:rPr lang="en-US" altLang="zh-TW" sz="1400" b="1" dirty="0" smtClean="0"/>
+              <a:t>80</a:t>
+            </a:r>
+            <a:r>
+              <a:rPr lang="en-US" sz="1400" b="1" dirty="0" smtClean="0"/>
+              <a:t> mil</a:t>
+            </a:r>
+            <a:endParaRPr lang="en-US" sz="1400" b="1" dirty="0"/>
+          </a:p>
+        </p:txBody>
+      </p:sp>
       <p:grpSp>
         <p:nvGrpSpPr>
-          <p:cNvPr id="19" name="群組 18"/>
+          <p:cNvPr id="10" name="群組 9"/>
           <p:cNvGrpSpPr/>
           <p:nvPr/>
         </p:nvGrpSpPr>
         <p:grpSpPr>
           <a:xfrm>
-            <a:off x="2712378" y="2917861"/>
-            <a:ext cx="4701820" cy="1299766"/>
-            <a:chOff x="2712378" y="2917861"/>
-            <a:chExt cx="4701820" cy="1299766"/>
+            <a:off x="6820635" y="3726302"/>
+            <a:ext cx="385879" cy="31172"/>
+            <a:chOff x="6075218" y="2826240"/>
+            <a:chExt cx="385879" cy="31172"/>
           </a:xfrm>
         </p:grpSpPr>
-        <p:pic>
-          <p:nvPicPr>
-            <p:cNvPr id="3" name="圖片 2"/>
-            <p:cNvPicPr>
-              <a:picLocks noChangeAspect="1"/>
-            </p:cNvPicPr>
-            <p:nvPr/>
-          </p:nvPicPr>
-          <p:blipFill rotWithShape="1">
-            <a:blip r:embed="rId2">
-              <a:extLst>
-                <a:ext uri="{28A0092B-C50C-407E-A947-70E740481C1C}">
-                  <a14:useLocalDpi xmlns:a14="http://schemas.microsoft.com/office/drawing/2010/main" val="0"/>
-                </a:ext>
-              </a:extLst>
-            </a:blip>
-            <a:srcRect l="26595" t="17593" r="22025"/>
-            <a:stretch/>
-          </p:blipFill>
-          <p:spPr>
-            <a:xfrm>
-              <a:off x="2712378" y="2917861"/>
-              <a:ext cx="4082122" cy="1299766"/>
-            </a:xfrm>
-            <a:prstGeom prst="rect">
-              <a:avLst/>
-            </a:prstGeom>
-          </p:spPr>
-        </p:pic>
         <p:cxnSp>
           <p:nvCxnSpPr>
-            <p:cNvPr id="4" name="直線單箭頭接點 3"/>
+            <p:cNvPr id="17" name="直線接點 16"/>
             <p:cNvCxnSpPr/>
             <p:nvPr/>
           </p:nvCxnSpPr>
           <p:spPr>
             <a:xfrm>
-              <a:off x="5806193" y="3767138"/>
-              <a:ext cx="0" cy="166928"/>
+              <a:off x="6075218" y="2826240"/>
+              <a:ext cx="385879" cy="0"/>
             </a:xfrm>
-            <a:prstGeom prst="straightConnector1">
+            <a:prstGeom prst="line">
               <a:avLst/>
             </a:prstGeom>
             <a:ln>
-              <a:solidFill>
-                <a:schemeClr val="tx1"/>
-              </a:solidFill>
-              <a:headEnd type="triangle"/>
-              <a:tailEnd type="triangle"/>
-            </a:ln>
-          </p:spPr>
-          <p:style>
-            <a:lnRef idx="1">
-              <a:schemeClr val="accent1"/>
-            </a:lnRef>
-            <a:fillRef idx="0">
-              <a:schemeClr val="accent1"/>
-            </a:fillRef>
-            <a:effectRef idx="0">
-              <a:schemeClr val="accent1"/>
-            </a:effectRef>
-            <a:fontRef idx="minor">
-              <a:schemeClr val="tx1"/>
-            </a:fontRef>
-          </p:style>
-        </p:cxnSp>
-        <p:sp>
-          <p:nvSpPr>
-            <p:cNvPr id="5" name="文字方塊 4"/>
-            <p:cNvSpPr txBox="1"/>
-            <p:nvPr/>
-          </p:nvSpPr>
-          <p:spPr>
-            <a:xfrm>
-              <a:off x="5806193" y="3696713"/>
-              <a:ext cx="795647" cy="307777"/>
-            </a:xfrm>
-            <a:prstGeom prst="rect">
-              <a:avLst/>
-            </a:prstGeom>
-            <a:noFill/>
-          </p:spPr>
-          <p:txBody>
-            <a:bodyPr wrap="square" rtlCol="0">
-              <a:spAutoFit/>
-            </a:bodyPr>
-            <a:lstStyle/>
-            <a:p>
-              <a:r>
-                <a:rPr lang="en-US" sz="1400" b="1" dirty="0" smtClean="0"/>
-                <a:t>19 mil</a:t>
-              </a:r>
-              <a:endParaRPr lang="en-US" sz="1400" b="1" dirty="0"/>
-            </a:p>
-          </p:txBody>
-        </p:sp>
-        <p:cxnSp>
-          <p:nvCxnSpPr>
-            <p:cNvPr id="6" name="直線單箭頭接點 5"/>
-            <p:cNvCxnSpPr/>
-            <p:nvPr/>
-          </p:nvCxnSpPr>
-          <p:spPr>
-            <a:xfrm flipH="1">
-              <a:off x="4940300" y="3691951"/>
-              <a:ext cx="427743" cy="4762"/>
-            </a:xfrm>
-            <a:prstGeom prst="straightConnector1">
-              <a:avLst/>
-            </a:prstGeom>
-            <a:ln>
-              <a:solidFill>
-                <a:schemeClr val="tx1"/>
-              </a:solidFill>
-              <a:headEnd type="triangle"/>
-              <a:tailEnd type="triangle"/>
+              <a:prstDash val="lgDashDot"/>
             </a:ln>
           </p:spPr>
           <p:style>
@@ -13767,24 +14889,20 @@
         </p:cxnSp>
         <p:cxnSp>
           <p:nvCxnSpPr>
-            <p:cNvPr id="7" name="直線單箭頭接點 6"/>
+            <p:cNvPr id="18" name="直線接點 17"/>
             <p:cNvCxnSpPr/>
             <p:nvPr/>
           </p:nvCxnSpPr>
           <p:spPr>
-            <a:xfrm flipH="1">
-              <a:off x="4191001" y="3688202"/>
-              <a:ext cx="749299" cy="0"/>
+            <a:xfrm>
+              <a:off x="6075218" y="2857412"/>
+              <a:ext cx="385879" cy="0"/>
             </a:xfrm>
-            <a:prstGeom prst="straightConnector1">
+            <a:prstGeom prst="line">
               <a:avLst/>
             </a:prstGeom>
             <a:ln>
-              <a:solidFill>
-                <a:schemeClr val="tx1"/>
-              </a:solidFill>
-              <a:headEnd type="triangle"/>
-              <a:tailEnd type="triangle"/>
+              <a:prstDash val="lgDashDot"/>
             </a:ln>
           </p:spPr>
           <p:style>
@@ -13802,497 +14920,348 @@
             </a:fontRef>
           </p:style>
         </p:cxnSp>
-        <p:sp>
-          <p:nvSpPr>
-            <p:cNvPr id="8" name="文字方塊 7"/>
-            <p:cNvSpPr txBox="1"/>
+      </p:grpSp>
+      <p:grpSp>
+        <p:nvGrpSpPr>
+          <p:cNvPr id="11" name="群組 10"/>
+          <p:cNvGrpSpPr/>
+          <p:nvPr/>
+        </p:nvGrpSpPr>
+        <p:grpSpPr>
+          <a:xfrm>
+            <a:off x="6820635" y="3934066"/>
+            <a:ext cx="385879" cy="31172"/>
+            <a:chOff x="6075218" y="2826240"/>
+            <a:chExt cx="385879" cy="31172"/>
+          </a:xfrm>
+        </p:grpSpPr>
+        <p:cxnSp>
+          <p:nvCxnSpPr>
+            <p:cNvPr id="15" name="直線接點 14"/>
+            <p:cNvCxnSpPr/>
             <p:nvPr/>
-          </p:nvSpPr>
+          </p:nvCxnSpPr>
           <p:spPr>
             <a:xfrm>
-              <a:off x="4890601" y="3382300"/>
-              <a:ext cx="795647" cy="307777"/>
+              <a:off x="6075218" y="2826240"/>
+              <a:ext cx="385879" cy="0"/>
             </a:xfrm>
-            <a:prstGeom prst="rect">
+            <a:prstGeom prst="line">
               <a:avLst/>
             </a:prstGeom>
-            <a:noFill/>
-          </p:spPr>
-          <p:txBody>
-            <a:bodyPr wrap="square" rtlCol="0">
-              <a:spAutoFit/>
-            </a:bodyPr>
-            <a:lstStyle/>
-            <a:p>
-              <a:r>
-                <a:rPr lang="en-US" altLang="zh-TW" sz="1400" b="1" dirty="0" smtClean="0"/>
-                <a:t>40</a:t>
-              </a:r>
-              <a:r>
-                <a:rPr lang="en-US" sz="1400" b="1" dirty="0" smtClean="0"/>
-                <a:t> mil</a:t>
-              </a:r>
-              <a:endParaRPr lang="en-US" sz="1400" b="1" dirty="0"/>
-            </a:p>
-          </p:txBody>
-        </p:sp>
-        <p:sp>
-          <p:nvSpPr>
-            <p:cNvPr id="9" name="文字方塊 8"/>
-            <p:cNvSpPr txBox="1"/>
-            <p:nvPr/>
-          </p:nvSpPr>
-          <p:spPr>
-            <a:xfrm>
-              <a:off x="4270903" y="3384174"/>
-              <a:ext cx="795647" cy="307777"/>
-            </a:xfrm>
-            <a:prstGeom prst="rect">
-              <a:avLst/>
-            </a:prstGeom>
-            <a:noFill/>
-          </p:spPr>
-          <p:txBody>
-            <a:bodyPr wrap="square" rtlCol="0">
-              <a:spAutoFit/>
-            </a:bodyPr>
-            <a:lstStyle/>
-            <a:p>
-              <a:r>
-                <a:rPr lang="en-US" altLang="zh-TW" sz="1400" b="1" dirty="0" smtClean="0"/>
-                <a:t>80</a:t>
-              </a:r>
-              <a:r>
-                <a:rPr lang="en-US" sz="1400" b="1" dirty="0" smtClean="0"/>
-                <a:t> mil</a:t>
-              </a:r>
-              <a:endParaRPr lang="en-US" sz="1400" b="1" dirty="0"/>
-            </a:p>
-          </p:txBody>
-        </p:sp>
-        <p:grpSp>
-          <p:nvGrpSpPr>
-            <p:cNvPr id="10" name="群組 9"/>
-            <p:cNvGrpSpPr/>
-            <p:nvPr/>
-          </p:nvGrpSpPr>
-          <p:grpSpPr>
-            <a:xfrm>
-              <a:off x="6820635" y="3726302"/>
-              <a:ext cx="385879" cy="31172"/>
-              <a:chOff x="6075218" y="2826240"/>
-              <a:chExt cx="385879" cy="31172"/>
-            </a:xfrm>
-          </p:grpSpPr>
-          <p:cxnSp>
-            <p:nvCxnSpPr>
-              <p:cNvPr id="17" name="直線接點 16"/>
-              <p:cNvCxnSpPr/>
-              <p:nvPr/>
-            </p:nvCxnSpPr>
-            <p:spPr>
-              <a:xfrm>
-                <a:off x="6075218" y="2826240"/>
-                <a:ext cx="385879" cy="0"/>
-              </a:xfrm>
-              <a:prstGeom prst="line">
-                <a:avLst/>
-              </a:prstGeom>
-              <a:ln>
-                <a:prstDash val="lgDashDot"/>
-              </a:ln>
-            </p:spPr>
-            <p:style>
-              <a:lnRef idx="1">
-                <a:schemeClr val="accent1"/>
-              </a:lnRef>
-              <a:fillRef idx="0">
-                <a:schemeClr val="accent1"/>
-              </a:fillRef>
-              <a:effectRef idx="0">
-                <a:schemeClr val="accent1"/>
-              </a:effectRef>
-              <a:fontRef idx="minor">
-                <a:schemeClr val="tx1"/>
-              </a:fontRef>
-            </p:style>
-          </p:cxnSp>
-          <p:cxnSp>
-            <p:nvCxnSpPr>
-              <p:cNvPr id="18" name="直線接點 17"/>
-              <p:cNvCxnSpPr/>
-              <p:nvPr/>
-            </p:nvCxnSpPr>
-            <p:spPr>
-              <a:xfrm>
-                <a:off x="6075218" y="2857412"/>
-                <a:ext cx="385879" cy="0"/>
-              </a:xfrm>
-              <a:prstGeom prst="line">
-                <a:avLst/>
-              </a:prstGeom>
-              <a:ln>
-                <a:prstDash val="lgDashDot"/>
-              </a:ln>
-            </p:spPr>
-            <p:style>
-              <a:lnRef idx="1">
-                <a:schemeClr val="accent1"/>
-              </a:lnRef>
-              <a:fillRef idx="0">
-                <a:schemeClr val="accent1"/>
-              </a:fillRef>
-              <a:effectRef idx="0">
-                <a:schemeClr val="accent1"/>
-              </a:effectRef>
-              <a:fontRef idx="minor">
-                <a:schemeClr val="tx1"/>
-              </a:fontRef>
-            </p:style>
-          </p:cxnSp>
-        </p:grpSp>
-        <p:grpSp>
-          <p:nvGrpSpPr>
-            <p:cNvPr id="11" name="群組 10"/>
-            <p:cNvGrpSpPr/>
-            <p:nvPr/>
-          </p:nvGrpSpPr>
-          <p:grpSpPr>
-            <a:xfrm>
-              <a:off x="6820635" y="3934066"/>
-              <a:ext cx="385879" cy="31172"/>
-              <a:chOff x="6075218" y="2826240"/>
-              <a:chExt cx="385879" cy="31172"/>
-            </a:xfrm>
-          </p:grpSpPr>
-          <p:cxnSp>
-            <p:nvCxnSpPr>
-              <p:cNvPr id="15" name="直線接點 14"/>
-              <p:cNvCxnSpPr/>
-              <p:nvPr/>
-            </p:nvCxnSpPr>
-            <p:spPr>
-              <a:xfrm>
-                <a:off x="6075218" y="2826240"/>
-                <a:ext cx="385879" cy="0"/>
-              </a:xfrm>
-              <a:prstGeom prst="line">
-                <a:avLst/>
-              </a:prstGeom>
-              <a:ln>
-                <a:prstDash val="lgDashDot"/>
-              </a:ln>
-            </p:spPr>
-            <p:style>
-              <a:lnRef idx="1">
-                <a:schemeClr val="accent1"/>
-              </a:lnRef>
-              <a:fillRef idx="0">
-                <a:schemeClr val="accent1"/>
-              </a:fillRef>
-              <a:effectRef idx="0">
-                <a:schemeClr val="accent1"/>
-              </a:effectRef>
-              <a:fontRef idx="minor">
-                <a:schemeClr val="tx1"/>
-              </a:fontRef>
-            </p:style>
-          </p:cxnSp>
-          <p:cxnSp>
-            <p:nvCxnSpPr>
-              <p:cNvPr id="16" name="直線接點 15"/>
-              <p:cNvCxnSpPr/>
-              <p:nvPr/>
-            </p:nvCxnSpPr>
-            <p:spPr>
-              <a:xfrm>
-                <a:off x="6075218" y="2857412"/>
-                <a:ext cx="385879" cy="0"/>
-              </a:xfrm>
-              <a:prstGeom prst="line">
-                <a:avLst/>
-              </a:prstGeom>
-              <a:ln>
-                <a:prstDash val="lgDashDot"/>
-              </a:ln>
-            </p:spPr>
-            <p:style>
-              <a:lnRef idx="1">
-                <a:schemeClr val="accent1"/>
-              </a:lnRef>
-              <a:fillRef idx="0">
-                <a:schemeClr val="accent1"/>
-              </a:fillRef>
-              <a:effectRef idx="0">
-                <a:schemeClr val="accent1"/>
-              </a:effectRef>
-              <a:fontRef idx="minor">
-                <a:schemeClr val="tx1"/>
-              </a:fontRef>
-            </p:style>
-          </p:cxnSp>
-        </p:grpSp>
-        <p:sp>
-          <p:nvSpPr>
-            <p:cNvPr id="12" name="文字方塊 11"/>
-            <p:cNvSpPr txBox="1"/>
-            <p:nvPr/>
-          </p:nvSpPr>
-          <p:spPr>
-            <a:xfrm>
-              <a:off x="6305946" y="3300640"/>
-              <a:ext cx="795647" cy="307777"/>
-            </a:xfrm>
-            <a:prstGeom prst="rect">
-              <a:avLst/>
-            </a:prstGeom>
-            <a:noFill/>
-          </p:spPr>
-          <p:txBody>
-            <a:bodyPr wrap="square" rtlCol="0">
-              <a:spAutoFit/>
-            </a:bodyPr>
-            <a:lstStyle/>
-            <a:p>
-              <a:r>
-                <a:rPr lang="en-US" sz="1400" b="1" dirty="0" smtClean="0"/>
-                <a:t>1 mil</a:t>
-              </a:r>
-              <a:endParaRPr lang="en-US" sz="1400" b="1" dirty="0"/>
-            </a:p>
-          </p:txBody>
-        </p:sp>
-        <p:sp>
-          <p:nvSpPr>
-            <p:cNvPr id="13" name="手繪多邊形 12"/>
-            <p:cNvSpPr/>
-            <p:nvPr/>
-          </p:nvSpPr>
-          <p:spPr>
-            <a:xfrm>
-              <a:off x="6794500" y="3467099"/>
-              <a:ext cx="494590" cy="294653"/>
-            </a:xfrm>
-            <a:custGeom>
-              <a:avLst/>
-              <a:gdLst>
-                <a:gd name="connsiteX0" fmla="*/ 0 w 393834"/>
-                <a:gd name="connsiteY0" fmla="*/ 0 h 342900"/>
-                <a:gd name="connsiteX1" fmla="*/ 298450 w 393834"/>
-                <a:gd name="connsiteY1" fmla="*/ 82550 h 342900"/>
-                <a:gd name="connsiteX2" fmla="*/ 374650 w 393834"/>
-                <a:gd name="connsiteY2" fmla="*/ 158750 h 342900"/>
-                <a:gd name="connsiteX3" fmla="*/ 393700 w 393834"/>
-                <a:gd name="connsiteY3" fmla="*/ 228600 h 342900"/>
-                <a:gd name="connsiteX4" fmla="*/ 381000 w 393834"/>
-                <a:gd name="connsiteY4" fmla="*/ 285750 h 342900"/>
-                <a:gd name="connsiteX5" fmla="*/ 342900 w 393834"/>
-                <a:gd name="connsiteY5" fmla="*/ 342900 h 342900"/>
-              </a:gdLst>
-              <a:ahLst/>
-              <a:cxnLst>
-                <a:cxn ang="0">
-                  <a:pos x="connsiteX0" y="connsiteY0"/>
-                </a:cxn>
-                <a:cxn ang="0">
-                  <a:pos x="connsiteX1" y="connsiteY1"/>
-                </a:cxn>
-                <a:cxn ang="0">
-                  <a:pos x="connsiteX2" y="connsiteY2"/>
-                </a:cxn>
-                <a:cxn ang="0">
-                  <a:pos x="connsiteX3" y="connsiteY3"/>
-                </a:cxn>
-                <a:cxn ang="0">
-                  <a:pos x="connsiteX4" y="connsiteY4"/>
-                </a:cxn>
-                <a:cxn ang="0">
-                  <a:pos x="connsiteX5" y="connsiteY5"/>
-                </a:cxn>
-              </a:cxnLst>
-              <a:rect l="l" t="t" r="r" b="b"/>
-              <a:pathLst>
-                <a:path w="393834" h="342900">
-                  <a:moveTo>
-                    <a:pt x="0" y="0"/>
-                  </a:moveTo>
-                  <a:cubicBezTo>
-                    <a:pt x="118004" y="28046"/>
-                    <a:pt x="236008" y="56092"/>
-                    <a:pt x="298450" y="82550"/>
-                  </a:cubicBezTo>
-                  <a:cubicBezTo>
-                    <a:pt x="360892" y="109008"/>
-                    <a:pt x="358775" y="134408"/>
-                    <a:pt x="374650" y="158750"/>
-                  </a:cubicBezTo>
-                  <a:cubicBezTo>
-                    <a:pt x="390525" y="183092"/>
-                    <a:pt x="392642" y="207433"/>
-                    <a:pt x="393700" y="228600"/>
-                  </a:cubicBezTo>
-                  <a:cubicBezTo>
-                    <a:pt x="394758" y="249767"/>
-                    <a:pt x="389467" y="266700"/>
-                    <a:pt x="381000" y="285750"/>
-                  </a:cubicBezTo>
-                  <a:cubicBezTo>
-                    <a:pt x="372533" y="304800"/>
-                    <a:pt x="357716" y="323850"/>
-                    <a:pt x="342900" y="342900"/>
-                  </a:cubicBezTo>
-                </a:path>
-              </a:pathLst>
-            </a:custGeom>
-            <a:noFill/>
             <a:ln>
-              <a:solidFill>
-                <a:schemeClr val="tx1"/>
-              </a:solidFill>
-              <a:tailEnd type="triangle"/>
+              <a:prstDash val="lgDashDot"/>
             </a:ln>
           </p:spPr>
           <p:style>
-            <a:lnRef idx="2">
-              <a:schemeClr val="accent1">
-                <a:shade val="50000"/>
-              </a:schemeClr>
+            <a:lnRef idx="1">
+              <a:schemeClr val="accent1"/>
             </a:lnRef>
-            <a:fillRef idx="1">
+            <a:fillRef idx="0">
               <a:schemeClr val="accent1"/>
             </a:fillRef>
             <a:effectRef idx="0">
               <a:schemeClr val="accent1"/>
             </a:effectRef>
             <a:fontRef idx="minor">
-              <a:schemeClr val="lt1"/>
+              <a:schemeClr val="tx1"/>
             </a:fontRef>
           </p:style>
-          <p:txBody>
-            <a:bodyPr rtlCol="0" anchor="ctr"/>
-            <a:lstStyle/>
-            <a:p>
-              <a:pPr algn="ctr"/>
-              <a:endParaRPr lang="en-US"/>
-            </a:p>
-          </p:txBody>
-        </p:sp>
-        <p:sp>
-          <p:nvSpPr>
-            <p:cNvPr id="14" name="手繪多邊形 13"/>
-            <p:cNvSpPr/>
+        </p:cxnSp>
+        <p:cxnSp>
+          <p:nvCxnSpPr>
+            <p:cNvPr id="16" name="直線接點 15"/>
+            <p:cNvCxnSpPr/>
             <p:nvPr/>
-          </p:nvSpPr>
+          </p:nvCxnSpPr>
           <p:spPr>
             <a:xfrm>
-              <a:off x="6804660" y="3413760"/>
-              <a:ext cx="609538" cy="552235"/>
+              <a:off x="6075218" y="2857412"/>
+              <a:ext cx="385879" cy="0"/>
             </a:xfrm>
-            <a:custGeom>
+            <a:prstGeom prst="line">
               <a:avLst/>
-              <a:gdLst>
-                <a:gd name="connsiteX0" fmla="*/ 0 w 585787"/>
-                <a:gd name="connsiteY0" fmla="*/ 0 h 552235"/>
-                <a:gd name="connsiteX1" fmla="*/ 304800 w 585787"/>
-                <a:gd name="connsiteY1" fmla="*/ 45720 h 552235"/>
-                <a:gd name="connsiteX2" fmla="*/ 556260 w 585787"/>
-                <a:gd name="connsiteY2" fmla="*/ 167640 h 552235"/>
-                <a:gd name="connsiteX3" fmla="*/ 571500 w 585787"/>
-                <a:gd name="connsiteY3" fmla="*/ 365760 h 552235"/>
-                <a:gd name="connsiteX4" fmla="*/ 472440 w 585787"/>
-                <a:gd name="connsiteY4" fmla="*/ 533400 h 552235"/>
-                <a:gd name="connsiteX5" fmla="*/ 434340 w 585787"/>
-                <a:gd name="connsiteY5" fmla="*/ 541020 h 552235"/>
-              </a:gdLst>
-              <a:ahLst/>
-              <a:cxnLst>
-                <a:cxn ang="0">
-                  <a:pos x="connsiteX0" y="connsiteY0"/>
-                </a:cxn>
-                <a:cxn ang="0">
-                  <a:pos x="connsiteX1" y="connsiteY1"/>
-                </a:cxn>
-                <a:cxn ang="0">
-                  <a:pos x="connsiteX2" y="connsiteY2"/>
-                </a:cxn>
-                <a:cxn ang="0">
-                  <a:pos x="connsiteX3" y="connsiteY3"/>
-                </a:cxn>
-                <a:cxn ang="0">
-                  <a:pos x="connsiteX4" y="connsiteY4"/>
-                </a:cxn>
-                <a:cxn ang="0">
-                  <a:pos x="connsiteX5" y="connsiteY5"/>
-                </a:cxn>
-              </a:cxnLst>
-              <a:rect l="l" t="t" r="r" b="b"/>
-              <a:pathLst>
-                <a:path w="585787" h="552235">
-                  <a:moveTo>
-                    <a:pt x="0" y="0"/>
-                  </a:moveTo>
-                  <a:cubicBezTo>
-                    <a:pt x="106045" y="8890"/>
-                    <a:pt x="212090" y="17780"/>
-                    <a:pt x="304800" y="45720"/>
-                  </a:cubicBezTo>
-                  <a:cubicBezTo>
-                    <a:pt x="397510" y="73660"/>
-                    <a:pt x="511810" y="114300"/>
-                    <a:pt x="556260" y="167640"/>
-                  </a:cubicBezTo>
-                  <a:cubicBezTo>
-                    <a:pt x="600710" y="220980"/>
-                    <a:pt x="585470" y="304800"/>
-                    <a:pt x="571500" y="365760"/>
-                  </a:cubicBezTo>
-                  <a:cubicBezTo>
-                    <a:pt x="557530" y="426720"/>
-                    <a:pt x="495300" y="504190"/>
-                    <a:pt x="472440" y="533400"/>
-                  </a:cubicBezTo>
-                  <a:cubicBezTo>
-                    <a:pt x="449580" y="562610"/>
-                    <a:pt x="441960" y="551815"/>
-                    <a:pt x="434340" y="541020"/>
-                  </a:cubicBezTo>
-                </a:path>
-              </a:pathLst>
-            </a:custGeom>
-            <a:noFill/>
+            </a:prstGeom>
             <a:ln>
-              <a:solidFill>
-                <a:schemeClr val="tx1"/>
-              </a:solidFill>
-              <a:tailEnd type="triangle"/>
+              <a:prstDash val="lgDashDot"/>
             </a:ln>
           </p:spPr>
           <p:style>
-            <a:lnRef idx="2">
-              <a:schemeClr val="accent1">
-                <a:shade val="50000"/>
-              </a:schemeClr>
+            <a:lnRef idx="1">
+              <a:schemeClr val="accent1"/>
             </a:lnRef>
-            <a:fillRef idx="1">
+            <a:fillRef idx="0">
               <a:schemeClr val="accent1"/>
             </a:fillRef>
             <a:effectRef idx="0">
               <a:schemeClr val="accent1"/>
             </a:effectRef>
             <a:fontRef idx="minor">
-              <a:schemeClr val="lt1"/>
+              <a:schemeClr val="tx1"/>
             </a:fontRef>
           </p:style>
-          <p:txBody>
-            <a:bodyPr rtlCol="0" anchor="ctr"/>
-            <a:lstStyle/>
-            <a:p>
-              <a:pPr algn="ctr"/>
-              <a:endParaRPr lang="en-US"/>
-            </a:p>
-          </p:txBody>
-        </p:sp>
+        </p:cxnSp>
       </p:grpSp>
+      <p:sp>
+        <p:nvSpPr>
+          <p:cNvPr id="12" name="文字方塊 11"/>
+          <p:cNvSpPr txBox="1"/>
+          <p:nvPr/>
+        </p:nvSpPr>
+        <p:spPr>
+          <a:xfrm>
+            <a:off x="6305946" y="3300640"/>
+            <a:ext cx="795647" cy="307777"/>
+          </a:xfrm>
+          <a:prstGeom prst="rect">
+            <a:avLst/>
+          </a:prstGeom>
+          <a:noFill/>
+        </p:spPr>
+        <p:txBody>
+          <a:bodyPr wrap="square" rtlCol="0">
+            <a:spAutoFit/>
+          </a:bodyPr>
+          <a:lstStyle/>
+          <a:p>
+            <a:r>
+              <a:rPr lang="en-US" sz="1400" b="1" dirty="0" smtClean="0"/>
+              <a:t>1 mil</a:t>
+            </a:r>
+            <a:endParaRPr lang="en-US" sz="1400" b="1" dirty="0"/>
+          </a:p>
+        </p:txBody>
+      </p:sp>
+      <p:sp>
+        <p:nvSpPr>
+          <p:cNvPr id="13" name="手繪多邊形 12"/>
+          <p:cNvSpPr/>
+          <p:nvPr/>
+        </p:nvSpPr>
+        <p:spPr>
+          <a:xfrm>
+            <a:off x="6794500" y="3467099"/>
+            <a:ext cx="494590" cy="294653"/>
+          </a:xfrm>
+          <a:custGeom>
+            <a:avLst/>
+            <a:gdLst>
+              <a:gd name="connsiteX0" fmla="*/ 0 w 393834"/>
+              <a:gd name="connsiteY0" fmla="*/ 0 h 342900"/>
+              <a:gd name="connsiteX1" fmla="*/ 298450 w 393834"/>
+              <a:gd name="connsiteY1" fmla="*/ 82550 h 342900"/>
+              <a:gd name="connsiteX2" fmla="*/ 374650 w 393834"/>
+              <a:gd name="connsiteY2" fmla="*/ 158750 h 342900"/>
+              <a:gd name="connsiteX3" fmla="*/ 393700 w 393834"/>
+              <a:gd name="connsiteY3" fmla="*/ 228600 h 342900"/>
+              <a:gd name="connsiteX4" fmla="*/ 381000 w 393834"/>
+              <a:gd name="connsiteY4" fmla="*/ 285750 h 342900"/>
+              <a:gd name="connsiteX5" fmla="*/ 342900 w 393834"/>
+              <a:gd name="connsiteY5" fmla="*/ 342900 h 342900"/>
+            </a:gdLst>
+            <a:ahLst/>
+            <a:cxnLst>
+              <a:cxn ang="0">
+                <a:pos x="connsiteX0" y="connsiteY0"/>
+              </a:cxn>
+              <a:cxn ang="0">
+                <a:pos x="connsiteX1" y="connsiteY1"/>
+              </a:cxn>
+              <a:cxn ang="0">
+                <a:pos x="connsiteX2" y="connsiteY2"/>
+              </a:cxn>
+              <a:cxn ang="0">
+                <a:pos x="connsiteX3" y="connsiteY3"/>
+              </a:cxn>
+              <a:cxn ang="0">
+                <a:pos x="connsiteX4" y="connsiteY4"/>
+              </a:cxn>
+              <a:cxn ang="0">
+                <a:pos x="connsiteX5" y="connsiteY5"/>
+              </a:cxn>
+            </a:cxnLst>
+            <a:rect l="l" t="t" r="r" b="b"/>
+            <a:pathLst>
+              <a:path w="393834" h="342900">
+                <a:moveTo>
+                  <a:pt x="0" y="0"/>
+                </a:moveTo>
+                <a:cubicBezTo>
+                  <a:pt x="118004" y="28046"/>
+                  <a:pt x="236008" y="56092"/>
+                  <a:pt x="298450" y="82550"/>
+                </a:cubicBezTo>
+                <a:cubicBezTo>
+                  <a:pt x="360892" y="109008"/>
+                  <a:pt x="358775" y="134408"/>
+                  <a:pt x="374650" y="158750"/>
+                </a:cubicBezTo>
+                <a:cubicBezTo>
+                  <a:pt x="390525" y="183092"/>
+                  <a:pt x="392642" y="207433"/>
+                  <a:pt x="393700" y="228600"/>
+                </a:cubicBezTo>
+                <a:cubicBezTo>
+                  <a:pt x="394758" y="249767"/>
+                  <a:pt x="389467" y="266700"/>
+                  <a:pt x="381000" y="285750"/>
+                </a:cubicBezTo>
+                <a:cubicBezTo>
+                  <a:pt x="372533" y="304800"/>
+                  <a:pt x="357716" y="323850"/>
+                  <a:pt x="342900" y="342900"/>
+                </a:cubicBezTo>
+              </a:path>
+            </a:pathLst>
+          </a:custGeom>
+          <a:noFill/>
+          <a:ln>
+            <a:solidFill>
+              <a:schemeClr val="tx1"/>
+            </a:solidFill>
+            <a:tailEnd type="triangle"/>
+          </a:ln>
+        </p:spPr>
+        <p:style>
+          <a:lnRef idx="2">
+            <a:schemeClr val="accent1">
+              <a:shade val="50000"/>
+            </a:schemeClr>
+          </a:lnRef>
+          <a:fillRef idx="1">
+            <a:schemeClr val="accent1"/>
+          </a:fillRef>
+          <a:effectRef idx="0">
+            <a:schemeClr val="accent1"/>
+          </a:effectRef>
+          <a:fontRef idx="minor">
+            <a:schemeClr val="lt1"/>
+          </a:fontRef>
+        </p:style>
+        <p:txBody>
+          <a:bodyPr rtlCol="0" anchor="ctr"/>
+          <a:lstStyle/>
+          <a:p>
+            <a:pPr algn="ctr"/>
+            <a:endParaRPr lang="en-US"/>
+          </a:p>
+        </p:txBody>
+      </p:sp>
+      <p:sp>
+        <p:nvSpPr>
+          <p:cNvPr id="14" name="手繪多邊形 13"/>
+          <p:cNvSpPr/>
+          <p:nvPr/>
+        </p:nvSpPr>
+        <p:spPr>
+          <a:xfrm>
+            <a:off x="6804660" y="3413760"/>
+            <a:ext cx="609538" cy="552235"/>
+          </a:xfrm>
+          <a:custGeom>
+            <a:avLst/>
+            <a:gdLst>
+              <a:gd name="connsiteX0" fmla="*/ 0 w 585787"/>
+              <a:gd name="connsiteY0" fmla="*/ 0 h 552235"/>
+              <a:gd name="connsiteX1" fmla="*/ 304800 w 585787"/>
+              <a:gd name="connsiteY1" fmla="*/ 45720 h 552235"/>
+              <a:gd name="connsiteX2" fmla="*/ 556260 w 585787"/>
+              <a:gd name="connsiteY2" fmla="*/ 167640 h 552235"/>
+              <a:gd name="connsiteX3" fmla="*/ 571500 w 585787"/>
+              <a:gd name="connsiteY3" fmla="*/ 365760 h 552235"/>
+              <a:gd name="connsiteX4" fmla="*/ 472440 w 585787"/>
+              <a:gd name="connsiteY4" fmla="*/ 533400 h 552235"/>
+              <a:gd name="connsiteX5" fmla="*/ 434340 w 585787"/>
+              <a:gd name="connsiteY5" fmla="*/ 541020 h 552235"/>
+            </a:gdLst>
+            <a:ahLst/>
+            <a:cxnLst>
+              <a:cxn ang="0">
+                <a:pos x="connsiteX0" y="connsiteY0"/>
+              </a:cxn>
+              <a:cxn ang="0">
+                <a:pos x="connsiteX1" y="connsiteY1"/>
+              </a:cxn>
+              <a:cxn ang="0">
+                <a:pos x="connsiteX2" y="connsiteY2"/>
+              </a:cxn>
+              <a:cxn ang="0">
+                <a:pos x="connsiteX3" y="connsiteY3"/>
+              </a:cxn>
+              <a:cxn ang="0">
+                <a:pos x="connsiteX4" y="connsiteY4"/>
+              </a:cxn>
+              <a:cxn ang="0">
+                <a:pos x="connsiteX5" y="connsiteY5"/>
+              </a:cxn>
+            </a:cxnLst>
+            <a:rect l="l" t="t" r="r" b="b"/>
+            <a:pathLst>
+              <a:path w="585787" h="552235">
+                <a:moveTo>
+                  <a:pt x="0" y="0"/>
+                </a:moveTo>
+                <a:cubicBezTo>
+                  <a:pt x="106045" y="8890"/>
+                  <a:pt x="212090" y="17780"/>
+                  <a:pt x="304800" y="45720"/>
+                </a:cubicBezTo>
+                <a:cubicBezTo>
+                  <a:pt x="397510" y="73660"/>
+                  <a:pt x="511810" y="114300"/>
+                  <a:pt x="556260" y="167640"/>
+                </a:cubicBezTo>
+                <a:cubicBezTo>
+                  <a:pt x="600710" y="220980"/>
+                  <a:pt x="585470" y="304800"/>
+                  <a:pt x="571500" y="365760"/>
+                </a:cubicBezTo>
+                <a:cubicBezTo>
+                  <a:pt x="557530" y="426720"/>
+                  <a:pt x="495300" y="504190"/>
+                  <a:pt x="472440" y="533400"/>
+                </a:cubicBezTo>
+                <a:cubicBezTo>
+                  <a:pt x="449580" y="562610"/>
+                  <a:pt x="441960" y="551815"/>
+                  <a:pt x="434340" y="541020"/>
+                </a:cubicBezTo>
+              </a:path>
+            </a:pathLst>
+          </a:custGeom>
+          <a:noFill/>
+          <a:ln>
+            <a:solidFill>
+              <a:schemeClr val="tx1"/>
+            </a:solidFill>
+            <a:tailEnd type="triangle"/>
+          </a:ln>
+        </p:spPr>
+        <p:style>
+          <a:lnRef idx="2">
+            <a:schemeClr val="accent1">
+              <a:shade val="50000"/>
+            </a:schemeClr>
+          </a:lnRef>
+          <a:fillRef idx="1">
+            <a:schemeClr val="accent1"/>
+          </a:fillRef>
+          <a:effectRef idx="0">
+            <a:schemeClr val="accent1"/>
+          </a:effectRef>
+          <a:fontRef idx="minor">
+            <a:schemeClr val="lt1"/>
+          </a:fontRef>
+        </p:style>
+        <p:txBody>
+          <a:bodyPr rtlCol="0" anchor="ctr"/>
+          <a:lstStyle/>
+          <a:p>
+            <a:pPr algn="ctr"/>
+            <a:endParaRPr lang="en-US"/>
+          </a:p>
+        </p:txBody>
+      </p:sp>
     </p:spTree>
     <p:extLst>
       <p:ext uri="{BB962C8B-B14F-4D97-AF65-F5344CB8AC3E}">
@@ -16980,6 +17949,1097 @@
 </p:sld>
 </file>
 
+<file path=ppt/slides/slide9.xml><?xml version="1.0" encoding="utf-8"?>
+<p:sld xmlns:a="http://schemas.openxmlformats.org/drawingml/2006/main" xmlns:r="http://schemas.openxmlformats.org/officeDocument/2006/relationships" xmlns:p="http://schemas.openxmlformats.org/presentationml/2006/main">
+  <p:cSld>
+    <p:spTree>
+      <p:nvGrpSpPr>
+        <p:cNvPr id="1" name=""/>
+        <p:cNvGrpSpPr/>
+        <p:nvPr/>
+      </p:nvGrpSpPr>
+      <p:grpSpPr>
+        <a:xfrm>
+          <a:off x="0" y="0"/>
+          <a:ext cx="0" cy="0"/>
+          <a:chOff x="0" y="0"/>
+          <a:chExt cx="0" cy="0"/>
+        </a:xfrm>
+      </p:grpSpPr>
+      <p:pic>
+        <p:nvPicPr>
+          <p:cNvPr id="3" name="圖片 2"/>
+          <p:cNvPicPr>
+            <a:picLocks noChangeAspect="1"/>
+          </p:cNvPicPr>
+          <p:nvPr/>
+        </p:nvPicPr>
+        <p:blipFill>
+          <a:blip r:embed="rId2">
+            <a:extLst>
+              <a:ext uri="{28A0092B-C50C-407E-A947-70E740481C1C}">
+                <a14:useLocalDpi xmlns:a14="http://schemas.microsoft.com/office/drawing/2010/main" val="0"/>
+              </a:ext>
+            </a:extLst>
+          </a:blip>
+          <a:stretch>
+            <a:fillRect/>
+          </a:stretch>
+        </p:blipFill>
+        <p:spPr>
+          <a:xfrm>
+            <a:off x="626969" y="916644"/>
+            <a:ext cx="6787229" cy="5100909"/>
+          </a:xfrm>
+          <a:prstGeom prst="rect">
+            <a:avLst/>
+          </a:prstGeom>
+        </p:spPr>
+      </p:pic>
+      <p:grpSp>
+        <p:nvGrpSpPr>
+          <p:cNvPr id="4" name="群組 3"/>
+          <p:cNvGrpSpPr/>
+          <p:nvPr/>
+        </p:nvGrpSpPr>
+        <p:grpSpPr>
+          <a:xfrm>
+            <a:off x="7487005" y="3705753"/>
+            <a:ext cx="385879" cy="153525"/>
+            <a:chOff x="6075218" y="2826240"/>
+            <a:chExt cx="385879" cy="153525"/>
+          </a:xfrm>
+        </p:grpSpPr>
+        <p:cxnSp>
+          <p:nvCxnSpPr>
+            <p:cNvPr id="5" name="直線接點 4"/>
+            <p:cNvCxnSpPr/>
+            <p:nvPr/>
+          </p:nvCxnSpPr>
+          <p:spPr>
+            <a:xfrm>
+              <a:off x="6075218" y="2826240"/>
+              <a:ext cx="385879" cy="0"/>
+            </a:xfrm>
+            <a:prstGeom prst="line">
+              <a:avLst/>
+            </a:prstGeom>
+            <a:ln>
+              <a:prstDash val="lgDashDot"/>
+            </a:ln>
+          </p:spPr>
+          <p:style>
+            <a:lnRef idx="1">
+              <a:schemeClr val="accent1"/>
+            </a:lnRef>
+            <a:fillRef idx="0">
+              <a:schemeClr val="accent1"/>
+            </a:fillRef>
+            <a:effectRef idx="0">
+              <a:schemeClr val="accent1"/>
+            </a:effectRef>
+            <a:fontRef idx="minor">
+              <a:schemeClr val="tx1"/>
+            </a:fontRef>
+          </p:style>
+        </p:cxnSp>
+        <p:cxnSp>
+          <p:nvCxnSpPr>
+            <p:cNvPr id="6" name="直線接點 5"/>
+            <p:cNvCxnSpPr/>
+            <p:nvPr/>
+          </p:nvCxnSpPr>
+          <p:spPr>
+            <a:xfrm>
+              <a:off x="6075218" y="2979765"/>
+              <a:ext cx="385879" cy="0"/>
+            </a:xfrm>
+            <a:prstGeom prst="line">
+              <a:avLst/>
+            </a:prstGeom>
+            <a:ln>
+              <a:prstDash val="lgDashDot"/>
+            </a:ln>
+          </p:spPr>
+          <p:style>
+            <a:lnRef idx="1">
+              <a:schemeClr val="accent1"/>
+            </a:lnRef>
+            <a:fillRef idx="0">
+              <a:schemeClr val="accent1"/>
+            </a:fillRef>
+            <a:effectRef idx="0">
+              <a:schemeClr val="accent1"/>
+            </a:effectRef>
+            <a:fontRef idx="minor">
+              <a:schemeClr val="tx1"/>
+            </a:fontRef>
+          </p:style>
+        </p:cxnSp>
+      </p:grpSp>
+      <p:grpSp>
+        <p:nvGrpSpPr>
+          <p:cNvPr id="13" name="群組 12"/>
+          <p:cNvGrpSpPr/>
+          <p:nvPr/>
+        </p:nvGrpSpPr>
+        <p:grpSpPr>
+          <a:xfrm>
+            <a:off x="7487005" y="5154409"/>
+            <a:ext cx="385879" cy="153525"/>
+            <a:chOff x="6075218" y="2826240"/>
+            <a:chExt cx="385879" cy="153525"/>
+          </a:xfrm>
+        </p:grpSpPr>
+        <p:cxnSp>
+          <p:nvCxnSpPr>
+            <p:cNvPr id="14" name="直線接點 13"/>
+            <p:cNvCxnSpPr/>
+            <p:nvPr/>
+          </p:nvCxnSpPr>
+          <p:spPr>
+            <a:xfrm>
+              <a:off x="6075218" y="2826240"/>
+              <a:ext cx="385879" cy="0"/>
+            </a:xfrm>
+            <a:prstGeom prst="line">
+              <a:avLst/>
+            </a:prstGeom>
+            <a:ln>
+              <a:prstDash val="lgDashDot"/>
+            </a:ln>
+          </p:spPr>
+          <p:style>
+            <a:lnRef idx="1">
+              <a:schemeClr val="accent1"/>
+            </a:lnRef>
+            <a:fillRef idx="0">
+              <a:schemeClr val="accent1"/>
+            </a:fillRef>
+            <a:effectRef idx="0">
+              <a:schemeClr val="accent1"/>
+            </a:effectRef>
+            <a:fontRef idx="minor">
+              <a:schemeClr val="tx1"/>
+            </a:fontRef>
+          </p:style>
+        </p:cxnSp>
+        <p:cxnSp>
+          <p:nvCxnSpPr>
+            <p:cNvPr id="15" name="直線接點 14"/>
+            <p:cNvCxnSpPr/>
+            <p:nvPr/>
+          </p:nvCxnSpPr>
+          <p:spPr>
+            <a:xfrm>
+              <a:off x="6075218" y="2979765"/>
+              <a:ext cx="385879" cy="0"/>
+            </a:xfrm>
+            <a:prstGeom prst="line">
+              <a:avLst/>
+            </a:prstGeom>
+            <a:ln>
+              <a:prstDash val="lgDashDot"/>
+            </a:ln>
+          </p:spPr>
+          <p:style>
+            <a:lnRef idx="1">
+              <a:schemeClr val="accent1"/>
+            </a:lnRef>
+            <a:fillRef idx="0">
+              <a:schemeClr val="accent1"/>
+            </a:fillRef>
+            <a:effectRef idx="0">
+              <a:schemeClr val="accent1"/>
+            </a:effectRef>
+            <a:fontRef idx="minor">
+              <a:schemeClr val="tx1"/>
+            </a:fontRef>
+          </p:style>
+        </p:cxnSp>
+      </p:grpSp>
+      <p:sp>
+        <p:nvSpPr>
+          <p:cNvPr id="16" name="文字方塊 15"/>
+          <p:cNvSpPr txBox="1"/>
+          <p:nvPr/>
+        </p:nvSpPr>
+        <p:spPr>
+          <a:xfrm>
+            <a:off x="7872884" y="3585681"/>
+            <a:ext cx="542136" cy="369332"/>
+          </a:xfrm>
+          <a:prstGeom prst="rect">
+            <a:avLst/>
+          </a:prstGeom>
+          <a:noFill/>
+        </p:spPr>
+        <p:txBody>
+          <a:bodyPr wrap="none" rtlCol="0">
+            <a:spAutoFit/>
+          </a:bodyPr>
+          <a:lstStyle/>
+          <a:p>
+            <a:r>
+              <a:rPr lang="en-US" dirty="0" smtClean="0"/>
+              <a:t>T</a:t>
+            </a:r>
+            <a:r>
+              <a:rPr lang="en-US" baseline="-25000" dirty="0" smtClean="0"/>
+              <a:t>PCB</a:t>
+            </a:r>
+            <a:endParaRPr lang="en-US" baseline="-25000" dirty="0"/>
+          </a:p>
+        </p:txBody>
+      </p:sp>
+      <p:sp>
+        <p:nvSpPr>
+          <p:cNvPr id="17" name="文字方塊 16"/>
+          <p:cNvSpPr txBox="1"/>
+          <p:nvPr/>
+        </p:nvSpPr>
+        <p:spPr>
+          <a:xfrm>
+            <a:off x="7872884" y="4370045"/>
+            <a:ext cx="574196" cy="369332"/>
+          </a:xfrm>
+          <a:prstGeom prst="rect">
+            <a:avLst/>
+          </a:prstGeom>
+          <a:noFill/>
+        </p:spPr>
+        <p:txBody>
+          <a:bodyPr wrap="none" rtlCol="0">
+            <a:spAutoFit/>
+          </a:bodyPr>
+          <a:lstStyle/>
+          <a:p>
+            <a:r>
+              <a:rPr lang="en-US" dirty="0" smtClean="0"/>
+              <a:t>H</a:t>
+            </a:r>
+            <a:r>
+              <a:rPr lang="en-US" baseline="-25000" dirty="0" smtClean="0"/>
+              <a:t>PCB</a:t>
+            </a:r>
+            <a:endParaRPr lang="en-US" baseline="-25000" dirty="0"/>
+          </a:p>
+        </p:txBody>
+      </p:sp>
+      <p:cxnSp>
+        <p:nvCxnSpPr>
+          <p:cNvPr id="19" name="直線單箭頭接點 18"/>
+          <p:cNvCxnSpPr/>
+          <p:nvPr/>
+        </p:nvCxnSpPr>
+        <p:spPr>
+          <a:xfrm>
+            <a:off x="7679944" y="3859278"/>
+            <a:ext cx="0" cy="1295131"/>
+          </a:xfrm>
+          <a:prstGeom prst="straightConnector1">
+            <a:avLst/>
+          </a:prstGeom>
+          <a:ln w="25400" cap="rnd">
+            <a:solidFill>
+              <a:schemeClr val="tx1"/>
+            </a:solidFill>
+            <a:headEnd type="triangle"/>
+            <a:tailEnd type="triangle"/>
+          </a:ln>
+        </p:spPr>
+        <p:style>
+          <a:lnRef idx="1">
+            <a:schemeClr val="accent1"/>
+          </a:lnRef>
+          <a:fillRef idx="0">
+            <a:schemeClr val="accent1"/>
+          </a:fillRef>
+          <a:effectRef idx="0">
+            <a:schemeClr val="accent1"/>
+          </a:effectRef>
+          <a:fontRef idx="minor">
+            <a:schemeClr val="tx1"/>
+          </a:fontRef>
+        </p:style>
+      </p:cxnSp>
+      <p:cxnSp>
+        <p:nvCxnSpPr>
+          <p:cNvPr id="27" name="直線單箭頭接點 26"/>
+          <p:cNvCxnSpPr/>
+          <p:nvPr/>
+        </p:nvCxnSpPr>
+        <p:spPr>
+          <a:xfrm flipH="1">
+            <a:off x="4193342" y="3267967"/>
+            <a:ext cx="199130" cy="199131"/>
+          </a:xfrm>
+          <a:prstGeom prst="straightConnector1">
+            <a:avLst/>
+          </a:prstGeom>
+          <a:ln w="25400" cap="rnd">
+            <a:solidFill>
+              <a:schemeClr val="tx1"/>
+            </a:solidFill>
+            <a:headEnd type="triangle"/>
+            <a:tailEnd type="none"/>
+          </a:ln>
+        </p:spPr>
+        <p:style>
+          <a:lnRef idx="1">
+            <a:schemeClr val="accent1"/>
+          </a:lnRef>
+          <a:fillRef idx="0">
+            <a:schemeClr val="accent1"/>
+          </a:fillRef>
+          <a:effectRef idx="0">
+            <a:schemeClr val="accent1"/>
+          </a:effectRef>
+          <a:fontRef idx="minor">
+            <a:schemeClr val="tx1"/>
+          </a:fontRef>
+        </p:style>
+      </p:cxnSp>
+      <p:cxnSp>
+        <p:nvCxnSpPr>
+          <p:cNvPr id="36" name="直線單箭頭接點 35"/>
+          <p:cNvCxnSpPr/>
+          <p:nvPr/>
+        </p:nvCxnSpPr>
+        <p:spPr>
+          <a:xfrm rot="10800000" flipH="1">
+            <a:off x="4446777" y="3028096"/>
+            <a:ext cx="199130" cy="199131"/>
+          </a:xfrm>
+          <a:prstGeom prst="straightConnector1">
+            <a:avLst/>
+          </a:prstGeom>
+          <a:ln w="25400" cap="rnd">
+            <a:solidFill>
+              <a:schemeClr val="tx1"/>
+            </a:solidFill>
+            <a:headEnd type="triangle"/>
+            <a:tailEnd type="none"/>
+          </a:ln>
+        </p:spPr>
+        <p:style>
+          <a:lnRef idx="1">
+            <a:schemeClr val="accent1"/>
+          </a:lnRef>
+          <a:fillRef idx="0">
+            <a:schemeClr val="accent1"/>
+          </a:fillRef>
+          <a:effectRef idx="0">
+            <a:schemeClr val="accent1"/>
+          </a:effectRef>
+          <a:fontRef idx="minor">
+            <a:schemeClr val="tx1"/>
+          </a:fontRef>
+        </p:style>
+      </p:cxnSp>
+      <p:sp>
+        <p:nvSpPr>
+          <p:cNvPr id="37" name="文字方塊 36"/>
+          <p:cNvSpPr txBox="1"/>
+          <p:nvPr/>
+        </p:nvSpPr>
+        <p:spPr>
+          <a:xfrm>
+            <a:off x="4628420" y="2758330"/>
+            <a:ext cx="719621" cy="369332"/>
+          </a:xfrm>
+          <a:prstGeom prst="rect">
+            <a:avLst/>
+          </a:prstGeom>
+          <a:noFill/>
+        </p:spPr>
+        <p:txBody>
+          <a:bodyPr wrap="none" rtlCol="0">
+            <a:spAutoFit/>
+          </a:bodyPr>
+          <a:lstStyle/>
+          <a:p>
+            <a:r>
+              <a:rPr lang="en-US" dirty="0" smtClean="0"/>
+              <a:t>2H</a:t>
+            </a:r>
+            <a:r>
+              <a:rPr lang="en-US" baseline="-25000" dirty="0" smtClean="0"/>
+              <a:t>wire</a:t>
+            </a:r>
+            <a:endParaRPr lang="en-US" baseline="-25000" dirty="0"/>
+          </a:p>
+        </p:txBody>
+      </p:sp>
+      <p:grpSp>
+        <p:nvGrpSpPr>
+          <p:cNvPr id="38" name="群組 37"/>
+          <p:cNvGrpSpPr/>
+          <p:nvPr/>
+        </p:nvGrpSpPr>
+        <p:grpSpPr>
+          <a:xfrm>
+            <a:off x="223056" y="2707545"/>
+            <a:ext cx="385879" cy="61059"/>
+            <a:chOff x="6075218" y="2918706"/>
+            <a:chExt cx="385879" cy="61059"/>
+          </a:xfrm>
+        </p:grpSpPr>
+        <p:cxnSp>
+          <p:nvCxnSpPr>
+            <p:cNvPr id="39" name="直線接點 38"/>
+            <p:cNvCxnSpPr/>
+            <p:nvPr/>
+          </p:nvCxnSpPr>
+          <p:spPr>
+            <a:xfrm>
+              <a:off x="6075218" y="2918706"/>
+              <a:ext cx="385879" cy="0"/>
+            </a:xfrm>
+            <a:prstGeom prst="line">
+              <a:avLst/>
+            </a:prstGeom>
+            <a:ln>
+              <a:prstDash val="lgDashDot"/>
+            </a:ln>
+          </p:spPr>
+          <p:style>
+            <a:lnRef idx="1">
+              <a:schemeClr val="accent1"/>
+            </a:lnRef>
+            <a:fillRef idx="0">
+              <a:schemeClr val="accent1"/>
+            </a:fillRef>
+            <a:effectRef idx="0">
+              <a:schemeClr val="accent1"/>
+            </a:effectRef>
+            <a:fontRef idx="minor">
+              <a:schemeClr val="tx1"/>
+            </a:fontRef>
+          </p:style>
+        </p:cxnSp>
+        <p:cxnSp>
+          <p:nvCxnSpPr>
+            <p:cNvPr id="40" name="直線接點 39"/>
+            <p:cNvCxnSpPr/>
+            <p:nvPr/>
+          </p:nvCxnSpPr>
+          <p:spPr>
+            <a:xfrm>
+              <a:off x="6075218" y="2979765"/>
+              <a:ext cx="385879" cy="0"/>
+            </a:xfrm>
+            <a:prstGeom prst="line">
+              <a:avLst/>
+            </a:prstGeom>
+            <a:ln>
+              <a:prstDash val="lgDashDot"/>
+            </a:ln>
+          </p:spPr>
+          <p:style>
+            <a:lnRef idx="1">
+              <a:schemeClr val="accent1"/>
+            </a:lnRef>
+            <a:fillRef idx="0">
+              <a:schemeClr val="accent1"/>
+            </a:fillRef>
+            <a:effectRef idx="0">
+              <a:schemeClr val="accent1"/>
+            </a:effectRef>
+            <a:fontRef idx="minor">
+              <a:schemeClr val="tx1"/>
+            </a:fontRef>
+          </p:style>
+        </p:cxnSp>
+      </p:grpSp>
+      <p:grpSp>
+        <p:nvGrpSpPr>
+          <p:cNvPr id="41" name="群組 40"/>
+          <p:cNvGrpSpPr/>
+          <p:nvPr/>
+        </p:nvGrpSpPr>
+        <p:grpSpPr>
+          <a:xfrm>
+            <a:off x="241091" y="3806049"/>
+            <a:ext cx="385879" cy="61059"/>
+            <a:chOff x="6075218" y="2826240"/>
+            <a:chExt cx="385879" cy="61059"/>
+          </a:xfrm>
+        </p:grpSpPr>
+        <p:cxnSp>
+          <p:nvCxnSpPr>
+            <p:cNvPr id="42" name="直線接點 41"/>
+            <p:cNvCxnSpPr/>
+            <p:nvPr/>
+          </p:nvCxnSpPr>
+          <p:spPr>
+            <a:xfrm>
+              <a:off x="6075218" y="2826240"/>
+              <a:ext cx="385879" cy="0"/>
+            </a:xfrm>
+            <a:prstGeom prst="line">
+              <a:avLst/>
+            </a:prstGeom>
+            <a:ln>
+              <a:prstDash val="lgDashDot"/>
+            </a:ln>
+          </p:spPr>
+          <p:style>
+            <a:lnRef idx="1">
+              <a:schemeClr val="accent1"/>
+            </a:lnRef>
+            <a:fillRef idx="0">
+              <a:schemeClr val="accent1"/>
+            </a:fillRef>
+            <a:effectRef idx="0">
+              <a:schemeClr val="accent1"/>
+            </a:effectRef>
+            <a:fontRef idx="minor">
+              <a:schemeClr val="tx1"/>
+            </a:fontRef>
+          </p:style>
+        </p:cxnSp>
+        <p:cxnSp>
+          <p:nvCxnSpPr>
+            <p:cNvPr id="43" name="直線接點 42"/>
+            <p:cNvCxnSpPr/>
+            <p:nvPr/>
+          </p:nvCxnSpPr>
+          <p:spPr>
+            <a:xfrm>
+              <a:off x="6075218" y="2887299"/>
+              <a:ext cx="385879" cy="0"/>
+            </a:xfrm>
+            <a:prstGeom prst="line">
+              <a:avLst/>
+            </a:prstGeom>
+            <a:ln>
+              <a:prstDash val="lgDashDot"/>
+            </a:ln>
+          </p:spPr>
+          <p:style>
+            <a:lnRef idx="1">
+              <a:schemeClr val="accent1"/>
+            </a:lnRef>
+            <a:fillRef idx="0">
+              <a:schemeClr val="accent1"/>
+            </a:fillRef>
+            <a:effectRef idx="0">
+              <a:schemeClr val="accent1"/>
+            </a:effectRef>
+            <a:fontRef idx="minor">
+              <a:schemeClr val="tx1"/>
+            </a:fontRef>
+          </p:style>
+        </p:cxnSp>
+      </p:grpSp>
+      <p:sp>
+        <p:nvSpPr>
+          <p:cNvPr id="44" name="文字方塊 43"/>
+          <p:cNvSpPr txBox="1"/>
+          <p:nvPr/>
+        </p:nvSpPr>
+        <p:spPr>
+          <a:xfrm>
+            <a:off x="223056" y="2315363"/>
+            <a:ext cx="548933" cy="369332"/>
+          </a:xfrm>
+          <a:prstGeom prst="rect">
+            <a:avLst/>
+          </a:prstGeom>
+          <a:noFill/>
+        </p:spPr>
+        <p:txBody>
+          <a:bodyPr wrap="none" rtlCol="0">
+            <a:spAutoFit/>
+          </a:bodyPr>
+          <a:lstStyle/>
+          <a:p>
+            <a:r>
+              <a:rPr lang="en-US" dirty="0" smtClean="0"/>
+              <a:t>T</a:t>
+            </a:r>
+            <a:r>
+              <a:rPr lang="en-US" baseline="-25000" dirty="0" smtClean="0"/>
+              <a:t>PKG</a:t>
+            </a:r>
+            <a:endParaRPr lang="en-US" baseline="-25000" dirty="0"/>
+          </a:p>
+        </p:txBody>
+      </p:sp>
+      <p:sp>
+        <p:nvSpPr>
+          <p:cNvPr id="45" name="文字方塊 44"/>
+          <p:cNvSpPr txBox="1"/>
+          <p:nvPr/>
+        </p:nvSpPr>
+        <p:spPr>
+          <a:xfrm>
+            <a:off x="-8463" y="3042053"/>
+            <a:ext cx="580993" cy="369332"/>
+          </a:xfrm>
+          <a:prstGeom prst="rect">
+            <a:avLst/>
+          </a:prstGeom>
+          <a:noFill/>
+        </p:spPr>
+        <p:txBody>
+          <a:bodyPr wrap="none" rtlCol="0">
+            <a:spAutoFit/>
+          </a:bodyPr>
+          <a:lstStyle/>
+          <a:p>
+            <a:r>
+              <a:rPr lang="en-US" dirty="0" smtClean="0"/>
+              <a:t>H</a:t>
+            </a:r>
+            <a:r>
+              <a:rPr lang="en-US" baseline="-25000" dirty="0" smtClean="0"/>
+              <a:t>PKG</a:t>
+            </a:r>
+            <a:endParaRPr lang="en-US" baseline="-25000" dirty="0"/>
+          </a:p>
+        </p:txBody>
+      </p:sp>
+      <p:cxnSp>
+        <p:nvCxnSpPr>
+          <p:cNvPr id="46" name="直線單箭頭接點 45"/>
+          <p:cNvCxnSpPr/>
+          <p:nvPr/>
+        </p:nvCxnSpPr>
+        <p:spPr>
+          <a:xfrm>
+            <a:off x="499360" y="2768604"/>
+            <a:ext cx="0" cy="1037445"/>
+          </a:xfrm>
+          <a:prstGeom prst="straightConnector1">
+            <a:avLst/>
+          </a:prstGeom>
+          <a:ln w="25400" cap="rnd">
+            <a:solidFill>
+              <a:schemeClr val="tx1"/>
+            </a:solidFill>
+            <a:headEnd type="triangle"/>
+            <a:tailEnd type="triangle"/>
+          </a:ln>
+        </p:spPr>
+        <p:style>
+          <a:lnRef idx="1">
+            <a:schemeClr val="accent1"/>
+          </a:lnRef>
+          <a:fillRef idx="0">
+            <a:schemeClr val="accent1"/>
+          </a:fillRef>
+          <a:effectRef idx="0">
+            <a:schemeClr val="accent1"/>
+          </a:effectRef>
+          <a:fontRef idx="minor">
+            <a:schemeClr val="tx1"/>
+          </a:fontRef>
+        </p:style>
+      </p:cxnSp>
+      <p:sp>
+        <p:nvSpPr>
+          <p:cNvPr id="49" name="文字方塊 48"/>
+          <p:cNvSpPr txBox="1"/>
+          <p:nvPr/>
+        </p:nvSpPr>
+        <p:spPr>
+          <a:xfrm>
+            <a:off x="223056" y="3912241"/>
+            <a:ext cx="548933" cy="369332"/>
+          </a:xfrm>
+          <a:prstGeom prst="rect">
+            <a:avLst/>
+          </a:prstGeom>
+          <a:noFill/>
+        </p:spPr>
+        <p:txBody>
+          <a:bodyPr wrap="none" rtlCol="0">
+            <a:spAutoFit/>
+          </a:bodyPr>
+          <a:lstStyle/>
+          <a:p>
+            <a:r>
+              <a:rPr lang="en-US" dirty="0" smtClean="0"/>
+              <a:t>T</a:t>
+            </a:r>
+            <a:r>
+              <a:rPr lang="en-US" baseline="-25000" dirty="0" smtClean="0"/>
+              <a:t>PKG</a:t>
+            </a:r>
+            <a:endParaRPr lang="en-US" baseline="-25000" dirty="0"/>
+          </a:p>
+        </p:txBody>
+      </p:sp>
+      <p:sp>
+        <p:nvSpPr>
+          <p:cNvPr id="50" name="文字方塊 49"/>
+          <p:cNvSpPr txBox="1"/>
+          <p:nvPr/>
+        </p:nvSpPr>
+        <p:spPr>
+          <a:xfrm>
+            <a:off x="2086152" y="2315363"/>
+            <a:ext cx="602601" cy="369332"/>
+          </a:xfrm>
+          <a:prstGeom prst="rect">
+            <a:avLst/>
+          </a:prstGeom>
+          <a:noFill/>
+        </p:spPr>
+        <p:txBody>
+          <a:bodyPr wrap="none" rtlCol="0">
+            <a:spAutoFit/>
+          </a:bodyPr>
+          <a:lstStyle/>
+          <a:p>
+            <a:r>
+              <a:rPr lang="en-US" dirty="0" err="1" smtClean="0"/>
+              <a:t>H</a:t>
+            </a:r>
+            <a:r>
+              <a:rPr lang="en-US" baseline="-25000" dirty="0" err="1" smtClean="0"/>
+              <a:t>wire</a:t>
+            </a:r>
+            <a:endParaRPr lang="en-US" baseline="-25000" dirty="0"/>
+          </a:p>
+        </p:txBody>
+      </p:sp>
+      <p:cxnSp>
+        <p:nvCxnSpPr>
+          <p:cNvPr id="51" name="直線單箭頭接點 50"/>
+          <p:cNvCxnSpPr/>
+          <p:nvPr/>
+        </p:nvCxnSpPr>
+        <p:spPr>
+          <a:xfrm>
+            <a:off x="2708304" y="2229492"/>
+            <a:ext cx="0" cy="478053"/>
+          </a:xfrm>
+          <a:prstGeom prst="straightConnector1">
+            <a:avLst/>
+          </a:prstGeom>
+          <a:ln w="25400" cap="rnd">
+            <a:solidFill>
+              <a:schemeClr val="tx1"/>
+            </a:solidFill>
+            <a:headEnd type="triangle"/>
+            <a:tailEnd type="triangle"/>
+          </a:ln>
+        </p:spPr>
+        <p:style>
+          <a:lnRef idx="1">
+            <a:schemeClr val="accent1"/>
+          </a:lnRef>
+          <a:fillRef idx="0">
+            <a:schemeClr val="accent1"/>
+          </a:fillRef>
+          <a:effectRef idx="0">
+            <a:schemeClr val="accent1"/>
+          </a:effectRef>
+          <a:fontRef idx="minor">
+            <a:schemeClr val="tx1"/>
+          </a:fontRef>
+        </p:style>
+      </p:cxnSp>
+      <p:cxnSp>
+        <p:nvCxnSpPr>
+          <p:cNvPr id="53" name="直線單箭頭接點 52"/>
+          <p:cNvCxnSpPr/>
+          <p:nvPr/>
+        </p:nvCxnSpPr>
+        <p:spPr>
+          <a:xfrm flipH="1">
+            <a:off x="3464807" y="3806049"/>
+            <a:ext cx="1163613" cy="0"/>
+          </a:xfrm>
+          <a:prstGeom prst="straightConnector1">
+            <a:avLst/>
+          </a:prstGeom>
+          <a:ln w="25400" cap="rnd">
+            <a:solidFill>
+              <a:schemeClr val="tx1"/>
+            </a:solidFill>
+            <a:headEnd type="triangle"/>
+            <a:tailEnd type="triangle"/>
+          </a:ln>
+        </p:spPr>
+        <p:style>
+          <a:lnRef idx="1">
+            <a:schemeClr val="accent1"/>
+          </a:lnRef>
+          <a:fillRef idx="0">
+            <a:schemeClr val="accent1"/>
+          </a:fillRef>
+          <a:effectRef idx="0">
+            <a:schemeClr val="accent1"/>
+          </a:effectRef>
+          <a:fontRef idx="minor">
+            <a:schemeClr val="tx1"/>
+          </a:fontRef>
+        </p:style>
+      </p:cxnSp>
+      <p:sp>
+        <p:nvSpPr>
+          <p:cNvPr id="57" name="文字方塊 56"/>
+          <p:cNvSpPr txBox="1"/>
+          <p:nvPr/>
+        </p:nvSpPr>
+        <p:spPr>
+          <a:xfrm>
+            <a:off x="3745837" y="3766542"/>
+            <a:ext cx="505588" cy="369332"/>
+          </a:xfrm>
+          <a:prstGeom prst="rect">
+            <a:avLst/>
+          </a:prstGeom>
+          <a:noFill/>
+        </p:spPr>
+        <p:txBody>
+          <a:bodyPr wrap="none" rtlCol="0">
+            <a:spAutoFit/>
+          </a:bodyPr>
+          <a:lstStyle/>
+          <a:p>
+            <a:r>
+              <a:rPr lang="en-US" dirty="0" err="1" smtClean="0"/>
+              <a:t>L</a:t>
+            </a:r>
+            <a:r>
+              <a:rPr lang="en-US" baseline="-25000" dirty="0" err="1" smtClean="0"/>
+              <a:t>gap</a:t>
+            </a:r>
+            <a:endParaRPr lang="en-US" baseline="-25000" dirty="0"/>
+          </a:p>
+        </p:txBody>
+      </p:sp>
+      <p:cxnSp>
+        <p:nvCxnSpPr>
+          <p:cNvPr id="58" name="直線單箭頭接點 57"/>
+          <p:cNvCxnSpPr/>
+          <p:nvPr/>
+        </p:nvCxnSpPr>
+        <p:spPr>
+          <a:xfrm flipH="1">
+            <a:off x="4645908" y="5424755"/>
+            <a:ext cx="922685" cy="10274"/>
+          </a:xfrm>
+          <a:prstGeom prst="straightConnector1">
+            <a:avLst/>
+          </a:prstGeom>
+          <a:ln w="25400" cap="rnd">
+            <a:solidFill>
+              <a:schemeClr val="tx1"/>
+            </a:solidFill>
+            <a:headEnd type="triangle"/>
+            <a:tailEnd type="triangle"/>
+          </a:ln>
+        </p:spPr>
+        <p:style>
+          <a:lnRef idx="1">
+            <a:schemeClr val="accent1"/>
+          </a:lnRef>
+          <a:fillRef idx="0">
+            <a:schemeClr val="accent1"/>
+          </a:fillRef>
+          <a:effectRef idx="0">
+            <a:schemeClr val="accent1"/>
+          </a:effectRef>
+          <a:fontRef idx="minor">
+            <a:schemeClr val="tx1"/>
+          </a:fontRef>
+        </p:style>
+      </p:cxnSp>
+      <p:sp>
+        <p:nvSpPr>
+          <p:cNvPr id="63" name="文字方塊 62"/>
+          <p:cNvSpPr txBox="1"/>
+          <p:nvPr/>
+        </p:nvSpPr>
+        <p:spPr>
+          <a:xfrm>
+            <a:off x="4789968" y="5424755"/>
+            <a:ext cx="671979" cy="369332"/>
+          </a:xfrm>
+          <a:prstGeom prst="rect">
+            <a:avLst/>
+          </a:prstGeom>
+          <a:noFill/>
+        </p:spPr>
+        <p:txBody>
+          <a:bodyPr wrap="none" rtlCol="0">
+            <a:spAutoFit/>
+          </a:bodyPr>
+          <a:lstStyle/>
+          <a:p>
+            <a:r>
+              <a:rPr lang="en-US" dirty="0" smtClean="0"/>
+              <a:t>2R</a:t>
+            </a:r>
+            <a:r>
+              <a:rPr lang="en-US" baseline="-25000" dirty="0" smtClean="0"/>
+              <a:t>PCB</a:t>
+            </a:r>
+            <a:endParaRPr lang="en-US" baseline="-25000" dirty="0"/>
+          </a:p>
+        </p:txBody>
+      </p:sp>
+      <p:cxnSp>
+        <p:nvCxnSpPr>
+          <p:cNvPr id="64" name="直線單箭頭接點 63"/>
+          <p:cNvCxnSpPr/>
+          <p:nvPr/>
+        </p:nvCxnSpPr>
+        <p:spPr>
+          <a:xfrm flipH="1">
+            <a:off x="2569624" y="3952583"/>
+            <a:ext cx="799218" cy="8899"/>
+          </a:xfrm>
+          <a:prstGeom prst="straightConnector1">
+            <a:avLst/>
+          </a:prstGeom>
+          <a:ln w="25400" cap="rnd">
+            <a:solidFill>
+              <a:schemeClr val="tx1"/>
+            </a:solidFill>
+            <a:headEnd type="triangle"/>
+            <a:tailEnd type="triangle"/>
+          </a:ln>
+        </p:spPr>
+        <p:style>
+          <a:lnRef idx="1">
+            <a:schemeClr val="accent1"/>
+          </a:lnRef>
+          <a:fillRef idx="0">
+            <a:schemeClr val="accent1"/>
+          </a:fillRef>
+          <a:effectRef idx="0">
+            <a:schemeClr val="accent1"/>
+          </a:effectRef>
+          <a:fontRef idx="minor">
+            <a:schemeClr val="tx1"/>
+          </a:fontRef>
+        </p:style>
+      </p:cxnSp>
+      <p:sp>
+        <p:nvSpPr>
+          <p:cNvPr id="65" name="文字方塊 64"/>
+          <p:cNvSpPr txBox="1"/>
+          <p:nvPr/>
+        </p:nvSpPr>
+        <p:spPr>
+          <a:xfrm>
+            <a:off x="2658033" y="3929570"/>
+            <a:ext cx="678776" cy="369332"/>
+          </a:xfrm>
+          <a:prstGeom prst="rect">
+            <a:avLst/>
+          </a:prstGeom>
+          <a:noFill/>
+        </p:spPr>
+        <p:txBody>
+          <a:bodyPr wrap="none" rtlCol="0">
+            <a:spAutoFit/>
+          </a:bodyPr>
+          <a:lstStyle/>
+          <a:p>
+            <a:r>
+              <a:rPr lang="en-US" dirty="0" smtClean="0"/>
+              <a:t>2R</a:t>
+            </a:r>
+            <a:r>
+              <a:rPr lang="en-US" baseline="-25000" dirty="0" smtClean="0"/>
+              <a:t>PKG</a:t>
+            </a:r>
+            <a:endParaRPr lang="en-US" baseline="-25000" dirty="0"/>
+          </a:p>
+        </p:txBody>
+      </p:sp>
+      <p:cxnSp>
+        <p:nvCxnSpPr>
+          <p:cNvPr id="67" name="直線單箭頭接點 66"/>
+          <p:cNvCxnSpPr/>
+          <p:nvPr/>
+        </p:nvCxnSpPr>
+        <p:spPr>
+          <a:xfrm flipH="1">
+            <a:off x="2937200" y="2099314"/>
+            <a:ext cx="309434" cy="0"/>
+          </a:xfrm>
+          <a:prstGeom prst="straightConnector1">
+            <a:avLst/>
+          </a:prstGeom>
+          <a:ln w="25400" cap="rnd">
+            <a:solidFill>
+              <a:schemeClr val="tx1"/>
+            </a:solidFill>
+            <a:headEnd type="triangle"/>
+            <a:tailEnd type="triangle"/>
+          </a:ln>
+        </p:spPr>
+        <p:style>
+          <a:lnRef idx="1">
+            <a:schemeClr val="accent1"/>
+          </a:lnRef>
+          <a:fillRef idx="0">
+            <a:schemeClr val="accent1"/>
+          </a:fillRef>
+          <a:effectRef idx="0">
+            <a:schemeClr val="accent1"/>
+          </a:effectRef>
+          <a:fontRef idx="minor">
+            <a:schemeClr val="tx1"/>
+          </a:fontRef>
+        </p:style>
+      </p:cxnSp>
+      <p:sp>
+        <p:nvSpPr>
+          <p:cNvPr id="68" name="文字方塊 67"/>
+          <p:cNvSpPr txBox="1"/>
+          <p:nvPr/>
+        </p:nvSpPr>
+        <p:spPr>
+          <a:xfrm>
+            <a:off x="2799850" y="1688833"/>
+            <a:ext cx="547971" cy="369332"/>
+          </a:xfrm>
+          <a:prstGeom prst="rect">
+            <a:avLst/>
+          </a:prstGeom>
+          <a:noFill/>
+        </p:spPr>
+        <p:txBody>
+          <a:bodyPr wrap="none" rtlCol="0">
+            <a:spAutoFit/>
+          </a:bodyPr>
+          <a:lstStyle/>
+          <a:p>
+            <a:r>
+              <a:rPr lang="en-US" altLang="zh-TW" dirty="0" err="1" smtClean="0"/>
+              <a:t>L</a:t>
+            </a:r>
+            <a:r>
+              <a:rPr lang="en-US" altLang="zh-TW" baseline="-25000" dirty="0" err="1" smtClean="0"/>
+              <a:t>wire</a:t>
+            </a:r>
+            <a:endParaRPr lang="en-US" baseline="-25000" dirty="0"/>
+          </a:p>
+        </p:txBody>
+      </p:sp>
+    </p:spTree>
+    <p:extLst>
+      <p:ext uri="{BB962C8B-B14F-4D97-AF65-F5344CB8AC3E}">
+        <p14:creationId xmlns:p14="http://schemas.microsoft.com/office/powerpoint/2010/main" val="2955466741"/>
+      </p:ext>
+    </p:extLst>
+  </p:cSld>
+  <p:clrMapOvr>
+    <a:masterClrMapping/>
+  </p:clrMapOvr>
+</p:sld>
+</file>
+
 <file path=ppt/theme/theme1.xml><?xml version="1.0" encoding="utf-8"?>
 <a:theme xmlns:a="http://schemas.openxmlformats.org/drawingml/2006/main" name="Office 佈景主題">
   <a:themeElements>

</xml_diff>

<commit_message>
Update the cross section picture using variables instead of numbers
</commit_message>
<xml_diff>
--- a/latex_report/Design Picture.pptx
+++ b/latex_report/Design Picture.pptx
@@ -5266,7 +5266,7 @@
         </p:nvCxnSpPr>
         <p:spPr>
           <a:xfrm flipH="1">
-            <a:off x="5057775" y="994184"/>
+            <a:off x="5057775" y="922266"/>
             <a:ext cx="200026" cy="0"/>
           </a:xfrm>
           <a:prstGeom prst="straightConnector1">
@@ -5303,7 +5303,7 @@
         </p:nvSpPr>
         <p:spPr>
           <a:xfrm>
-            <a:off x="4840233" y="567033"/>
+            <a:off x="4840233" y="422358"/>
             <a:ext cx="641907" cy="369332"/>
           </a:xfrm>
           <a:prstGeom prst="rect">
@@ -5337,7 +5337,7 @@
         </p:nvCxnSpPr>
         <p:spPr>
           <a:xfrm flipH="1">
-            <a:off x="4086225" y="1039666"/>
+            <a:off x="4103742" y="926091"/>
             <a:ext cx="971551" cy="0"/>
           </a:xfrm>
           <a:prstGeom prst="straightConnector1">
@@ -5374,7 +5374,7 @@
         </p:nvSpPr>
         <p:spPr>
           <a:xfrm>
-            <a:off x="4367817" y="1063211"/>
+            <a:off x="4275720" y="414946"/>
             <a:ext cx="579389" cy="369332"/>
           </a:xfrm>
           <a:prstGeom prst="rect">
@@ -5408,7 +5408,7 @@
         </p:nvCxnSpPr>
         <p:spPr>
           <a:xfrm flipH="1">
-            <a:off x="3890461" y="994184"/>
+            <a:off x="3890461" y="922266"/>
             <a:ext cx="200026" cy="0"/>
           </a:xfrm>
           <a:prstGeom prst="straightConnector1">
@@ -5445,7 +5445,7 @@
         </p:nvSpPr>
         <p:spPr>
           <a:xfrm>
-            <a:off x="3672919" y="567033"/>
+            <a:off x="3668348" y="433644"/>
             <a:ext cx="641907" cy="369332"/>
           </a:xfrm>
           <a:prstGeom prst="rect">
@@ -5621,7 +5621,7 @@
         <p:spPr>
           <a:xfrm>
             <a:off x="5285781" y="2935842"/>
-            <a:ext cx="527709" cy="369332"/>
+            <a:ext cx="360996" cy="369332"/>
           </a:xfrm>
           <a:prstGeom prst="rect">
             <a:avLst/>
@@ -5640,7 +5640,7 @@
             </a:r>
             <a:r>
               <a:rPr lang="en-US" altLang="zh-TW" baseline="-25000" dirty="0" smtClean="0"/>
-              <a:t>PCB</a:t>
+              <a:t>1</a:t>
             </a:r>
             <a:endParaRPr lang="en-US" baseline="-25000" dirty="0"/>
           </a:p>
@@ -5941,7 +5941,7 @@
         </p:nvSpPr>
         <p:spPr>
           <a:xfrm>
-            <a:off x="3989302" y="3619261"/>
+            <a:off x="3989302" y="3603209"/>
             <a:ext cx="468398" cy="369332"/>
           </a:xfrm>
           <a:prstGeom prst="rect">
@@ -5964,6 +5964,158 @@
               <a:t>2</a:t>
             </a:r>
             <a:endParaRPr lang="en-US" baseline="-25000" dirty="0"/>
+          </a:p>
+        </p:txBody>
+      </p:sp>
+      <p:sp>
+        <p:nvSpPr>
+          <p:cNvPr id="2" name="文字方塊 1"/>
+          <p:cNvSpPr txBox="1"/>
+          <p:nvPr/>
+        </p:nvSpPr>
+        <p:spPr>
+          <a:xfrm>
+            <a:off x="3241790" y="5524418"/>
+            <a:ext cx="759632" cy="369332"/>
+          </a:xfrm>
+          <a:prstGeom prst="rect">
+            <a:avLst/>
+          </a:prstGeom>
+          <a:noFill/>
+        </p:spPr>
+        <p:txBody>
+          <a:bodyPr wrap="none" rtlCol="0">
+            <a:spAutoFit/>
+          </a:bodyPr>
+          <a:lstStyle/>
+          <a:p>
+            <a:r>
+              <a:rPr lang="en-US" b="1" dirty="0" smtClean="0">
+                <a:solidFill>
+                  <a:srgbClr val="002060"/>
+                </a:solidFill>
+              </a:rPr>
+              <a:t>Port 1</a:t>
+            </a:r>
+            <a:endParaRPr lang="en-US" b="1" dirty="0">
+              <a:solidFill>
+                <a:srgbClr val="002060"/>
+              </a:solidFill>
+            </a:endParaRPr>
+          </a:p>
+        </p:txBody>
+      </p:sp>
+      <p:sp>
+        <p:nvSpPr>
+          <p:cNvPr id="30" name="文字方塊 29"/>
+          <p:cNvSpPr txBox="1"/>
+          <p:nvPr/>
+        </p:nvSpPr>
+        <p:spPr>
+          <a:xfrm>
+            <a:off x="5273021" y="5524418"/>
+            <a:ext cx="759632" cy="369332"/>
+          </a:xfrm>
+          <a:prstGeom prst="rect">
+            <a:avLst/>
+          </a:prstGeom>
+          <a:noFill/>
+        </p:spPr>
+        <p:txBody>
+          <a:bodyPr wrap="none" rtlCol="0">
+            <a:spAutoFit/>
+          </a:bodyPr>
+          <a:lstStyle/>
+          <a:p>
+            <a:r>
+              <a:rPr lang="en-US" b="1" dirty="0" smtClean="0">
+                <a:solidFill>
+                  <a:srgbClr val="002060"/>
+                </a:solidFill>
+              </a:rPr>
+              <a:t>Port 2</a:t>
+            </a:r>
+            <a:endParaRPr lang="en-US" b="1" dirty="0">
+              <a:solidFill>
+                <a:srgbClr val="002060"/>
+              </a:solidFill>
+            </a:endParaRPr>
+          </a:p>
+        </p:txBody>
+      </p:sp>
+      <p:sp>
+        <p:nvSpPr>
+          <p:cNvPr id="31" name="文字方塊 30"/>
+          <p:cNvSpPr txBox="1"/>
+          <p:nvPr/>
+        </p:nvSpPr>
+        <p:spPr>
+          <a:xfrm>
+            <a:off x="3136661" y="936365"/>
+            <a:ext cx="759632" cy="369332"/>
+          </a:xfrm>
+          <a:prstGeom prst="rect">
+            <a:avLst/>
+          </a:prstGeom>
+          <a:noFill/>
+        </p:spPr>
+        <p:txBody>
+          <a:bodyPr wrap="none" rtlCol="0">
+            <a:spAutoFit/>
+          </a:bodyPr>
+          <a:lstStyle/>
+          <a:p>
+            <a:r>
+              <a:rPr lang="en-US" b="1" dirty="0" smtClean="0">
+                <a:solidFill>
+                  <a:srgbClr val="002060"/>
+                </a:solidFill>
+              </a:rPr>
+              <a:t>Port 3</a:t>
+            </a:r>
+            <a:endParaRPr lang="en-US" b="1" dirty="0">
+              <a:solidFill>
+                <a:srgbClr val="002060"/>
+              </a:solidFill>
+            </a:endParaRPr>
+          </a:p>
+        </p:txBody>
+      </p:sp>
+      <p:sp>
+        <p:nvSpPr>
+          <p:cNvPr id="32" name="文字方塊 31"/>
+          <p:cNvSpPr txBox="1"/>
+          <p:nvPr/>
+        </p:nvSpPr>
+        <p:spPr>
+          <a:xfrm>
+            <a:off x="5315606" y="936365"/>
+            <a:ext cx="759632" cy="369332"/>
+          </a:xfrm>
+          <a:prstGeom prst="rect">
+            <a:avLst/>
+          </a:prstGeom>
+          <a:noFill/>
+        </p:spPr>
+        <p:txBody>
+          <a:bodyPr wrap="none" rtlCol="0">
+            <a:spAutoFit/>
+          </a:bodyPr>
+          <a:lstStyle/>
+          <a:p>
+            <a:r>
+              <a:rPr lang="en-US" b="1" dirty="0" smtClean="0">
+                <a:solidFill>
+                  <a:srgbClr val="002060"/>
+                </a:solidFill>
+              </a:rPr>
+              <a:t>Port 4</a:t>
+            </a:r>
+            <a:endParaRPr lang="en-US" b="1" dirty="0">
+              <a:solidFill>
+                <a:srgbClr val="002060"/>
+              </a:solidFill>
+            </a:endParaRPr>
           </a:p>
         </p:txBody>
       </p:sp>
@@ -14668,178 +14820,6 @@
           </a:fontRef>
         </p:style>
       </p:cxnSp>
-      <p:sp>
-        <p:nvSpPr>
-          <p:cNvPr id="5" name="文字方塊 4"/>
-          <p:cNvSpPr txBox="1"/>
-          <p:nvPr/>
-        </p:nvSpPr>
-        <p:spPr>
-          <a:xfrm>
-            <a:off x="5806193" y="3696713"/>
-            <a:ext cx="795647" cy="307777"/>
-          </a:xfrm>
-          <a:prstGeom prst="rect">
-            <a:avLst/>
-          </a:prstGeom>
-          <a:noFill/>
-        </p:spPr>
-        <p:txBody>
-          <a:bodyPr wrap="square" rtlCol="0">
-            <a:spAutoFit/>
-          </a:bodyPr>
-          <a:lstStyle/>
-          <a:p>
-            <a:r>
-              <a:rPr lang="en-US" sz="1400" b="1" dirty="0" smtClean="0"/>
-              <a:t>19 mil</a:t>
-            </a:r>
-            <a:endParaRPr lang="en-US" sz="1400" b="1" dirty="0"/>
-          </a:p>
-        </p:txBody>
-      </p:sp>
-      <p:cxnSp>
-        <p:nvCxnSpPr>
-          <p:cNvPr id="6" name="直線單箭頭接點 5"/>
-          <p:cNvCxnSpPr/>
-          <p:nvPr/>
-        </p:nvCxnSpPr>
-        <p:spPr>
-          <a:xfrm flipH="1">
-            <a:off x="4940300" y="3691951"/>
-            <a:ext cx="427743" cy="4762"/>
-          </a:xfrm>
-          <a:prstGeom prst="straightConnector1">
-            <a:avLst/>
-          </a:prstGeom>
-          <a:ln>
-            <a:solidFill>
-              <a:schemeClr val="tx1"/>
-            </a:solidFill>
-            <a:headEnd type="triangle"/>
-            <a:tailEnd type="triangle"/>
-          </a:ln>
-        </p:spPr>
-        <p:style>
-          <a:lnRef idx="1">
-            <a:schemeClr val="accent1"/>
-          </a:lnRef>
-          <a:fillRef idx="0">
-            <a:schemeClr val="accent1"/>
-          </a:fillRef>
-          <a:effectRef idx="0">
-            <a:schemeClr val="accent1"/>
-          </a:effectRef>
-          <a:fontRef idx="minor">
-            <a:schemeClr val="tx1"/>
-          </a:fontRef>
-        </p:style>
-      </p:cxnSp>
-      <p:cxnSp>
-        <p:nvCxnSpPr>
-          <p:cNvPr id="7" name="直線單箭頭接點 6"/>
-          <p:cNvCxnSpPr/>
-          <p:nvPr/>
-        </p:nvCxnSpPr>
-        <p:spPr>
-          <a:xfrm flipH="1">
-            <a:off x="4191001" y="3688202"/>
-            <a:ext cx="749299" cy="0"/>
-          </a:xfrm>
-          <a:prstGeom prst="straightConnector1">
-            <a:avLst/>
-          </a:prstGeom>
-          <a:ln>
-            <a:solidFill>
-              <a:schemeClr val="tx1"/>
-            </a:solidFill>
-            <a:headEnd type="triangle"/>
-            <a:tailEnd type="triangle"/>
-          </a:ln>
-        </p:spPr>
-        <p:style>
-          <a:lnRef idx="1">
-            <a:schemeClr val="accent1"/>
-          </a:lnRef>
-          <a:fillRef idx="0">
-            <a:schemeClr val="accent1"/>
-          </a:fillRef>
-          <a:effectRef idx="0">
-            <a:schemeClr val="accent1"/>
-          </a:effectRef>
-          <a:fontRef idx="minor">
-            <a:schemeClr val="tx1"/>
-          </a:fontRef>
-        </p:style>
-      </p:cxnSp>
-      <p:sp>
-        <p:nvSpPr>
-          <p:cNvPr id="8" name="文字方塊 7"/>
-          <p:cNvSpPr txBox="1"/>
-          <p:nvPr/>
-        </p:nvSpPr>
-        <p:spPr>
-          <a:xfrm>
-            <a:off x="4890601" y="3382300"/>
-            <a:ext cx="795647" cy="307777"/>
-          </a:xfrm>
-          <a:prstGeom prst="rect">
-            <a:avLst/>
-          </a:prstGeom>
-          <a:noFill/>
-        </p:spPr>
-        <p:txBody>
-          <a:bodyPr wrap="square" rtlCol="0">
-            <a:spAutoFit/>
-          </a:bodyPr>
-          <a:lstStyle/>
-          <a:p>
-            <a:r>
-              <a:rPr lang="en-US" altLang="zh-TW" sz="1400" b="1" dirty="0" smtClean="0"/>
-              <a:t>40</a:t>
-            </a:r>
-            <a:r>
-              <a:rPr lang="en-US" sz="1400" b="1" dirty="0" smtClean="0"/>
-              <a:t> mil</a:t>
-            </a:r>
-            <a:endParaRPr lang="en-US" sz="1400" b="1" dirty="0"/>
-          </a:p>
-        </p:txBody>
-      </p:sp>
-      <p:sp>
-        <p:nvSpPr>
-          <p:cNvPr id="9" name="文字方塊 8"/>
-          <p:cNvSpPr txBox="1"/>
-          <p:nvPr/>
-        </p:nvSpPr>
-        <p:spPr>
-          <a:xfrm>
-            <a:off x="4270903" y="3384174"/>
-            <a:ext cx="795647" cy="307777"/>
-          </a:xfrm>
-          <a:prstGeom prst="rect">
-            <a:avLst/>
-          </a:prstGeom>
-          <a:noFill/>
-        </p:spPr>
-        <p:txBody>
-          <a:bodyPr wrap="square" rtlCol="0">
-            <a:spAutoFit/>
-          </a:bodyPr>
-          <a:lstStyle/>
-          <a:p>
-            <a:r>
-              <a:rPr lang="en-US" altLang="zh-TW" sz="1400" b="1" dirty="0" smtClean="0"/>
-              <a:t>80</a:t>
-            </a:r>
-            <a:r>
-              <a:rPr lang="en-US" sz="1400" b="1" dirty="0" smtClean="0"/>
-              <a:t> mil</a:t>
-            </a:r>
-            <a:endParaRPr lang="en-US" sz="1400" b="1" dirty="0"/>
-          </a:p>
-        </p:txBody>
-      </p:sp>
       <p:grpSp>
         <p:nvGrpSpPr>
           <p:cNvPr id="10" name="群組 9"/>
@@ -15002,36 +14982,6 @@
           </p:style>
         </p:cxnSp>
       </p:grpSp>
-      <p:sp>
-        <p:nvSpPr>
-          <p:cNvPr id="12" name="文字方塊 11"/>
-          <p:cNvSpPr txBox="1"/>
-          <p:nvPr/>
-        </p:nvSpPr>
-        <p:spPr>
-          <a:xfrm>
-            <a:off x="6305946" y="3300640"/>
-            <a:ext cx="795647" cy="307777"/>
-          </a:xfrm>
-          <a:prstGeom prst="rect">
-            <a:avLst/>
-          </a:prstGeom>
-          <a:noFill/>
-        </p:spPr>
-        <p:txBody>
-          <a:bodyPr wrap="square" rtlCol="0">
-            <a:spAutoFit/>
-          </a:bodyPr>
-          <a:lstStyle/>
-          <a:p>
-            <a:r>
-              <a:rPr lang="en-US" sz="1400" b="1" dirty="0" smtClean="0"/>
-              <a:t>1 mil</a:t>
-            </a:r>
-            <a:endParaRPr lang="en-US" sz="1400" b="1" dirty="0"/>
-          </a:p>
-        </p:txBody>
-      </p:sp>
       <p:sp>
         <p:nvSpPr>
           <p:cNvPr id="13" name="手繪多邊形 12"/>
@@ -15262,6 +15212,291 @@
           </a:p>
         </p:txBody>
       </p:sp>
+      <p:cxnSp>
+        <p:nvCxnSpPr>
+          <p:cNvPr id="21" name="直線單箭頭接點 20"/>
+          <p:cNvCxnSpPr/>
+          <p:nvPr/>
+        </p:nvCxnSpPr>
+        <p:spPr>
+          <a:xfrm flipH="1">
+            <a:off x="4198998" y="3537665"/>
+            <a:ext cx="729078" cy="0"/>
+          </a:xfrm>
+          <a:prstGeom prst="straightConnector1">
+            <a:avLst/>
+          </a:prstGeom>
+          <a:ln>
+            <a:solidFill>
+              <a:schemeClr val="tx1"/>
+            </a:solidFill>
+            <a:headEnd type="triangle"/>
+            <a:tailEnd type="triangle"/>
+          </a:ln>
+        </p:spPr>
+        <p:style>
+          <a:lnRef idx="1">
+            <a:schemeClr val="accent1"/>
+          </a:lnRef>
+          <a:fillRef idx="0">
+            <a:schemeClr val="accent1"/>
+          </a:fillRef>
+          <a:effectRef idx="0">
+            <a:schemeClr val="accent1"/>
+          </a:effectRef>
+          <a:fontRef idx="minor">
+            <a:schemeClr val="tx1"/>
+          </a:fontRef>
+        </p:style>
+      </p:cxnSp>
+      <p:sp>
+        <p:nvSpPr>
+          <p:cNvPr id="22" name="文字方塊 21"/>
+          <p:cNvSpPr txBox="1"/>
+          <p:nvPr/>
+        </p:nvSpPr>
+        <p:spPr>
+          <a:xfrm>
+            <a:off x="4279784" y="3126635"/>
+            <a:ext cx="853968" cy="400110"/>
+          </a:xfrm>
+          <a:prstGeom prst="rect">
+            <a:avLst/>
+          </a:prstGeom>
+          <a:noFill/>
+        </p:spPr>
+        <p:txBody>
+          <a:bodyPr wrap="square" rtlCol="0">
+            <a:spAutoFit/>
+          </a:bodyPr>
+          <a:lstStyle/>
+          <a:p>
+            <a:r>
+              <a:rPr lang="en-US" sz="2000" dirty="0" smtClean="0"/>
+              <a:t>D</a:t>
+            </a:r>
+            <a:r>
+              <a:rPr lang="en-US" sz="2000" baseline="-25000" dirty="0" smtClean="0"/>
+              <a:t>PCB</a:t>
+            </a:r>
+            <a:endParaRPr lang="en-US" sz="2000" baseline="-25000" dirty="0"/>
+          </a:p>
+        </p:txBody>
+      </p:sp>
+      <p:cxnSp>
+        <p:nvCxnSpPr>
+          <p:cNvPr id="23" name="直線單箭頭接點 22"/>
+          <p:cNvCxnSpPr/>
+          <p:nvPr/>
+        </p:nvCxnSpPr>
+        <p:spPr>
+          <a:xfrm flipH="1">
+            <a:off x="3787645" y="3532937"/>
+            <a:ext cx="411353" cy="0"/>
+          </a:xfrm>
+          <a:prstGeom prst="straightConnector1">
+            <a:avLst/>
+          </a:prstGeom>
+          <a:ln>
+            <a:solidFill>
+              <a:schemeClr val="tx1"/>
+            </a:solidFill>
+            <a:headEnd type="triangle"/>
+            <a:tailEnd type="triangle"/>
+          </a:ln>
+        </p:spPr>
+        <p:style>
+          <a:lnRef idx="1">
+            <a:schemeClr val="accent1"/>
+          </a:lnRef>
+          <a:fillRef idx="0">
+            <a:schemeClr val="accent1"/>
+          </a:fillRef>
+          <a:effectRef idx="0">
+            <a:schemeClr val="accent1"/>
+          </a:effectRef>
+          <a:fontRef idx="minor">
+            <a:schemeClr val="tx1"/>
+          </a:fontRef>
+        </p:style>
+      </p:cxnSp>
+      <p:sp>
+        <p:nvSpPr>
+          <p:cNvPr id="24" name="文字方塊 23"/>
+          <p:cNvSpPr txBox="1"/>
+          <p:nvPr/>
+        </p:nvSpPr>
+        <p:spPr>
+          <a:xfrm>
+            <a:off x="4829655" y="3138014"/>
+            <a:ext cx="635110" cy="369332"/>
+          </a:xfrm>
+          <a:prstGeom prst="rect">
+            <a:avLst/>
+          </a:prstGeom>
+          <a:noFill/>
+        </p:spPr>
+        <p:txBody>
+          <a:bodyPr wrap="none" rtlCol="0">
+            <a:spAutoFit/>
+          </a:bodyPr>
+          <a:lstStyle/>
+          <a:p>
+            <a:r>
+              <a:rPr lang="en-US" dirty="0" smtClean="0"/>
+              <a:t>W</a:t>
+            </a:r>
+            <a:r>
+              <a:rPr lang="en-US" baseline="-25000" dirty="0" smtClean="0"/>
+              <a:t>PCB</a:t>
+            </a:r>
+            <a:endParaRPr lang="en-US" baseline="-25000" dirty="0"/>
+          </a:p>
+        </p:txBody>
+      </p:sp>
+      <p:sp>
+        <p:nvSpPr>
+          <p:cNvPr id="25" name="文字方塊 24"/>
+          <p:cNvSpPr txBox="1"/>
+          <p:nvPr/>
+        </p:nvSpPr>
+        <p:spPr>
+          <a:xfrm>
+            <a:off x="3621020" y="3117151"/>
+            <a:ext cx="635110" cy="369332"/>
+          </a:xfrm>
+          <a:prstGeom prst="rect">
+            <a:avLst/>
+          </a:prstGeom>
+          <a:noFill/>
+        </p:spPr>
+        <p:txBody>
+          <a:bodyPr wrap="none" rtlCol="0">
+            <a:spAutoFit/>
+          </a:bodyPr>
+          <a:lstStyle/>
+          <a:p>
+            <a:r>
+              <a:rPr lang="en-US" dirty="0" smtClean="0"/>
+              <a:t>W</a:t>
+            </a:r>
+            <a:r>
+              <a:rPr lang="en-US" baseline="-25000" dirty="0" smtClean="0"/>
+              <a:t>PCB</a:t>
+            </a:r>
+            <a:endParaRPr lang="en-US" baseline="-25000" dirty="0"/>
+          </a:p>
+        </p:txBody>
+      </p:sp>
+      <p:cxnSp>
+        <p:nvCxnSpPr>
+          <p:cNvPr id="28" name="直線單箭頭接點 27"/>
+          <p:cNvCxnSpPr/>
+          <p:nvPr/>
+        </p:nvCxnSpPr>
+        <p:spPr>
+          <a:xfrm flipH="1">
+            <a:off x="4928076" y="3532937"/>
+            <a:ext cx="411353" cy="0"/>
+          </a:xfrm>
+          <a:prstGeom prst="straightConnector1">
+            <a:avLst/>
+          </a:prstGeom>
+          <a:ln>
+            <a:solidFill>
+              <a:schemeClr val="tx1"/>
+            </a:solidFill>
+            <a:headEnd type="triangle"/>
+            <a:tailEnd type="triangle"/>
+          </a:ln>
+        </p:spPr>
+        <p:style>
+          <a:lnRef idx="1">
+            <a:schemeClr val="accent1"/>
+          </a:lnRef>
+          <a:fillRef idx="0">
+            <a:schemeClr val="accent1"/>
+          </a:fillRef>
+          <a:effectRef idx="0">
+            <a:schemeClr val="accent1"/>
+          </a:effectRef>
+          <a:fontRef idx="minor">
+            <a:schemeClr val="tx1"/>
+          </a:fontRef>
+        </p:style>
+      </p:cxnSp>
+      <p:sp>
+        <p:nvSpPr>
+          <p:cNvPr id="30" name="文字方塊 29"/>
+          <p:cNvSpPr txBox="1"/>
+          <p:nvPr/>
+        </p:nvSpPr>
+        <p:spPr>
+          <a:xfrm>
+            <a:off x="6327735" y="3245093"/>
+            <a:ext cx="542136" cy="369332"/>
+          </a:xfrm>
+          <a:prstGeom prst="rect">
+            <a:avLst/>
+          </a:prstGeom>
+          <a:noFill/>
+        </p:spPr>
+        <p:txBody>
+          <a:bodyPr wrap="none" rtlCol="0">
+            <a:spAutoFit/>
+          </a:bodyPr>
+          <a:lstStyle/>
+          <a:p>
+            <a:r>
+              <a:rPr lang="en-US" dirty="0" smtClean="0"/>
+              <a:t>T</a:t>
+            </a:r>
+            <a:r>
+              <a:rPr lang="en-US" baseline="-25000" dirty="0" smtClean="0"/>
+              <a:t>PCB</a:t>
+            </a:r>
+            <a:endParaRPr lang="en-US" baseline="-25000" dirty="0"/>
+          </a:p>
+        </p:txBody>
+      </p:sp>
+      <p:sp>
+        <p:nvSpPr>
+          <p:cNvPr id="31" name="文字方塊 30"/>
+          <p:cNvSpPr txBox="1"/>
+          <p:nvPr/>
+        </p:nvSpPr>
+        <p:spPr>
+          <a:xfrm>
+            <a:off x="5843871" y="3562530"/>
+            <a:ext cx="574196" cy="369332"/>
+          </a:xfrm>
+          <a:prstGeom prst="rect">
+            <a:avLst/>
+          </a:prstGeom>
+          <a:solidFill>
+            <a:schemeClr val="bg1">
+              <a:alpha val="60000"/>
+            </a:schemeClr>
+          </a:solidFill>
+        </p:spPr>
+        <p:txBody>
+          <a:bodyPr wrap="none" rtlCol="0">
+            <a:spAutoFit/>
+          </a:bodyPr>
+          <a:lstStyle/>
+          <a:p>
+            <a:r>
+              <a:rPr lang="en-US" dirty="0" smtClean="0"/>
+              <a:t>H</a:t>
+            </a:r>
+            <a:r>
+              <a:rPr lang="en-US" baseline="-25000" dirty="0" smtClean="0"/>
+              <a:t>PCB</a:t>
+            </a:r>
+            <a:endParaRPr lang="en-US" baseline="-25000" dirty="0"/>
+          </a:p>
+        </p:txBody>
+      </p:sp>
     </p:spTree>
     <p:extLst>
       <p:ext uri="{BB962C8B-B14F-4D97-AF65-F5344CB8AC3E}">
@@ -15292,130 +15527,204 @@
           <a:chExt cx="0" cy="0"/>
         </a:xfrm>
       </p:grpSpPr>
+      <p:pic>
+        <p:nvPicPr>
+          <p:cNvPr id="2" name="圖片 1"/>
+          <p:cNvPicPr>
+            <a:picLocks noChangeAspect="1"/>
+          </p:cNvPicPr>
+          <p:nvPr/>
+        </p:nvPicPr>
+        <p:blipFill rotWithShape="1">
+          <a:blip r:embed="rId2"/>
+          <a:srcRect l="4952" t="37462" r="20954" b="26583"/>
+          <a:stretch/>
+        </p:blipFill>
+        <p:spPr>
+          <a:xfrm>
+            <a:off x="1428107" y="4187801"/>
+            <a:ext cx="5044611" cy="1072568"/>
+          </a:xfrm>
+          <a:prstGeom prst="rect">
+            <a:avLst/>
+          </a:prstGeom>
+        </p:spPr>
+      </p:pic>
+      <p:cxnSp>
+        <p:nvCxnSpPr>
+          <p:cNvPr id="3" name="直線單箭頭接點 2"/>
+          <p:cNvCxnSpPr/>
+          <p:nvPr/>
+        </p:nvCxnSpPr>
+        <p:spPr>
+          <a:xfrm>
+            <a:off x="5260505" y="4949666"/>
+            <a:ext cx="0" cy="166928"/>
+          </a:xfrm>
+          <a:prstGeom prst="straightConnector1">
+            <a:avLst/>
+          </a:prstGeom>
+          <a:ln>
+            <a:solidFill>
+              <a:schemeClr val="tx1"/>
+            </a:solidFill>
+            <a:headEnd type="triangle"/>
+            <a:tailEnd type="triangle"/>
+          </a:ln>
+        </p:spPr>
+        <p:style>
+          <a:lnRef idx="1">
+            <a:schemeClr val="accent1"/>
+          </a:lnRef>
+          <a:fillRef idx="0">
+            <a:schemeClr val="accent1"/>
+          </a:fillRef>
+          <a:effectRef idx="0">
+            <a:schemeClr val="accent1"/>
+          </a:effectRef>
+          <a:fontRef idx="minor">
+            <a:schemeClr val="tx1"/>
+          </a:fontRef>
+        </p:style>
+      </p:cxnSp>
+      <p:cxnSp>
+        <p:nvCxnSpPr>
+          <p:cNvPr id="5" name="直線單箭頭接點 4"/>
+          <p:cNvCxnSpPr/>
+          <p:nvPr/>
+        </p:nvCxnSpPr>
+        <p:spPr>
+          <a:xfrm flipH="1">
+            <a:off x="4807320" y="4757247"/>
+            <a:ext cx="245853" cy="0"/>
+          </a:xfrm>
+          <a:prstGeom prst="straightConnector1">
+            <a:avLst/>
+          </a:prstGeom>
+          <a:ln>
+            <a:solidFill>
+              <a:schemeClr val="tx1"/>
+            </a:solidFill>
+            <a:headEnd type="triangle"/>
+            <a:tailEnd type="triangle"/>
+          </a:ln>
+        </p:spPr>
+        <p:style>
+          <a:lnRef idx="1">
+            <a:schemeClr val="accent1"/>
+          </a:lnRef>
+          <a:fillRef idx="0">
+            <a:schemeClr val="accent1"/>
+          </a:fillRef>
+          <a:effectRef idx="0">
+            <a:schemeClr val="accent1"/>
+          </a:effectRef>
+          <a:fontRef idx="minor">
+            <a:schemeClr val="tx1"/>
+          </a:fontRef>
+        </p:style>
+      </p:cxnSp>
+      <p:cxnSp>
+        <p:nvCxnSpPr>
+          <p:cNvPr id="6" name="直線單箭頭接點 5"/>
+          <p:cNvCxnSpPr/>
+          <p:nvPr/>
+        </p:nvCxnSpPr>
+        <p:spPr>
+          <a:xfrm flipH="1">
+            <a:off x="3102796" y="4748736"/>
+            <a:ext cx="1704524" cy="0"/>
+          </a:xfrm>
+          <a:prstGeom prst="straightConnector1">
+            <a:avLst/>
+          </a:prstGeom>
+          <a:ln>
+            <a:solidFill>
+              <a:schemeClr val="tx1"/>
+            </a:solidFill>
+            <a:headEnd type="triangle"/>
+            <a:tailEnd type="triangle"/>
+          </a:ln>
+        </p:spPr>
+        <p:style>
+          <a:lnRef idx="1">
+            <a:schemeClr val="accent1"/>
+          </a:lnRef>
+          <a:fillRef idx="0">
+            <a:schemeClr val="accent1"/>
+          </a:fillRef>
+          <a:effectRef idx="0">
+            <a:schemeClr val="accent1"/>
+          </a:effectRef>
+          <a:fontRef idx="minor">
+            <a:schemeClr val="tx1"/>
+          </a:fontRef>
+        </p:style>
+      </p:cxnSp>
+      <p:sp>
+        <p:nvSpPr>
+          <p:cNvPr id="8" name="文字方塊 7"/>
+          <p:cNvSpPr txBox="1"/>
+          <p:nvPr/>
+        </p:nvSpPr>
+        <p:spPr>
+          <a:xfrm>
+            <a:off x="3781793" y="4351201"/>
+            <a:ext cx="853968" cy="400110"/>
+          </a:xfrm>
+          <a:prstGeom prst="rect">
+            <a:avLst/>
+          </a:prstGeom>
+          <a:noFill/>
+        </p:spPr>
+        <p:txBody>
+          <a:bodyPr wrap="square" rtlCol="0">
+            <a:spAutoFit/>
+          </a:bodyPr>
+          <a:lstStyle/>
+          <a:p>
+            <a:r>
+              <a:rPr lang="en-US" sz="2000" dirty="0"/>
+              <a:t>D</a:t>
+            </a:r>
+            <a:r>
+              <a:rPr lang="en-US" sz="2000" baseline="-25000" dirty="0"/>
+              <a:t>PKG</a:t>
+            </a:r>
+            <a:endParaRPr lang="en-US" sz="2000" baseline="-25000" dirty="0"/>
+          </a:p>
+        </p:txBody>
+      </p:sp>
       <p:grpSp>
         <p:nvGrpSpPr>
-          <p:cNvPr id="22" name="群組 21"/>
+          <p:cNvPr id="9" name="群組 8"/>
           <p:cNvGrpSpPr/>
           <p:nvPr/>
         </p:nvGrpSpPr>
         <p:grpSpPr>
           <a:xfrm>
-            <a:off x="1428107" y="4187801"/>
-            <a:ext cx="5657318" cy="1072568"/>
-            <a:chOff x="1428107" y="4187801"/>
-            <a:chExt cx="5657318" cy="1072568"/>
+            <a:off x="6491862" y="4921240"/>
+            <a:ext cx="385879" cy="31172"/>
+            <a:chOff x="6075218" y="2826240"/>
+            <a:chExt cx="385879" cy="31172"/>
           </a:xfrm>
         </p:grpSpPr>
-        <p:pic>
-          <p:nvPicPr>
-            <p:cNvPr id="2" name="圖片 1"/>
-            <p:cNvPicPr>
-              <a:picLocks noChangeAspect="1"/>
-            </p:cNvPicPr>
-            <p:nvPr/>
-          </p:nvPicPr>
-          <p:blipFill rotWithShape="1">
-            <a:blip r:embed="rId2"/>
-            <a:srcRect l="4952" t="37462" r="20954" b="26583"/>
-            <a:stretch/>
-          </p:blipFill>
-          <p:spPr>
-            <a:xfrm>
-              <a:off x="1428107" y="4187801"/>
-              <a:ext cx="5044611" cy="1072568"/>
-            </a:xfrm>
-            <a:prstGeom prst="rect">
-              <a:avLst/>
-            </a:prstGeom>
-          </p:spPr>
-        </p:pic>
         <p:cxnSp>
           <p:nvCxnSpPr>
-            <p:cNvPr id="3" name="直線單箭頭接點 2"/>
+            <p:cNvPr id="10" name="直線接點 9"/>
             <p:cNvCxnSpPr/>
             <p:nvPr/>
           </p:nvCxnSpPr>
           <p:spPr>
             <a:xfrm>
-              <a:off x="5260505" y="4949666"/>
-              <a:ext cx="0" cy="166928"/>
+              <a:off x="6075218" y="2826240"/>
+              <a:ext cx="385879" cy="0"/>
             </a:xfrm>
-            <a:prstGeom prst="straightConnector1">
+            <a:prstGeom prst="line">
               <a:avLst/>
             </a:prstGeom>
             <a:ln>
-              <a:solidFill>
-                <a:schemeClr val="tx1"/>
-              </a:solidFill>
-              <a:headEnd type="triangle"/>
-              <a:tailEnd type="triangle"/>
-            </a:ln>
-          </p:spPr>
-          <p:style>
-            <a:lnRef idx="1">
-              <a:schemeClr val="accent1"/>
-            </a:lnRef>
-            <a:fillRef idx="0">
-              <a:schemeClr val="accent1"/>
-            </a:fillRef>
-            <a:effectRef idx="0">
-              <a:schemeClr val="accent1"/>
-            </a:effectRef>
-            <a:fontRef idx="minor">
-              <a:schemeClr val="tx1"/>
-            </a:fontRef>
-          </p:style>
-        </p:cxnSp>
-        <p:sp>
-          <p:nvSpPr>
-            <p:cNvPr id="4" name="文字方塊 3"/>
-            <p:cNvSpPr txBox="1"/>
-            <p:nvPr/>
-          </p:nvSpPr>
-          <p:spPr>
-            <a:xfrm>
-              <a:off x="5260505" y="4879241"/>
-              <a:ext cx="795647" cy="307777"/>
-            </a:xfrm>
-            <a:prstGeom prst="rect">
-              <a:avLst/>
-            </a:prstGeom>
-            <a:noFill/>
-          </p:spPr>
-          <p:txBody>
-            <a:bodyPr wrap="square" rtlCol="0">
-              <a:spAutoFit/>
-            </a:bodyPr>
-            <a:lstStyle/>
-            <a:p>
-              <a:r>
-                <a:rPr lang="en-US" sz="1400" b="1" dirty="0" smtClean="0"/>
-                <a:t>200 um</a:t>
-              </a:r>
-              <a:endParaRPr lang="en-US" sz="1400" b="1" dirty="0"/>
-            </a:p>
-          </p:txBody>
-        </p:sp>
-        <p:cxnSp>
-          <p:nvCxnSpPr>
-            <p:cNvPr id="5" name="直線單箭頭接點 4"/>
-            <p:cNvCxnSpPr/>
-            <p:nvPr/>
-          </p:nvCxnSpPr>
-          <p:spPr>
-            <a:xfrm flipH="1">
-              <a:off x="4807320" y="4757247"/>
-              <a:ext cx="245853" cy="0"/>
-            </a:xfrm>
-            <a:prstGeom prst="straightConnector1">
-              <a:avLst/>
-            </a:prstGeom>
-            <a:ln>
-              <a:solidFill>
-                <a:schemeClr val="tx1"/>
-              </a:solidFill>
-              <a:headEnd type="triangle"/>
-              <a:tailEnd type="triangle"/>
+              <a:prstDash val="lgDashDot"/>
             </a:ln>
           </p:spPr>
           <p:style>
@@ -15435,24 +15744,20 @@
         </p:cxnSp>
         <p:cxnSp>
           <p:nvCxnSpPr>
-            <p:cNvPr id="6" name="直線單箭頭接點 5"/>
+            <p:cNvPr id="11" name="直線接點 10"/>
             <p:cNvCxnSpPr/>
             <p:nvPr/>
           </p:nvCxnSpPr>
           <p:spPr>
-            <a:xfrm flipH="1">
-              <a:off x="3102796" y="4748736"/>
-              <a:ext cx="1704524" cy="0"/>
+            <a:xfrm>
+              <a:off x="6075218" y="2857412"/>
+              <a:ext cx="385879" cy="0"/>
             </a:xfrm>
-            <a:prstGeom prst="straightConnector1">
+            <a:prstGeom prst="line">
               <a:avLst/>
             </a:prstGeom>
             <a:ln>
-              <a:solidFill>
-                <a:schemeClr val="tx1"/>
-              </a:solidFill>
-              <a:headEnd type="triangle"/>
-              <a:tailEnd type="triangle"/>
+              <a:prstDash val="lgDashDot"/>
             </a:ln>
           </p:spPr>
           <p:style>
@@ -15470,508 +15775,37 @@
             </a:fontRef>
           </p:style>
         </p:cxnSp>
-        <p:sp>
-          <p:nvSpPr>
-            <p:cNvPr id="7" name="文字方塊 6"/>
-            <p:cNvSpPr txBox="1"/>
-            <p:nvPr/>
-          </p:nvSpPr>
-          <p:spPr>
-            <a:xfrm>
-              <a:off x="4719526" y="4443534"/>
-              <a:ext cx="795647" cy="307777"/>
-            </a:xfrm>
-            <a:prstGeom prst="rect">
-              <a:avLst/>
-            </a:prstGeom>
-            <a:noFill/>
-          </p:spPr>
-          <p:txBody>
-            <a:bodyPr wrap="square" rtlCol="0">
-              <a:spAutoFit/>
-            </a:bodyPr>
-            <a:lstStyle/>
-            <a:p>
-              <a:r>
-                <a:rPr lang="en-US" altLang="zh-TW" sz="1400" b="1" dirty="0" smtClean="0"/>
-                <a:t>367 um</a:t>
-              </a:r>
-              <a:endParaRPr lang="en-US" sz="1400" b="1" dirty="0"/>
-            </a:p>
-          </p:txBody>
-        </p:sp>
-        <p:sp>
-          <p:nvSpPr>
-            <p:cNvPr id="8" name="文字方塊 7"/>
-            <p:cNvSpPr txBox="1"/>
-            <p:nvPr/>
-          </p:nvSpPr>
-          <p:spPr>
-            <a:xfrm>
-              <a:off x="3637053" y="4495577"/>
-              <a:ext cx="853968" cy="307777"/>
-            </a:xfrm>
-            <a:prstGeom prst="rect">
-              <a:avLst/>
-            </a:prstGeom>
-            <a:noFill/>
-          </p:spPr>
-          <p:txBody>
-            <a:bodyPr wrap="square" rtlCol="0">
-              <a:spAutoFit/>
-            </a:bodyPr>
-            <a:lstStyle/>
-            <a:p>
-              <a:r>
-                <a:rPr lang="en-US" altLang="zh-TW" sz="1400" b="1" dirty="0" smtClean="0"/>
-                <a:t>3334 um</a:t>
-              </a:r>
-              <a:endParaRPr lang="en-US" sz="1400" b="1" dirty="0"/>
-            </a:p>
-          </p:txBody>
-        </p:sp>
-        <p:grpSp>
-          <p:nvGrpSpPr>
-            <p:cNvPr id="9" name="群組 8"/>
-            <p:cNvGrpSpPr/>
-            <p:nvPr/>
-          </p:nvGrpSpPr>
-          <p:grpSpPr>
-            <a:xfrm>
-              <a:off x="6491862" y="4921240"/>
-              <a:ext cx="385879" cy="31172"/>
-              <a:chOff x="6075218" y="2826240"/>
-              <a:chExt cx="385879" cy="31172"/>
-            </a:xfrm>
-          </p:grpSpPr>
-          <p:cxnSp>
-            <p:nvCxnSpPr>
-              <p:cNvPr id="10" name="直線接點 9"/>
-              <p:cNvCxnSpPr/>
-              <p:nvPr/>
-            </p:nvCxnSpPr>
-            <p:spPr>
-              <a:xfrm>
-                <a:off x="6075218" y="2826240"/>
-                <a:ext cx="385879" cy="0"/>
-              </a:xfrm>
-              <a:prstGeom prst="line">
-                <a:avLst/>
-              </a:prstGeom>
-              <a:ln>
-                <a:prstDash val="lgDashDot"/>
-              </a:ln>
-            </p:spPr>
-            <p:style>
-              <a:lnRef idx="1">
-                <a:schemeClr val="accent1"/>
-              </a:lnRef>
-              <a:fillRef idx="0">
-                <a:schemeClr val="accent1"/>
-              </a:fillRef>
-              <a:effectRef idx="0">
-                <a:schemeClr val="accent1"/>
-              </a:effectRef>
-              <a:fontRef idx="minor">
-                <a:schemeClr val="tx1"/>
-              </a:fontRef>
-            </p:style>
-          </p:cxnSp>
-          <p:cxnSp>
-            <p:nvCxnSpPr>
-              <p:cNvPr id="11" name="直線接點 10"/>
-              <p:cNvCxnSpPr/>
-              <p:nvPr/>
-            </p:nvCxnSpPr>
-            <p:spPr>
-              <a:xfrm>
-                <a:off x="6075218" y="2857412"/>
-                <a:ext cx="385879" cy="0"/>
-              </a:xfrm>
-              <a:prstGeom prst="line">
-                <a:avLst/>
-              </a:prstGeom>
-              <a:ln>
-                <a:prstDash val="lgDashDot"/>
-              </a:ln>
-            </p:spPr>
-            <p:style>
-              <a:lnRef idx="1">
-                <a:schemeClr val="accent1"/>
-              </a:lnRef>
-              <a:fillRef idx="0">
-                <a:schemeClr val="accent1"/>
-              </a:fillRef>
-              <a:effectRef idx="0">
-                <a:schemeClr val="accent1"/>
-              </a:effectRef>
-              <a:fontRef idx="minor">
-                <a:schemeClr val="tx1"/>
-              </a:fontRef>
-            </p:style>
-          </p:cxnSp>
-        </p:grpSp>
-        <p:grpSp>
-          <p:nvGrpSpPr>
-            <p:cNvPr id="12" name="群組 11"/>
-            <p:cNvGrpSpPr/>
-            <p:nvPr/>
-          </p:nvGrpSpPr>
-          <p:grpSpPr>
-            <a:xfrm>
-              <a:off x="6491862" y="5129004"/>
-              <a:ext cx="385879" cy="31172"/>
-              <a:chOff x="6075218" y="2826240"/>
-              <a:chExt cx="385879" cy="31172"/>
-            </a:xfrm>
-          </p:grpSpPr>
-          <p:cxnSp>
-            <p:nvCxnSpPr>
-              <p:cNvPr id="13" name="直線接點 12"/>
-              <p:cNvCxnSpPr/>
-              <p:nvPr/>
-            </p:nvCxnSpPr>
-            <p:spPr>
-              <a:xfrm>
-                <a:off x="6075218" y="2826240"/>
-                <a:ext cx="385879" cy="0"/>
-              </a:xfrm>
-              <a:prstGeom prst="line">
-                <a:avLst/>
-              </a:prstGeom>
-              <a:ln>
-                <a:prstDash val="lgDashDot"/>
-              </a:ln>
-            </p:spPr>
-            <p:style>
-              <a:lnRef idx="1">
-                <a:schemeClr val="accent1"/>
-              </a:lnRef>
-              <a:fillRef idx="0">
-                <a:schemeClr val="accent1"/>
-              </a:fillRef>
-              <a:effectRef idx="0">
-                <a:schemeClr val="accent1"/>
-              </a:effectRef>
-              <a:fontRef idx="minor">
-                <a:schemeClr val="tx1"/>
-              </a:fontRef>
-            </p:style>
-          </p:cxnSp>
-          <p:cxnSp>
-            <p:nvCxnSpPr>
-              <p:cNvPr id="14" name="直線接點 13"/>
-              <p:cNvCxnSpPr/>
-              <p:nvPr/>
-            </p:nvCxnSpPr>
-            <p:spPr>
-              <a:xfrm>
-                <a:off x="6075218" y="2857412"/>
-                <a:ext cx="385879" cy="0"/>
-              </a:xfrm>
-              <a:prstGeom prst="line">
-                <a:avLst/>
-              </a:prstGeom>
-              <a:ln>
-                <a:prstDash val="lgDashDot"/>
-              </a:ln>
-            </p:spPr>
-            <p:style>
-              <a:lnRef idx="1">
-                <a:schemeClr val="accent1"/>
-              </a:lnRef>
-              <a:fillRef idx="0">
-                <a:schemeClr val="accent1"/>
-              </a:fillRef>
-              <a:effectRef idx="0">
-                <a:schemeClr val="accent1"/>
-              </a:effectRef>
-              <a:fontRef idx="minor">
-                <a:schemeClr val="tx1"/>
-              </a:fontRef>
-            </p:style>
-          </p:cxnSp>
-        </p:grpSp>
-        <p:sp>
-          <p:nvSpPr>
-            <p:cNvPr id="15" name="文字方塊 14"/>
-            <p:cNvSpPr txBox="1"/>
-            <p:nvPr/>
-          </p:nvSpPr>
-          <p:spPr>
-            <a:xfrm>
-              <a:off x="5903575" y="4495578"/>
-              <a:ext cx="869245" cy="307777"/>
-            </a:xfrm>
-            <a:prstGeom prst="rect">
-              <a:avLst/>
-            </a:prstGeom>
-            <a:noFill/>
-          </p:spPr>
-          <p:txBody>
-            <a:bodyPr wrap="square" rtlCol="0">
-              <a:spAutoFit/>
-            </a:bodyPr>
-            <a:lstStyle/>
-            <a:p>
-              <a:r>
-                <a:rPr lang="en-US" sz="1400" b="1" dirty="0" smtClean="0"/>
-                <a:t>17 um</a:t>
-              </a:r>
-              <a:endParaRPr lang="en-US" sz="1400" b="1" dirty="0"/>
-            </a:p>
-          </p:txBody>
-        </p:sp>
-        <p:sp>
-          <p:nvSpPr>
-            <p:cNvPr id="16" name="手繪多邊形 15"/>
-            <p:cNvSpPr/>
-            <p:nvPr/>
-          </p:nvSpPr>
-          <p:spPr>
-            <a:xfrm>
-              <a:off x="6465727" y="4662037"/>
-              <a:ext cx="494590" cy="294653"/>
-            </a:xfrm>
-            <a:custGeom>
-              <a:avLst/>
-              <a:gdLst>
-                <a:gd name="connsiteX0" fmla="*/ 0 w 393834"/>
-                <a:gd name="connsiteY0" fmla="*/ 0 h 342900"/>
-                <a:gd name="connsiteX1" fmla="*/ 298450 w 393834"/>
-                <a:gd name="connsiteY1" fmla="*/ 82550 h 342900"/>
-                <a:gd name="connsiteX2" fmla="*/ 374650 w 393834"/>
-                <a:gd name="connsiteY2" fmla="*/ 158750 h 342900"/>
-                <a:gd name="connsiteX3" fmla="*/ 393700 w 393834"/>
-                <a:gd name="connsiteY3" fmla="*/ 228600 h 342900"/>
-                <a:gd name="connsiteX4" fmla="*/ 381000 w 393834"/>
-                <a:gd name="connsiteY4" fmla="*/ 285750 h 342900"/>
-                <a:gd name="connsiteX5" fmla="*/ 342900 w 393834"/>
-                <a:gd name="connsiteY5" fmla="*/ 342900 h 342900"/>
-              </a:gdLst>
-              <a:ahLst/>
-              <a:cxnLst>
-                <a:cxn ang="0">
-                  <a:pos x="connsiteX0" y="connsiteY0"/>
-                </a:cxn>
-                <a:cxn ang="0">
-                  <a:pos x="connsiteX1" y="connsiteY1"/>
-                </a:cxn>
-                <a:cxn ang="0">
-                  <a:pos x="connsiteX2" y="connsiteY2"/>
-                </a:cxn>
-                <a:cxn ang="0">
-                  <a:pos x="connsiteX3" y="connsiteY3"/>
-                </a:cxn>
-                <a:cxn ang="0">
-                  <a:pos x="connsiteX4" y="connsiteY4"/>
-                </a:cxn>
-                <a:cxn ang="0">
-                  <a:pos x="connsiteX5" y="connsiteY5"/>
-                </a:cxn>
-              </a:cxnLst>
-              <a:rect l="l" t="t" r="r" b="b"/>
-              <a:pathLst>
-                <a:path w="393834" h="342900">
-                  <a:moveTo>
-                    <a:pt x="0" y="0"/>
-                  </a:moveTo>
-                  <a:cubicBezTo>
-                    <a:pt x="118004" y="28046"/>
-                    <a:pt x="236008" y="56092"/>
-                    <a:pt x="298450" y="82550"/>
-                  </a:cubicBezTo>
-                  <a:cubicBezTo>
-                    <a:pt x="360892" y="109008"/>
-                    <a:pt x="358775" y="134408"/>
-                    <a:pt x="374650" y="158750"/>
-                  </a:cubicBezTo>
-                  <a:cubicBezTo>
-                    <a:pt x="390525" y="183092"/>
-                    <a:pt x="392642" y="207433"/>
-                    <a:pt x="393700" y="228600"/>
-                  </a:cubicBezTo>
-                  <a:cubicBezTo>
-                    <a:pt x="394758" y="249767"/>
-                    <a:pt x="389467" y="266700"/>
-                    <a:pt x="381000" y="285750"/>
-                  </a:cubicBezTo>
-                  <a:cubicBezTo>
-                    <a:pt x="372533" y="304800"/>
-                    <a:pt x="357716" y="323850"/>
-                    <a:pt x="342900" y="342900"/>
-                  </a:cubicBezTo>
-                </a:path>
-              </a:pathLst>
-            </a:custGeom>
-            <a:noFill/>
-            <a:ln>
-              <a:solidFill>
-                <a:schemeClr val="tx1"/>
-              </a:solidFill>
-              <a:tailEnd type="triangle"/>
-            </a:ln>
-          </p:spPr>
-          <p:style>
-            <a:lnRef idx="2">
-              <a:schemeClr val="accent1">
-                <a:shade val="50000"/>
-              </a:schemeClr>
-            </a:lnRef>
-            <a:fillRef idx="1">
-              <a:schemeClr val="accent1"/>
-            </a:fillRef>
-            <a:effectRef idx="0">
-              <a:schemeClr val="accent1"/>
-            </a:effectRef>
-            <a:fontRef idx="minor">
-              <a:schemeClr val="lt1"/>
-            </a:fontRef>
-          </p:style>
-          <p:txBody>
-            <a:bodyPr rtlCol="0" anchor="ctr"/>
-            <a:lstStyle/>
-            <a:p>
-              <a:pPr algn="ctr"/>
-              <a:endParaRPr lang="en-US"/>
-            </a:p>
-          </p:txBody>
-        </p:sp>
-        <p:sp>
-          <p:nvSpPr>
-            <p:cNvPr id="17" name="手繪多邊形 16"/>
-            <p:cNvSpPr/>
-            <p:nvPr/>
-          </p:nvSpPr>
-          <p:spPr>
-            <a:xfrm>
-              <a:off x="6475887" y="4608698"/>
-              <a:ext cx="609538" cy="552235"/>
-            </a:xfrm>
-            <a:custGeom>
-              <a:avLst/>
-              <a:gdLst>
-                <a:gd name="connsiteX0" fmla="*/ 0 w 585787"/>
-                <a:gd name="connsiteY0" fmla="*/ 0 h 552235"/>
-                <a:gd name="connsiteX1" fmla="*/ 304800 w 585787"/>
-                <a:gd name="connsiteY1" fmla="*/ 45720 h 552235"/>
-                <a:gd name="connsiteX2" fmla="*/ 556260 w 585787"/>
-                <a:gd name="connsiteY2" fmla="*/ 167640 h 552235"/>
-                <a:gd name="connsiteX3" fmla="*/ 571500 w 585787"/>
-                <a:gd name="connsiteY3" fmla="*/ 365760 h 552235"/>
-                <a:gd name="connsiteX4" fmla="*/ 472440 w 585787"/>
-                <a:gd name="connsiteY4" fmla="*/ 533400 h 552235"/>
-                <a:gd name="connsiteX5" fmla="*/ 434340 w 585787"/>
-                <a:gd name="connsiteY5" fmla="*/ 541020 h 552235"/>
-              </a:gdLst>
-              <a:ahLst/>
-              <a:cxnLst>
-                <a:cxn ang="0">
-                  <a:pos x="connsiteX0" y="connsiteY0"/>
-                </a:cxn>
-                <a:cxn ang="0">
-                  <a:pos x="connsiteX1" y="connsiteY1"/>
-                </a:cxn>
-                <a:cxn ang="0">
-                  <a:pos x="connsiteX2" y="connsiteY2"/>
-                </a:cxn>
-                <a:cxn ang="0">
-                  <a:pos x="connsiteX3" y="connsiteY3"/>
-                </a:cxn>
-                <a:cxn ang="0">
-                  <a:pos x="connsiteX4" y="connsiteY4"/>
-                </a:cxn>
-                <a:cxn ang="0">
-                  <a:pos x="connsiteX5" y="connsiteY5"/>
-                </a:cxn>
-              </a:cxnLst>
-              <a:rect l="l" t="t" r="r" b="b"/>
-              <a:pathLst>
-                <a:path w="585787" h="552235">
-                  <a:moveTo>
-                    <a:pt x="0" y="0"/>
-                  </a:moveTo>
-                  <a:cubicBezTo>
-                    <a:pt x="106045" y="8890"/>
-                    <a:pt x="212090" y="17780"/>
-                    <a:pt x="304800" y="45720"/>
-                  </a:cubicBezTo>
-                  <a:cubicBezTo>
-                    <a:pt x="397510" y="73660"/>
-                    <a:pt x="511810" y="114300"/>
-                    <a:pt x="556260" y="167640"/>
-                  </a:cubicBezTo>
-                  <a:cubicBezTo>
-                    <a:pt x="600710" y="220980"/>
-                    <a:pt x="585470" y="304800"/>
-                    <a:pt x="571500" y="365760"/>
-                  </a:cubicBezTo>
-                  <a:cubicBezTo>
-                    <a:pt x="557530" y="426720"/>
-                    <a:pt x="495300" y="504190"/>
-                    <a:pt x="472440" y="533400"/>
-                  </a:cubicBezTo>
-                  <a:cubicBezTo>
-                    <a:pt x="449580" y="562610"/>
-                    <a:pt x="441960" y="551815"/>
-                    <a:pt x="434340" y="541020"/>
-                  </a:cubicBezTo>
-                </a:path>
-              </a:pathLst>
-            </a:custGeom>
-            <a:noFill/>
-            <a:ln>
-              <a:solidFill>
-                <a:schemeClr val="tx1"/>
-              </a:solidFill>
-              <a:tailEnd type="triangle"/>
-            </a:ln>
-          </p:spPr>
-          <p:style>
-            <a:lnRef idx="2">
-              <a:schemeClr val="accent1">
-                <a:shade val="50000"/>
-              </a:schemeClr>
-            </a:lnRef>
-            <a:fillRef idx="1">
-              <a:schemeClr val="accent1"/>
-            </a:fillRef>
-            <a:effectRef idx="0">
-              <a:schemeClr val="accent1"/>
-            </a:effectRef>
-            <a:fontRef idx="minor">
-              <a:schemeClr val="lt1"/>
-            </a:fontRef>
-          </p:style>
-          <p:txBody>
-            <a:bodyPr rtlCol="0" anchor="ctr"/>
-            <a:lstStyle/>
-            <a:p>
-              <a:pPr algn="ctr"/>
-              <a:endParaRPr lang="en-US"/>
-            </a:p>
-          </p:txBody>
-        </p:sp>
+      </p:grpSp>
+      <p:grpSp>
+        <p:nvGrpSpPr>
+          <p:cNvPr id="12" name="群組 11"/>
+          <p:cNvGrpSpPr/>
+          <p:nvPr/>
+        </p:nvGrpSpPr>
+        <p:grpSpPr>
+          <a:xfrm>
+            <a:off x="6491862" y="5129004"/>
+            <a:ext cx="385879" cy="31172"/>
+            <a:chOff x="6075218" y="2826240"/>
+            <a:chExt cx="385879" cy="31172"/>
+          </a:xfrm>
+        </p:grpSpPr>
         <p:cxnSp>
           <p:nvCxnSpPr>
-            <p:cNvPr id="20" name="直線單箭頭接點 19"/>
+            <p:cNvPr id="13" name="直線接點 12"/>
             <p:cNvCxnSpPr/>
             <p:nvPr/>
           </p:nvCxnSpPr>
           <p:spPr>
-            <a:xfrm flipH="1">
-              <a:off x="2865024" y="4757247"/>
-              <a:ext cx="245853" cy="0"/>
+            <a:xfrm>
+              <a:off x="6075218" y="2826240"/>
+              <a:ext cx="385879" cy="0"/>
             </a:xfrm>
-            <a:prstGeom prst="straightConnector1">
+            <a:prstGeom prst="line">
               <a:avLst/>
             </a:prstGeom>
             <a:ln>
-              <a:solidFill>
-                <a:schemeClr val="tx1"/>
-              </a:solidFill>
-              <a:headEnd type="triangle"/>
-              <a:tailEnd type="triangle"/>
+              <a:prstDash val="lgDashDot"/>
             </a:ln>
           </p:spPr>
           <p:style>
@@ -15989,37 +15823,443 @@
             </a:fontRef>
           </p:style>
         </p:cxnSp>
-        <p:sp>
-          <p:nvSpPr>
-            <p:cNvPr id="21" name="文字方塊 20"/>
-            <p:cNvSpPr txBox="1"/>
+        <p:cxnSp>
+          <p:nvCxnSpPr>
+            <p:cNvPr id="14" name="直線接點 13"/>
+            <p:cNvCxnSpPr/>
             <p:nvPr/>
-          </p:nvSpPr>
+          </p:nvCxnSpPr>
           <p:spPr>
             <a:xfrm>
-              <a:off x="2790191" y="4435783"/>
-              <a:ext cx="795647" cy="307777"/>
+              <a:off x="6075218" y="2857412"/>
+              <a:ext cx="385879" cy="0"/>
             </a:xfrm>
-            <a:prstGeom prst="rect">
+            <a:prstGeom prst="line">
               <a:avLst/>
             </a:prstGeom>
-            <a:noFill/>
+            <a:ln>
+              <a:prstDash val="lgDashDot"/>
+            </a:ln>
           </p:spPr>
-          <p:txBody>
-            <a:bodyPr wrap="square" rtlCol="0">
-              <a:spAutoFit/>
-            </a:bodyPr>
-            <a:lstStyle/>
-            <a:p>
-              <a:r>
-                <a:rPr lang="en-US" altLang="zh-TW" sz="1400" b="1" dirty="0" smtClean="0"/>
-                <a:t>367 um</a:t>
-              </a:r>
-              <a:endParaRPr lang="en-US" sz="1400" b="1" dirty="0"/>
-            </a:p>
-          </p:txBody>
-        </p:sp>
+          <p:style>
+            <a:lnRef idx="1">
+              <a:schemeClr val="accent1"/>
+            </a:lnRef>
+            <a:fillRef idx="0">
+              <a:schemeClr val="accent1"/>
+            </a:fillRef>
+            <a:effectRef idx="0">
+              <a:schemeClr val="accent1"/>
+            </a:effectRef>
+            <a:fontRef idx="minor">
+              <a:schemeClr val="tx1"/>
+            </a:fontRef>
+          </p:style>
+        </p:cxnSp>
       </p:grpSp>
+      <p:sp>
+        <p:nvSpPr>
+          <p:cNvPr id="16" name="手繪多邊形 15"/>
+          <p:cNvSpPr/>
+          <p:nvPr/>
+        </p:nvSpPr>
+        <p:spPr>
+          <a:xfrm>
+            <a:off x="6465727" y="4662037"/>
+            <a:ext cx="494590" cy="294653"/>
+          </a:xfrm>
+          <a:custGeom>
+            <a:avLst/>
+            <a:gdLst>
+              <a:gd name="connsiteX0" fmla="*/ 0 w 393834"/>
+              <a:gd name="connsiteY0" fmla="*/ 0 h 342900"/>
+              <a:gd name="connsiteX1" fmla="*/ 298450 w 393834"/>
+              <a:gd name="connsiteY1" fmla="*/ 82550 h 342900"/>
+              <a:gd name="connsiteX2" fmla="*/ 374650 w 393834"/>
+              <a:gd name="connsiteY2" fmla="*/ 158750 h 342900"/>
+              <a:gd name="connsiteX3" fmla="*/ 393700 w 393834"/>
+              <a:gd name="connsiteY3" fmla="*/ 228600 h 342900"/>
+              <a:gd name="connsiteX4" fmla="*/ 381000 w 393834"/>
+              <a:gd name="connsiteY4" fmla="*/ 285750 h 342900"/>
+              <a:gd name="connsiteX5" fmla="*/ 342900 w 393834"/>
+              <a:gd name="connsiteY5" fmla="*/ 342900 h 342900"/>
+            </a:gdLst>
+            <a:ahLst/>
+            <a:cxnLst>
+              <a:cxn ang="0">
+                <a:pos x="connsiteX0" y="connsiteY0"/>
+              </a:cxn>
+              <a:cxn ang="0">
+                <a:pos x="connsiteX1" y="connsiteY1"/>
+              </a:cxn>
+              <a:cxn ang="0">
+                <a:pos x="connsiteX2" y="connsiteY2"/>
+              </a:cxn>
+              <a:cxn ang="0">
+                <a:pos x="connsiteX3" y="connsiteY3"/>
+              </a:cxn>
+              <a:cxn ang="0">
+                <a:pos x="connsiteX4" y="connsiteY4"/>
+              </a:cxn>
+              <a:cxn ang="0">
+                <a:pos x="connsiteX5" y="connsiteY5"/>
+              </a:cxn>
+            </a:cxnLst>
+            <a:rect l="l" t="t" r="r" b="b"/>
+            <a:pathLst>
+              <a:path w="393834" h="342900">
+                <a:moveTo>
+                  <a:pt x="0" y="0"/>
+                </a:moveTo>
+                <a:cubicBezTo>
+                  <a:pt x="118004" y="28046"/>
+                  <a:pt x="236008" y="56092"/>
+                  <a:pt x="298450" y="82550"/>
+                </a:cubicBezTo>
+                <a:cubicBezTo>
+                  <a:pt x="360892" y="109008"/>
+                  <a:pt x="358775" y="134408"/>
+                  <a:pt x="374650" y="158750"/>
+                </a:cubicBezTo>
+                <a:cubicBezTo>
+                  <a:pt x="390525" y="183092"/>
+                  <a:pt x="392642" y="207433"/>
+                  <a:pt x="393700" y="228600"/>
+                </a:cubicBezTo>
+                <a:cubicBezTo>
+                  <a:pt x="394758" y="249767"/>
+                  <a:pt x="389467" y="266700"/>
+                  <a:pt x="381000" y="285750"/>
+                </a:cubicBezTo>
+                <a:cubicBezTo>
+                  <a:pt x="372533" y="304800"/>
+                  <a:pt x="357716" y="323850"/>
+                  <a:pt x="342900" y="342900"/>
+                </a:cubicBezTo>
+              </a:path>
+            </a:pathLst>
+          </a:custGeom>
+          <a:noFill/>
+          <a:ln>
+            <a:solidFill>
+              <a:schemeClr val="tx1"/>
+            </a:solidFill>
+            <a:tailEnd type="triangle"/>
+          </a:ln>
+        </p:spPr>
+        <p:style>
+          <a:lnRef idx="2">
+            <a:schemeClr val="accent1">
+              <a:shade val="50000"/>
+            </a:schemeClr>
+          </a:lnRef>
+          <a:fillRef idx="1">
+            <a:schemeClr val="accent1"/>
+          </a:fillRef>
+          <a:effectRef idx="0">
+            <a:schemeClr val="accent1"/>
+          </a:effectRef>
+          <a:fontRef idx="minor">
+            <a:schemeClr val="lt1"/>
+          </a:fontRef>
+        </p:style>
+        <p:txBody>
+          <a:bodyPr rtlCol="0" anchor="ctr"/>
+          <a:lstStyle/>
+          <a:p>
+            <a:pPr algn="ctr"/>
+            <a:endParaRPr lang="en-US"/>
+          </a:p>
+        </p:txBody>
+      </p:sp>
+      <p:sp>
+        <p:nvSpPr>
+          <p:cNvPr id="17" name="手繪多邊形 16"/>
+          <p:cNvSpPr/>
+          <p:nvPr/>
+        </p:nvSpPr>
+        <p:spPr>
+          <a:xfrm>
+            <a:off x="6475887" y="4608698"/>
+            <a:ext cx="609538" cy="552235"/>
+          </a:xfrm>
+          <a:custGeom>
+            <a:avLst/>
+            <a:gdLst>
+              <a:gd name="connsiteX0" fmla="*/ 0 w 585787"/>
+              <a:gd name="connsiteY0" fmla="*/ 0 h 552235"/>
+              <a:gd name="connsiteX1" fmla="*/ 304800 w 585787"/>
+              <a:gd name="connsiteY1" fmla="*/ 45720 h 552235"/>
+              <a:gd name="connsiteX2" fmla="*/ 556260 w 585787"/>
+              <a:gd name="connsiteY2" fmla="*/ 167640 h 552235"/>
+              <a:gd name="connsiteX3" fmla="*/ 571500 w 585787"/>
+              <a:gd name="connsiteY3" fmla="*/ 365760 h 552235"/>
+              <a:gd name="connsiteX4" fmla="*/ 472440 w 585787"/>
+              <a:gd name="connsiteY4" fmla="*/ 533400 h 552235"/>
+              <a:gd name="connsiteX5" fmla="*/ 434340 w 585787"/>
+              <a:gd name="connsiteY5" fmla="*/ 541020 h 552235"/>
+            </a:gdLst>
+            <a:ahLst/>
+            <a:cxnLst>
+              <a:cxn ang="0">
+                <a:pos x="connsiteX0" y="connsiteY0"/>
+              </a:cxn>
+              <a:cxn ang="0">
+                <a:pos x="connsiteX1" y="connsiteY1"/>
+              </a:cxn>
+              <a:cxn ang="0">
+                <a:pos x="connsiteX2" y="connsiteY2"/>
+              </a:cxn>
+              <a:cxn ang="0">
+                <a:pos x="connsiteX3" y="connsiteY3"/>
+              </a:cxn>
+              <a:cxn ang="0">
+                <a:pos x="connsiteX4" y="connsiteY4"/>
+              </a:cxn>
+              <a:cxn ang="0">
+                <a:pos x="connsiteX5" y="connsiteY5"/>
+              </a:cxn>
+            </a:cxnLst>
+            <a:rect l="l" t="t" r="r" b="b"/>
+            <a:pathLst>
+              <a:path w="585787" h="552235">
+                <a:moveTo>
+                  <a:pt x="0" y="0"/>
+                </a:moveTo>
+                <a:cubicBezTo>
+                  <a:pt x="106045" y="8890"/>
+                  <a:pt x="212090" y="17780"/>
+                  <a:pt x="304800" y="45720"/>
+                </a:cubicBezTo>
+                <a:cubicBezTo>
+                  <a:pt x="397510" y="73660"/>
+                  <a:pt x="511810" y="114300"/>
+                  <a:pt x="556260" y="167640"/>
+                </a:cubicBezTo>
+                <a:cubicBezTo>
+                  <a:pt x="600710" y="220980"/>
+                  <a:pt x="585470" y="304800"/>
+                  <a:pt x="571500" y="365760"/>
+                </a:cubicBezTo>
+                <a:cubicBezTo>
+                  <a:pt x="557530" y="426720"/>
+                  <a:pt x="495300" y="504190"/>
+                  <a:pt x="472440" y="533400"/>
+                </a:cubicBezTo>
+                <a:cubicBezTo>
+                  <a:pt x="449580" y="562610"/>
+                  <a:pt x="441960" y="551815"/>
+                  <a:pt x="434340" y="541020"/>
+                </a:cubicBezTo>
+              </a:path>
+            </a:pathLst>
+          </a:custGeom>
+          <a:noFill/>
+          <a:ln>
+            <a:solidFill>
+              <a:schemeClr val="tx1"/>
+            </a:solidFill>
+            <a:tailEnd type="triangle"/>
+          </a:ln>
+        </p:spPr>
+        <p:style>
+          <a:lnRef idx="2">
+            <a:schemeClr val="accent1">
+              <a:shade val="50000"/>
+            </a:schemeClr>
+          </a:lnRef>
+          <a:fillRef idx="1">
+            <a:schemeClr val="accent1"/>
+          </a:fillRef>
+          <a:effectRef idx="0">
+            <a:schemeClr val="accent1"/>
+          </a:effectRef>
+          <a:fontRef idx="minor">
+            <a:schemeClr val="lt1"/>
+          </a:fontRef>
+        </p:style>
+        <p:txBody>
+          <a:bodyPr rtlCol="0" anchor="ctr"/>
+          <a:lstStyle/>
+          <a:p>
+            <a:pPr algn="ctr"/>
+            <a:endParaRPr lang="en-US"/>
+          </a:p>
+        </p:txBody>
+      </p:sp>
+      <p:cxnSp>
+        <p:nvCxnSpPr>
+          <p:cNvPr id="20" name="直線單箭頭接點 19"/>
+          <p:cNvCxnSpPr/>
+          <p:nvPr/>
+        </p:nvCxnSpPr>
+        <p:spPr>
+          <a:xfrm flipH="1">
+            <a:off x="2865024" y="4757247"/>
+            <a:ext cx="245853" cy="0"/>
+          </a:xfrm>
+          <a:prstGeom prst="straightConnector1">
+            <a:avLst/>
+          </a:prstGeom>
+          <a:ln>
+            <a:solidFill>
+              <a:schemeClr val="tx1"/>
+            </a:solidFill>
+            <a:headEnd type="triangle"/>
+            <a:tailEnd type="triangle"/>
+          </a:ln>
+        </p:spPr>
+        <p:style>
+          <a:lnRef idx="1">
+            <a:schemeClr val="accent1"/>
+          </a:lnRef>
+          <a:fillRef idx="0">
+            <a:schemeClr val="accent1"/>
+          </a:fillRef>
+          <a:effectRef idx="0">
+            <a:schemeClr val="accent1"/>
+          </a:effectRef>
+          <a:fontRef idx="minor">
+            <a:schemeClr val="tx1"/>
+          </a:fontRef>
+        </p:style>
+      </p:cxnSp>
+      <p:sp>
+        <p:nvSpPr>
+          <p:cNvPr id="23" name="文字方塊 22"/>
+          <p:cNvSpPr txBox="1"/>
+          <p:nvPr/>
+        </p:nvSpPr>
+        <p:spPr>
+          <a:xfrm>
+            <a:off x="4618598" y="4341461"/>
+            <a:ext cx="641907" cy="369332"/>
+          </a:xfrm>
+          <a:prstGeom prst="rect">
+            <a:avLst/>
+          </a:prstGeom>
+          <a:noFill/>
+        </p:spPr>
+        <p:txBody>
+          <a:bodyPr wrap="none" rtlCol="0">
+            <a:spAutoFit/>
+          </a:bodyPr>
+          <a:lstStyle/>
+          <a:p>
+            <a:r>
+              <a:rPr lang="en-US" dirty="0" smtClean="0"/>
+              <a:t>W</a:t>
+            </a:r>
+            <a:r>
+              <a:rPr lang="en-US" baseline="-25000" dirty="0" smtClean="0"/>
+              <a:t>PKG</a:t>
+            </a:r>
+            <a:endParaRPr lang="en-US" baseline="-25000" dirty="0"/>
+          </a:p>
+        </p:txBody>
+      </p:sp>
+      <p:sp>
+        <p:nvSpPr>
+          <p:cNvPr id="24" name="文字方塊 23"/>
+          <p:cNvSpPr txBox="1"/>
+          <p:nvPr/>
+        </p:nvSpPr>
+        <p:spPr>
+          <a:xfrm>
+            <a:off x="2700687" y="4341461"/>
+            <a:ext cx="641907" cy="369332"/>
+          </a:xfrm>
+          <a:prstGeom prst="rect">
+            <a:avLst/>
+          </a:prstGeom>
+          <a:noFill/>
+        </p:spPr>
+        <p:txBody>
+          <a:bodyPr wrap="none" rtlCol="0">
+            <a:spAutoFit/>
+          </a:bodyPr>
+          <a:lstStyle/>
+          <a:p>
+            <a:r>
+              <a:rPr lang="en-US" dirty="0" smtClean="0"/>
+              <a:t>W</a:t>
+            </a:r>
+            <a:r>
+              <a:rPr lang="en-US" baseline="-25000" dirty="0" smtClean="0"/>
+              <a:t>PKG</a:t>
+            </a:r>
+            <a:endParaRPr lang="en-US" baseline="-25000" dirty="0"/>
+          </a:p>
+        </p:txBody>
+      </p:sp>
+      <p:sp>
+        <p:nvSpPr>
+          <p:cNvPr id="25" name="文字方塊 24"/>
+          <p:cNvSpPr txBox="1"/>
+          <p:nvPr/>
+        </p:nvSpPr>
+        <p:spPr>
+          <a:xfrm>
+            <a:off x="5933076" y="4390896"/>
+            <a:ext cx="548933" cy="369332"/>
+          </a:xfrm>
+          <a:prstGeom prst="rect">
+            <a:avLst/>
+          </a:prstGeom>
+          <a:noFill/>
+        </p:spPr>
+        <p:txBody>
+          <a:bodyPr wrap="none" rtlCol="0">
+            <a:spAutoFit/>
+          </a:bodyPr>
+          <a:lstStyle/>
+          <a:p>
+            <a:r>
+              <a:rPr lang="en-US" dirty="0" smtClean="0"/>
+              <a:t>T</a:t>
+            </a:r>
+            <a:r>
+              <a:rPr lang="en-US" baseline="-25000" dirty="0" smtClean="0"/>
+              <a:t>PKG</a:t>
+            </a:r>
+            <a:endParaRPr lang="en-US" baseline="-25000" dirty="0"/>
+          </a:p>
+        </p:txBody>
+      </p:sp>
+      <p:sp>
+        <p:nvSpPr>
+          <p:cNvPr id="26" name="文字方塊 25"/>
+          <p:cNvSpPr txBox="1"/>
+          <p:nvPr/>
+        </p:nvSpPr>
+        <p:spPr>
+          <a:xfrm>
+            <a:off x="5327912" y="4812450"/>
+            <a:ext cx="580993" cy="369332"/>
+          </a:xfrm>
+          <a:prstGeom prst="rect">
+            <a:avLst/>
+          </a:prstGeom>
+          <a:noFill/>
+        </p:spPr>
+        <p:txBody>
+          <a:bodyPr wrap="none" rtlCol="0">
+            <a:spAutoFit/>
+          </a:bodyPr>
+          <a:lstStyle/>
+          <a:p>
+            <a:r>
+              <a:rPr lang="en-US" dirty="0"/>
+              <a:t>H</a:t>
+            </a:r>
+            <a:r>
+              <a:rPr lang="en-US" baseline="-25000" dirty="0" smtClean="0"/>
+              <a:t>PKG</a:t>
+            </a:r>
+            <a:endParaRPr lang="en-US" baseline="-25000" dirty="0"/>
+          </a:p>
+        </p:txBody>
+      </p:sp>
     </p:spTree>
     <p:extLst>
       <p:ext uri="{BB962C8B-B14F-4D97-AF65-F5344CB8AC3E}">

</xml_diff>